<commit_message>
fixes after 29.9.2022 lecture
</commit_message>
<xml_diff>
--- a/lectures/02_EPL/02_VerticallyScalableSolution_Esper+EPL.pptx
+++ b/lectures/02_EPL/02_VerticallyScalableSolution_Esper+EPL.pptx
@@ -8838,16 +8838,44 @@
           </p:cNvPicPr>
           <p:nvPr/>
         </p:nvPicPr>
-        <p:blipFill>
+        <p:blipFill rotWithShape="1">
           <a:blip r:embed="rId3"/>
-          <a:stretch>
-            <a:fillRect/>
-          </a:stretch>
+          <a:srcRect r="79198"/>
+          <a:stretch/>
         </p:blipFill>
         <p:spPr>
           <a:xfrm>
             <a:off x="415491" y="1181409"/>
-            <a:ext cx="9379817" cy="6426911"/>
+            <a:ext cx="1951191" cy="6426911"/>
+          </a:xfrm>
+          <a:prstGeom prst="rect">
+            <a:avLst/>
+          </a:prstGeom>
+        </p:spPr>
+      </p:pic>
+      <p:pic>
+        <p:nvPicPr>
+          <p:cNvPr id="16" name="Picture 15">
+            <a:extLst>
+              <a:ext uri="{FF2B5EF4-FFF2-40B4-BE49-F238E27FC236}">
+                <a16:creationId xmlns:a16="http://schemas.microsoft.com/office/drawing/2014/main" id="{1D0FD71F-8172-9C99-BC5A-723644512CE9}"/>
+              </a:ext>
+            </a:extLst>
+          </p:cNvPr>
+          <p:cNvPicPr>
+            <a:picLocks noChangeAspect="1"/>
+          </p:cNvPicPr>
+          <p:nvPr/>
+        </p:nvPicPr>
+        <p:blipFill rotWithShape="1">
+          <a:blip r:embed="rId4"/>
+          <a:srcRect l="9722"/>
+          <a:stretch/>
+        </p:blipFill>
+        <p:spPr>
+          <a:xfrm>
+            <a:off x="2250140" y="1240369"/>
+            <a:ext cx="8875059" cy="6735942"/>
           </a:xfrm>
           <a:prstGeom prst="rect">
             <a:avLst/>

</xml_diff>

<commit_message>
status after assessment in august 2023
</commit_message>
<xml_diff>
--- a/lectures/02_EPL/02_VerticallyScalableSolution_Esper+EPL.pptx
+++ b/lectures/02_EPL/02_VerticallyScalableSolution_Esper+EPL.pptx
@@ -182,6 +182,282 @@
           <inkml:channelProperty channel="F" name="resolution" value="0" units="1/dev"/>
         </inkml:channelProperties>
       </inkml:inkSource>
+      <inkml:timestamp xml:id="ts0" timeString="2023-07-04T10:24:45.040"/>
+    </inkml:context>
+    <inkml:brush xml:id="br0">
+      <inkml:brushProperty name="width" value="0.05292" units="cm"/>
+      <inkml:brushProperty name="height" value="0.05292" units="cm"/>
+      <inkml:brushProperty name="color" value="#FF0000"/>
+    </inkml:brush>
+  </inkml:definitions>
+  <inkml:trace contextRef="#ctx0" brushRef="#br0">5273 12412 24575,'40'-1'0,"0"0"0,2 0 0,3 1 0,4-1 0,-8 1 0,1 0 0,3 0 0,2 0 0,0 0-469,-5 0 1,1 0 0,0 0 0,2 0 0,1 0 0,0 0 0,0 0 58,-1 0 0,1 0 1,0 0-1,1 0 1,0 0-1,0 0 0,1 0 1,0 0 44,-3 0 1,1 0 0,0 0 0,1 0 0,0 0 0,-1 0 0,1 0 0,0 0 0,0 0 145,0 0 1,1 0-1,-1 0 1,1 0 0,-1 0-1,1 0 1,-1 0 0,1 0-1,-1 0 219,-2 0 0,1 0 0,0 0 0,-1 0 0,1 0 0,-1 0 0,0 0 0,0 0 0,-1 0-38,2 0 0,0 0 1,0 0-1,-1 0 1,0 0-1,-1 0 1,1 0-1,-1 0 38,3 0 0,0 0 0,0 0 0,-1 0 0,0 0 0,0 0 0,-1 0-261,6 0 1,-1 0 0,-1 0 0,1 0 0,-1 0 0,-1 0 260,-1 0 0,0 0 0,-1 0 0,1 0 0,-1 0 0,0 0 0,0 0 0,0 1 0,0-1 0,-1 1 0,1 0 0,-1-1 139,-1 1 1,0 0-1,-1 0 1,0 0 0,1 0-1,-1 1-139,0-1 0,-1 1 0,1 0 0,-1 0 0,0 0 0,0 0 0,7 1 0,0 0 0,0 1 0,0-1 0,1 0 0,-9 0 0,1 0 0,-1 0 0,1-1 0,0 1 0,0 0 0,3 0 0,-1 0 0,1-1 0,0 1 0,0 0 0,0-1 152,3 1 0,0-1 0,0 0 0,1-1 0,0 1 0,1 0-152,-5-1 0,0 0 0,1 0 0,0 0 0,1-1 0,-1 1 0,0 0 0,1-1 0,0 1 0,-1-1 0,1 0 0,0 1 0,0-1 0,1 0-50,-5 0 1,1 0 0,0 0 0,0 0 0,1 0 0,-1 0 0,1 0 0,0 0 49,0 0 0,2 0 0,-1-1 0,0 1 0,1 0 0,-1-1 0,0 1 0,0 0 0,-2-1 0,1 0 0,-1 1 0,0-1 0,0 1 0,0-1 0,0 0 0,0 0-40,0 0 0,1 0 1,-1 0-1,1 0 1,-1 0-1,1 0 1,-2 0-1,0 0 40,3 0 0,-1 0 0,0-1 0,0 1 0,-1 0 0,-1 0 0,0 0 66,1 0 1,0 0-1,-1 0 1,-1 0-1,0 0 1,-1 0-67,3 1 0,-1-1 0,0 1 0,-2-1 0,-2 1 668,12 0 1,-3 0 0,-3 0-669,4 0 0,-4 0 1638,-10 0 0,-4 0-1366,7 1 3004,-18 0-2708,-9 2 1831,-6-1-2399,-3 0 424,-8-2-424,2 0 0,-3 0 0,4 0 0,2 0 0</inkml:trace>
+</inkml:ink>
+</file>
+
+<file path=ppt/ink/ink10.xml><?xml version="1.0" encoding="utf-8"?>
+<inkml:ink xmlns:inkml="http://www.w3.org/2003/InkML">
+  <inkml:definitions>
+    <inkml:context xml:id="ctx0">
+      <inkml:inkSource xml:id="inkSrc0">
+        <inkml:traceFormat>
+          <inkml:channel name="X" type="integer" min="-2.14748E9" max="2.14748E9" units="cm"/>
+          <inkml:channel name="Y" type="integer" min="-2.14748E9" max="2.14748E9" units="cm"/>
+          <inkml:channel name="F" type="integer" max="32767" units="dev"/>
+        </inkml:traceFormat>
+        <inkml:channelProperties>
+          <inkml:channelProperty channel="X" name="resolution" value="1000" units="1/cm"/>
+          <inkml:channelProperty channel="Y" name="resolution" value="1000" units="1/cm"/>
+          <inkml:channelProperty channel="F" name="resolution" value="0" units="1/dev"/>
+        </inkml:channelProperties>
+      </inkml:inkSource>
+      <inkml:timestamp xml:id="ts0" timeString="2023-07-05T07:55:28.866"/>
+    </inkml:context>
+    <inkml:brush xml:id="br0">
+      <inkml:brushProperty name="width" value="0.05292" units="cm"/>
+      <inkml:brushProperty name="height" value="0.05292" units="cm"/>
+      <inkml:brushProperty name="color" value="#FF0000"/>
+    </inkml:brush>
+  </inkml:definitions>
+  <inkml:trace contextRef="#ctx0" brushRef="#br0">14416 14758 24575,'10'20'0,"4"-2"0,4 3 0,10 11 0,4 2 0,-7-8 0,2 1 0,0 0 0,0 1 0,1 0 0,-1-1 0,-2-2 0,-1-1 0,0 0 0,7 8 0,-2-1 0,-3-3 0,-1-1 0,-2-3 0,-2-1 0,0 0 0,0 0 0,-1-1 0,0 0 0,-1 0 0,0-1 0,-1-1 0,-1 0 0,11 13 0,-5-8 0,-3-4 0,-1-1 0,0-1 0,0-1 0,-2-3 0,-5-2 0,-4-6 0,-5-2 0,-2-3 0</inkml:trace>
+  <inkml:trace contextRef="#ctx0" brushRef="#br0" timeOffset="1399">14335 15602 24575,'25'-8'0,"3"-7"0,14-11 0,-16 7 0,0 0 0,4-4 0,0 0 0,4-3 0,1-1 0,3-3 0,-1-1 0,-11 9 0,0 1 0,0-1 0,0 0 0,2-1 0,-2 1 0,13-11 0,-1 2 0,-3 3 0,-1 0 0,-3 3 0,-1 1 0,-5 3 0,-1 2 0,16-11 0,-10 8 0,-9 7 0,-6 5 0,-4 2 0,-1 4 0,-2 0 0,-1 3 0,-2-2 0,-1 0 0,2-4 0,1-4 0,2-1 0,2 1 0,0 3 0,0 4 0,-2 2 0,-1 1 0,-3 1 0,-4 0 0,-7 0 0,3 0 0,-4 0 0</inkml:trace>
+  <inkml:trace contextRef="#ctx0" brushRef="#br0" timeOffset="3182">21177 14646 24575,'37'27'0,"2"0"0,-16-11 0,1-1 0,1 2 0,-1-1 0,1 1 0,-1 0 0,0 0 0,1 0 0,-4-1 0,0-1 0,15 12 0,-7-3 0,-7-4 0,-3-1 0,-2-3 0,-2 1 0,-1-3 0,0 0 0,1 1 0,1 0 0,0 2 0,-1-2 0,-4-3 0,-2-3 0,-5-5 0,-2-2 0</inkml:trace>
+  <inkml:trace contextRef="#ctx0" brushRef="#br0" timeOffset="4333">21151 15200 24575,'28'-28'0,"8"-3"0,-16 14 0,2 1 0,-1-2 0,1 1 0,16-14 0,-7-3 0,1-1 0,-4 0 0,2 0 0,2 2 0,3-2 0,-14 17 0,0 1 0,1-1 0,1 1 0,-2 0 0,-1 2 0,14-10 0,-11 7 0,-8 7 0,-4 5 0,-6 2 0,-1 2 0,-4 1 0,0 0 0</inkml:trace>
+  <inkml:trace contextRef="#ctx0" brushRef="#br0" timeOffset="6281">14642 15176 24575,'43'0'0,"0"0"0,-4 0 0,1 0 0,4 0 0,-3 0 0,3 0 0,2 0 0,0 0-656,-3 0 1,2 0-1,0 0 1,0 0 0,1 0 168,2 0 1,1 0 0,0 0-1,0 0 1,0 0 486,-6 0 0,-1 0 0,2 0 0,-1 0 0,0 0 0,0 0 0,1 0 0,-1 0 0,1 0 0,-1 0 0,1 0 0,-1 0 0,-1 0 0,1 0 0,-1 0 0,1 0 0,-1 0 0,0 0 0,8 0 0,-1 0 0,1 0 0,-1 0 0,-1 0 0,-5 0 0,0 0 0,-1 0 0,0 0 0,0 0 0,7-1 0,0 1 0,-1-1 0,0 1-80,-3-2 1,0 0-1,-1 0 1,0 0 79,-1-1 0,1 0 0,-1-1 0,0 0 0,1-1 0,0 1 0,0-2 0,0 1 0,-2 0 0,0 0 0,0 0 0,0-1 0,-1 1 0,0 0 0,1 0 0,-1 1 0,0-1 0,-1 0 0,1 1 0,-1-1 0,1 1 0,0-1 0,-1 1 0,0 0 81,0 0 1,-1 0 0,-1 0 0,1 0-82,10-1 0,0 1 0,-1-1 0,0 0 0,-1 1 0,0 0 0,-2 1 0,0 0 0,0 0 0,-1 0 0,-1 0 0,1 0 0,0 1 0,1 1 0,0 0 0,-2 0 0,0 0 0,0 0 0,2 0 0,0-1 0,1-1 0,0 1 0,0-2 0,0 0 0,-1-1 0,1-1 0,0 0 0,0-1 0,1-1 0,-1 0 0,-1-1 0,1 1 0,-1-2 0,2 1 0,-1-1 0,1 1 0,-10 1 0,0 1 0,0-1 0,0 0 0,2 0 0,0-1 0,0 1 0,0-1 0,1 0 0,0 0 0,-1 0 0,0-1 0,-1 1 0,0 0 0,0 0 0,-1 0 0,8-3 0,0 1 0,-1 0-159,-3 0 1,0 2-1,-1-1 159,-3 1 0,-1 1 0,0-1 0,-2 1 0,-1 0 0,1 0 0,-1-1 0,0 0 0,0 0 0,15-5 0,-1 1 1219,-2 0 0,-1 0-1219,-1 0 0,-1 1 0,-2 1 0,-1 1 862,-3 1 0,-1 1-862,-4 1 0,-1 1 1236,15 0-1236,-11 5 655,-5 1-655,-2 0 123,3 0-123,6 0 0,2 0 0,1 1 0,-4 0 0,-6 2 0,-8 0 0,-7-2 0,-2 0 0,-4-1 0,-2 0 0,-2 0 0,-2 0 0,-1 0 0</inkml:trace>
+</inkml:ink>
+</file>
+
+<file path=ppt/ink/ink11.xml><?xml version="1.0" encoding="utf-8"?>
+<inkml:ink xmlns:inkml="http://www.w3.org/2003/InkML">
+  <inkml:definitions>
+    <inkml:context xml:id="ctx0">
+      <inkml:inkSource xml:id="inkSrc0">
+        <inkml:traceFormat>
+          <inkml:channel name="X" type="integer" min="-2.14748E9" max="2.14748E9" units="cm"/>
+          <inkml:channel name="Y" type="integer" min="-2.14748E9" max="2.14748E9" units="cm"/>
+          <inkml:channel name="F" type="integer" max="32767" units="dev"/>
+        </inkml:traceFormat>
+        <inkml:channelProperties>
+          <inkml:channelProperty channel="X" name="resolution" value="1000" units="1/cm"/>
+          <inkml:channelProperty channel="Y" name="resolution" value="1000" units="1/cm"/>
+          <inkml:channelProperty channel="F" name="resolution" value="0" units="1/dev"/>
+        </inkml:channelProperties>
+      </inkml:inkSource>
+      <inkml:timestamp xml:id="ts0" timeString="2023-07-04T10:40:54.585"/>
+    </inkml:context>
+    <inkml:brush xml:id="br0">
+      <inkml:brushProperty name="width" value="0.05292" units="cm"/>
+      <inkml:brushProperty name="height" value="0.05292" units="cm"/>
+      <inkml:brushProperty name="color" value="#FF0000"/>
+    </inkml:brush>
+  </inkml:definitions>
+  <inkml:trace contextRef="#ctx0" brushRef="#br0">4091 7429 24575,'-2'-4'0,"1"9"0,0 19 0,0 5 0,2 5 0,-1 1 0,0 3 0,0 2-646,0-2 0,0 2 0,0 1 0,0 0 646,0 5 0,0 1 0,0 1 0,0-1 0,0 2 0,0 1 0,0-1 0,0 0 0,0-2 0,0 0 0,0 0 0,0-2 0,0-2 0,0-1 0,0 0 0,0-1-63,0 8 1,0 0-1,0-1 63,0-6 0,0-1 0,0 0 0,0-4 0,0 0 0,0-1-19,0 14 1,0-1 18,0-5 0,0-2 0,0-5 0,0-1 0,-1-6 0,0-1 940,0-2 1,1 1-941,-2 3 0,0 0 442,1 5 1,-1 2-443,0 6 0,0 1 0,0 2 0,0 2 0,1-16 0,0 1 0,-1 0 0,1 0 0,-1 0 0,0-1 0,-1 16 0,1-2 0,-1-2 0,1-2 21,0-5 1,0-1-22,0-3 0,0-1 0,0 0 0,-1-1 0,1 0 0,-1-1 0,0 0 0,1-1 0,-1-4 0,1-1 0,-1 14 0,2-13 0,1-12 0,0-7 0,0-4 0</inkml:trace>
+  <inkml:trace contextRef="#ctx0" brushRef="#br0" timeOffset="2479">4027 11784 24575,'0'33'0,"0"-9"0,0 4 0,0 12 0,0 4 0,0-10 0,0 2 0,0 0-361,0 2 0,0 0 0,0 0 361,0 0 0,0 1 0,0-1 0,0-3 0,0 1 0,0-1 0,0 0 0,0 0 0,0-1 0,0 1 0,0-1 0,0 0 0,0 0 0,0 1 0,0-1 0,0 3 0,0 1 0,0 0 0,0 2 0,0 1 0,0 0 0,0 2 0,0 1 0,0-1 0,0 2 0,0 0 0,0-1 0,0-3 0,0-1 0,0 0 0,0-3 0,0 0 0,0-1 0,0 15 0,0-3 0,0-2 0,0 0 136,0-2 0,0 1-136,0-2 0,0-1 0,0 0 0,0-1 99,0-1 1,0 0-100,0 0 0,0 0 0,0-1 0,0-1 0,0 0 0,0-1 273,-1-1 1,-1-1-274,0-4 0,0-1 32,1-3 1,-1-1-33,-1 17 0,3-5 0,0 2 0,-1 2 0,-1 2 0,0 0 0,1-1 0,0-5 0,-2 5 0,0-15 0,1 2 0,0-18 0,2-1 0,0-3 0,0-1 0,0-1 0,0 1 0,0 6 0,0 3 0,-1 2 0,0-1 0,0-11 0,0-4 0,1-8 0</inkml:trace>
+  <inkml:trace contextRef="#ctx0" brushRef="#br0" timeOffset="19265">11773 8025 24575,'47'0'0,"1"0"0,-10 0 0,1 0 0,2 0 0,0 0 0,2 0 0,2 0 0,1 0-656,-7 0 1,1 0-1,1 0 1,0 0 0,0 0 333,3 0 1,1 0 0,1 0 0,0 0 0,-1 0 321,2 0 0,-1 0 0,1 0 0,-1 0 0,0 0 0,-3 0 0,0 0 0,-1 0 0,0 0 0,0 0 0,0 0 0,0 0 0,0 0 0,-1 0 0,-1 0 50,5 0 0,-1 0 1,-2 0-1,0 0-50,6 0 0,-1 0 0,-2 0 353,-9 0 0,-1 0 0,-2 0-353,6 0 0,-2 0 0,-10 0 0,-2 0 0,5 0 2459,-14 0-2459,-8 0 0,-5 0 0,-1 0 0</inkml:trace>
+  <inkml:trace contextRef="#ctx0" brushRef="#br0" timeOffset="43884">11271 9749 24575,'20'0'0,"13"0"0,-9 0 0,2 0 0,7 0 0,2 0 0,3 0 0,1 0 0,1 0 0,0 0 0,-1 0 0,1 0 0,-1 0 0,-1 0 0,0 0 0,-1 0 0,0 0 0,-1 0 0,-2 0 0,-1 0 0,-3 0 0,-1 1 0,-1 0 0,0 1 0,-1 0 0,1 0 0,0 0 0,1 0 0,0 0 0,1 0 0,-2-1 0,0 0 0,22 0 0,-11-1 0,-13 0 0,-7 0 0,-9 0 0,-2 0 0,5 0 0,12 0 0,14 0 0,-15 0 0,2 0 0,-1 0 0,0 1 0,16 1 0,-13 0 0,-11 0 0,-7 0 0,-6 0 0,-2 0 0,-2 0 0,0 0 0,0-1 0</inkml:trace>
+  <inkml:trace contextRef="#ctx0" brushRef="#br0" timeOffset="51300">13978 9668 24575,'42'0'0,"6"0"0,-21 0 0,1 0 0,4 0 0,0 0 0,4 0 0,1 0 0,0 0 0,1 0 0,1 0 0,0 0 0,0 0 0,0 0 0,-1 0 0,1 0 0,-1 0 0,0 0 0,0 0 0,-1 0 0,0 0 0,0 0 0,1 1 0,-1 0 0,2-1 0,-1 1 0,-1 1 0,1 0 0,-2-1 0,0 1 0,-3-1 0,0 0 0,-2 0 0,-1 1 0,-3-1 0,-1 0 0,19 2 0,-11 1 0,-9-1 0,-8 1 0,-7-1 0,-3 1 0,-3-1 0,-1 0 0,-1-1 0,-2-1 0,0 0 0</inkml:trace>
+  <inkml:trace contextRef="#ctx0" brushRef="#br0" timeOffset="67416">23927 9652 24575,'32'0'0,"-7"0"0,3 0 0,10 0 0,3 0 0,-9 0 0,2 0 0,1 0-653,5 0 1,0 0 0,1 0 652,4 0 0,0 0 0,2 0 0,-10 0 0,0 0 0,1 0 0,0 0 0,1 0 0,0 0 0,0 0 0,-1 0 0,12 0 0,-1 0 0,0 0 0,-2 0 0,-2 0 0,1 0 0,-5 0 0,1 0 0,-2 0 0,-2 0 0,-1 0 0,0 0 86,-2 0 1,0 0 0,-1 0-87,16 0 0,-1 0 0,0 0 0,0 1 0,0 1 0,0 0 0,0 0 0,0 1 0,-1-1 0,-1 1 0,-3-1 0,0 0 205,-6-1 1,-1 0-206,-6-1 0,-2 1 0,20-1 0,-9 0 988,0 0-988,-1 0 298,1 0-298,-5 0 0,-9 0 0,-6 0 0,-11 0 0,-2 0 0,-6-1 0,0 0 0,-1 1 0</inkml:trace>
+  <inkml:trace contextRef="#ctx0" brushRef="#br0" timeOffset="128171">10046 12406 24575,'23'0'0,"1"0"0,4 0 0,11 0 0,5 0 0,-7 0 0,1 0 0,2 0-702,3 0 1,2 0-1,0 0 702,0 0 0,1 0 0,-1 0 0,-1 0 0,-1 0 0,-1 0 54,-2 0 0,0 0 1,-2 0-55,-4 0 0,-1 0 0,0 0 0,10 0 0,-2 0 233,-3 0 1,-3 0-234,-5 0 0,-2 0 0,18 0 0,-6 0 1059,-7 0-1059,-6 1 416,-8 2-416,-5-1 0,-9 0 0,-2-1 0,-6-1 0</inkml:trace>
+  <inkml:trace contextRef="#ctx0" brushRef="#br0" timeOffset="129455">5195 12993 24575,'26'0'0,"0"0"0,4 0 0,1 0 0,5 0 0,0 0 0,-1 0 0,-1 0 0,-3 0 0,-2 0 0,12 0 0,-15 0 0,-14 0 0,-8 0 0</inkml:trace>
+  <inkml:trace contextRef="#ctx0" brushRef="#br0" timeOffset="135460">11705 14314 24575,'24'-2'0,"19"0"0,-8 2 0,4 0 0,-6 0 0,3 0 0,0 0-640,4 0 1,2 0 0,1 0 639,2 0 0,1 0 0,0 0 0,0 0 0,1 0 0,-2 0 0,0 0 0,-1 0 0,-1 0 0,-3 0 0,-1 0 0,-1 0 309,10 0 1,-2 0-310,-9 0 0,-4 0 317,12 0-317,-17 0 0,-11 0 0,-9 0 982,-1 0-982,-6 0 0,-1 0 0,0 0 0</inkml:trace>
+</inkml:ink>
+</file>
+
+<file path=ppt/ink/ink12.xml><?xml version="1.0" encoding="utf-8"?>
+<inkml:ink xmlns:inkml="http://www.w3.org/2003/InkML">
+  <inkml:definitions>
+    <inkml:context xml:id="ctx0">
+      <inkml:inkSource xml:id="inkSrc0">
+        <inkml:traceFormat>
+          <inkml:channel name="X" type="integer" min="-2.14748E9" max="2.14748E9" units="cm"/>
+          <inkml:channel name="Y" type="integer" min="-2.14748E9" max="2.14748E9" units="cm"/>
+          <inkml:channel name="F" type="integer" max="32767" units="dev"/>
+        </inkml:traceFormat>
+        <inkml:channelProperties>
+          <inkml:channelProperty channel="X" name="resolution" value="1000" units="1/cm"/>
+          <inkml:channelProperty channel="Y" name="resolution" value="1000" units="1/cm"/>
+          <inkml:channelProperty channel="F" name="resolution" value="0" units="1/dev"/>
+        </inkml:channelProperties>
+      </inkml:inkSource>
+      <inkml:timestamp xml:id="ts0" timeString="2023-07-04T10:44:16.293"/>
+    </inkml:context>
+    <inkml:brush xml:id="br0">
+      <inkml:brushProperty name="width" value="0.05292" units="cm"/>
+      <inkml:brushProperty name="height" value="0.05292" units="cm"/>
+      <inkml:brushProperty name="color" value="#FF0000"/>
+    </inkml:brush>
+  </inkml:definitions>
+  <inkml:trace contextRef="#ctx0" brushRef="#br0">8133 3925 24575,'11'-2'0,"14"0"0,-1 2 0,3 0 0,10 0 0,4 0 0,7 0 0,2 0-360,-13 0 1,1 0 0,0 0 359,2 0 0,1 0 0,0 0 0,3 0 0,1 0 0,0 0 0,2 0 0,1 0 0,1 0-355,-11 0 1,1 0 0,1 0-1,-1 0 355,4 0 0,-1 0 0,1 0 0,1 0 0,1 1 0,0-1 0,1 1 0,1 1-491,1-1 0,0 1 1,1 1-1,-1-1 491,1 1 0,0 1 0,0-1 0,0 1 0,1 0 0,-1 1 0,1 0 0,-1-1 0,0 1 0,0 0 0,0-1 0,0 1 0,0 0 0,0 0 0,0-1 0,0 1 0,-9-2 0,0 0 0,0 0 0,0 0 0,0-1 0,10 1 0,0 0 0,-1-1 0,0 0 0,-2-1 0,-1 1 0,0-1 0,-1-1-203,-4 0 1,0 0-1,-1 0 1,-2 0 202,7 0 0,-1 0 0,-3 0 314,10 0 1,-3 0-315,-8 0 0,-2 0 740,-7 0 1,-3 0-741,15-1 2122,-11-1-2122,-11 1 1037,-6 0-1037,-6 1 0,-3 0 0,-1 0 0,-1 0 0,7 0 0,13 0 0,17-1 0,-14 0 0,1 0 0,4 0 0,-1 0 0,-1 0 0,-1-1 0,20 1 0,-12-1 0,-13 1 0,-9 1 0,-6 0 0,-3 0 0,-3 1 0,-1-1 0,-1 1 0</inkml:trace>
+</inkml:ink>
+</file>
+
+<file path=ppt/ink/ink13.xml><?xml version="1.0" encoding="utf-8"?>
+<inkml:ink xmlns:inkml="http://www.w3.org/2003/InkML">
+  <inkml:definitions>
+    <inkml:context xml:id="ctx0">
+      <inkml:inkSource xml:id="inkSrc0">
+        <inkml:traceFormat>
+          <inkml:channel name="X" type="integer" min="-2.14748E9" max="2.14748E9" units="cm"/>
+          <inkml:channel name="Y" type="integer" min="-2.14748E9" max="2.14748E9" units="cm"/>
+          <inkml:channel name="F" type="integer" max="32767" units="dev"/>
+        </inkml:traceFormat>
+        <inkml:channelProperties>
+          <inkml:channelProperty channel="X" name="resolution" value="1000" units="1/cm"/>
+          <inkml:channelProperty channel="Y" name="resolution" value="1000" units="1/cm"/>
+          <inkml:channelProperty channel="F" name="resolution" value="0" units="1/dev"/>
+        </inkml:channelProperties>
+      </inkml:inkSource>
+      <inkml:timestamp xml:id="ts0" timeString="2023-07-04T10:44:45.763"/>
+    </inkml:context>
+    <inkml:brush xml:id="br0">
+      <inkml:brushProperty name="width" value="0.05292" units="cm"/>
+      <inkml:brushProperty name="height" value="0.05292" units="cm"/>
+      <inkml:brushProperty name="color" value="#FF0000"/>
+    </inkml:brush>
+  </inkml:definitions>
+  <inkml:trace contextRef="#ctx0" brushRef="#br0">7367 3639 24575,'36'3'0,"-6"-2"0,6-1 0,4 1 0,-3-1 0,2 0 0,2 0 0,3 0 0,1 0-469,-3 0 1,2 0 0,1 0 0,1 0 0,2 0 0,1 0 0,0 0 103,-5 0 1,2 0 0,1 0 0,1 0 0,0 0 0,0 0 0,1 0 0,0 0 0,0 0 36,-2 0 0,1 0 0,0 0 1,0 0-1,0 0 0,1 0 1,0 0-1,-1 0 0,0 0 1,0 0 37,-1 0 0,0 0 0,0 0 1,0 0-1,0 0 0,0 0 1,-1 0-1,0 0 0,0 0 1,-1 0 289,3 0 0,-1 0 0,0 0 0,0 0 0,-1 0 0,0 0 0,-1 0 0,-1 0 0,0 0 91,4 0 1,-1 0-1,-1 0 1,-1 0 0,-1 0-1,0 0 1,-2 0-92,6 0 0,-2 0 0,-1 0 0,-1 0 0,-2 0-56,2 0 1,-1 0-1,-3 0 1,-3 0 55,15 0 0,-7 0 1625,-14 0 1,-4 0-1626,7 0 0,-19 0 3276,-7 0-1042,-5 0 771,-1 2-3005,-1 0 543,-1 2-543,0-2 0,-1 0 0,-2-1 0,1-1 0,-1 0 0</inkml:trace>
+  <inkml:trace contextRef="#ctx0" brushRef="#br0" timeOffset="3519">3631 12373 24575,'23'0'0,"22"0"0,-6 0 0,6 0 0,-6 0 0,2 0 0,2 0-879,5 0 0,0 0 0,2 0 879,-12 0 0,1 0 0,0 0 0,-1 0 0,10 0 0,-1 0 0,-1 0 26,-3 0 1,-1 0 0,-1 0-27,-3 0 0,-2 0 0,0 0 0,12-1 0,-3 1 303,-3-1 1,-2 0-304,-7 0 0,-2 0 0,17-1 0,-11 2 1323,-7-1-1323,-2-2 627,1-1-627,0 0 0,-4 0 0,-5 2 0,-4 1 0,-6 0 0,-2 1 0,-4 0 0,-3 0 0,-5 0 0,2 0 0,-3 0 0</inkml:trace>
+  <inkml:trace contextRef="#ctx0" brushRef="#br0" timeOffset="7064">3690 15669 24575,'38'0'0,"1"0"0,8 0 0,-12 0 0,3 0 0,3 0 0,1 0-656,-2 0 1,3 0-1,0 0 1,1 0 0,0 0 301,0 0 1,1 0-1,-1 0 1,1 0-1,-1 0 354,-1 0 0,1 0 0,-1 0 0,-1 0 0,-1 0 109,4 0 0,-2 0 0,-1 0 1,-2 0-110,5 0 0,-3 0 0,-3 0 522,9 0 0,-5 0-522,7 0 0,-24 0 0,-13 0 2569,-8 0-2569,0 1 995,0 1-995,1 2 0,-1 1 0,-1 1 0,-1-2 0,-1-1 0,-1 0 0,0-2 0,-1 0 0</inkml:trace>
+</inkml:ink>
+</file>
+
+<file path=ppt/ink/ink14.xml><?xml version="1.0" encoding="utf-8"?>
+<inkml:ink xmlns:inkml="http://www.w3.org/2003/InkML">
+  <inkml:definitions>
+    <inkml:context xml:id="ctx0">
+      <inkml:inkSource xml:id="inkSrc0">
+        <inkml:traceFormat>
+          <inkml:channel name="X" type="integer" min="-2.14748E9" max="2.14748E9" units="cm"/>
+          <inkml:channel name="Y" type="integer" min="-2.14748E9" max="2.14748E9" units="cm"/>
+          <inkml:channel name="F" type="integer" max="32767" units="dev"/>
+        </inkml:traceFormat>
+        <inkml:channelProperties>
+          <inkml:channelProperty channel="X" name="resolution" value="1000" units="1/cm"/>
+          <inkml:channelProperty channel="Y" name="resolution" value="1000" units="1/cm"/>
+          <inkml:channelProperty channel="F" name="resolution" value="0" units="1/dev"/>
+        </inkml:channelProperties>
+      </inkml:inkSource>
+      <inkml:timestamp xml:id="ts0" timeString="2023-07-05T07:57:52.155"/>
+    </inkml:context>
+    <inkml:brush xml:id="br0">
+      <inkml:brushProperty name="width" value="0.05292" units="cm"/>
+      <inkml:brushProperty name="height" value="0.05292" units="cm"/>
+      <inkml:brushProperty name="color" value="#FF0000"/>
+    </inkml:brush>
+  </inkml:definitions>
+  <inkml:trace contextRef="#ctx0" brushRef="#br0">26710 6934 24575,'13'-2'0,"12"0"0,15 2 0,10 0 0,-23 0 0,-1 0 0,0 0 0,0 0 0,17 0 0,-10 0 0,-14 0 0,-10 0 0,-5 2 0,-2 5 0,-4 5 0,-2 4 0,-3 3 0,-4 2 0,-2 2 0,-3 3 0,-2 2 0,-4 4 0,-2 6 0,10-16 0,1 1 0,-2 2 0,0 0 0,-1 1 0,2 0 0,0-1 0,1 0 0,-9 18 0,6-8 0,5-9 0,5-10 0,3-8 0,2-4 0</inkml:trace>
+  <inkml:trace contextRef="#ctx0" brushRef="#br0" timeOffset="1233">26640 7231 24575,'10'0'0,"9"0"0,16 0 0,12 0 0,-21 0 0,0 0 0,21 0 0,-12 0 0,-12 0 0,-12 0 0,-3 0 0,-3 0 0,2 0 0,6 0 0,7 0 0,5 0 0,6 0 0,0 0 0,-3 0 0,-5 0 0,-6 0 0,-5-1 0,-3-1 0,-2-1 0,-2 1 0,-2 0 0,-2 1 0,-1 0 0</inkml:trace>
+</inkml:ink>
+</file>
+
+<file path=ppt/ink/ink15.xml><?xml version="1.0" encoding="utf-8"?>
+<inkml:ink xmlns:inkml="http://www.w3.org/2003/InkML">
+  <inkml:definitions>
+    <inkml:context xml:id="ctx0">
+      <inkml:inkSource xml:id="inkSrc0">
+        <inkml:traceFormat>
+          <inkml:channel name="X" type="integer" min="-2.14748E9" max="2.14748E9" units="cm"/>
+          <inkml:channel name="Y" type="integer" min="-2.14748E9" max="2.14748E9" units="cm"/>
+          <inkml:channel name="F" type="integer" max="32767" units="dev"/>
+        </inkml:traceFormat>
+        <inkml:channelProperties>
+          <inkml:channelProperty channel="X" name="resolution" value="1000" units="1/cm"/>
+          <inkml:channelProperty channel="Y" name="resolution" value="1000" units="1/cm"/>
+          <inkml:channelProperty channel="F" name="resolution" value="0" units="1/dev"/>
+        </inkml:channelProperties>
+      </inkml:inkSource>
+      <inkml:timestamp xml:id="ts0" timeString="2023-07-04T10:46:24.548"/>
+    </inkml:context>
+    <inkml:brush xml:id="br0">
+      <inkml:brushProperty name="width" value="0.05292" units="cm"/>
+      <inkml:brushProperty name="height" value="0.05292" units="cm"/>
+      <inkml:brushProperty name="color" value="#FF0000"/>
+    </inkml:brush>
+  </inkml:definitions>
+  <inkml:trace contextRef="#ctx0" brushRef="#br0">2558 3510 24575,'0'-19'0,"15"3"0,23 14 0,14 4 0,-15-2 0,4 0 0,3 0 0,3 0 0,2 0-410,-8 0 0,2 0 1,1 0-1,2 0 1,1 0-1,1 0 0,1 0 1,0 0 81,-4 0 0,1 0 0,0 0 1,2 0-1,0 0 0,0 0 1,2 0-1,-1 0 0,2 0 1,0 0 74,-6 0 1,0 0 0,2 0 0,0 0 0,0 0 0,1 0 0,0 0 0,0 0 0,1 0 0,-1 0 0,1 0 0,-1 0 0,0 0-1,1 0 1,0 0 0,1 0 0,-1 0 0,1 0 0,0 0 0,-1 0 0,1 0 0,0 0 0,0 0 0,-1 0 0,1 0 0,0 0 161,0 0 0,-1 0 0,1 0 0,0 0 0,0 0 0,0 0 0,0 0 0,0 0 0,0 0 0,-1 0 0,0 0 0,0 0 0,0 0 91,0 0 0,1 0 0,-1 0 0,1 0 0,-1 0 0,0 0 0,-1 0 0,0 0 0,0 0 0,-1 0 0,-1 0 0,-1 0 0,6 0 0,-1 0 0,-1 0 0,-1 0 0,0 0 0,-1 0 0,0 0 0,-1 0 0,1 0-149,2 0 1,1 0 0,-1 0 0,0 0-1,-1 0 1,-2 0 0,0 0 0,-3 0 148,11 0 0,-3 0 0,-2 0 0,-1 0 0,-1 0 506,5 0 1,0-1-1,-3 1 1,-4 1-507,-2 4 0,-3 1 0,-5-1 1638,-5-4 0,-4 2-1433,18 12 3071,-29-15-1346,-15 24 1346,0-18-2826,0 17 588,0-23-1038,-15 0 0,-13 0 0,7 0 0,-3 0 0</inkml:trace>
+</inkml:ink>
+</file>
+
+<file path=ppt/ink/ink16.xml><?xml version="1.0" encoding="utf-8"?>
+<inkml:ink xmlns:inkml="http://www.w3.org/2003/InkML">
+  <inkml:definitions>
+    <inkml:context xml:id="ctx0">
+      <inkml:inkSource xml:id="inkSrc0">
+        <inkml:traceFormat>
+          <inkml:channel name="X" type="integer" min="-2.14748E9" max="2.14748E9" units="cm"/>
+          <inkml:channel name="Y" type="integer" min="-2.14748E9" max="2.14748E9" units="cm"/>
+          <inkml:channel name="F" type="integer" max="32767" units="dev"/>
+        </inkml:traceFormat>
+        <inkml:channelProperties>
+          <inkml:channelProperty channel="X" name="resolution" value="1000" units="1/cm"/>
+          <inkml:channelProperty channel="Y" name="resolution" value="1000" units="1/cm"/>
+          <inkml:channelProperty channel="F" name="resolution" value="0" units="1/dev"/>
+        </inkml:channelProperties>
+      </inkml:inkSource>
+      <inkml:timestamp xml:id="ts0" timeString="2023-07-05T08:34:33.643"/>
+    </inkml:context>
+    <inkml:brush xml:id="br0">
+      <inkml:brushProperty name="width" value="0.05292" units="cm"/>
+      <inkml:brushProperty name="height" value="0.05292" units="cm"/>
+      <inkml:brushProperty name="color" value="#FF0000"/>
+    </inkml:brush>
+  </inkml:definitions>
+  <inkml:trace contextRef="#ctx0" brushRef="#br0">21475 3539 24575,'42'-5'0,"-4"-5"0,5-4 0,0-3 0,4-2 0,1-2-820,-6 1 1,2-1 0,0-1 0,0-3 477,-6 3 0,1-2 0,-1 0 1,0-2-1,0 0 342,-1 0 0,-1 0 0,0-1 0,-1-1 0,-1 1 0,5-5 0,-2-1 0,0 1 0,-2-1 118,-3 3 0,-1-1 0,-2 1 0,-1 1-118,0-2 0,-2 1 0,-3 2 512,4-5 1,-4 2-513,4-7 0,-15 17 0,-7 14 2543,-4 18-2543,-1 24 0,0-7 0,0 4 0,-1 0 0,0 2 0,0 2-438,-2 10 0,0 3 0,-1 3 438,0-13 0,0 1 0,0 2 0,-1 0 0,0 1-547,0-3 1,1 1 0,-1 1 0,-1 0 0,1 0 0,0 1 545,-1 3 0,-1 1 0,1 0 0,0 1 1,0 0-1,-1-1 1,1 3 0,0-1 0,0 1 0,0 0 0,1-1 0,-1-1 0,1-3 0,0 0 0,1-1 0,-1 0 0,0-1 0,1-1-261,-1 5 1,1-1-1,0-1 1,0 0-1,0-3 261,1 2 0,0-2 0,0-1 0,1-3 0,0-1 0,0-1 0,1-3 0,0 6 0,0-4 1692,1 6-1692,0-19 3276,0-9-3185,0-4 1695,0-3-1786,0-3 0,0-4 0,0-3 0,0-1 0,0-1 0,0 2 0,0 2 0</inkml:trace>
+  <inkml:trace contextRef="#ctx0" brushRef="#br0" timeOffset="2482">24183 2754 24575,'-10'-3'0,"-12"2"0,-16 1 0,12-1 0,-3 2 0,-6 1 0,-1 2 0,-3 6 0,0 3 0,-4 7 0,2 4-171,14-4 0,1 1 0,0 3 171,1 2 0,0 2 0,1 1 0,2 2 0,0 2 0,2 1 0,1 0 0,1 1 0,0 1 0,2 0 0,0 1 0,2 1 0,2-2 0,0 0 0,2 1 0,1-1 0,0 1 0,2 1 0,0 0 0,2 0 0,0 1 0,1 1 0,1 0 0,1 1 0,0-1 0,1 1 0,0 0 0,0-1 0,1 1 0,1-1 0,-1 2 0,0 0 0,2 0-459,1 3 0,1-1 0,2 1 459,0-7 0,1 0 0,1 1 0,1 0-414,2 3 0,1 0 0,2 1 1,0-1 413,1-1 0,1 0 0,1 0 0,0-1 0,0-2 0,1 0 0,0-2 0,0-1-90,4 4 1,0-2 0,-1-2 89,8 6 0,-1-5 213,-5-10 1,1-3-214,15 3 1267,-1-15-1267,4-9 897,-14-6 1,1-4-898,7-6 0,2-3 0,-5 0 0,1-2 0,0-3-365,-3 3 0,0-2 0,1-1 0,1-1 365,2-2 0,1 0 0,0-1 0,-1-1 0,0 0 0,0-1 0,0 0 0,-2 0 0,-3 2 0,-1 0 0,0 0 0,-2-1-178,4-5 1,-3-1 0,-2 0 177,-4 2 0,-3 0 0,-3-1 0,-1-1 0,-2-2 0,-2 0 0,-1-3 0,-3-2 0,-1 0 0,-1-3 0,-2-2 0,0 0-403,-1-3 0,-1-1 0,-2 0 403,-1 12 0,0-1 0,-2 0 0,-1 1 0,0-2 0,-2 1 0,-1 0 0,-1 0 0,-1 0 0,-2 0 0,0 1 0,-2 1 0,-1 0 0,-1 1 0,-1 1 0,0 0 0,-6-7 0,-1 1 0,-1 3-81,2 4 1,0 2 0,-1 2 80,-9-7 0,-1 3 797,4 7 1,1 2-798,2 4 0,2 3 268,1 1 1,0 2-269,1 2 0,1 1 1343,-24-8-1343,22 10 0,-1 0 145,-1-1 1,1 1-146,0-1 0,1 0 0,-18-10 0,10 2 0,10 5 0,9 4 0,6 5 0,5 2 0</inkml:trace>
+  <inkml:trace contextRef="#ctx0" brushRef="#br0" timeOffset="3131">25538 3296 24575,'0'0'0</inkml:trace>
+  <inkml:trace contextRef="#ctx0" brushRef="#br0" timeOffset="3697">25538 4271 24575,'0'0'0</inkml:trace>
+  <inkml:trace contextRef="#ctx0" brushRef="#br0" timeOffset="5449">27181 2869 24575,'-26'0'0,"0"0"0,-12 0 0,-6 0 0,-1 0 0,-5 0 0,-2 0-820,6 0 1,-1 0 0,-1 0 0,0 0 596,-1 0 0,0 0 1,1 0-1,0 0 223,3 0 0,0 0 0,1 0 0,3 0-259,-2 0 1,4 0-1,2 0 259,-5 0 0,6 0 1111,-3 4-1111,26 5 0,24 19 0,-2-5 0,0 4 0,3 9 0,0 3 0,0 4 0,1 2 0,-2 2 0,0 0 0,-4-13 0,1 0 0,-1-1 0,4 15 0,0 0 0,-1-1 0,0-1 1003,-1-5 0,0-3-1003,-3-7 0,0-2 1827,4 19-1827,-3-18 0,-2-13 0,0-9 0,1-5 0,1-5 0,1-5 0,6-5 0,15-5 0,-4 9 0,5 1 0,14 0 0,4 3-337,-8 1 0,2 2 0,0 1 337,2 0 0,0 3 0,0 0 0,-1 2 0,-1 1 0,-1 1 0,-6 1 0,-2 1 0,-2 1 0,6 6 0,-4 2 0,-7-1 0,-4 3 0,-7 0 0,-3 3 0,-2 3 0,-3 1 0,-2 5 0,-1 2 505,-1 2 1,-1 2-506,-2 0 0,-1-1 0,-2 0 0,-4-1 0,-2-3 0,-3 0 0,-3-3 0,-4-1 0,-6 0 0,-2-2 0,-2-1 0,-2-2 0,-1-2 0,-1-2 0,-4-2 0,-2-2 0,-1-3 0,-2-1 0,9-4 0,0-1 0,-2-1-256,-3 0 1,-2 0 0,0-1 255,0-1 0,-1 0 0,1-1 0,-1 0 0,1-1 0,1 0 0,3-1 0,2 0 0,1 0-101,-7-1 1,4 0 100,6 0 0,5 0 0,1-2 0,11 2 0,13-1 0</inkml:trace>
+  <inkml:trace contextRef="#ctx0" brushRef="#br0" timeOffset="8249">28533 2916 24575,'-12'0'0,"-6"8"0,-13 17 0,10-6 0,0 3 0,1 2 0,-1 1 0,0 2 0,1 0 0,3-2 0,1 0 0,0 2 0,0 0 0,0 2 0,0 0 0,3-1 0,-1 1 0,1 0 0,0 0 0,2-1 0,0 0 0,0 1 0,1 0 0,0 2 0,0 0 0,1 1 0,0 1 0,0 2 0,0 0 0,0 4 0,1 0 0,0 0 0,1 0 0,1 1 0,1 0 0,1 0 0,1 0 0,1-3 0,0 0 0,1 0 0,1 0 0,0-5 0,0 0 0,0-2 0,1 0 0,8 10 0,2-1 0,-1-9 0,1-1 0,7 10 0,3-2 0,-3-11 0,0-2 0,1-3 0,0 0 0,0-3 0,0-2 0,16 9 0,-3-9 0,-4-6 0,-2-5 0,-3-4 0,-1-9 0,-2-7 0,3-10 0,4-7 0,5-3 0,-12 18 0,1 0 0,2 0 0,1 1 0,2 0 0,0 1 0,2-1 0,0 1 0,0-2 0,1 1 0,-1-3 0,1 0 0,-1-2 0,-2-2 0,2-2 0,-2-3 0,0-4 0,-2-2 0,1-4 0,-1-2 0,-9 11 0,0-2 0,-1 0-193,0-2 0,-1-1 0,-1 0 193,1-3 0,-2 1 0,0-1 0,-1 0 0,-1 1 0,-1 0 0,0 0 0,0 1 0,-1 0 0,1-13 0,-2 2 0,-1 6 0,-1 2 0,-1 4 0,-1 2 0,-4-17 0,-7 12 0,-9 6 0,-11 0 289,10 13 1,-2-1-290,-2-2 0,-2-1 0,0-1 0,-2-1 0,1 0 0,-1 1 0,2 1 0,0 1 0,1 1 0,0 0 0,2 3 0,1 2 0,-16-11 0,8 7 0,9 7 0,7 6 0,5 3 0,4 3 0,1 0 0,0 0 0,-2 0 0,0 0 0,0 0 0,-1 0 0,1 0 0,-2 0 0,-1 0 0,-1 0 0,-2 0 0,0 0 0,3 0 0,1 0 0,3 0 0,0 0 0,1 0 0,-1 0 0,-2 0 0,0 0 0,-1 0 0,0 0 0,2 0 0,2 0 0,2 0 0</inkml:trace>
+</inkml:ink>
+</file>
+
+<file path=ppt/ink/ink17.xml><?xml version="1.0" encoding="utf-8"?>
+<inkml:ink xmlns:inkml="http://www.w3.org/2003/InkML">
+  <inkml:definitions>
+    <inkml:context xml:id="ctx0">
+      <inkml:inkSource xml:id="inkSrc0">
+        <inkml:traceFormat>
+          <inkml:channel name="X" type="integer" min="-2.14748E9" max="2.14748E9" units="cm"/>
+          <inkml:channel name="Y" type="integer" min="-2.14748E9" max="2.14748E9" units="cm"/>
+          <inkml:channel name="F" type="integer" max="32767" units="dev"/>
+        </inkml:traceFormat>
+        <inkml:channelProperties>
+          <inkml:channelProperty channel="X" name="resolution" value="1000" units="1/cm"/>
+          <inkml:channelProperty channel="Y" name="resolution" value="1000" units="1/cm"/>
+          <inkml:channelProperty channel="F" name="resolution" value="0" units="1/dev"/>
+        </inkml:channelProperties>
+      </inkml:inkSource>
+      <inkml:timestamp xml:id="ts0" timeString="2023-07-05T09:21:57.268"/>
+    </inkml:context>
+    <inkml:brush xml:id="br0">
+      <inkml:brushProperty name="width" value="0.05292" units="cm"/>
+      <inkml:brushProperty name="height" value="0.05292" units="cm"/>
+      <inkml:brushProperty name="color" value="#FF0000"/>
+    </inkml:brush>
+  </inkml:definitions>
+  <inkml:trace contextRef="#ctx0" brushRef="#br0">5463 10152 24575,'22'0'0,"3"0"0,5 0 0,14 0 0,6 0-820,-13 0 1,3 0 0,3 0 0,1 0 454,-1 0 1,1 0 0,3 0 0,-1 0 0,1 0 5,-6 0 0,1 0 1,0 0-1,0 0 1,1 0-1,0 0 359,2 0 0,1 0 0,1 0 0,0 0 0,-1 0 0,0 0 0,-1 0 0,0 0 0,0 0 0,0 0 0,-1 0 0,0 0 0,4 0 0,0 0 0,0 0 0,-1 0 0,-1 0 62,-3 0 0,0 0 1,-1 0-1,-1 0 1,-1 0-63,3 0 0,-2 0 0,-1 0 0,-2 0-4,3 0 0,-3 0 1,-3 0 3,8 0 0,-4 0 1041,-11 0 0,-4 0-1041,4 0 3164,-14 0-3164,-6 0 1686,-3 1-1686,-1 1 17,-4-1-17,-6 0 0,3-1 0,-4 0 0</inkml:trace>
+  <inkml:trace contextRef="#ctx0" brushRef="#br0" timeOffset="1531">4659 6626 24575,'18'0'0,"19"0"0,-8 0 0,4 0 0,4 0 0,2 0 0,2 0 0,0 0 0,-1 0 0,0 0 0,-4 0 0,-2 0 0,-1 0 0,-3 0 0,18 0 0,-13 0 0,-12 2 0,-9 1 0,-5 2 0,-4 0 0,-2-1 0,-1-2 0,-1-1 0,-4 0 0,2-1 0,-3 0 0</inkml:trace>
+  <inkml:trace contextRef="#ctx0" brushRef="#br0" timeOffset="6798">4452 13109 24575,'15'0'0,"20"0"0,-5 0 0,3 0 0,13 0 0,2 0-530,-10 0 0,2 1 1,0 0 529,0 0 0,0 1 0,0 0 0,-1 0 0,0 0 0,-1 1 157,-4-1 1,0 1-1,-2-1-157,11 1 0,-2-1 137,-5-1 0,-2 0-137,-4 1 0,-3-1 0,18 1 0,-11 1 809,-9-1-809,-8 0 34,-4 0-34,-5 0 0,-1-1 0,-4-1 0,-2 0 0,-1 0 0</inkml:trace>
+  <inkml:trace contextRef="#ctx0" brushRef="#br0" timeOffset="20682">4773 16121 24575,'21'0'0,"10"0"0,17 0 0,-17 0 0,2 0 0,3 0 0,2 0 0,4 0 0,0 0 0,4 0 0,1 0 0,3 0 0,0 0 0,-16 0 0,0 0 0,0 0 0,0 0 0,0 0 0,0 0 0,2 0 0,-1 0 0,1 0 0,-1 0 0,0 0 0,1 0 0,-2 0 0,1 0 0,-1 0 0,0 1 0,-1-1 0,1 1 0,12 0 0,0 0 0,-2 0 0,-1 0 0,0 0 0,0 0 0,-3-1 0,0 0 0,-3 0 0,0 0 0,-1 0 0,0 0 0,-1 0 0,-2 0 0,-2 0 0,-1 0 0,-3 0 0,-1 0 0,18 0 0,-7 0 0,-3 0 0,0 0 0,0 0 0,4 0 0,5 0 0,6 0 0,-20 0 0,2 0 0,3 0 0,1 0 0,2 0 0,1 0 0,0 0 0,0 0 0,-3 0 0,0 1 0,-4 0 0,-2 1 0,19 2 0,-14 1 0,-12 0 0,-7-3 0,-4-1 0,-2-1 0,-2 0 0,-2 0 0,-2 0 0,-1 0 0,0 0 0,1 0 0,0 0 0,-1 0 0,1 0 0,0 0 0,0 1 0,-1 0 0,-1 0 0</inkml:trace>
+  <inkml:trace contextRef="#ctx0" brushRef="#br0" timeOffset="23652">3741 15162 24575,'25'0'0,"22"0"0,-8 0 0,4 0 0,-4 0 0,2 0 0,1 0-820,-5 0 1,1 0 0,1 0 0,1 0 736,5 1 1,1-1-1,0 0 1,1-1 82,2 1 0,1-1 0,0 0 0,-1 0 0,0 0 0,-1-1 0,0 0 0,0 0 0,-4 0 0,0 0 0,-2-1 0,0 1 77,7-2 1,-1 1-1,-2-1-77,-6 2 0,-2-1 0,-1 1 394,9 0 0,-2 0-394,-8 1 0,-2 1 0,13 0 0,-18 0 1820,-10 0-1820,-7 0 767,-6 0-767,0 0 0,-5 0 0,-1 0 0</inkml:trace>
+</inkml:ink>
+</file>
+
+<file path=ppt/ink/ink18.xml><?xml version="1.0" encoding="utf-8"?>
+<inkml:ink xmlns:inkml="http://www.w3.org/2003/InkML">
+  <inkml:definitions>
+    <inkml:context xml:id="ctx0">
+      <inkml:inkSource xml:id="inkSrc0">
+        <inkml:traceFormat>
+          <inkml:channel name="X" type="integer" min="-2.14748E9" max="2.14748E9" units="cm"/>
+          <inkml:channel name="Y" type="integer" min="-2.14748E9" max="2.14748E9" units="cm"/>
+          <inkml:channel name="F" type="integer" max="32767" units="dev"/>
+        </inkml:traceFormat>
+        <inkml:channelProperties>
+          <inkml:channelProperty channel="X" name="resolution" value="1000" units="1/cm"/>
+          <inkml:channelProperty channel="Y" name="resolution" value="1000" units="1/cm"/>
+          <inkml:channelProperty channel="F" name="resolution" value="0" units="1/dev"/>
+        </inkml:channelProperties>
+      </inkml:inkSource>
       <inkml:timestamp xml:id="ts0" timeString="2022-07-04T10:29:20.615"/>
     </inkml:context>
     <inkml:brush xml:id="br0">
@@ -191,6 +467,697 @@
     </inkml:brush>
   </inkml:definitions>
   <inkml:trace contextRef="#ctx0" brushRef="#br0">16636 6549 24575,'-48'0'0,"0"0"0,-9 0 0,-3 0 0,-20 0 0,-6 0-514,17 0 0,-3 0 0,0 0 514,0 0 0,-1 0 0,-2 0 0,-11 0 0,-1 0 0,-1 0-409,0 0 1,0 0 0,-1 0 408,19 0 0,0 0 0,0 0 0,-3 0 0,-7 0 0,-3 0 0,1 0 0,0 0 0,5 0 0,2 0 0,-1 0 0,-1 0 0,-4 0 0,-2 0 0,0 0 0,3 0 0,8 0 0,2 0 0,0 0 0,-1 0 0,-3 0 0,0 0 0,0 0 0,2 0 0,-14 0 0,2 0 0,0 0-27,2 0 1,0 0 0,0 0 26,5 0 0,0 0 0,3 0-60,-13 0 1,2 0 59,20 0 0,-1 0 0,6 0 349,-2 0 1,2 0-350,-6 0 0,4 0 1315,-8 0-1315,-7 0 812,40 0-812,-25 0 139,25 0-139,-26 0 0,41 0 0,-7 0 0,14 0 0,26 0 0,8 0 0,3 0 0,22 0 0,-41 0 0,12 0 0,15 0 0,-23 0 0,22 0 0,-29 0 0,15 0 0,-11 0 0,10 0 0,-14 0 0,30 0 0,-23 0 0,22 0 0,-29 29 0,0-21 0,0 21 0</inkml:trace>
+</inkml:ink>
+</file>
+
+<file path=ppt/ink/ink19.xml><?xml version="1.0" encoding="utf-8"?>
+<inkml:ink xmlns:inkml="http://www.w3.org/2003/InkML">
+  <inkml:definitions>
+    <inkml:context xml:id="ctx0">
+      <inkml:inkSource xml:id="inkSrc0">
+        <inkml:traceFormat>
+          <inkml:channel name="X" type="integer" min="-2.14748E9" max="2.14748E9" units="cm"/>
+          <inkml:channel name="Y" type="integer" min="-2.14748E9" max="2.14748E9" units="cm"/>
+          <inkml:channel name="F" type="integer" max="32767" units="dev"/>
+        </inkml:traceFormat>
+        <inkml:channelProperties>
+          <inkml:channelProperty channel="X" name="resolution" value="1000" units="1/cm"/>
+          <inkml:channelProperty channel="Y" name="resolution" value="1000" units="1/cm"/>
+          <inkml:channelProperty channel="F" name="resolution" value="0" units="1/dev"/>
+        </inkml:channelProperties>
+      </inkml:inkSource>
+      <inkml:timestamp xml:id="ts0" timeString="2023-07-05T09:23:09.537"/>
+    </inkml:context>
+    <inkml:brush xml:id="br0">
+      <inkml:brushProperty name="width" value="0.05292" units="cm"/>
+      <inkml:brushProperty name="height" value="0.05292" units="cm"/>
+      <inkml:brushProperty name="color" value="#FF0000"/>
+    </inkml:brush>
+  </inkml:definitions>
+  <inkml:trace contextRef="#ctx0" brushRef="#br0">7927 4285 24575,'0'23'0,"0"15"0,0-12 0,0 2 0,0 6 0,0 2 0,0 2 0,0 1 0,0 0 0,0 0 0,0 0 0,0 0 0,2-3 0,-1-1 0,1-4 0,1-2 0,3 18 0,1-15 0,-3-12 0,-2-5 0,-1-9 0,0 1 0,0-6 0,0 0 0,0-1 0</inkml:trace>
+  <inkml:trace contextRef="#ctx0" brushRef="#br0" timeOffset="1985">7698 4771 24575,'6'22'0,"4"4"0,4 5 0,3 2 0,-1-2 0,-2-3 0,-1-4 0,-2-2 0,-1-3 0,0-4 0,-1-3 0,0-2 0,-3-3 0,-2-2 0,-2-1 0,0-3 0,0 2 0,-1-1 0,0 1 0,0 0 0,1-1 0,0-1 0,0-1 0,0 0 0,1 0 0,0 0 0,1 0 0,0-2 0,1-3 0,0-3 0,0-4 0,-1-1 0,2-2 0,1-1 0,0-2 0,4-2 0,6-3 0,6-4 0,8-3 0,4-2 0,-1 3 0,-2 2 0,-6 7 0,-7 5 0,-5 3 0,-7 7 0,-3 1 0,-2 2 0,-1 0 0,0-1 0,1 1 0,-1 1 0,-1 0 0</inkml:trace>
+  <inkml:trace contextRef="#ctx0" brushRef="#br0" timeOffset="5217">2614 6783 24575,'0'29'0,"0"4"0,0 6 0,0 1 0,0-2 0,0-5 0,0-3 0,3-5 0,2-6 0,2-4 0,5-3 0,3-1 0,6 3 0,5 4 0,5 1 0,3 2 0,4-1 0,0-1 0,3-1 0,1-2 0,2-2 0,4-2 0,-20-7 0,1-1 0,4-1 0,2-1 0,2-1 0,1 0 0,2-2 0,0-1 0,-2-1 0,-1-1 0,-4-2 0,-2-1 0,-6 0 0,-1-1 0,7-7 0,-11 2 0,-10 1 0,-5-1 0,-3-1 0,-2-1 0,0-6 0,0-11 0,2-16 0,-1 14 0,0-2 0,0-3 0,0-2 0,0-1 0,-1 1 0,0 2 0,0 1 0,0 7 0,0 2 0,-2-18 0,-5 14 0,-8 8 0,-13-1 0,-12-1 0,15 13 0,-1-1 0,-1 0 0,-1 0 0,1 1 0,0 0 0,1 1 0,1 0 0,-20-8 0,4 2 0,3 3 0,0 1 0,-3 4 0,1 5 0,-1 3 0,4 3 0,4 0 0,4 3 0,6 5 0,3 4 0,5 6 0,1 3 0,2 1 0,2 2 0,-2 3 0,-1 2 0,-4 5 0,-2 3 0,-1 0 0,1-1 0,2-7 0,3-6 0,4-6 0,4-4 0,4-3 0,1-3 0,1 0 0,0 0 0,0-1 0,0 1 0,0-2 0,0 0 0,0 0 0,0-2 0,0-3 0,0-1 0</inkml:trace>
+  <inkml:trace contextRef="#ctx0" brushRef="#br0" timeOffset="6653">2323 5378 24575,'22'0'0,"6"0"0,7 2 0,4 3 0,6 11 0,-20-4 0,1 3 0,1 2 0,2 4 0,-4 0 0,1 2 0,-1 1 0,2 2 0,-2 2 0,5 7 0,-3 0 0,-13-11 0,-3-1 0,8 22 0,-4-3 0,-2-1 0,-2-3 0,-1-4 0,-2-3 0,-2-3 0,-2-3 0,-1-2 0,1-3 0,-2-2 0,1-2 0,-1-2 0,0-2 0,0-1 0,-1-2 0,0-1 0,0-2 0,-1-1 0,1-3 0,0 0 0,0-2 0,0 0 0</inkml:trace>
+  <inkml:trace contextRef="#ctx0" brushRef="#br0" timeOffset="8351">2706 5977 24575,'1'14'0,"4"3"0,6 7 0,5 1 0,3 0 0,-1-2 0,-1-2 0,-2-2 0,-2-2 0,0-2 0,-3-2 0,-2-3 0,-2-3 0,-2-3 0,-2-2 0,-1-1 0,0 1 0,0-1 0,1-1 0,0 0 0,0 0 0,1 0 0,0 0 0,2-5 0,1-6 0,1-9 0,0-5 0,-1-2 0,0 2 0,-1 5 0,0 1 0,0 4 0,0 2 0,0 4 0,0 2 0,-1 3 0,0 0 0,0 0 0,0 1 0,-1 0 0,-1 0 0,0 1 0,0-1 0,-1 1 0,0-1 0,-1 2 0</inkml:trace>
+  <inkml:trace contextRef="#ctx0" brushRef="#br0" timeOffset="9934">2949 5493 24575,'0'-17'0,"0"-18"0,0 5 0,0-3 0,0-8 0,0-1 0,2-3 0,1 0 0,0 1 0,2 2 0,2 5 0,0 1 0,1 5 0,0 0 0,0 4 0,1 1 0,1 2 0,0 0 0,2-1 0,0 0 0,1 0 0,0-1 0,-1 2 0,0 0 0,8-15 0,-7 13 0,-5 13 0,-4 11 0,-1 8 0,-1 8 0,-1 7 0,2 4 0,-1 2 0,0 0 0,2-1 0,-1 0 0,2 0 0,0 2 0,1 2 0,0 2 0,0 0 0,-1 2 0,1-2 0,-1 0 0,1 0 0,0 0 0,-1 0 0,1 0 0,0-2 0,0-1 0,-1-2 0,0-4 0,-1-4 0,0-5 0,-2-1 0,-1-8 0,-1 0 0</inkml:trace>
+  <inkml:trace contextRef="#ctx0" brushRef="#br0" timeOffset="11284">2991 5227 24575,'24'-2'0,"5"0"0,6 2 0,3 0 0,-1 0 0,-5 0 0,-3 0 0,-4 0 0,-3 0 0,-5 0 0,-3 0 0,-5 0 0,-4 0 0,0 0 0,-2 0 0,0 0 0,0 0 0,-1 0 0</inkml:trace>
+  <inkml:trace contextRef="#ctx0" brushRef="#br0" timeOffset="14801">3491 7327 24575,'7'20'0,"9"9"0,9 9 0,-10-16 0,1 1 0,0 0 0,-2 0 0,0-1 0,-2 0 0,9 16 0,-6-4 0,-4-5 0,-6-2 0,-3 4 0,-2 4 0,0 4 0,0 4 0,0 3 0,0-1 0,-2 0 0,-3-5 0,-3-4 0,-1-4 0,-1-4 0,0-4 0,-3-1 0,-3-3 0,-4 1 0,-9 2 0,-5 3 0,-6 2 0,1 1 0,2-3 0,5-3 0,5-3 0,0 0 0,1 2 0,-1 3 0,-3 2 0,0 1 0,0-1 0,1-2 0,4-2 0,3-5 0,5-5 0,7-5 0,5-5 0,3-2 0</inkml:trace>
+  <inkml:trace contextRef="#ctx0" brushRef="#br0" timeOffset="16770">3108 8315 24575,'0'23'0,"0"1"0,0 0 0,-1 2 0,-2 1 0,-3 0 0,-3 1 0,-3-4 0,0 2 0,-1-1 0,-1 1 0,-1-1 0,1-2 0,2-5 0,5-4 0,3-4 0,3-3 0,1-2 0,0-2 0,1-1 0,1-1 0,3-1 0,2 0 0,3-2 0,2-2 0,1-1 0,2 1 0,3 1 0,4 2 0,4 1 0,3 0 0,2 0 0,-2 0 0,-3 0 0,-3 0 0,-3 0 0,-2 0 0,-2 0 0,-1 1 0,-1 2 0,-2 0 0,0 3 0,-5-4 0,0 2 0,-6-3 0,1 0 0,0 1 0,0 0 0,1-1 0,-1 1 0,1-1 0,-1 0 0,-1 0 0</inkml:trace>
+  <inkml:trace contextRef="#ctx0" brushRef="#br0" timeOffset="20418">4050 7622 24575,'0'17'0,"0"3"0,0 1 0,0 1 0,0-1 0,0-3 0,0 0 0,0-1 0,0 1 0,0 0 0,0 0 0,0-2 0,0-2 0,0-1 0,0-1 0,0 1 0,0 1 0,0 4 0,0-2 0,0-2 0,0-2 0,0-4 0,0-1 0,0-2 0,1-3 0,1-1 0,1 0 0,0-1 0,1 0 0,0 0 0,2 0 0,2 0 0,0 0 0,2-1 0,-1-1 0,1-1 0,1 0 0,1-1 0,0-1 0,-1-2 0,1-2 0,0-4 0,3-4 0,2-4 0,-2-1 0,-1 2 0,-3 4 0,-6 3 0,-2 1 0,-2 1 0,-1-1 0,0 1 0,0 1 0,-2 3 0,-2 4 0,-2 1 0,-3 2 0,0 0 0,-3 0 0,-1 0 0,0 0 0,-1 0 0,1 0 0,1 0 0,0 0 0,1 0 0,2 0 0,1 0 0,2 0 0,1 0 0,0 1 0,1 0 0,-1 1 0,0 0 0,0 0 0,2-2 0,2-1 0,3-2 0,2-3 0,4-3 0,4 0 0,2 0 0,1 4 0,-2 2 0,-2 0 0,0 1 0,-2 0 0,0-1 0,1 1 0,-1 0 0,0-2 0,0 0 0,-1-1 0,-1 0 0,-2 0 0,-1 1 0,0-1 0,-2-1 0,-1 2 0,-1-2 0,0 2 0,0-2 0,-1-1 0,0 0 0,-3-2 0,-4-5 0,-5-6 0,-5-8 0,-5-5 0,-2 0 0,1 4 0,3 9 0,3 5 0,4 7 0,2 5 0,0 2 0,0 1 0,-2 0 0,0 2 0,-1 2 0,2 2 0,0 1 0,2-2 0,1 0 0,-1-1 0,5-2 0,1-1 0,3 0 0,1 1 0,1 0 0,0 1 0,0 0 0,0 0 0,0 0 0,0-1 0,0 0 0,1 0 0,-1 0 0,1-1 0</inkml:trace>
+  <inkml:trace contextRef="#ctx0" brushRef="#br0" timeOffset="23536">3024 8763 24575,'-14'0'0,"-4"0"0,-7 0 0,-6 0 0,-1 0 0,-4 0 0,-1 0 0,-3 0 0,0 4 0,-1 7 0,0 9 0,2 11 0,5 4 0,8 4 0,5-1 0,6-3 0,4 1 0,5-3 0,3-1 0,2-2 0,1 1 0,0-2 0,0 2 0,2-1 0,1-2 0,3-1 0,1-5 0,0-2 0,0-1 0,2 0 0,1 2 0,5 1 0,4 0 0,7-2 0,6-2 0,2-2 0,3-2 0,1-2 0,-1-4 0,1-2 0,-3-4 0,-3 0 0,-5-2 0,-4 0 0,-4 0 0,0-1 0,2-1 0,1-2 0,0-2 0,0 0 0,-5 0 0,-3 1 0,-3 0 0,-2-1 0,0 0 0,1-1 0,-1-2 0,2-1 0,1-5 0,2-1 0,0-1 0,-2 0 0,-2 1 0,-2 1 0,-2 1 0,-2 0 0,-1-1 0,1-1 0,-1-4 0,1-3 0,0-6 0,-1-5 0,0-2 0,-2-1 0,-1 5 0,0 7 0,0 5 0,0 5 0,0 0 0,-1-1 0,-3-1 0,0-2 0,-2 1 0,-1 2 0,0-1 0,-2 2 0,0 1 0,-1 1 0,-1 1 0,-1 0 0,-1 1 0,-2 3 0,1 2 0,0 3 0,0 1 0,-1 2 0,2 0 0,1 0 0,1 0 0,4 0 0,1 0 0,1 0 0,2 1 0,2 0 0,0 1 0,1 1 0,0-2 0,0 1 0</inkml:trace>
+  <inkml:trace contextRef="#ctx0" brushRef="#br0" timeOffset="25920">2749 9229 24575,'15'0'0,"3"0"0,0 0 0,-3 0 0,-5-1 0,-7-3 0,-4-3 0,-2-3 0,-6-1 0,-5 3 0,-6 0 0,-5 1 0,-2 2 0,0-1 0,2 3 0,6 0 0,4 2 0,4 1 0,3 1 0,3 3 0,2 4 0,2 5 0,1 3 0,1-2 0,4-1 0,5-1 0,7-1 0,6-1 0,2-2 0,3-2 0,3-3 0,3-3 0,3-1 0,2-3 0,1-4 0,-7-5 0,-7 0 0,-9 0 0,-8 1 0,-5 1 0,-8 0 0,-7 0 0,-7 1 0,-7 1 0,-3 1 0,-2 3 0,2 2 0,5 3 0,6 0 0,8 0 0,5 4 0,3 4 0,3 4 0,4 1 0,6 0 0,7-2 0,1-3 0,0-2 0,-2-3 0,-4-3 0,-2 0 0,-1 0 0,-2-1 0,-1-2 0,-2-4 0,-2-4 0,-3-3 0,-1-1 0,-3 0 0,-5 1 0,-8 0 0,-9 1 0,-7 2 0,-6 5 0,0 2 0,6 3 0,8 1 0,6 4 0,6 2 0,4 5 0,4 1 0,3 0 0,2-2 0,4 0 0,6-1 0,4 1 0,3-1 0,-3-2 0,-3-3 0,-2-1 0,-1-2 0,-3 0 0,-2-1 0,-3 0 0</inkml:trace>
+  <inkml:trace contextRef="#ctx0" brushRef="#br0" timeOffset="30755">2122 5182 24575,'0'8'0,"0"3"0,0 5 0,0 3 0,-1 0 0,0 0 0,0 1 0,0 3 0,1 5 0,0 1 0,0-3 0,0-4 0,0-7 0,0-3 0,0-3 0,0 0 0,0 0 0,0 0 0,0-1 0,0-3 0,0 1 0,0-4 0,0 1 0,1 0 0,2 0 0,3-1 0,3-1 0,4-1 0,2 0 0,0 1 0,-2 0 0,-4 1 0,0-1 0,-1-1 0,-1 0 0,-2-1 0,1-2 0,-1-1 0,-1-3 0,1-1 0,0-2 0,0-2 0,0 0 0,0 0 0,-1 1 0,0 2 0,-1 1 0,-1 1 0,-1 0 0,-1 0 0,-1-1 0,-2-3 0,-5 0 0,-5 1 0,-4 0 0,-1 3 0,-1 1 0,1 1 0,1 2 0,0 0 0,-1 0 0,0 2 0,-1 0 0,-2 0 0,-1 0 0,0-2 0,1 0 0,2-1 0,4-1 0,3 2 0,1 0 0,2 2 0,1 1 0,1 1 0,1 1 0,2 4 0,2 6 0,2 6 0,1 2 0,4-1 0,3-3 0,4-6 0,2-3 0,1-4 0,0-3 0,0-2 0,0-1 0,1 1 0,0 0 0,1 1 0,0 1 0,2 0 0,1 0 0,2 0 0,1 0 0,-3-1 0,-3-2 0,-3-3 0,-6-2 0,-3-4 0,-5-2 0,-6-2 0,-6-2 0,-5 2 0,-2 2 0,0 4 0,1 3 0,1 2 0,0 1 0,2 2 0,2 1 0,2 1 0,0 1 0,1 2 0,0 3 0,3 6 0,3 3 0,3 5 0,0 2 0,1 0 0,1-2 0,2-5 0,3-1 0,2-1 0,2 5 0,1 7 0,1 8 0,3 6 0,2 3 0,0-6 0,0-8 0,-1-12 0,-1-7 0,0-6 0,-2-3 0,1-3 0,-1-5 0,-1-6 0,-4-7 0,-3-5 0,-3 0 0,-5 1 0,-6 5 0,-6 6 0,-6 4 0,-3 5 0,2 3 0,0 1 0,2 1 0,2 0 0,3 0 0,2 0 0,1 0 0,1 0 0,1-1 0,2-1 0,0-2 0,0 0 0,-2-1 0,-1 2 0,1 0 0,3 2 0,3 2 0,2 2 0,2 3 0,4 3 0,1-2 0,0-2 0,0-3 0,-2-2 0,-1-2 0,-1-2 0,1 0 0,1 0 0,-1 1 0,0 2 0</inkml:trace>
+  <inkml:trace contextRef="#ctx0" brushRef="#br0" timeOffset="44902">10369 4481 24575,'0'33'0,"0"11"0,0-16 0,0 2 0,0 3 0,0 1 0,0 0 0,0-1 0,0-3 0,0-1 0,0 18 0,0-14 0,0-12 0,0-6 0,0-9 0,0-2 0</inkml:trace>
+  <inkml:trace contextRef="#ctx0" brushRef="#br0" timeOffset="46622">10079 4754 24575,'15'23'0,"8"8"0,-6-9 0,1 0 0,0 0 0,1 0 0,-1-1 0,-2-2 0,9 10 0,-8-10 0,-6-7 0,-5-4 0,-2-3 0,-2-1 0,0-1 0,0 1 0,1 1 0,1 2 0,2 1 0,0 0 0,-1-2 0,-2-1 0,1-2 0,-2-1 0,1-1 0,-1-1 0,0 0 0,0 0 0,1 0 0,1 0 0,1-1 0,2-3 0,1-3 0,1-4 0,1-2 0,2-1 0,4-1 0,6-2 0,3 0 0,0 0 0,-4 2 0,-5 5 0,-5 3 0,-3 3 0,-1-1 0,-1-1 0,4-1 0,2-2 0,0-1 0,0 2 0,-4 2 0,-2 4 0,-4 0 0,-1 1 0,-1 0 0</inkml:trace>
+  <inkml:trace contextRef="#ctx0" brushRef="#br0" timeOffset="48852">7885 4299 24575,'24'0'0,"11"0"0,-9 0 0,3 0 0,7 0 0,4 0 0,5 0 0,3 0-302,-13 0 0,1 0 0,1 0 302,1 0 0,2 0 0,-1 0 0,2 0 0,1 0 0,-1 0 0,0 0 0,1 0 0,-1 0 0,-1 0 0,-1 0 0,0 0 0,0 0 0,-1 0 0,0 0 0,-1 0 0,0 0 0,-1 0 0,1 0 0,0 0 0,0 0 0,1 0 0,0 0 0,0 0 0,-1-1 0,-1 1 0,0-1 0,-1 1 0,-1-1 0,0 0 111,13-1 1,-1 0-112,-3 0 0,-1 0 0,-4 1 0,0 0 0,0 0 0,-1 0 0,2 1 0,-1 0 0,1 0 0,0 0 341,1 0 1,-1 0-342,0 0 0,0 0 0,-2 1 0,-1 0 0,-1 0 0,1 1 0,-1 0 0,0 1 0,0 0 0,-1-1 0,0 0 0,0 1 0,-2-2 0,0 1 0,-4-1 0,-1 0 0,19 0 0,-9-1 0,-8 0 0,-8 0 0,-5 0 0,-9 0 0,-4 0 0,-10 0 0,2 0 0,-1 0 0,4 0 0,1 0 0</inkml:trace>
+  <inkml:trace contextRef="#ctx0" brushRef="#br0" timeOffset="60753">15561 4294 24575,'0'19'0,"0"8"0,0 8 0,0 9 0,0 2 0,0 1 0,0 1 0,0-1 0,2-1 0,2-3 0,1-2 0,1-3 0,-2-5 0,0-6 0,1-5 0,0-4 0,-1-1 0,0 0 0,-1-2 0,1-2 0,-1-4 0,-1-4 0,-1-3 0</inkml:trace>
+  <inkml:trace contextRef="#ctx0" brushRef="#br0" timeOffset="62988">15352 4854 24575,'5'11'0,"3"4"0,6 5 0,3 2 0,1 2 0,-3-4 0,-1-1 0,-2-2 0,0-2 0,0-1 0,-1-3 0,-2-3 0,-5-3 0,0-3 0,-2 1 0,1 0 0,1 3 0,2 2 0,2 0 0,1 2 0,3 1 0,1 1 0,0 0 0,1 0 0,-6-6 0,-1-2 0,-5-4 0,0 0 0,1 0 0,-1-1 0,0-2 0,0-3 0,-1-3 0,1-3 0,0-1 0,0 0 0,0 2 0,0 1 0,1 2 0,-1 1 0,0 1 0,1-1 0,0 1 0,3-5 0,5-3 0,4-3 0,5-2 0,-1 2 0,-1 0 0,-3 2 0,-2 2 0,-1 2 0,-2 3 0,-3 2 0,-3 2 0,-1 0 0,1 1 0,1-2 0,2 0 0,0 1 0,-2-1 0,-3 1 0,-1 1 0,-1 1 0,0 0 0,0 1 0</inkml:trace>
+  <inkml:trace contextRef="#ctx0" brushRef="#br0" timeOffset="69237">20532 4551 24575,'0'20'0,"0"2"0,0 8 0,0 3 0,0 3 0,0 0 0,0-1 0,0 0 0,2-4 0,0-3 0,0-5 0,1-5 0,-1-5 0,0-2 0,0-2 0,0-2 0,0-1 0,-1-3 0,-1 0 0,0 0 0,0-1 0,0 1 0,1 0 0,0-1 0,0-1 0,0 0 0,-1 0 0</inkml:trace>
+  <inkml:trace contextRef="#ctx0" brushRef="#br0" timeOffset="70921">20359 4858 24575,'2'11'0,"3"0"0,6 3 0,3 1 0,2 0 0,2 0 0,-1 0 0,0-1 0,-2 0 0,-4-3 0,-2-2 0,-3-2 0,-2 0 0,1-1 0,2 4 0,1 2 0,2 1 0,-1 1 0,-1-2 0,-1-3 0,-3-2 0,0-2 0,-2-2 0,1-2 0,0-2 0,0-1 0,0-3 0,-1-4 0,1-3 0,1-1 0,-1-2 0,0 0 0,0 1 0,2 1 0,1 0 0,1 0 0,4 0 0,3-1 0,0 2 0,-2 2 0,-2 2 0,-4 3 0,-3 1 0,0 0 0,-2 2 0,-1 0 0</inkml:trace>
+  <inkml:trace contextRef="#ctx0" brushRef="#br0" timeOffset="73470">15562 4401 24575,'33'-3'0,"-9"2"0,2 0 0,12 1 0,4 0 0,-8 0 0,1 0 0,2 0-706,4 0 0,2 0 0,0 0 706,4 0 0,0 0 0,1 0 0,-10 0 0,0 0 0,1 0 0,0 0-299,1 0 0,0 0 0,1 0 0,-1 0 299,0 0 0,0 0 0,1 0 0,-1 0 0,-1 0 0,1 0 0,-1 0 0,1 0 0,9 0 0,1 0 0,-1 0 0,-2 0 0,0 0 0,0 0-15,-3 0 0,0 0 0,0 0 15,-1 0 0,0 0 0,-1 0 0,1 0 0,0 1 0,-1-2 0,-1 1 0,0-1 0,1-1 0,-1 1 0,1-1 0,-1 1 0,1-1 0,-1 1 0,0-1 0,0 0 0,-1 0 0,0 0 0,0 1 0,-1 1 0,0-1 0,0-1 0,1 1 0,-1 0 0,-2-1 0,0 0 0,1 0 0,-1 0 0,1 1 0,0 0 0,1-1 0,1 1 0,0 0 0,0 0 0,2 0 0,-1 1 0,2 0 0,0 0 0,0 0 0,1 0 0,0 0 0,0 0 0,0 0 0,0 0 0,0 0 0,-2 0 0,0 0 0,0 0 0,-1 0 0,-1 0 0,0 0 0,-1 0 0,-1 0 0,0 0 0,-1 0 0,0 0 0,-1 0-120,0 0 1,0 0 0,0 0 119,0 0 0,0 0 0,-1 0 0,-1 0 0,0 0 0,-1 0 0,13 0 0,-1 0 470,-4 0 0,-2 0-470,-4 0 0,-1 0 716,-3 0 1,-1 0-717,-1 0 0,-2 0 458,1 0 0,-1 0-458,0 0 0,-1 0 214,0 0 0,0 0-214,22 0 0,-7 0 0,-8 0 0,-6 0 0,-1 0 0,3 0 0,4 0 0,1 0 0,-3 0 0,-7 0 0,-6 0 0,-8 0 0,-4 1 0,-3 0 0,-2 1 0,-1 1 0,0 0 0,0 0 0,-1-1 0,0 1 0,-1-2 0,0 1 0,0-2 0,0 0 0,0 0 0,2 0 0</inkml:trace>
+  <inkml:trace contextRef="#ctx0" brushRef="#br0" timeOffset="83040">23239 5061 24575,'0'-39'0,"0"-5"0,0 18 0,0-2 0,0 0 0,0 1 0,0 1 0,0 0 0,0-22 0,0 4 0,0 0 0,-1-1 0,-2 5 0,-1 8 0,1 12 0,-1 9 0,3 8 0,-1 2 0</inkml:trace>
+  <inkml:trace contextRef="#ctx0" brushRef="#br0" timeOffset="84938">23047 4856 24575,'13'1'0,"1"3"0,1 5 0,2 5 0,-1 2 0,-3 0 0,-2-2 0,-2-4 0,-2-3 0,-2-1 0,1-1 0,0 3 0,3 1 0,2 2 0,2 3 0,4 2 0,0 1 0,-1-1 0,-2-3 0,-3-2 0,-6-4 0,0-2 0,-4-4 0,0 0 0,1-1 0,0 0 0,0 0 0,0-1 0,1-2 0,1-5 0,1-5 0,2-4 0,3-3 0,0 2 0,-1 2 0,-1 3 0,-1 4 0,-1 2 0,0 0 0,1 0 0,-1 0 0,-1 0 0,-2 2 0,-2 2 0,-1 1 0,0-1 0,0 1 0,-2 1 0,2 0 0,-2 1 0</inkml:trace>
+  <inkml:trace contextRef="#ctx0" brushRef="#br0" timeOffset="88472">23235 4474 24575,'28'0'0,"13"0"0,-10 0 0,3 0 0,11 0 0,2 0-546,-11 0 1,1 0 0,0 0 545,5 0 0,0 0 0,0 0 0,2 0 0,-1 0 0,1 0 0,0 0 0,0 0 0,-1 0 0,0 0 0,-1 0 0,0 0 0,-3 0 0,0 0 0,0 0 0,-2 0 0,0 0 0,-1 0 125,13 0 1,-1 0-126,1-1 0,0 0 0,-1 0 0,0 0 0,1 0 0,1 0 0,-1 0 0,0-1 0,-1 1 0,0 0 0,-1 0 0,1 0 0,-1 0 0,0 0 0,-1 1 0,1 0 0,-4 0 0,0 0 168,-4 0 1,-3 0-169,-4 0 0,-2 0 0,18 0 0,-10-1 826,-10-1-826,-4 1 222,-5-1-222,-3 0 0,1 1 0,-1-2 0,0 2 0,-2 0 0,-2 1 0,-2 0 0,-2 0 0,-2 0 0,-3 0 0,0 0 0,0 0 0,0 0 0,0 0 0,-1 0 0,-2 3 0,-1 2 0,-1 3 0,-1 2 0,0 3 0,-1 3 0,0 2 0,0 1 0,0 1 0,1 0 0,0 2 0,2 0 0,1 0 0,0 2 0,0-2 0,0 2 0,0 3 0,0-1 0,0-1 0,0-1 0,0-5 0,1-2 0,0-2 0,1-4 0,-1-2 0,-1-4 0,1-1 0,-1-2 0,1-1 0</inkml:trace>
+  <inkml:trace contextRef="#ctx0" brushRef="#br0" timeOffset="90272">25470 4839 24575,'13'3'0,"2"4"0,3 3 0,0 3 0,1 1 0,-1 1 0,2 1 0,-2-2 0,-3-2 0,-3-1 0,-4-4 0,-3-1 0,-2-2 0,-1 0 0,1 1 0,4 3 0,4 3 0,5 6 0,3 3 0,1 4 0,-2-2 0,-3-5 0,-3-5 0,-7-6 0,0-6 0,-5-7 0,0-3 0,0 0 0,0 0 0,0 2 0,1 0 0,2 1 0,-1-1 0,0 2 0,0 0 0,-1 0 0,1 1 0,1-1 0,1-4 0,3-4 0,3-5 0,5-6 0,5-3 0,2-1 0,0 2 0,-4 6 0,-5 7 0,-8 8 0,0 3 0,-6 3 0</inkml:trace>
+</inkml:ink>
+</file>
+
+<file path=ppt/ink/ink2.xml><?xml version="1.0" encoding="utf-8"?>
+<inkml:ink xmlns:inkml="http://www.w3.org/2003/InkML">
+  <inkml:definitions>
+    <inkml:context xml:id="ctx0">
+      <inkml:inkSource xml:id="inkSrc0">
+        <inkml:traceFormat>
+          <inkml:channel name="X" type="integer" min="-2.14748E9" max="2.14748E9" units="cm"/>
+          <inkml:channel name="Y" type="integer" min="-2.14748E9" max="2.14748E9" units="cm"/>
+          <inkml:channel name="F" type="integer" max="32767" units="dev"/>
+        </inkml:traceFormat>
+        <inkml:channelProperties>
+          <inkml:channelProperty channel="X" name="resolution" value="1000" units="1/cm"/>
+          <inkml:channelProperty channel="Y" name="resolution" value="1000" units="1/cm"/>
+          <inkml:channelProperty channel="F" name="resolution" value="0" units="1/dev"/>
+        </inkml:channelProperties>
+      </inkml:inkSource>
+      <inkml:timestamp xml:id="ts0" timeString="2023-07-04T10:19:04.505"/>
+    </inkml:context>
+    <inkml:brush xml:id="br0">
+      <inkml:brushProperty name="width" value="0.05292" units="cm"/>
+      <inkml:brushProperty name="height" value="0.05292" units="cm"/>
+      <inkml:brushProperty name="color" value="#FF0000"/>
+    </inkml:brush>
+  </inkml:definitions>
+  <inkml:trace contextRef="#ctx0" brushRef="#br0">12168 7755 24575,'16'-3'0,"14"1"0,17 2 0,-17 0 0,0 0 0,2 0 0,0 0 0,-1 0 0,-1 0 0,0 0 0,-1 0 0,-3 0 0,-1-1 0,16 0 0,-7-2 0,-11 0 0,-7 2 0,-6 0 0,-4 1 0,-1 0 0,-2 0 0,5 0 0,8 0 0,12 0 0,12 0 0,5 0 0,-1 0 0,-5 0 0,-8 0 0,-9 0 0,-7 0 0,-5 0 0,-4 0 0,-3 0 0,-11 0 0,5 0 0,-6 0 0</inkml:trace>
+  <inkml:trace contextRef="#ctx0" brushRef="#br0" timeOffset="46502">6220 10290 24575,'33'0'0,"-7"0"0,3 0 0,11 0 0,3 0 0,-7 0 0,3 0 0,1 0-911,6 0 0,0 0 0,2 0 911,-10 1 0,1 1 0,0 0 0,0 0 0,1 0 0,-1 1 0,0 0 0,0 0 0,10 2 0,0 1 0,-1-1 28,-5 1 1,0 0-1,-2 0-28,-4-1 0,-1 0 0,0 0 0,12 1 0,-1 0 314,-5-1 0,-2-1-314,-1-1 0,-1 0 0,1-1 0,0 0 0,4 0 0,1-1 0,4 1 0,1 0-185,-13-1 0,0 1 0,0-1 185,1 1 0,1 0 0,-1 0 0,1 1 0,1-1 0,-1 1 0,0 0 0,0-1 0,-1 1 0,1 1 0,-1-1 0,1 0 0,-1 0 0,0 0 0,0 0 0,0 0 0,-1-1 0,0 0 0,-1 1 0,-1-2 0,0 1 0,16-1 0,-1 0 599,-2 0 0,0 0-599,-3-1 0,-1 0 313,-1 0 0,-1 0-313,-3 0 0,-1 0 0,-2 0 0,-2-1 0,-2-1 0,-2 1 305,-2-1 1,-2-1-306,15-1 140,-8 0-140,-7 1 0,-6 1 0,-6-1 0,-2 2 0,-4 1 0,-1-1 0,-5 0 0,1 0 0,-1 0 0,-10 0 0,8 1 0,-8 0 0</inkml:trace>
+  <inkml:trace contextRef="#ctx0" brushRef="#br0" timeOffset="50501">10373 10271 24575,'24'-3'0,"15"2"0,-9 0 0,2 2 0,5-1 0,2 0 0,0 0 0,0 0 0,-4 0 0,-1 0 0,-8 0 0,-1 0 0,11 0 0,-16 0 0,-10 0 0,-4 0 0,0 0 0,3-2 0,6 1 0,5-1 0,0 1 0,-3 1 0,-4 0 0,-5 0 0,-3 0 0,-1 0 0,-2 0 0,1 0 0,0 0 0,0 0 0,0 0 0,0 0 0,-1 0 0,0 0 0,0 0 0</inkml:trace>
+  <inkml:trace contextRef="#ctx0" brushRef="#br0" timeOffset="97522">13839 10246 24575,'38'0'0,"2"0"0,3 0 0,-9 0 0,-11 0 0,-11 0 0,-8 0 0,-2 0 0,-1 0 0</inkml:trace>
+  <inkml:trace contextRef="#ctx0" brushRef="#br0" timeOffset="98707">14699 10342 24575,'6'0'0,"0"0"0,-2 0 0,2 0 0,7-1 0,9-2 0,8-1 0,5 0 0,-5 1 0,-7 2 0,-8 1 0,-4 0 0,-1 0 0,-2 0 0,-2 0 0,-2 0 0,-3 0 0</inkml:trace>
+  <inkml:trace contextRef="#ctx0" brushRef="#br0" timeOffset="100339">14313 10355 24575,'7'0'0,"1"0"0,0 0 0,3 0 0,-4 0 0,0 0 0,-4 0 0,0 0 0,1 0 0,1 0 0,1 0 0,0 0 0,1 0 0,-1 0 0,0 0 0,1 0 0,-3 0 0,-1 0 0,-1 0 0</inkml:trace>
+  <inkml:trace contextRef="#ctx0" brushRef="#br0" timeOffset="111689">2467 10525 24575,'0'34'0,"0"13"0,0-12 0,0 3 0,0 8 0,0 2-505,0-12 0,0 0 0,0 2 505,0 2 0,0 1 0,0 1 0,0 2 0,0 1 0,0 1-446,0-8 1,0 0-1,0 0 1,0 2 445,0 2 0,0 1 0,0 1 0,0 4 0,0-7 0,0 3 0,0 1 0,0 2 0,0 0 0,0-1 0,1-2 0,0 7 0,0-2 0,1 0 0,-1 0 0,1 3-288,0-6 0,-1 2 0,1 2 1,0 1-1,0-2 0,0-2 0,1-3 288,0 1 0,0-2 0,1-3 0,0 0 0,0 0 0,1 6 0,1 0 0,0-1 0,-1-1-217,0-3 0,1-2 0,-1 1 0,0-2 217,1 7 0,0 0 0,1-2 150,-2-4 0,1-1 1,0-2-151,0 9 0,0-4 720,0-10 1,-2-3-721,3 9 2974,-4-15-2974,-1-9 1163,-1-5-1163,1-2 151,0-2-151,-1 0 0,0 0 0,1-1 0,-1 7 0,1 15 0,-2 18 0,0-14 0,0 3 0,0 2 0,0 1 0,0-2 0,0-1 0,0-4 0,0-3 0,1 11 0,0-14 0,1-8 0,0 4 0,0 13 0,2 16 0,-2-17 0,-1 1 0,0 0 0,0 1 0,-1-5 0,1-1 0,0 13 0,1-17 0,-1-11 0,-1-7 0,0-3 0,0-7 0,0 0 0,0 0 0,0 2 0</inkml:trace>
+  <inkml:trace contextRef="#ctx0" brushRef="#br0" timeOffset="112726">2249 14148 24575,'27'0'0,"-3"0"0,3 0 0,15 0 0,4 0 0,-8 0 0,1 0 0,2 0-584,3 0 1,0 0 0,0 0 583,-1 0 0,0 0 0,-1 0 0,-3 0 0,-2 0 0,0 0 283,10 0 0,-3 0-283,-11 0 0,-2 0 289,14 0-289,-19 0 0,-14 0 0,-7 0 0,-2 0 0</inkml:trace>
+  <inkml:trace contextRef="#ctx0" brushRef="#br0" timeOffset="114206">2018 10453 24575,'14'0'0,"14"0"0,19 0 0,-15 0 0,2 0 0,7 0 0,0 0 0,3 0 0,0 0 0,-1 0 0,1 0 0,-2 0 0,1 0 0,-5 0 0,-1 0 0,-3 0 0,-2 0 0,-5 0 0,-2 0 0,9 0 0,-14 0 0,-7 0 0,-6 1 0,-1 0 0,-2 1 0,-2 0 0,0 0 0,-2-1 0,1-1 0</inkml:trace>
+  <inkml:trace contextRef="#ctx0" brushRef="#br0" timeOffset="122958">1231 12141 24575,'-15'0'0,"-14"0"0,-14 0 0,18 0 0,-1 0 0,0 0 0,0 0 0,-19 2 0,6 5 0,10 4 0,-3 21 0,7-3 0,9-7 0,-1 1 0,-6 15 0,3-5 0,8-6 0,5-9 0,5-4 0,2-4 0,0-2 0,2-1 0,1-3 0,2 0 0,2 3 0,3 8 0,3 10 0,5 11 0,3 1 0,1-5 0,2-7 0,3-10 0,2-6 0,5-4 0,2-3 0,1-2 0,0 0 0,-1 0 0,-2 0 0,-4 0 0,-5 0 0,-5 0 0,-5 0 0,-3 0 0,-7 0 0,-1 0 0</inkml:trace>
+  <inkml:trace contextRef="#ctx0" brushRef="#br0" timeOffset="124257">777 12436 24575,'17'0'0,"8"0"0,10 0 0,10 0 0,0 0 0,-5 0 0,-5 0-3277,-18 0 0,-5 0 3047,-11 0 230,-2 0 0,-2 0 0</inkml:trace>
+  <inkml:trace contextRef="#ctx0" brushRef="#br0" timeOffset="125923">820 12346 24575,'22'0'0,"2"0"0,1 0 0,-1 0 0,-6 0 0,-3 0 0,-7 0 0,-1 0 0,-5 0 0,1 0 0,0 0 0,1 0 0,0 0 0,0 0 0,0 0 0,0 0 0,1 0 0,3 0 0,6 0 0,1 0 0,0 0 0,-3 0 0,-6 0 0,-3 0 0,-2 0 0,-1 0 0</inkml:trace>
+  <inkml:trace contextRef="#ctx0" brushRef="#br0" timeOffset="173045">5821 11628 24575,'37'0'0,"-7"0"0,3 0 0,12 0 0,3 0 0,-13 0 0,0 0 0,0 0 0,14 0 0,-2 0 0,-8 0 0,-3 0 0,-8 0 0,-4 0 0,8 0 0,-16 0 0,-13 0 0,-8-2 0,3 2 0,-2-2 0</inkml:trace>
+</inkml:ink>
+</file>
+
+<file path=ppt/ink/ink20.xml><?xml version="1.0" encoding="utf-8"?>
+<inkml:ink xmlns:inkml="http://www.w3.org/2003/InkML">
+  <inkml:definitions>
+    <inkml:context xml:id="ctx0">
+      <inkml:inkSource xml:id="inkSrc0">
+        <inkml:traceFormat>
+          <inkml:channel name="X" type="integer" min="-2.14748E9" max="2.14748E9" units="cm"/>
+          <inkml:channel name="Y" type="integer" min="-2.14748E9" max="2.14748E9" units="cm"/>
+          <inkml:channel name="F" type="integer" max="32767" units="dev"/>
+        </inkml:traceFormat>
+        <inkml:channelProperties>
+          <inkml:channelProperty channel="X" name="resolution" value="1000" units="1/cm"/>
+          <inkml:channelProperty channel="Y" name="resolution" value="1000" units="1/cm"/>
+          <inkml:channelProperty channel="F" name="resolution" value="0" units="1/dev"/>
+        </inkml:channelProperties>
+      </inkml:inkSource>
+      <inkml:timestamp xml:id="ts0" timeString="2023-07-05T09:25:36.930"/>
+    </inkml:context>
+    <inkml:brush xml:id="br0">
+      <inkml:brushProperty name="width" value="0.05292" units="cm"/>
+      <inkml:brushProperty name="height" value="0.05292" units="cm"/>
+      <inkml:brushProperty name="color" value="#FF0000"/>
+    </inkml:brush>
+  </inkml:definitions>
+  <inkml:trace contextRef="#ctx0" brushRef="#br0">1677 5250 24575,'0'14'0,"0"2"0,0 3 0,0 2 0,0 0 0,0-1 0,0-3 0,0-2 0,1-5 0,2-5 0,2-4 0,4-1 0,3-3 0,1 0 0,1-1 0,-1 0 0,1 1 0,1-2 0,2-3 0,5-2 0,4-4 0,-2 1 0,-3-1 0,-7 1 0,-5 2 0,-5-1 0,-2 0 0,-2-2 0,0-1 0,-1 2 0,-3 2 0,-4 2 0,-3 4 0,-3 2 0,-2 2 0,-1 1 0,-1 0 0,-2 1 0,-1 2 0,3 3 0,3 2 0,5 2 0,5 1 0,2 2 0,3 2 0,0 1 0,2 2 0,3-2 0,1-1 0,1-1 0,-1-2 0,0-1 0,1 0 0,2 0 0,2 0 0,2-1 0,6 0 0,3-2 0,2-4 0,-2-2 0,-5-2 0,-5-1 0,-4-6 0,-4-7 0,-3-7 0,-2-3 0,-5 4 0,-6 2 0,-8 4 0,-8 0 0,-9 1 0,-4 3 0,-1 2 0,5 5 0,11 2 0,9 2 0,8 2 0,6 4 0,2 4 0,1 1 0,2 0 0,4-1 0,3-2 0,3 1 0,0 3 0,1 4 0,3 1 0,1 0 0,1-5 0,1-7 0,0-4 0,0-5 0,-1-6 0,-4-6 0,-3-4 0,-3 0 0,-4 1 0,-3 3 0,-2 5 0,-3 4 0,-6 4 0,-6 1 0,0 1 0,0 0 0,8 0 0,1 0 0,7 0 0</inkml:trace>
+  <inkml:trace contextRef="#ctx0" brushRef="#br0" timeOffset="1583">2035 5486 24575,'20'0'0,"14"0"0,10 3 0,-18 2 0,0 2 0,1 1 0,-2 4 0,-1 1 0,-1 3 0,1 1 0,-1 1 0,-2-1 0,0 2 0,1 0 0,-2 0 0,0 1 0,-1-1 0,-1 1 0,0 1 0,-2 0 0,-1 0 0,10 21 0,-2 2 0,-13-21 0,-1 1 0,-1 1 0,0 0 0,-2-1 0,1 0 0,-2 1 0,0 0 0,3 21 0,-3-4 0,-3-5 0,0-11 0,-2-7 0,0-7 0,-1 0 0,-1 0 0,-2 2 0,-3 2 0,-2 4 0,-1 3 0,1-2 0,2-3 0,3-4 0,2-6 0,2-1 0,0-8 0,0 0 0</inkml:trace>
+  <inkml:trace contextRef="#ctx0" brushRef="#br0" timeOffset="3199">2440 6236 24575,'0'13'0,"0"10"0,0 13 0,0 9 0,0 2 0,0-4 0,0-5 0,0-6 0,0-6 0,0-7 0,0-6 0,0-2 0,0-2 0,0-3 0,0-1 0,0-3 0,0 0 0,0 1 0,2-1 0,-1-1 0,2 0 0,0-1 0,0 0 0,0 0 0,1-1 0,5-4 0,8-4 0,14-6 0,14-4 0,-18 9 0,1 0 0,0 1 0,-1 1 0,18-4 0,-11 3 0,-13 4 0,-7 3 0,-4 1 0,-4 1 0,-2 0 0,-2 0 0,1 0 0,-1 0 0,0 0 0,0 0 0,0 0 0,0 0 0,0 0 0,0 0 0,-1 0 0</inkml:trace>
+  <inkml:trace contextRef="#ctx0" brushRef="#br0" timeOffset="4582">2855 5939 24575,'0'-34'0,"0"-15"0,0 16 0,0-1 0,1-3 0,1-1 0,0 4 0,2 0 0,0 7 0,1 1 0,5-10 0,-2 16 0,0 8 0,0 6 0,3 3 0,1 0 0,2 2 0,4 1 0,2 0 0,2 0 0,0 0 0,-2 0 0,-1 1 0,0 2 0,-2 6 0,0 8 0,0 8 0,-2 6 0,-1 5 0,-2 5 0,-1 1 0,-3 2 0,-2 2 0,-2-3 0,-3-3 0,1-8 0,-2-8 0,0-9 0,0-5 0,0-3 0,0-2 0,0-4 0,0 0 0</inkml:trace>
+  <inkml:trace contextRef="#ctx0" brushRef="#br0" timeOffset="6034">2894 5832 24575,'10'0'0,"3"0"0,5 0 0,6 0 0,1 0 0,-2 0 0,-6 0 0,-8 0 0,-2 0 0,-3 0 0,-1 0 0,0 0 0,1 0 0,-1 0 0,2 0 0,0 0 0,1 0 0,0 0 0,1 0 0,-1 0 0,-1 0 0,0 0 0,1 0 0,3 0 0,2 0 0,1 0 0,0 0 0,-2 0 0,-4 0 0,-3 0 0,-2 0 0</inkml:trace>
+  <inkml:trace contextRef="#ctx0" brushRef="#br0" timeOffset="8802">2376 6971 24575,'-7'-2'0,"-3"0"0,-8 2 0,-12 0 0,-10 2 0,14 1 0,-1 2 0,-1 2 0,-1 1 0,1 2 0,0 1 0,3 1 0,0-1 0,-16 10 0,8-2 0,7 0 0,4 1 0,2 3 0,0 3 0,0 2 0,-1 1 0,1-2 0,2-4 0,5-4 0,5-5 0,4-3 0,3-3 0,1-2 0,4-1 0,1 2 0,3 1 0,3 4 0,3 4 0,4 4 0,5 4 0,4 2 0,2 1 0,5 2 0,6-1 0,-18-14 0,1-1 0,1 0 0,2-1 0,0-1 0,1-1 0,-1-2 0,1 0 0,-1-3 0,-1 0 0,21 0 0,-7-2 0,-5-3 0,-4 0 0,-2 0 0,0 0 0,-2-2 0,0-2 0,-2-3 0,-1-5 0,-1-3 0,1-8 0,0-6 0,3-10 0,-12 18 0,1-2 0,0-1 0,0 0 0,0-2 0,0 1 0,-1 1 0,-1 0 0,8-21 0,-6 4 0,-7 8 0,-4 6 0,-3 8 0,-1 6 0,-3 1 0,-6-4 0,-6-4 0,-9-8 0,-5-4 0,-3 2 0,2 2 0,3 7 0,6 8 0,6 5 0,5 6 0,3 1 0,3 2 0,2 1 0,1-1 0,1 0 0</inkml:trace>
+  <inkml:trace contextRef="#ctx0" brushRef="#br0" timeOffset="10133">2751 7611 24575,'33'0'0,"1"4"0,4 6 0,-4 8 0,-4 6 0,-3 4 0,-3 2 0,2 4 0,1 7 0,-13-17 0,0 1 0,0 1 0,0 2 0,-1 2 0,-1 0 0,-2-1 0,-1 0 0,-2-2 0,-1 0 0,0 20 0,-3-7 0,-5-6 0,-7-1 0,-16 4 0,6-15 0,-2 0 0,-4 4 0,-2 0 0,-2 1 0,0 1 0,0 0 0,1-1 0,2-3 0,1-1 0,3-3 0,2-2 0,-10 8 0,11-11 0,10-8 0,4-6 0,5-3 0,0 0 0</inkml:trace>
+  <inkml:trace contextRef="#ctx0" brushRef="#br0" timeOffset="11614">2747 8431 24575,'0'25'0,"-1"7"0,-4 9 0,-4 3 0,-4-2 0,-2-5 0,1-3 0,1-5 0,3 0 0,-1-4 0,2-3 0,2-4 0,2-3 0,3-7 0,1-2 0,1-4 0,2-1 0,2-1 0,1 0 0,3 0 0,6 0 0,8-2 0,8 0 0,8-1 0,8-1 0,4 1 0,-3 1 0,-6 1 0,-12 1 0,-9 0 0,-5 0 0,-8-1 0,0 0 0,-6-1 0,0-1 0,-1 2 0,0 0 0</inkml:trace>
+  <inkml:trace contextRef="#ctx0" brushRef="#br0" timeOffset="13601">3426 8458 24575,'0'-12'0,"0"-5"0,0-9 0,0-6 0,0-3 0,0-2 0,0 1 0,0-3 0,0-4 0,0-3 0,0 0 0,2 3 0,2 5 0,2 4 0,3-2 0,2 0 0,2 0 0,6 3 0,6 6 0,7 7 0,6 10 0,5 6 0,4 10 0,0 9 0,-6 10 0,-8 4 0,-9 0 0,-8-4 0,-7-1 0,-4 1 0,-4 2 0,-7 4 0,-10 1 0,-10 0 0,-10-5 0,-4-4 0,0-5 0,6-6 0,8-5 0,9-4 0,8-2 0,3-2 0,5-1 0,1-1 0,0-1 0,0 0 0,2 2 0,4 0 0,4 0 0,6 1 0,4 0 0,4 1 0,4 0 0,7 1 0,4 7 0,3 7 0,-4 6 0,-8 4 0,-8-1 0,-7-2 0,-5-1 0,-4-5 0,-2-2 0,-3-2 0,-1-1 0,-2-1 0,-3-1 0,-3 0 0,-3-3 0,-2-1 0,-1-2 0,-1 0 0,-5-1 0,-7 0 0,-4-1 0,-4-1 0,6 0 0,8-1 0,9-3 0,7 2 0,4-2 0</inkml:trace>
+  <inkml:trace contextRef="#ctx0" brushRef="#br0" timeOffset="16135">2071 5314 24575,'28'-3'0,"5"-11"0,-11 1 0,0-4 0,2-5 0,-1-3 0,4-7 0,-2-2 0,1-4 0,-2-3 0,-1-3 0,-3-2 0,-7 15 0,-1-1 0,-1 1 0,2-16 0,-2 1 0,-3 2 0,-2 1 0,-2 7 0,-2 0 0,0 5 0,-3 0 0,-1 4 0,-2 0 0,-1 1 0,-2 1 0,-1-1 0,-1 1 0,-2-1 0,0 1 0,0 1 0,-1 1 0,-13-19 0,10 22 0,-2 0 0,-19-14 0,16 19 0,-1 1 0,-19-10 0,0 7 0,3 7 0,-1 4 0,-3 5 0,-5 1 0,19 0 0,-1 2 0,-2 0 0,-1 2 0,0 2 0,0 2 0,1 2 0,2 2 0,1 1 0,2 2 0,1 2 0,2 1 0,-1 2 0,2 1 0,1 2 0,0 1 0,1 1 0,0 1 0,0 0 0,2 1 0,1-2 0,1-1 0,1-2 0,0-1 0,-7 18 0,3-6 0,4-3 0,2 2 0,2 0 0,1 4 0,3 1 0,1-5 0,4-6 0,0-5 0,1-3 0,2 0 0,2-1 0,1-4 0,1-3 0,-1-4 0,-1-3 0,-1-2 0,-1-1 0,-1 0 0</inkml:trace>
+  <inkml:trace contextRef="#ctx0" brushRef="#br0" timeOffset="17981">1088 4790 24575,'9'2'0,"2"5"0,6 4 0,2 5 0,3 3 0,2 0 0,0 1 0,2 1 0,-2 1 0,-1 1 0,-2-1 0,-3-3 0,-2-1 0,-2-4 0,-2-2 0,-4-2 0,-3-3 0,-2-3 0,-2-1 0,1-1 0,0 0 0,0 2 0,3 1 0,0 2 0,1 1 0,-1-2 0,-1-2 0,-1-2 0,-1-2 0,1 0 0,-1 0 0,1 0 0,0-1 0,2-3 0,1-7 0,1-9 0,6-9 0,7-8 0,8-3 0,-11 21 0,0 0 0,14-12 0,-6 10 0,-8 7 0,-5 7 0,-3 2 0,-1 1 0,0 1 0,1-2 0,0-1 0,0 0 0,0 0 0,0-2 0,-5 5 0,-1-1 0</inkml:trace>
+  <inkml:trace contextRef="#ctx0" brushRef="#br0" timeOffset="19534">2845 4737 24575,'-3'-7'0,"1"-13"0,2-14 0,0 9 0,0-3 0,0-4 0,0-1 0,0 0 0,0 0 0,0-3 0,0-1 0,0 2 0,0 0 0,1-4 0,1 1 0,1 0 0,1 0 0,3 1 0,1 1 0,1 2 0,2 2 0,-2 6 0,1 1 0,6-12 0,-4 17 0,-3 10 0,1 6 0,-1 3 0,0 3 0,0 3 0,1 5 0,3 7 0,3 7 0,7 11 0,-10-14 0,0 2 0,1 3 0,-1 1 0,-1 3 0,-1 0 0,-1-1 0,-2 1 0,-1-1 0,-1 1 0,-2-2 0,0 0 0,-2 0 0,-1 0 0,0-1 0,-1 0 0,0 21 0,0-8 0,0-9 0,0-3 0,0-4 0,0 1 0,0-3 0,0-5 0,0-3 0,0-10 0,0 0 0,0-4 0</inkml:trace>
+  <inkml:trace contextRef="#ctx0" brushRef="#br0" timeOffset="24935">2898 4421 24575,'9'0'0,"3"0"0,3 0 0,2 0 0,-1 0 0,-1 0 0,-1 0 0,-1 0 0,-1 0 0,-1 0 0,-5 0 0,-2-2 0,-3 1 0,1 0 0,0 1 0,1 0 0,0 0 0,0 0 0,1 0 0,-1 0 0,2 0 0,4 0 0,4 0 0,5 0 0,5 0 0,0 0 0,-3 0 0,-6 0 0,-8 0 0,-3 0 0</inkml:trace>
+  <inkml:trace contextRef="#ctx0" brushRef="#br0" timeOffset="35270">7887 4887 24575,'0'-46'0,"0"15"0,0-2 0,0-13 0,0-2 0,0 12 0,0 1 0,0-1 0,0-1 0,0 0 0,0 1 0,0-15 0,0 3 0,0 10 0,1 2 0,-1 6 0,1 3 0,0-6 0,0 12 0,0 7 0,-1 3 0,0 3 0,0 1 0,0 3 0,0 2 0,0-1 0,0 1 0,1 1 0,0 0 0,1 1 0,2 0 0,2 0 0,3 0 0,4 2 0,8 4 0,14 2 0,-10-1 0,4-1 0,9 1 0,3 0 0,-8-2 0,2 0 0,1-1-405,4 1 0,2-1 0,2 0 405,-8-2 0,2 1 0,0-1 0,0 0 0,2 0 0,0 0 0,1 0 0,-1 0 0,1 0 0,-1-1 0,1 1 0,-1 0 0,-1 0 0,0 0 0,0 1 0,-1 0 0,10 0 0,-1 1 0,-1-1 0,0 1 0,-2 1 0,1-1 0,-1 1 0,0-1 0,-1 1 0,-1 1 0,0-1 0,0 1 0,0 0 0,0 1 0,0 0 0,0 0 0,2 1 0,-1-1 0,3 2 0,0-1 0,0 1 0,3 0 0,0 0 0,-1-1 0,-1 1 0,-1-1 0,-1 0 0,-2 0 0,-1 0 0,-1 0-86,-5-2 1,0 1 0,-1 0 85,12 1 0,-3 1 0,-2-2 0,-3-1 0,-5-1 0,-2-1 0,-5-1 0,-2-1 0,19 0 1199,-7 0-1199,-6 0 272,-6-1-272,-3 1 0,-4 0 0,-3-1 0,-4 1 0,-4-1 0,-3 1 0,-2 0 0,-2 1 0,0-1 0,0 1 0,-2 1 0,-4 3 0,-3 1 0,-2 2 0,1 2 0,1 1 0,0 3 0,2 0 0,0 1 0,0 0 0,2 2 0,-2 5 0,-1 9 0,-1 7 0,1 0 0,2-5 0,2-10 0,1-8 0,2-8 0,0-4 0,1-1 0,-1-3 0,0-1 0,-1-2 0,2 1 0,0-2 0</inkml:trace>
+  <inkml:trace contextRef="#ctx0" brushRef="#br0" timeOffset="37100">10557 4706 24575,'2'9'0,"4"4"0,4 5 0,4 1 0,-1-1 0,-2-3 0,-2-2 0,-1-2 0,1 2 0,1 2 0,2 1 0,-1-1 0,-2-3 0,-2-1 0,-4-5 0,0 1 0,-3-5 0,0 1 0,1-1 0,0 1 0,0-1 0,0 1 0,-1 0 0,1 0 0,0 0 0,1 2 0,1 3 0,1 4 0,2 3 0,0 0 0,-1-2 0,1-4 0,-4-4 0,2-3 0,-2-2 0,1 0 0,1 0 0,1-2 0,1-1 0,1-4 0,1-1 0,1-1 0,4-1 0,3-2 0,5-2 0,5-1 0,4-1 0,1 1 0,-3 2 0,-6 3 0,-6 3 0,-4 2 0,-6 3 0,0 0 0,-6 2 0,1 0 0</inkml:trace>
+  <inkml:trace contextRef="#ctx0" brushRef="#br0" timeOffset="39253">7694 4753 24575,'7'12'0,"5"6"0,6 8 0,1 6 0,-1 2 0,-1 0 0,-1-2 0,0 2 0,1-2 0,0-4 0,-2-5 0,-2-6 0,-4-4 0,-2-5 0,-3-3 0,-2-3 0,-2-3 0,0-3 0,1-2 0,1-4 0,2-5 0,1-3 0,1-6 0,2 0 0,1 1 0,3 1 0,-1 6 0,0 4 0,-1 4 0,-4 2 0,-1 1 0,2-2 0,3-5 0,5-4 0,2-1 0,-1 1 0,-2 4 0,-8 7 0,-1 1 0</inkml:trace>
+  <inkml:trace contextRef="#ctx0" brushRef="#br0" timeOffset="49603">15418 5031 24575,'0'-35'0,"0"3"0,0-3 0,0-13 0,0-3-387,0 12 0,0-1 0,0 0 387,0 2 0,-1 1 0,1 2 0,-1-8 0,0 3 190,0 11 0,-1 3-190,0-3 192,1 16-192,0 6 0,1 4 0,0 0 589,-1 1-589,0 1 0,5 0 0,2 2 0,9 1 0,3 1 0,4-1 0,3-1 0,9-1 0,14 0 0,-18 0 0,3 0 0,7 0 0,1 0 0,3 1 0,2-2 0,2 1 0,2-1-214,-15-1 1,0 1 0,0 0 213,2-1 0,1 0 0,0 1 0,3-1 0,0 0 0,1 0 0,1-1 0,0 1 0,0-1-347,2 1 1,0-1 0,0 1 346,1-1 0,-1 1 0,1-1 0,1 1 0,0-1 0,0 1 0,2 0 0,0 1 0,1 0-376,-12 0 0,1 0 1,0 0-1,0 0 376,2 0 0,0 1 0,0 0 0,1-1 0,2 1 0,0 0 0,0 0 0,1 0-525,2 0 0,0 0 0,1-1 0,0 0 525,-6 0 0,0 0 0,0-1 0,1 0 0,1 0-417,3 0 0,2-1 0,0 0 0,0 0 0,0-1 417,-6 1 0,-1-1 0,1 0 0,0 0 0,-1 0 0,1-1 0,0 1 0,-1-1 0,1 1 0,-1-1 0,1 1 0,-1-1 0,8 0 0,0-1 0,0 1 0,-1 0 0,0 0-186,-3 0 1,-1 0-1,0 1 1,-1-1 0,0 1 185,-3 1 0,0-1 0,-1 1 0,0 0 0,-1 0 64,6 0 0,-1 0 0,0 0 1,-3 0-65,8 0 0,-3 0 0,-1-1 465,-5 1 0,-1-1 0,-1 1-465,-3 0 0,-1-1 0,0 1 0,10-1 0,-2-1 1358,-4 2 1,-3 1-1359,-7 0 0,-2 1 2244,11-1-2244,-10 2 1211,-6 0-1211,-1 0 470,6 0-470,3 0 0,0 1 0,-3 0 0,-6 2 0,-5 0 0,-4 1 0,-1 0 0,4-1 0,6 0 0,8-2 0,4 1 0,-2 0 0,-5 0 0,-4 2 0,-1 0 0,3 1 0,2-1 0,1 0 0,-1 0 0,-6 0 0,-7 0 0,-5 0 0,-3-1 0,-3 0 0,1 0 0,-1 0 0,0 0 0,-1 1 0,0 1 0,0 0 0,0 1 0,0 0 0,0 0 0,0 2 0,0 0 0,0 2 0,0 1 0,0 4 0,0 3 0,0 8 0,0 13 0,0-13 0,0 2 0,0 4 0,0 2 0,0 1 0,0 1 0,0-3 0,1 0 0,0-5 0,1-1 0,2 15 0,2-11 0,-1-7 0,1-2 0,-1-1 0,-1-3 0,-2-2 0,-1-7 0,-1 0 0,0-7 0,1 1 0,0-1 0,0-2 0,0-2 0</inkml:trace>
+  <inkml:trace contextRef="#ctx0" brushRef="#br0" timeOffset="52402">20441 4807 24575,'6'12'0,"4"7"0,8 10 0,4 6 0,5 6 0,-11-19 0,1 0 0,1 3 0,2 0 0,1 3 0,1 0 0,0 1 0,0 1 0,-1-2 0,-2 0 0,-2-2 0,-1-2 0,8 14 0,-9-13 0,-3-8 0,-7-12 0,-2-4 0,-3-11 0,0-4 0,0-4 0,0-2 0,2 1 0,-1 3 0,2 4 0,-1 3 0,-1 2 0,0 1 0,2-5 0,3-6 0,4-6 0,6-9 0,1-4 0,2-1 0,-1 1 0,-3 6 0,-3 9 0,-3 6 0,-5 9 0,-1 3 0,-3 4 0,0 0 0</inkml:trace>
+  <inkml:trace contextRef="#ctx0" brushRef="#br0" timeOffset="74271">18075 5183 24575,'0'-18'0,"-1"-10"0,-1-18 0,1 15 0,-1-2 0,-1-4 0,-1-1 0,1-2 0,-1 1 0,0 4 0,0 1 0,0 6 0,0 2 0,0-9 0,1 12 0,2 13 0,1 3 0,1 6 0,1 0 0,2 3 0,2 1 0,4 3 0,2 1 0,3-2 0,4 0 0,7-3 0,15 1 0,-14-1 0,3 1 0,9-1 0,3-1 0,4 1 0,3 0-249,-13-2 1,0 1-1,2-1 249,1 0 0,1 0 0,0 0 0,0 0 0,-1 0 0,1 0 0,-2-1 0,1 0 0,-1-1 0,-3 0 0,0 0 0,0-1-81,14-2 0,-1 0 81,-1-1 0,-1 1 0,4-1 0,-1 1 0,-16 2 0,1 0 0,-1 0 0,0 0 0,1 1 0,0-1 0,-1 0 0,1 1 0,0-1 0,15 0 0,-1 0 0,-3 0 0,1 0 0,-3 1 0,0 0 0,-3 1 0,-1 0 0,-3 0 0,-2 1 0,-2 0 0,-2 0 0,-4 0 0,-1 0 740,11 0-740,-12 0 168,-6 0-168,-11 1 0,-1 2 0,-6 2 0,0 2 0,0 2 0,0 2 0,0 6 0,0 7 0,2 9 0,5 10 0,-2-18 0,2 0 0,0 0 0,1 0 0,8 19 0,-5-8 0,-2-10 0,-4-6 0,-2-5 0,-2-3 0,1-4 0,-1-3 0,2-3 0,-3-2 0</inkml:trace>
+  <inkml:trace contextRef="#ctx0" brushRef="#br0" timeOffset="76122">20028 5013 24575,'22'3'0,"6"6"0,5 6 0,2 3 0,-2 0 0,-5-3 0,-6-4 0,-5-2 0,-3-2 0,-8-1 0,-1-2 0,-4-3 0,0 0 0,1-1 0,0 0 0,0-1 0,-1-2 0,-1-6 0,0-5 0,0-3 0,0-1 0,0 2 0,0 3 0,0 1 0,0 3 0,0 2 0,0 2 0,0 1 0,1 1 0,3-1 0,3-3 0,3-3 0,1-1 0,0 2 0,-1 2 0,-4 1-3277,-3 4 0,-1-2 3047,-2 2 230,0 0 0,0 1 0,0 0 0</inkml:trace>
+  <inkml:trace contextRef="#ctx0" brushRef="#br0" timeOffset="83199">23212 4879 24575,'0'-24'0,"0"-6"0,0-7 0,0-1 0,0 2 0,0 6 0,0 4 0,0 5 0,0 7 0,0 5 0,2 4 0,3 3 0,4 2 0,9 1 0,12 3 0,17 1 0,-15-2 0,2-1 0,7 0 0,1-1 0,6-1 0,1 1-225,-14-1 1,1 0 0,0 0 224,2 0 0,1 0 0,0 0 0,3 0 0,0 0 0,1 0 0,1 0 0,-1 0 0,2 0 0,0-1 0,0 1 0,1 1-408,0-1 0,1 2 0,1-1 408,-1 1 0,1 0 0,0 1 0,0-1 0,-1 2 0,0-1 0,0 0 0,-1-1 0,-1 1 0,-3-1 0,0-1 0,-2 0-73,-3 0 0,-1 0 0,-1-1 73,14 0 0,-2 0 0,-6 0 0,-1 0 0,-5 0 0,-2 0 312,-5 0 0,-1 0-312,14 0 1251,-14 0-1251,-9 0 241,-9 0-241,-1 0 0,-2-1 0,6 0 0,6-1 0,5-1 0,3 1 0,-2-1 0,-3 1 0,-4-1 0,-2-1 0,-3-1 0,-1 1 0,0 2 0,-2-1 0,-2 2 0,-2 0 0,-3 4 0,-2 3 0,-1 6 0,-2 4 0,-1 3 0,-2 2 0,2-1 0,0 0 0,2-1 0,1-4 0,1-2 0,0-2 0,0-2 0,-1 0 0,0 0 0,-1 2 0,1 0 0,1-1 0,0 1 0,0-2 0,0-3 0,0 0 0,0-3 0,0-1 0,0 1 0,0-1 0,0 0 0,0-1 0</inkml:trace>
+  <inkml:trace contextRef="#ctx0" brushRef="#br0" timeOffset="84955">25335 4889 24575,'17'0'0,"2"4"0,3 4 0,2 5 0,3 8 0,1 2 0,0 2 0,-3-1 0,-6-5 0,-3-4 0,-5-5 0,-4-3 0,-2-3 0,-2-1 0,-2-2 0,-1 1 0,1 0 0,0 1 0,0 0 0,1 0 0,0 1 0,0-1 0,0 0 0,-1 1 0,1 1 0,-1 0 0,0-1 0,2-1 0,-1-1 0,2-3 0,0-3 0,1-5 0,-1-5 0,0-2 0,1-1 0,0 2 0,2-1 0,6 0 0,6-1 0,3-2 0,2 2 0,-3 2 0,-2 3 0,-3 3 0,-4 2 0,-3 2 0,-3 2 0,-2 0 0,-3 0 0,-2 2 0,0 0 0,-1 1 0</inkml:trace>
+</inkml:ink>
+</file>
+
+<file path=ppt/ink/ink21.xml><?xml version="1.0" encoding="utf-8"?>
+<inkml:ink xmlns:inkml="http://www.w3.org/2003/InkML">
+  <inkml:definitions>
+    <inkml:context xml:id="ctx0">
+      <inkml:inkSource xml:id="inkSrc0">
+        <inkml:traceFormat>
+          <inkml:channel name="X" type="integer" min="-2.14748E9" max="2.14748E9" units="cm"/>
+          <inkml:channel name="Y" type="integer" min="-2.14748E9" max="2.14748E9" units="cm"/>
+          <inkml:channel name="F" type="integer" max="32767" units="dev"/>
+        </inkml:traceFormat>
+        <inkml:channelProperties>
+          <inkml:channelProperty channel="X" name="resolution" value="1000" units="1/cm"/>
+          <inkml:channelProperty channel="Y" name="resolution" value="1000" units="1/cm"/>
+          <inkml:channelProperty channel="F" name="resolution" value="0" units="1/dev"/>
+        </inkml:channelProperties>
+      </inkml:inkSource>
+      <inkml:timestamp xml:id="ts0" timeString="2023-07-05T09:27:39.801"/>
+    </inkml:context>
+    <inkml:brush xml:id="br0">
+      <inkml:brushProperty name="width" value="0.05292" units="cm"/>
+      <inkml:brushProperty name="height" value="0.05292" units="cm"/>
+      <inkml:brushProperty name="color" value="#FF0000"/>
+    </inkml:brush>
+  </inkml:definitions>
+  <inkml:trace contextRef="#ctx0" brushRef="#br0">7893 5209 24575,'0'-8'0,"0"-1"0,0-1 0,0-1 0,0-6 0,0-13 0,-1-20 0,0 15 0,0-4 0,0-4 0,-1-1 0,1-2 0,-2 0 0,1 4 0,0 1 0,0 7 0,0 3 0,1 5 0,-1 1 0,0-11 0,1 9 0,-1 4 0,1 2 0,0 3 0,-1 3 0,1 4 0,0 3 0,1 4 0,0 1 0,1 1 0,1 1 0,0 1 0,2 0 0,-2 0 0,1 0 0,1 0 0,-1 0 0,0 0 0,1 0 0,-1 0 0,0 0 0,0 0 0,0 0 0,0 1 0,1 0 0,1 0 0,0 1 0,2 0 0,3 0 0,11 2 0,20-1 0,-9-1 0,4-1 0,-5 0 0,3-1 0,1 0-407,6 0 1,2 0 0,2 0 406,3 0 0,2 0 0,0 0 0,-10 0 0,-1 0 0,1 0 0,-1 0 0,1 0 0,-1 0 0,1 0 0,-1 0 0,0 1 0,0-1 0,0 0 0,-1 1 0,11-1 0,0 1 0,-2 0 0,-2 0 0,-1-1 0,0 1-159,-4 0 0,0 1 0,0-1 159,-5 0 0,-1 1 0,0 0 0,14 0 0,-1 1 0,-1 1 0,-1 0 0,-2 0 0,-1 1 0,0-1 0,0-1 0,-2 0 0,0 0 0,-4-1 0,-1-1 0,-4-1 0,-1 0 594,-1 0 1,-1 0-595,-1 0 0,1 0 253,1 0 1,1 0-254,3 0 0,2 0 0,2 0 0,0 0 0,4 0 0,0 0 0,-2 1 0,1 0 0,-4 0 0,-2-1 0,-4 1 0,-2 0 0,14 1 0,-13-1 0,-8 1 0,-12 0 0,-4-1 0,-5 1 0,0 0 0,0 1 0,0 0 0,0 0 0,-3 2 0,-1 2 0,-2 1 0,-2 1 0,-1 1 0,1 2 0,1 2 0,0-1 0,1 1 0,1-1 0,0 1 0,0 2 0,1 2 0,-1 0 0,1 1 0,2-2 0,0 1 0,0 1 0,-1 2 0,1 1 0,-1 0 0,1-2 0,1-3 0,0-1 0,1 1 0,0 1 0,0 0 0,0-2 0,0-4 0,0-3 0,0-3 0,0-4 0,0-1 0,0-1 0</inkml:trace>
+  <inkml:trace contextRef="#ctx0" brushRef="#br0" timeOffset="2286">10331 4882 24575,'18'14'0,"0"1"0,-2 5 0,0 1 0,0 1 0,2 4 0,3 4 0,3 5 0,2 4 0,-1-1 0,-3-6 0,-5-6 0,-4-7 0,-4-6 0,-2-5 0,-3-3 0,-1-2 0,-2-2 0,0 0 0,0 0 0,0-4 0,0-4 0,2-6 0,0-3 0,3 0 0,0 1 0,1 2 0,1 3 0,4-2 0,8-1 0,5-4 0,4-2 0,-1 0 0,-3 2 0,-5 2 0,-5 3 0,-4 1 0,-3 3 0,-4 0 0,-1 2 0,-2 1 0,-1 1 0,1 0 0,0 1 0,0 0 0,0 0 0,-1 0 0,0 0 0,0 1 0,0 1 0</inkml:trace>
+  <inkml:trace contextRef="#ctx0" brushRef="#br0" timeOffset="5517">3465 6003 24575,'6'0'0,"1"-3"0,-1-5 0,-1-6 0,-2-5 0,-6-1 0,-7 1 0,-8 5 0,-6 5 0,-3 5 0,1 2 0,6 4 0,5 3 0,6 4 0,6 4 0,5 3 0,9 2 0,12 0 0,10-3 0,3-4 0,-6-6 0,-12-5 0,-8-9 0,-12-9 0,-13-8 0,-10-4 0,-7 6 0,1 9 0,6 7 0,9 6 0,7 5 0,5 6 0,3 3 0,2 4 0,3-1 0,4-4 0,2-4 0,0-3 0,-3-5 0,-2-3 0,-3-5 0,-5-2 0,-2 1 0,-4 5 0,3 4 0,0 1 0,6 2 0</inkml:trace>
+  <inkml:trace contextRef="#ctx0" brushRef="#br0" timeOffset="7070">3572 5920 24575,'34'0'0,"4"0"0,8 0 0,0 0 0,-2 0 0,-2 0 0,-4 3 0,-1 3 0,-1 7 0,-3 5 0,-2 1 0,-5 1 0,-7-1 0,-2 1 0,-4 2 0,-1 2 0,0 1 0,-3 1 0,-1-2 0,-2-3 0,-4-4 0,0 1 0,-2 1 0,0 5 0,-3 7 0,-3 6 0,-7 4 0,-3 4 0,6-21 0,0-1 0,-2 2 0,1 1 0,-1-1 0,0 1 0,0-1 0,0 1 0,1-1 0,0 0 0,-9 20 0,3-5 0,4-8 0,2-7 0,3-6 0,4-11 0,1-3 0,3-6 0</inkml:trace>
+  <inkml:trace contextRef="#ctx0" brushRef="#br0" timeOffset="8570">3818 6597 24575,'0'23'0,"0"2"0,0 3 0,0 1 0,0-2 0,0-4 0,0-4 0,0-2 0,0-1 0,-3 2 0,0-1 0,-1-1 0,1-3 0,1-7 0,2 0 0,0-4 0,0 0 0,1-1 0,2 0 0,6-2 0,14 0 0,15 0 0,-11 0 0,1 1 0,4 0 0,0 0 0,-1 0 0,0 0 0,-3 0 0,-2 0 0,13 1 0,-14 0 0,-10 1 0,-7 0 0,-4-2 0,-3 1 0</inkml:trace>
+  <inkml:trace contextRef="#ctx0" brushRef="#br0" timeOffset="10803">3592 7025 24575,'-5'0'0,"-3"0"0,-1 0 0,-4 1 0,0 2 0,2 3 0,4 2 0,3 4 0,3 4 0,1 4 0,0 4 0,0 6 0,-3 5 0,-3 3 0,-3 1 0,-2-2 0,1-6 0,3-6 0,2-5 0,3-6 0,0-3 0,2-1 0,0 2 0,0 4 0,0 6 0,1 6 0,2 4 0,2 2 0,3 0 0,2-3 0,3-6 0,3-6 0,3-4 0,4-3 0,2-4 0,5-1 0,5-3 0,7-2 0,7-1 0,-23-1 0,0 0 0,-1 0 0,1 0 0,20 0 0,-7-3 0,-7-3 0,-7-2 0,-8-3 0,-7 0 0,-4-2 0,-1-6 0,0-9 0,3-12 0,2-7 0,1-1 0,-3 2 0,-3 3 0,-3 1 0,-2-2 0,-3 0 0,-3-1 0,-7 1 0,-6 6 0,-7 6 0,-3 8 0,-4 5 0,-1 7 0,0 5 0,4 3 0,4 3 0,6 1 0,5 0 0,4 0 0,3 0 0,2 0 0,1 1 0,3 0 0,0 1 0,0 1 0,1-1 0,-1 0 0,0 1 0,0-2 0,0 1 0,0 0 0,-1 0 0,-3 2 0,-5 2 0,-5 2 0,-3-1 0,-1-1 0,5-3 0,7-2 0,3-1 0</inkml:trace>
+  <inkml:trace contextRef="#ctx0" brushRef="#br0" timeOffset="13070">4479 6421 24575,'0'-18'0,"0"-7"0,0-12 0,0-8 0,0 20 0,0-1 0,0-1 0,0 0 0,0 1 0,0-1 0,0 0 0,0 1 0,0-23 0,1 4 0,2 3 0,4-1 0,4-3 0,-4 21 0,1 1 0,0-1 0,1 1 0,7-17 0,-1 9 0,-4 12 0,-3 11 0,-3 5 0,1 2 0,-3 3 0,1 5 0,1 7 0,1 10 0,4 11 0,6 10 0,-7-20 0,1 2 0,0 0 0,0 1 0,0 0 0,-1-1 0,-1-1 0,-1 0 0,6 21 0,-4-5 0,-4-4 0,-1-5 0,-3-7 0,1-5 0,-2-4 0,0 0 0,0-1 0,0 0 0,0-2 0,0-2 0,1-6 0,0-1 0,0-4 0,0 0 0</inkml:trace>
+  <inkml:trace contextRef="#ctx0" brushRef="#br0" timeOffset="14331">4551 6197 24575,'13'-2'0,"5"0"0,7 2 0,5 0 0,-1 0 0,-4 0 0,-4 0 0,-6 0 0,-8 0 0,-2 0 0</inkml:trace>
+  <inkml:trace contextRef="#ctx0" brushRef="#br0" timeOffset="15939">3978 7704 24575,'4'11'0,"3"3"0,2 7 0,-1 5 0,-3 2 0,-3 3 0,-2 1 0,0 5 0,0 6 0,0 4 0,0-19 0,-2 0 0,-2 4 0,-2 0 0,-2 2 0,-4 0 0,-3 2 0,-4 1 0,-5 1 0,-2 0 0,-4 1 0,0-1 0,-2 0 0,-1 0 0,1-3 0,-1 0 0,2-4 0,0 0 0,2-3 0,0 0 0,3-3 0,2 0 0,3-4 0,2-2 0,-8 12 0,9-10 0,7-6 0,4-4 0,2-2 0,1 0 0,1-1 0,1-3 0,1-3 0,1-2 0</inkml:trace>
+  <inkml:trace contextRef="#ctx0" brushRef="#br0" timeOffset="17286">3414 8559 24575,'0'11'0,"0"5"0,0 9 0,0 4 0,0 2 0,0-3 0,0-1 0,0-2 0,0 0 0,0-2 0,-2 1 0,0 2 0,-3 2 0,-1 1 0,0-2 0,1-5 0,2-7 0,2-7 0,7-5 0,9-2 0,8-1 0,8 0 0,5 0 0,-1 0 0,-2 1 0,-8 1 0,-7 1 0,-8 0 0,-5-1 0,-2-1 0</inkml:trace>
+  <inkml:trace contextRef="#ctx0" brushRef="#br0" timeOffset="18802">3040 9408 24575,'-2'5'0,"3"-1"0,4-5 0,1-5 0,-1-4 0,-2-3 0,-2 0 0,-2 6 0,-1 4 0,-1 2 0,-1 2 0,0 2 0,2 3 0,1 2 0,1-3 0,5-1 0,3-4 0,3-3 0,-1-4 0,-4-3 0,-4 1 0,-2 3 0,-2 4 0,-1 1 0,0 3 0,-1 2 0,1 3 0,2 3 0,0-5 0,1-1 0</inkml:trace>
+  <inkml:trace contextRef="#ctx0" brushRef="#br0" timeOffset="21022">3082 9128 24575,'-17'0'0,"-7"0"0,-9 0 0,-5 0 0,3 0 0,7 0 0,7 0 0,9 2 0,3 3 0,3 6 0,0 5 0,-2 6 0,-3 5 0,-3 2 0,-1 0 0,2-2 0,2-4 0,5-5 0,3-5 0,2-3 0,1 0 0,2-1 0,1 0 0,3 0 0,4 4 0,4 3 0,2 6 0,3 1 0,-2-3 0,-3-2 0,1-4 0,0-3 0,2-1 0,4-1 0,5 0 0,5 1 0,5 0 0,1 0 0,-4-2 0,-4-3 0,-7-1 0,-6-2 0,-3-1 0,-6-1 0,-1 0 0,-3 0 0,-1 0 0,1 0 0,0-1 0,4-1 0,20-4 0,-1-3 0,16-3 0,-13-1 0,-5-2 0,-9 1 0,-7-2 0,-4 0 0,-3-5 0,-1-4 0,-2-6 0,-3-3 0,-5-4 0,-2 1 0,-1 0 0,-1 3 0,2 5 0,0 5 0,2 7 0,2 6 0,0 4 0,-2 4 0,-2 2 0,-1 1 0,-1 0 0,1 0 0,0 0 0,2 0 0,-1 1 0,-1 2 0,6-1 0,0 1 0,6-3 0,0 0 0</inkml:trace>
+  <inkml:trace contextRef="#ctx0" brushRef="#br0" timeOffset="23288">3903 8802 24575,'0'-13'0,"0"-3"0,0-6 0,0-6 0,0-4 0,0-3 0,0-4 0,0-3 0,2-1 0,3 2 0,3 7 0,1 6 0,0 9 0,-2 6 0,-2 5 0,-1 2 0,0-2 0,0 0 0,2 1 0,-3 2 0,3 3 0,-3 2 0,3 0 0,3 2 0,5 3 0,3 3 0,0 2 0,-2 0 0,-6 3 0,-4 1 0,-3 2 0,-2 3 0,0-1 0,0-1 0,-3-3 0,-2-2 0,-1-3 0,-2-4 0,0-3 0,0-1 0,0-1 0,2 0 0,2-1 0,2-2 0,1-3 0,1-4 0,0-1 0,1 1 0,3 4 0,1 3 0,4 2 0,2 1 0,4 0 0,4 0 0,3 0 0,1 0 0,1 2 0,-1 4 0,-5 2 0,-3 3 0,-4 3 0,-1 1 0,-5 0 0,-1 0 0,-3-2 0,-1 0 0,0 0 0,0 3 0,-1 0 0,-1 1 0,-2-2 0,-4-2 0,-2-2 0,0-3 0,-1-1 0,0-2 0,-1-3 0,-2 0 0,-7-1 0,-5 3 0,-7 3 0,-2 3 0,3 0 0,4-3 0,6-4 0,11-1 0,3-2 0</inkml:trace>
+  <inkml:trace contextRef="#ctx0" brushRef="#br0" timeOffset="25253">3636 7819 24575,'-11'0'0,"-17"0"0,4 0 0,-3 0 0,-10 0 0,-3 0 0,7 0 0,-2 0 0,0 0-542,-6 0 1,-2 0 0,-1 0 541,-4 0 0,-2 0 0,1 0 0,1 0 0,0 0 0,0 0 0,2 0 0,1 0 0,2 0 92,6 0 0,1 0 0,1 0-92,-8-3 0,2-2 0,3-2 0,1-4 0,7-2 0,1-4 0,2-4 0,1-2 0,3-1 0,2-3 611,2 0 0,1-2-611,3 0 0,0-1 63,3 0 0,0 1-63,2 1 0,0 1 0,2 2 0,2 1 0,-4-18 0,5 4 0,5 0 0,9 1 0,10 2 0,12 2 0,-11 16 0,3 1 0,5-4 0,1 1 0,3-3 0,0 0 0,1 0 0,0-1 0,-1 0 0,0 1 0,-3 3 0,0 2 0,0 0 0,0 3 0,0 3 0,1 2 0,0 1 0,0 3 0,1 1 0,1 2 0,0 1 0,0 1 0,-1 0 0,0 0 0,-2 2 0,-2 1 0,19 8 0,-10 6 0,-6 6 0,-3 3 0,0 3 0,-1 0 0,-1-1 0,-4-2 0,-1-3 0,-4-1 0,-1-1 0,-2-1 0,-1-1 0,-1-2 0,-2-3 0,-5-3 0,-1-6 0,-3 0 0</inkml:trace>
+  <inkml:trace contextRef="#ctx0" brushRef="#br0" timeOffset="26854">3145 7154 24575,'27'0'0,"5"0"0,4 0 0,-2 2 0,-5 0 0,-7 3 0,-5 2 0,-6 0 0,-2-1 0,-5-4 0,-2-2 0,-2-3 0,0-4 0,0-3 0,0-6 0,0-5 0,0-4 0,2-7 0,2-10 0,0 17 0,1-2 0,1 0 0,1-1 0,-1 1 0,2 2 0,5-15 0,-3 15 0,-4 11 0,-3 8 0,-2 4 0</inkml:trace>
+  <inkml:trace contextRef="#ctx0" brushRef="#br0" timeOffset="30302">2216 6930 24575,'0'-14'0,"0"-5"0,0-5 0,0-7 0,0-5 0,0-1 0,0-1 0,0 4 0,0 3 0,1 4 0,1 2 0,4 1 0,2 2 0,2 1 0,0 4 0,0 1 0,-1 2 0,1 0 0,-1 1 0,0 0 0,1 0 0,2 1 0,1 1 0,0 2 0,0 4 0,2 3 0,1 1 0,0 1 0,1 0 0,-3 3 0,0 2 0,-2 6 0,-1 4 0,-2 2 0,-2 1 0,-2 0 0,-4-2 0,-1-1 0,0-3 0,0-3 0,0 1 0,0-1 0,0-1 0,0 0 0,0 0 0,0 1 0,-4 3 0,-3 2 0,-4-1 0,-2-1 0,-4-3 0,0-4 0,-4-3 0,-1 0 0,0-2 0,1 0 0,5 0 0,3 0 0,4-1 0,3 0 0,4-2 0,1-2 0,1 0 0,0-2 0,5 2 0,5 2 0,5 1 0,5 2 0,3 0 0,4 0 0,5 0 0,5 0 0,1 3 0,-2 3 0,-5 3 0,-5 4 0,-7 0 0,-4-1 0,-3 0 0,-3-1 0,-3-1 0,-3-2 0,-2 0 0,-1-1 0,0 1 0,0 0 0,-3 0 0,-5 1 0,-6 1 0,-6 0 0,-3-1 0,0-3 0,-1-1 0,-2-3 0,1-1 0,1 0 0,1-1 0,3 0 0,1 0 0,1 0 0,1 0 0,0 1 0,-1 0 0,-1 1 0,2 1 0,3-2-3277,3 0 2457,5-1 1,2 0 0,3 0 0</inkml:trace>
+  <inkml:trace contextRef="#ctx0" brushRef="#br0" timeOffset="38056">7750 5208 24575,'0'-12'0,"0"-6"0,0-17 0,0-2 0,0-3 0,0 8 0,0 0 0,0-15 0,0-1 0,0 17 0,0 2 0,0 0 0,0 1 0,0-1 0,0 2 0,0-20 0,0 2 0,0 4 0,0 4 0,0 1 0,0 1 0,0 1 0,0 4 0,0 5 0,0 8 0,0 6 0,0 4 0,0 0 0,0-2 0,0-5 0,-1-5 0,0-3 0,-2 1 0,0 1 0,2 5 0,0 3 0,0 2 0,0 1 0,-1 2 0,2 2 0,4 3 0,3 2 0,8 0 0,16 0 0,-6 0 0,3 0 0,8 0 0,3 1 0,9 0 0,2 0-309,-13-1 1,1 1-1,1 0 309,3-1 0,0 1 0,2 0 0,1-1 0,1 0 0,0 0 0,0 0 0,1 0 0,-1 0 0,0 0 0,0 0 0,-1 0 0,-2 0 0,-1 0 0,0 0 0,-4 0 0,0 0 0,-1 0-85,-1 0 1,-1 0 0,-1 0 84,14 0 0,-1 0 0,2 0 0,1 0 0,-1 0 0,0 0 0,-1 0 0,0 0 0,1 0 0,-1 0 0,-3 0 0,0 0 0,2 0 0,1 0 0,-15 0 0,0 0 0,2 0-406,3 1 1,2 0 0,1 0 405,-4 0 0,1 0 0,2 0 0,1 1-638,5-1 0,3 1 0,1 0 0,0 1 638,-4-1 0,1 0 0,1 0 0,1 0 0,0 0-363,-6-1 0,2 1 0,-1-1 0,1 1 0,0-1 0,0 0 363,0 0 0,1 0 0,1 0 0,-1 0 0,0 0 0,0-1 0,-1 1 0,1-1 0,-1 1 0,1-1 0,-2 0 0,1 1-290,5-1 0,-1 0 0,0 0 0,-1 0 1,0 0 289,-6 0 0,0 0 0,-1 0 0,-1 0 0,-1 0 64,3-1 1,-1 1 0,-2 0 0,-1-1-65,4 0 0,-1 0 0,-3-1 999,10 0 0,-3-1-999,-5 1 0,-1-1 1545,-3 1 0,0 1-1545,1 0 0,0 0 0,4 1 0,1 0 0,1 0 0,1 0 0,-11 0 0,1 0 0,0 0 0,0 0 0,0 0 0,-1 0 0,17 0 0,0 0 0,-1 0 0,-2 0 0,-7 0 0,-1 1 1177,-5 0 0,-2 1-1177,16 2 873,-17 0-873,-15 0 0,-9 1 0,-5-1 0,-2 2 0,0 0 0,-1 2 0,-2 0 0,-2 4 0,-2 5 0,-2 8 0,0 13 0,4-13 0,1 0 0,0 5 0,1 1 0,-1 2 0,2 1 0,0 1 0,1-1 0,0 1 0,1-2 0,0-2 0,0 0 0,0-4 0,0-1 0,-2 19 0,1-9 0,-1-5 0,-1-5 0,2-4 0,-1-4 0,2-3 0,0-2 0,0-4 0,0-2 0,0-3 0,0-1 0,0-1 0,0-1 0,0 0 0</inkml:trace>
+  <inkml:trace contextRef="#ctx0" brushRef="#br0" timeOffset="39536">12765 4806 24575,'2'16'0,"2"7"0,6 6 0,7 4 0,5-2 0,3-2 0,2-3 0,-3-2 0,-3-3 0,-3-3 0,-3-1 0,-3-2 0,-2-2 0,-3-3 0,-2-4 0,-2-2 0,-2 0 0,0-1 0,1 2 0,2 2 0,3 3 0,2 0 0,0 1 0,0-3 0,-2-3 0,-1-3 0,0-2 0,0 0 0,4-2 0,5-6 0,3-4 0,2-5 0,0-2 0,0-1 0,5-4 0,7-5 0,-12 12 0,2 0 0,3-2 0,1-1 0,0 0 0,1 1 0,-2 0 0,-1 1 0,14-12 0,-12 8 0,-10 8 0,-8 7 0,-4 3 0,-2 3 0</inkml:trace>
+  <inkml:trace contextRef="#ctx0" brushRef="#br0" timeOffset="55305">7566 5283 24575,'0'-18'0,"0"-17"0,0 8 0,0-3 0,0-7 0,0-2 0,0-1 0,0-1 0,0 2 0,0 1 0,0 1 0,0 1 0,0 3 0,0 0 0,0 4 0,0 0 0,0 3 0,0 1 0,0-19 0,0 5 0,0 3 0,0-2 0,0 1 0,-2-4 0,-1-3 0,-2 1 0,0 3 0,1 2 0,0 3 0,-1-1 0,-2 0 0,0-2 0,-1 0 0,-1 0 0,2 2 0,1 3 0,1 4 0,2 4 0,0 3 0,2 4 0,0 5 0,1 4 0,0 2 0,0 3 0,0 1 0,0 1 0,0 0 0,1 0 0,3 0 0,5 3 0,6 3 0,11 3 0,14 3 0,-11-5 0,3-1 0,9 0 0,4-2 0,-10-1 0,2 0 0,1 0-364,5-1 0,0 0 0,1 0 364,3 0 0,0 0 0,1 0 0,1 0 0,0 0 0,1 0 0,-12 0 0,0 0 0,1 0 0,0 0-426,1 0 0,1 0 0,0 0 0,1 0 426,1 0 0,1 0 0,0 0 0,0 0-455,-4-1 0,0 0 0,0 1 1,1-1-1,0 0 455,1-1 0,1 1 0,0-1 0,1 0 0,0-1 0,1 0 0,1 0 0,1 0 0,0-1 0,1 0-547,-2 1 1,0-1 0,0 0 0,2 0 0,0 0 0,0 0 534,-4 0 0,-1 1 1,1-1-1,1 0 1,0 1-1,2-1 1,0 1-354,-2 0 1,0 0 0,1 0 0,1 1 0,1-1 0,0 0 0,1 1 0,0-1 0,0 1 340,-5 0 0,0 0 0,1 0 1,-1 0-1,1 0 0,1 0 0,0 1 1,0-1-1,0 0 0,1 0 0,1 1-166,-1-1 1,1 0 0,1 0 0,0 1-1,0-1 1,1 0 0,0 0 0,0 1 0,1-1-1,-1 0 1,1 0 0,1 0 189,-5 0 0,0 1 0,1-1 0,0 0 0,1 0 0,-1 1 0,1-1 0,0 0 0,0 0 0,0 0 0,0 0 0,1 0 0,-2-1 0,1 1-104,0-1 0,1 0 1,-1 0-1,0 0 0,0 0 1,1 0-1,-1 0 0,0 0 1,1-1-1,-1 1 0,1-1 1,-1 1-1,1-1 0,-1 0 104,-2 0 0,0 0 0,0 0 0,0 0 0,1 0 0,-1 0 0,0 0 0,1 0 0,-1-1 0,0 1 0,0-1 0,0 0 0,-1 1 0,1-1 0,-1 0-50,1-1 0,0 1 1,0 0-1,0-1 1,0 0-1,-1 0 1,1 0-1,-1 0 1,0 0-1,0 0 1,-1 0-1,1 0 1,-1 0-1,-1 0 50,4-1 0,0 1 0,0-1 0,-1 0 0,0 0 0,-1 0 0,1 1 0,-1-1 0,-1 0 0,1 1 0,-1-1 0,-1 1 27,6 0 1,-2-1 0,1 0 0,-1 1-1,-1 0 1,0 0 0,0 0 0,0 0 0,-1 0-1,-1 1-27,7-1 0,-1 0 0,-1 1 0,0 0 0,-1 0 0,0 0 0,-1 1 0,0 0 130,0 1 1,-1 0-1,0 0 1,-1 1-1,0 0 1,-1 0-1,0 0-130,4 0 0,0 1 0,-1-1 0,0 1 0,0 0 0,-2 0 296,5 1 0,0 0 0,-2 0 0,0 1 0,0-1-296,-3 1 0,0 1 0,0-1 0,-1 1 0,0 0 0,-2 0 0,0 0 0,0 0 0,-1 0 0,0 0 466,-1 0 0,-1 0 0,1 0 1,-2 0-1,1 0-466,7 1 0,0-1 0,0 0 0,-1 0 0,-1 0 0,0 0 0,0 1 0,-1-1 0,1 1 0,-1 0 0,0 0 0,0 1 706,-2 0 1,-1 0-1,0 0 1,-1 0-707,10 2 0,0-1 0,-2 1 0,-4-1 0,0 0 0,-2 0 861,-4-1 0,-1 0 0,0-1-861,-3 0 0,-1-1 0,0 0 0,12 0 0,-1-1 0,-2-1 0,0 0 0,1 0 0,2 1 0,3 1 0,1 1 0,0 1 0,-2 1 0,-1 1 0,-2 0 1220,-5 1 1,-3 0-1221,-8-2 0,-3 1 1901,12 4-1901,-16-1 1294,-6-1-1294,-3 5 338,1 0-338,-1 3 0,-1-2 0,-3-2 0,-4-2 0,-2-4 0,-3-1 0,-1-3 0,-2 1 0,-2 3 0,-2 2 0,-1 1 0,1 0 0,0 0 0,0 1 0,-2 0 0,0 0 0,-1 1 0,-1-1 0,3-3 0,0-2 0,2-2 0,1-3 0,1 0 0,2 0 0,0 0 0,19 0 0,16 0 0,3 0 0,5 0 0,-5 0 0,2 0 0,2 0-552,7 0 1,3 0 0,1 0 551,-8 0 0,1 0 0,1 0 0,-1 0 0,-1 0 0,1 0 0,-1 0 0,-1 0 0,-1 0 0,0 0 0,-1 0 0,-1 0-145,8 0 0,-2 0 0,-2 0 145,-7 0 0,-1 0 0,-2 0 0,11 0 0,-4 0 0,-7 0 0,-2 1 0,-3 0 0,0 1 0,3 3 0,0 2 807,5 2 1,2 1-808,2 2 0,2 0 237,-1 1 0,-1 0-237,-5-2 0,-3-1 0,15 6 0,-18-5 0,-15-6 0,-7-1 0,-5-1 0,-1 0 0,0 2 0,0 1 0,0 1 0,0 3 0,-2 2 0,-3 4 0,-2 0 0,-1 1 0,2-1 0,-1 7 0,-1 13 0,2-12 0,0 3 0,0 5 0,-1 2 0,1 0 0,-1 2 0,0-1 0,1 0 0,1-4 0,0 0 0,2-4 0,1-1 0,0 0 0,1-1 0,1 1 0,0 0 0,0 2 0,0 0 0,0 2 0,0-1 0,0-2 0,0 0 0,0 15 0,1-13 0,2-12 0,0-8 0,0-2 0,0-3 0,-2 1 0,1-3 0,-2 1 0,3 2 0,1 12 0,3 16 0,-3-7 0,1 3 0,0 8 0,0 2 0,-1 1 0,0 0 0,-1-5 0,-1-1 0,-1-7 0,0-3 0,-1 2 0,0-13 0,0-11 0,4-12 0,-1 2 0,4-4 0,0 6 0,0 1 0,0 0 0,-3 2 0,-1 1 0</inkml:trace>
+  <inkml:trace contextRef="#ctx0" brushRef="#br0" timeOffset="56956">20383 4931 24575,'8'17'0,"3"3"0,4 5 0,3 2 0,0-2 0,2 1 0,-2-1 0,-1-3 0,-3-3 0,-2-3 0,-2-3 0,-4-3 0,-2-3 0,-3-4 0,1-1 0,0 1 0,2 1 0,5 4 0,3 1 0,4 1 0,3 0 0,1 0 0,1-2 0,-4-2 0,-2-3 0,-4-1 0,-3-2 0,1-6 0,0-7 0,3-10 0,6-7 0,4-3 0,3-2 0,2 1 0,1 1 0,1 1 0,3 0 0,-2 4 0,-5 4 0,-7 7 0,-5 5 0,-7 6 0,-2 0 0,-4 4 0,0 0 0,0 0 0,-1 0 0,1 0 0,-1 1 0</inkml:trace>
+  <inkml:trace contextRef="#ctx0" brushRef="#br0" timeOffset="67673">7289 5285 24575,'0'-29'0,"0"5"0,0-4 0,0-16 0,0-4 0,0 6 0,0-2 0,0-1-787,0 7 1,0-1 0,0 0 0,0-1 786,0-2 0,0 0 0,0-1 0,0 1 0,0 1 0,0 0 0,0 0 0,0 0 0,0 2 0,0 0 0,0 1 0,0 1 156,0-8 1,0 1 0,0 2-157,0 6 0,0 1 0,0 2 0,-1-10 0,-1 3 317,0 6 0,-1 1-317,-1 0 0,-1 1 0,-1 1 0,1 0 0,-1 0 0,1 2 801,0 2 1,1 2-802,-3-16 438,4 14-438,0 10 0,2 6 0,1 5 0,0 2 0,-2-1 0,-2-4 0,-1-6 0,-2-5 0,0-1 0,1 3 0,3 7 0,1 4 0,5 5 0,2 3 0,5 2 0,4 2 0,9 0 0,3-3 0,6-1 0,10 0 0,7 0 0,6-2-469,-17 0 1,3 0 0,3-1 0,2-1 0,1 0 0,3 0 0,0 0 170,-8 0 0,2 1 0,1-1 0,1-1 0,1 1 0,1-1 0,1 1 0,1-1 1,0 0-1,1 0 0,0-1 79,-6 1 1,1 0-1,0 0 1,1-1-1,1 1 1,0-1-1,1 0 1,0 0-1,0 0 1,1 0 0,0 0-1,1-1 1,0 1-1,-1-1 1,1 0 135,-4 1 0,1 0 0,0-1 1,0 0-1,0 0 0,1 0 0,0 0 1,1 0-1,-1 0 0,1 0 0,0-1 1,0 1-1,0-1 0,0 1 0,0-1 1,0 0-1,0 0 0,1 1-69,-4-1 0,1 1 0,-1-1 1,1 0-1,0 0 0,0 0 1,0 1-1,0-2 0,1 1 1,-1 0-1,0 0 0,1 0 1,-1 0-1,1-1 0,-1 1 1,1-1-1,-1 1 0,0-1 1,1 1-1,-1-1 152,0 1 0,0-1 0,1 0 0,-1 0 0,0 0 0,0 0 0,1 0 0,-1 0 0,0 0 0,0 0 0,0 0 0,1 0 0,-1 0 0,0-1 0,0 1 0,1 0 0,-1-1 0,0 1 0,0-1 0,1 1-102,-1-1 1,1 0-1,0 1 1,0-1-1,0 0 1,0 0 0,0 0-1,1 0 1,-1 0-1,0 0 1,0 0 0,0-1-1,0 1 1,-1 0-1,1 0 1,0 0-1,-1 0 1,0 0 0,0 0-1,0 0 102,0 0 0,0 0 0,0 0 0,0 0 0,-1-1 0,1 1 0,0 0 0,-1 0 0,0 0 0,0 0 0,0 0 0,0 0 0,0 0 0,0 0 0,-1 0 0,1 0 0,-1 1 0,0-1 0,0 0 0,2 0 0,0 0 0,0 1 0,0-1 0,0 0 0,-1 0 0,1 0 0,-1 0 0,0 1 0,0-1 0,0 0 0,-1 1 0,1 0 0,-1-1 0,-1 1 0,0 0 0,0 0 0,5 0 0,0-1 0,-1 1 0,0-1 0,0 1 0,0 0 0,-1 0 0,0 0 0,-1 0 0,0 1 0,-1-1 0,-1 1 0,-1 0 0,0 1 57,6-1 1,-1 0 0,-2 0 0,1 0-1,-2 1 1,-1 0 0,0 1 0,-1-1-1,0 1 1,-2 0-58,10 0 0,-1-1 0,-1 1 0,-1 1 0,-2-1 0,-1 2 0,-2 0 356,2 0 0,-1 1 0,-2 0 0,-2 1 1,-1-1-357,12 1 0,-3 0 0,-2 0 1036,-8 1 1,-1 0-1,-2 0-1036,7 0 0,-2 0 0,1 0 0,2 0 0,-10 0 0,2 0 0,0 0 1092,6 0 0,2 0 0,0 0-880,4 0 1,1 0 0,0 0-213,0 0 0,1 0 0,-1 0 0,-3 0 0,-1 0 0,-1 0 1092,-5 0 0,-1 0 0,-1 1-745,11 0 0,-3 1 375,-8 1 0,-2 1-722,-7 0 0,-2 1 172,13 5-172,-13-2 1165,-10-2-1165,-7-1 252,-4-2-252,-2 0 0,-2-2 0,0 0 0</inkml:trace>
+  <inkml:trace contextRef="#ctx0" brushRef="#br0" timeOffset="69921">17817 2372 24575,'43'0'0,"1"0"0,-7 0 0,4 0 0,4 0 0,4 0 0,-10 0 0,2 0 0,3 0 0,2 0 0,2 0 0,1 0 0,2 0 0,1 0-253,-9 0 1,0 0 0,2 0 0,2 0 0,0 0 0,1 0 0,1 0 0,0 0 0,1 0 0,1 0 0,0 0 0,1 0 0,0 0 69,-8 0 1,0 0 0,1 0 0,1 0 0,0 0 0,0 0 0,1 0 0,0 0 0,1 0 0,0 0 0,0 0 0,0 0 0,1 0 0,0 0 0,0 0 0,0 0 0,0 0 0,0 0 25,-3 0 1,1 0 0,0 0 0,0 0 0,0 0 0,1 0 0,0 0 0,1 0 0,-1 0 0,1 0 0,-1 0 0,1 0 0,-1 0 0,1 0 0,-1 0 0,1 0 0,-1 0 0,0 0 0,0 0 0,-1 0 0,0 0-17,3 0 1,0 0-1,0 0 1,0 0-1,0 0 1,0 0-1,0 0 1,-1 0-1,1 0 1,-1 0-1,0 0 1,0 0 0,0 0-1,0 0 1,-1 0-1,0 0 1,-1 0-1,1 0 1,-1 0 94,4 0 0,-1 0 0,1 0 0,-1 0 0,1 0 0,-1 0 0,-1 0 0,1 0 0,-1 0 1,-1 0-1,0 0 0,0 0 0,-1 0 0,-1 0 0,0 0 0,-1 0 78,6 0 0,-1 0 0,0 0 0,-1 0 0,-1 0 0,0 0 0,-1 0 0,0 0 0,-2 0 0,0 0 0,0 0 0,-2 0-156,10 0 1,-2 0-1,0 0 1,-2 0-1,-1 1 1,-1-1-1,0 1 1,-1-1 155,7 2 0,-1-1 0,-1 0 0,-1 1 0,-2 0 0,-2 1 371,-3 0 0,-1 1 0,-2 0 0,-1 1 0,-2 0-371,4 1 0,-3 1 0,0 1 0,-2 0 1051,4 3 1,-2 1 0,-1 0-1052,11 5 0,-2 1 0,-8-3 0,0 1 1638,-4-3 0,-2 0-826,-4-3 0,-2 0 826,-3-1 0,1-1-1391,1 1 0,2 1-247,5 1 0,2 1 0,11 1 0,3 1 160,-8-3 1,1-1 0,1 1-161,1-1 0,1 0 0,-1 0 0,-1 0 0,1 0 0,-2 0 27,-4 0 0,-1 0 1,0-1-28,8 4 0,-1 0 0,-4 0 0,-1 0 0,-7-2 0,-1 0 0,14 6 0,-15-2 1073,-11-3-1073,-7-1 282,-6-2-282,-3 3 0,-2 6 0,0 12 0,0 17 0,1-15 0,0 3 0,0 8 0,0 3 0,0-11 0,-1 2 0,1 0-335,0 4 1,-1 2-1,1 0 335,-1 2 0,0 1 0,0-1 0,0 2 0,0 0 0,0-1 0,0-2 0,0 0 0,0 0 0,0-3 0,0-1 0,0-1-82,0-2 1,0-1 0,0 0 81,0 12 0,0-2 0,0-2 0,0-2 0,0-3 0,0-2 0,0-2 0,0-1 0,0-3 0,0 0 0,0-2 0,0 0 495,0-2 1,0 0-496,0 23 257,0-8-257,0-7 0,0-8 0,0-4 0,0-1 0,0 1 0,0 3 0,0-2 0,0-3 0,0-5 0,0-5 0,0-5 0,0-3 0</inkml:trace>
+  <inkml:trace contextRef="#ctx0" brushRef="#br0" timeOffset="71739">25439 4647 24575,'0'8'0,"0"2"0,0 0 0,1 1 0,0 1 0,0 4 0,1-6 0,-2 1 0,4-3 0,12 13 0,-1-1 0,2 2 0,4 6 0,2 2 0,2 3 0,0 1 0,-3-4 0,-1-2 0,-5-5 0,-2-3 0,6 7 0,-8-14 0,-5-7 0,-1-4 0,-3-2 0,1-1 0,1-2 0,1-6 0,7-9 0,11-15 0,-5 9 0,2-1 0,3-3 0,1-1 0,2 0 0,0-1 0,-2 3 0,-1 1 0,-5 5 0,-1 2 0,8-11 0,-10 14 0,-6 7 0,-6 6 0,-1 1 0</inkml:trace>
+</inkml:ink>
+</file>
+
+<file path=ppt/ink/ink22.xml><?xml version="1.0" encoding="utf-8"?>
+<inkml:ink xmlns:inkml="http://www.w3.org/2003/InkML">
+  <inkml:definitions>
+    <inkml:context xml:id="ctx0">
+      <inkml:inkSource xml:id="inkSrc0">
+        <inkml:traceFormat>
+          <inkml:channel name="X" type="integer" min="-2.14748E9" max="2.14748E9" units="cm"/>
+          <inkml:channel name="Y" type="integer" min="-2.14748E9" max="2.14748E9" units="cm"/>
+          <inkml:channel name="F" type="integer" max="32767" units="dev"/>
+        </inkml:traceFormat>
+        <inkml:channelProperties>
+          <inkml:channelProperty channel="X" name="resolution" value="1000" units="1/cm"/>
+          <inkml:channelProperty channel="Y" name="resolution" value="1000" units="1/cm"/>
+          <inkml:channelProperty channel="F" name="resolution" value="0" units="1/dev"/>
+        </inkml:channelProperties>
+      </inkml:inkSource>
+      <inkml:timestamp xml:id="ts0" timeString="2023-07-05T09:30:06.796"/>
+    </inkml:context>
+    <inkml:brush xml:id="br0">
+      <inkml:brushProperty name="width" value="0.05292" units="cm"/>
+      <inkml:brushProperty name="height" value="0.05292" units="cm"/>
+      <inkml:brushProperty name="color" value="#FF0000"/>
+    </inkml:brush>
+  </inkml:definitions>
+  <inkml:trace contextRef="#ctx0" brushRef="#br0">2722 7035 24575,'-30'0'0,"4"3"0,-18 6 0,12 6 0,3 5 0,8 0 0,8 1 0,5-2 0,5 1 0,2 0 0,0 3 0,1 5 0,0 6 0,0 8 0,1 6 0,2-22 0,1 0 0,2 1 0,3-1 0,2 0 0,2 0 0,4 0 0,1-2 0,3 0 0,2 0 0,1-1 0,1-2 0,2-2 0,0-2 0,0-1 0,0-3 0,-2-3 0,-1-2 0,21 3 0,-5-6 0,-6-6 0,-3-8 0,1-5 0,0-7 0,2-4 0,0-3 0,0-4 0,-3-4 0,-4-3 0,-5 1 0,-5 3 0,-4 2 0,-5 5 0,-5 4 0,-3 4 0,-5 0 0,-7-5 0,-8-8 0,-6-8 0,10 18 0,-1 0 0,-1-1 0,-2 0 0,1 2 0,-2 1 0,1 1 0,-1 1 0,-17-8 0,5 10 0,4 8 0,4 7 0,1 6 0,2 5 0,0 6 0,2 4 0,-1-1 0,1-4 0,1-5 0,2-5 0,4-2 0,5-1 0,5-1 0</inkml:trace>
+  <inkml:trace contextRef="#ctx0" brushRef="#br0" timeOffset="2231">2163 5822 24575,'8'0'0,"0"0"0,-3 0 0,1 0 0,1 0 0,-2 0 0,1 0 0,0-2 0,-2-2 0,2 0 0,-1 1 0,2-1 0,0 0 0,-1-4 0,-1-1 0,-1 0 0,-2-2 0,-3 6 0,-3-1 0,-5 6 0,-5 0 0,-1 0 0,0 0 0,2 1 0,4 1 0,3 5 0,3 3 0,1 4 0,0 0 0,1-2 0,0-2 0,1-1 0,0 1 0,0-4 0,0 0 0,1-5 0,1 0 0,2-1 0,2 0 0,0-1 0,1 0 0,-1-2 0,1 0 0,-1-1 0,1-1 0,1-2 0,-1-5 0,2-5 0,-3-5 0,-3 1 0,-1 3 0,-2 4 0,0 5 0,0 3 0,-2 3 0,-2 3 0,-2 0 0,-1 1 0,-2 3 0,0 3 0,0 5 0,0 0 0,2 0 0,2-2 0,1-1 0,2 1 0,2-3 0,0-1 0,0-5 0,0 0 0</inkml:trace>
+  <inkml:trace contextRef="#ctx0" brushRef="#br0" timeOffset="3751">2369 5833 24575,'37'0'0,"-12"0"0,3 0 0,8 0 0,3 1 0,7 2 0,0 3 0,2 2 0,-1 2 0,-1 4 0,-1 2 0,-4 3 0,0 4 0,-10-2 0,0 3 0,-2 0 0,1 3 0,-1 1 0,4 7 0,-3 1 0,-15-13 0,-3-1 0,8 18 0,-7-4 0,-4-4 0,-5-3 0,-3 0 0,-1-1 0,-3 1 0,-4 2 0,-5 2 0,-5 3 0,-5 3 0,-2-1 0,0-2 0,3-6 0,4-3 0,3-3 0,2-1 0,0 1 0,0 1 0,0-2 0,1-4 0,3-3 0,3-5 0,1-2 0,1 0 0,1-3 0,-1-2 0,1-3 0,1-4 0,0 2 0,0-2 0</inkml:trace>
+  <inkml:trace contextRef="#ctx0" brushRef="#br0" timeOffset="5449">2866 6564 24575,'0'12'0,"0"5"0,0 5 0,0 3 0,0-4 0,0-5 0,0-5 0,0-3 0,0-1 0,0 2 0,0 2 0,0 4 0,0 4 0,0 4 0,0 5 0,0 3 0,0-1 0,0-1 0,0-6 0,0-6 0,0-3 0,1-8 0,2-1 0,5-5 0,7 0 0,12 0 0,11 0 0,6 2 0,-1-1 0,-6 1 0,-9-1 0,-5-1 0,-4 0 0,-1 0 0,-1 0 0,2 0 0,2 0 0,0 0 0,-1 0 0,-3 0 0,-3 1 0,-3 1 0,-5 0 0,-1 0 0,-4-1 0</inkml:trace>
+  <inkml:trace contextRef="#ctx0" brushRef="#br0" timeOffset="6783">3454 6359 24575,'0'-19'0,"0"-22"0,1 9 0,0-2 0,0-4 0,2-1 0,2 6 0,2-2 0,-1 4 0,2 1 0,0 2 0,4-5 0,0 3 0,3 8 0,-3 7 0,-1 6 0,-3 6 0,0 2 0,-2 1 0,-1 1 0,-1 3 0,0 6 0,2 8 0,0 7 0,3 6 0,1 4 0,0 8 0,-4-19 0,0 0 0,1 3 0,-1 0 0,0 1 0,-1-1 0,0-1 0,-1-1 0,4 17 0,-4-9 0,0-9 0,-3-7 0,0-5 0,0-3 0,1 0 0,-1-2 0,-1 0 0,1-3 0,1 1 0,-1 0 0,-1-2 0,0 0 0</inkml:trace>
+  <inkml:trace contextRef="#ctx0" brushRef="#br0" timeOffset="8131">3468 6247 24575,'11'0'0,"5"0"0,3 0 0,0 0 0,-1 0 0,-5 0 0,-3 0 0,-4 0 0,-2 0 0,-1 0 0,-1 0 0,1 0 0,-1 0 0,1 0 0,0 0 0,0 0 0,0 0 0,-1 0 0,-1 0 0</inkml:trace>
+  <inkml:trace contextRef="#ctx0" brushRef="#br0" timeOffset="10266">2338 5699 24575,'12'-20'0,"17"-20"0,-9 12 0,2-3 0,2-3 0,0-2 0,-3 1 0,-1 0 0,-5 2 0,-2 0 0,-3 0 0,-2 0 0,-2 0 0,0-1 0,-3 2 0,-1 0 0,0 2 0,-2 1 0,-4-21 0,-10 10 0,-10 8 0,-13 1 0,15 15 0,-2 0 0,-1 0 0,-2 0 0,-1-1 0,-1 0 0,0 2 0,-1 0 0,-4 1 0,0 0 0,0 3 0,-1 0 0,1 2 0,0 1 0,3 1 0,1 2 0,4 2 0,1 0 0,-17 0 0,8 3 0,6 4 0,4 8 0,0 8 0,1 11 0,0 4 0,4 3 0,4 2 0,3 1 0,4 1 0,3 1 0,2 2 0,2 1 0,0-21 0,1 1 0,1 0 0,0 0 0,2 0 0,1-1 0,6 19 0,4-11 0,0-9 0,0-8 0,-2-4 0,1-2 0,0 0 0,-2-1 0,-2 0 0,-2-3 0,-2-2 0,-2-2 0,-1 0 0,-1-1 0,-1-1 0</inkml:trace>
+  <inkml:trace contextRef="#ctx0" brushRef="#br0" timeOffset="11884">1403 5468 24575,'15'0'0,"8"0"0,8 0 0,10 0 0,0 2 0,0 2 0,-6 3 0,-7 3 0,-7-1 0,-6-1 0,-3-1 0,-3 0 0,0-1 0,0 0 0,1-1 0,-2 0 0,1-2 0,-4 0 0,2-1 0,-4 0 0,2 1 0,1 1 0,2 1 0,1 1 0,3 2 0,1-1 0,-1-1 0,-1-2 0,-2-1 0,-2-2 0,-2-1 0,-1 0 0,-2-2 0,-1-6 0,-1-8 0,0-6 0,0-4 0,0 3 0,1 2 0,3 3 0,2 2 0,4 0 0,4-1 0,4-1 0,3-1 0,3-3 0,0-2 0,-1-1 0,-5 3 0,-5 5 0,-6 6 0,-3 6 0,-2 2 0</inkml:trace>
+  <inkml:trace contextRef="#ctx0" brushRef="#br0" timeOffset="13583">2593 4770 24575,'-2'-12'0,"0"-11"0,2-11 0,0-9 0,0 1 0,0 5 0,0 4 0,1 3 0,3 3 0,4 4 0,3 3 0,0 4 0,0 4 0,-3 4 0,-1 4 0,-1 2 0,-1 2 0,0 0 0,0 0 0,1 0 0,0 2 0,-2 3 0,-1 6 0,1 5 0,0 4 0,2 5 0,3 4 0,2 3 0,3 2 0,0-1 0,0 3 0,-1 1 0,-2-1 0,0-2 0,-1-5 0,-4-7 0,-1-3 0,-3-3 0,1 0 0,1 0 0,0 0 0,-1-2 0,0-3 0,0-3 0,-1-5 0,0-3 0,-1 0 0,0-1 0</inkml:trace>
+  <inkml:trace contextRef="#ctx0" brushRef="#br0" timeOffset="14886">2657 4801 24575,'10'0'0,"3"0"0,5 0 0,1 0 0,1 0 0,-3 1 0,-3 0 0,-5 1 0,0 0 0,-4 0 0,-1 1 0,-2-2 0,0 0 0,0-1 0,1 0 0,0 0 0,0 0 0,-1 1 0,-1 0 0,0 0 0,-1 0 0</inkml:trace>
+  <inkml:trace contextRef="#ctx0" brushRef="#br0" timeOffset="16968">3156 7772 24575,'2'9'0,"4"8"0,7 14 0,2 8 0,-5-15 0,0 0 0,-1 1 0,-1 0 0,5 20 0,-1-1 0,-3-9 0,-3-6 0,-2-2 0,-2-3 0,-2 1 0,-3 1 0,-3-1 0,-4 1 0,-4-1 0,-2 0 0,-1-1 0,-4 1 0,0 1 0,0-2 0,-2 2 0,-1 2 0,-4 4 0,12-13 0,-2 0 0,-1 2 0,0-1 0,-1 1 0,0-2 0,-15 14 0,7-9 0,10-9 0,8-8 0,5-4 0</inkml:trace>
+  <inkml:trace contextRef="#ctx0" brushRef="#br0" timeOffset="18734">2861 8540 24575,'0'16'0,"0"3"0,0 4 0,0-2 0,0-1 0,0-3 0,0-2 0,0-1 0,0-2 0,0 0 0,0-3 0,0 0 0,0-2 0,0-1 0,0-3 0,0-1 0,4-1 0,5-1 0,8 0 0,8 0 0,7 0 0,1 0 0,-3 0 0,-7 0 0,-6 1 0,-5 0 0,-4 1 0,-3 1 0,-3-1 0,0 0 0,-1-1 0,0 0 0,1-1 0,0 0 0,0 0 0,1 1 0,0 1 0,0 1 0,-2 0 0,1-2 0</inkml:trace>
+  <inkml:trace contextRef="#ctx0" brushRef="#br0" timeOffset="20185">2413 9063 24575,'12'0'0,"1"0"0,-3-1 0,1-3 0,-4-2 0,-2-2 0,-3-1 0,-6 0 0,-3 0 0,-5 2 0,0 3 0,3 1 0,3 4 0,4 4 0,1 6 0,1 2 0,0-1 0,1-2 0,1-5 0,2-2 0,1-3 0,1 0 0,-1 0 0,-3-3 0,0-2 0,-2-1 0,0 2 0,0 2 0,0 2 0</inkml:trace>
+  <inkml:trace contextRef="#ctx0" brushRef="#br0" timeOffset="22534">2447 8912 24575,'-23'0'0,"0"0"0,-1 0 0,5 0 0,7 0 0,3 0 0,6 1 0,1 2 0,1 3 0,0 2 0,0 1 0,0 0 0,0 1 0,0 1 0,-1-1 0,0 1 0,0-2 0,1-1 0,0 0 0,1 1 0,0 3 0,0 3 0,0 6 0,0 3 0,0 5 0,0 3 0,4 1 0,1-1 0,3-2 0,0-6 0,-1-4 0,2-5 0,-2-2 0,2-2 0,-1 0 0,1 0 0,3 0 0,2-1 0,2-1 0,0 1 0,0 0 0,-1-1 0,-1-2 0,-2-3 0,-2-1 0,0-2 0,-1-1 0,-2 0 0,-1-1 0,-1-3 0,0-4 0,0-5 0,0-4 0,0 0 0,-1 0 0,-2-1 0,-1 1 0,-1-4 0,1-2 0,1-1 0,-1 0 0,1 4 0,-2 4 0,0 1 0,0 2 0,0-2 0,0 1 0,0 1 0,0-1 0,0 0 0,0 0 0,0 1 0,1 2 0,0 3 0,1 1 0,0 1 0,0 0 0,-1-1 0,-1 3 0,0-1 0,0 2 0,0 0 0,-3 0 0,-1 2 0,-2 0 0,-2 1 0,1-1 0,-1 0 0,1-1 0,1 1 0,3 0 0,1 0 0,2 0 0</inkml:trace>
+  <inkml:trace contextRef="#ctx0" brushRef="#br0" timeOffset="24765">3712 8734 24575,'0'-16'0,"0"-7"0,0-12 0,0-7 0,0-2 0,0 11 0,0-1 0,0 7 0,0-1 0,0-9 0,0-1 0,0 7 0,0 1 0,0 0 0,0 0 0,0 2 0,0 2 0,0-18 0,0 11 0,0 6 0,0 3 0,2 2 0,3 2 0,3 4 0,4 2 0,4 4 0,5 5 0,5 3 0,0 2 0,-1 3 0,1 7 0,-2 6 0,0 8 0,-4 4 0,-4 1 0,-5 3 0,-4-1 0,-4 1 0,-3 0 0,-3-1 0,-6 0 0,-5-1 0,-4-5 0,-1-4 0,0-7 0,2-8 0,0-3 0,3-3 0,0-1 0,2-1 0,1-1 0,2-1 0,1 1 0,0-1 0,-1 1 0,2-2 0,2-1 0,3 1 0,2-1 0,1 1 0,4 1 0,9 2 0,13 1 0,16 1 0,-16 1 0,1 1 0,3 0 0,0 2 0,-1 1 0,-1 1 0,-4 2 0,-2 2 0,12 11 0,-13 3 0,-7 3 0,-6 2 0,-4-1 0,-4-3 0,-1-3 0,-1-4 0,-5-5 0,-5-2 0,-5-3 0,-3-3 0,-1-2 0,-1-3 0,0 0 0,0 0 0,1-1 0,-1-2 0,1-1 0,1-1 0,1 0 0,4 1 0,7 1 0,2 1 0</inkml:trace>
+  <inkml:trace contextRef="#ctx0" brushRef="#br0" timeOffset="26851">2454 7938 24575,'-18'0'0,"-6"0"0,-15 0 0,13 0 0,-3 0 0,-4 0 0,-2 0 0,-1 0 0,0 0 0,1-3 0,1-1 0,3-2 0,0-3 0,4-2 0,2-3 0,2-2 0,1-2 0,3 1 0,1-2 0,1-1 0,2 0 0,-1-1 0,2 0 0,0 0 0,1-1 0,1-1 0,1 0 0,0 0 0,1-1 0,2-1 0,1 1 0,0-1 0,2 0 0,-3-21 0,4 6 0,3 4 0,2-2 0,7-10 0,1 16 0,2-1 0,3-4 0,3-1 0,2-2 0,1 2 0,1 2 0,0 2 0,-1 5 0,1 2 0,-1 4 0,1 3 0,-2 4 0,2 2 0,19-4 0,2 9 0,-1 7 0,-1 3 0,-1 7 0,-2 7 0,0 8 0,-1 9 0,-17-14 0,-1 1 0,0 0 0,0 1 0,0 0 0,0 0 0,11 16 0,-4-7 0,-7-6 0,-5-7 0,-2-3 0,-2-3 0,-3-3 0,-3-2 0,-1-3 0</inkml:trace>
+  <inkml:trace contextRef="#ctx0" brushRef="#br0" timeOffset="28583">2286 7133 24575,'11'3'0,"0"0"0,0 0 0,1 2 0,0 1 0,-1 1 0,0 0 0,-1-2 0,0-1 0,-3 1 0,-3-5 0,-1 2 0,-1-2 0,0 0 0,1 0 0,-1 0 0,1-1 0,-2-3 0,0-7 0,0-7 0,-1-6 0,0-6 0,0 0 0,0-1 0,0 4 0,0 5 0,0 3 0,0 4 0,0 2 0,2 2 0,0 1 0,2 1 0,-1 2 0,0 0 0,-1 1 0,-1 1 0,0 1 0,-1 2 0,0 1 0</inkml:trace>
+  <inkml:trace contextRef="#ctx0" brushRef="#br0" timeOffset="31852">955 7166 24575,'0'27'0,"0"7"0,0 8 0,0 3 0,0-8 0,0-9 0,0-11 0,0-7 0,0-4 0,0-3 0,-1-3 0,-1-6 0,-2-9 0,-2-6 0,0-3 0,-1-2 0,1 1 0,2-5 0,1-3 0,2 1 0,0 0 0,1 3 0,0 4 0,0 4 0,2 5 0,3 5 0,3 6 0,1 2 0,4 2 0,2 1 0,4 4 0,4 5 0,3 6 0,3 6 0,0 4 0,-2 3 0,-3 1 0,-3 1 0,-3-1 0,-3-4 0,-5-6 0,-2-5 0,-4-3 0,-3-2 0,-1 1 0,0-5 0,-1 3 0,-4-5 0,-5 1 0,-5-2 0,-4-1 0,1-1 0,4 0 0,2-2 0,4-1 0,0-3 0,3-1 0,1 2 0,1 1 0,-1 1 0,4 2 0,6 0 0,3 2 0,7 1 0,1 2 0,2 2 0,4 2 0,6 3 0,1 3 0,-1 4 0,-4 2 0,-5 2 0,-5 1 0,-2-1 0,-4 1 0,-3-1 0,-2-1 0,-3-3 0,-1-3 0,-5-3 0,-5-3 0,-5-3 0,-7-3 0,-2-3 0,-7 0 0,-7 0 0,-5 0 0,-5 0 0,1 0 0,3 0 0,5 0 0,9 0 0,8 0 0,7 0 0,8-2 0,3-2 0,3-2 0,1 0 0,0 0 0,0 0 0,0-1 0,0-3 0,0-2 0,0-2 0,0-4 0,0-2 0,0-2 0,0-1 0,0 1 0,0 3 0,0 3 0,0 5 0,0 5 0,0 4 0</inkml:trace>
+  <inkml:trace contextRef="#ctx0" brushRef="#br0" timeOffset="38567">7907 5646 24575,'0'-33'0,"0"9"0,0-2 0,0-9 0,0-1 0,0-6 0,0-1 0,0 1 0,0 2 0,0 5 0,0 2 0,0 6 0,0 3 0,0-11 0,0 12 0,0 3 0,0-2 0,0-3 0,0 0 0,0 4 0,0 4 0,0 4 0,0 3 0,0 2 0,0 1 0,0 4 0,-1 1 0,-2 1 0,0 1 0,9 2 0,0 1 0,11 4 0,0 2 0,9 3 0,14 3 0,-13-7 0,4 0 0,8 0 0,2 1 0,-8-3 0,1 0 0,0 0-226,3 0 0,1 0 0,1 0 226,0 0 0,1 1 0,0-1 0,2 1 0,0 0 0,0 0 0,0 0 0,0 0 0,1 0 0,1 0 0,0 0 0,1-1-365,0 1 0,0-1 1,1 0 364,-1 0 0,1-1 0,1 1 0,1-1 0,2 0 0,0 0-402,-10-1 0,0 0 0,1-1 1,-1 1 401,2-1 0,0 1 0,0-1 0,0 0 0,1 0 0,-1-1 0,1 1 0,-2-1-239,9 0 0,-1 1 0,-1-2 239,-5 0 0,-1 0 0,-2-1 0,-3 1 0,-1 0 0,-2-1 280,10 1 1,-2 0-281,-3 1 0,-2 0 495,-8 0 1,-2 0-496,13 3 1685,-13 0-1685,-9-1 859,-6-1-859,-5-1 0,-3 0 0,-4-1 0,-3 0 0,-2 5 0,-1 2 0,0 4 0,0 3 0,1 0 0,0 2 0,0-4 0,2 1 0,1-2 0,-1-2 0,2 1 0,-1-3 0,0 0 0,1-1 0,-1 0 0,-1 0 0,1 1 0,-1-1 0,2-1 0,1-1 0,0-1 0,0-1 0,0 0 0,0 1 0,0 0 0,0-1 0,0 1 0,0-1 0,0 0 0,0-2 0,0-1 0</inkml:trace>
+  <inkml:trace contextRef="#ctx0" brushRef="#br0" timeOffset="40553">10316 5463 24575,'0'28'0,"0"-2"0,1-1 0,1-4 0,2-4 0,1-3 0,0-3 0,-1-3 0,0-1 0,-1-3 0,0 2 0,1 0 0,-1 1 0,2 0 0,-2 0 0,1-1 0,-1-1 0,0 0 0,-1-2 0,2 0 0,-2-1 0,2-1 0,-2 0 0,1-1 0,0 0 0,0 0 0,1 0 0,0 0 0,2 0 0,1-3 0,4-2 0,2-2 0,4-3 0,2-2 0,0 1 0,1-2 0,-1 0 0,-3 1 0,-3 1 0,-2 2 0,-1 1 0,1 0 0,3 0 0,4-3 0,5-2 0,2-2 0,2-1 0,1-1 0,-4 3 0,-4 4 0,-5 3 0,-5 5 0,-4 2 0,-2-1 0,-3 1 0,-1-1 0</inkml:trace>
+  <inkml:trace contextRef="#ctx0" brushRef="#br0" timeOffset="210234">20498 5307 24575,'8'14'0,"5"7"0,7 8 0,6 6 0,1-1 0,-2-4 0,-5-8 0,-5-7 0,-4-4 0,-3-3 0,-3-2 0,-2-3 0,-2-1 0,0-1 0,0 0 0,2 3 0,2 3 0,3 4 0,2 4 0,1 0 0,0-2 0,-1-6 0,-2-3 0,-2-3 0,0-3 0,1-6 0,2-6 0,3-4 0,1 0 0,-1 4 0,-1 4 0,-2 4 0,3 1 0,3-1 0,3 0 0,1 0 0,-2 0 0,-4 2 0,-3 2 0,-4 0 0,0 1 0,-2-2 0,0 0 0,0-1 0,-1 1 0,-1 1 0,-1 1 0</inkml:trace>
+  <inkml:trace contextRef="#ctx0" brushRef="#br0" timeOffset="233297">20184 5309 24575,'0'17'0,"0"3"0,0 6 0,0 1 0,0 0 0,2-2 0,4-2 0,2-1 0,3-4 0,-1-2 0,-2-3 0,-2-3 0,-2-4 0,-2-1 0,-1-3 0,0 0 0,0-1 0,0 0 0,1 1 0,-1-1 0,1 1 0,0-1 0,1 0 0,1-1 0,1 0 0,1 0 0,1 0 0,4 0 0,2-2 0,4-4 0,2-2 0,3-4 0,2-1 0,1-2 0,0 1 0,-3 2 0,-4 2 0,-6 3 0,-4 1 0,-4 2 0,-3 0 0,-1 2 0,0 1 0</inkml:trace>
+  <inkml:trace contextRef="#ctx0" brushRef="#br0" timeOffset="237087">18069 6190 24575,'-2'9'0,"0"3"0,3 1 0,3 4 0,4 1 0,2 1 0,2 0 0,3-1 0,4-4 0,6-2 0,8-1 0,10-1 0,-18-5 0,1 1 0,5 0 0,1 1 0,6 1 0,2 1 0,7 0 0,2 1-290,-12-4 0,1 1 0,1-1 290,2-1 0,0 0 0,1-1 0,1-1 0,1 0 0,1-1 0,-1 0 0,1-1 0,-1 0 0,-2-1 0,-1 0 0,0 0 0,0 0 0,-1 0 0,-1 0 0,-2 0 0,-2 0 0,0 0 0,13 0 0,-2 0 0,-3 0 0,-2 0 0,-6 0 0,-1-1 0,-4 1 0,1-1 0,-2-1 0,1 1 0,-1-1 0,1 0 435,1 0 0,1 1-435,-2-1 0,1 1 0,-3 0 0,0 0 0,-3 0 0,0 0 0,18 0 0,-7 1 0,-2 0 0,-3 0 0,-1 0 0,0 0 0,-1 0 0,0 0 0,-3 0 0,-6 0 0,-5-1 0,-5-1 0,-4-3 0,-3 0 0,-1 0 0,0-1 0,3-2 0,5-2 0,6-1 0,4-1 0,3 2 0,0 1 0,-1 2 0,-1 2 0,-4 1 0,-5 3 0,-3-1 0,-4 0 0,-2-2 0,-2-1 0,-1-1 0,0-1 0,0-1 0,-2 0 0,-1 0 0,-1 0 0,0 0 0,1 0 0,0 0 0,1 1 0,0 1 0,0 1 0,1 1 0,0 1 0,1 0 0,0 0 0,0-1 0,0 0 0,0-1 0,-1-1 0,0 1 0,0 2 0,0 2 0</inkml:trace>
+  <inkml:trace contextRef="#ctx0" brushRef="#br0" timeOffset="240417">20297 6290 24575,'16'-3'0,"2"-2"0,2-2 0,-4 0 0,-4 1 0,-5 4 0,-3 2 0,1 0 0,-1 2 0,1 0 0,2 1 0,1-1 0,1-2 0,0 0 0,2 0 0,-4 0 0,0-3 0,-5 0 0,1-1 0,1 0 0,0 2 0,2 1 0,0-1 0,1 1 0,2-1 0,1 0 0,1 1 0,0-1 0,-2 0 0,0 1 0,-1 0 0,-3 1 0,-1 0 0,-2 0 0,0 2 0,0 4 0,1 4 0,1 3 0,2 0 0,1-1 0,2-1 0,0-2 0,1 2 0,0 0 0,2 1 0,0 0 0,0-1 0,-1-1 0,-2 0 0,-3-1 0,-1 0 0,-1-1 0,-1-1 0,-1-1 0,-1-1 0,-1-1 0,0 1 0,0 0 0,2 1 0,2 1 0,0 0 0,2-2 0,-3-1 0,2-2 0,-4-1 0,1 0 0</inkml:trace>
+  <inkml:trace contextRef="#ctx0" brushRef="#br0" timeOffset="271118">7282 5556 24575,'0'-25'0,"0"-1"0,0-6 0,0-3 0,0-9 0,0-1 0,0 12 0,0-1 0,0 1-311,0-2 1,0 0 0,0 0 310,0-1 0,0-1 0,0 0 0,0-3 0,0-1 0,0 0-287,0-3 1,0 0 0,0 0 286,0 1 0,0 0 0,0 1 0,0 3 0,0-1 0,0 2 216,0-11 0,0 2-216,0 8 0,0 2 0,0 5 0,0 3 0,0-14 450,0 14-450,0 10 908,0 8-908,0 4 0,0 3 0,0-3 0,0-4 0,-1-5 0,-1-6 0,-1-7 0,0-8 0,-2-8 0,2 21 0,0-2 0,0 1 0,0 0 0,-1-21 0,0 11 0,1 10 0,1 10 0,1 7 0,1 4 0,0 1 0,0 0 0,0 0 0,0-1 0,0 2 0,1 0 0,2 1 0,3 1 0,3 0 0,5 1 0,12 2 0,19 0 0,-10-1 0,3-1 0,-3-1 0,3 1 0,2-2-655,-2 0 1,2 0-1,2-1 1,2-1 654,-2 0 0,1-1 0,2 1 0,1-2 0,1 0-547,-1 0 1,2 0 0,1-1 0,1-1 0,0 1 0,2-1 412,-9 2 0,0-1 0,2-1 0,0 1 0,0 0 0,1-1 0,0 1 0,1 0-231,-3 0 1,1 0 0,1 0 0,-1 0 0,1 0 0,1 0 0,0 0 0,-1 0 0,2 0 263,-3 0 1,0 1-1,0-1 1,1 1-1,0 0 1,0-1 0,1 1-1,0 0 1,0 0-1,0 0-177,-1 0 0,0 0 0,0 0 0,1 1 0,0-1 0,0 1 0,0-1 0,1 1 0,-1-1 0,1 1 1,0-1 277,-3 1 0,1 0 0,0 0 0,0 0 0,0 0 0,1 0 0,-1 0 0,1 0 0,0 0 0,0 0 0,0 0 0,1-1-111,-3 2 0,1-1 0,0 0 0,0 0 1,0 0-1,0 0 0,1 0 0,-1 0 1,1 0-1,0 0 0,0 0 0,-1 0 1,1 0 110,2 0 0,-1 0 0,1 1 0,0-1 0,0 0 0,0 0 0,0 0 0,0 0 0,0 0 0,0 1 0,0-1 0,0 1 0,-1-1-43,0 1 1,0 0 0,-1 0 0,1 0-1,0-1 1,-1 2 0,1-1 0,-1 0-1,0 0 1,0 0 0,0 1 0,0-1-1,0 1 43,3-1 0,0 1 0,-1-1 0,1 1 0,-1 0 0,0 0 0,0 0 0,0 0 0,0 0 0,-1 0 0,1 1 0,-1-1-8,1 1 0,0 0 0,0-1 0,0 1 0,0 1 0,-1-1 0,0 0 0,0 0 0,0 1 0,0-1 0,0 1 8,2-1 0,0 1 0,0 0 0,0 0 0,-1 0 0,1 0 0,-1 0 0,1 0 0,1 0 0,-1 0 0,-1 0 0,0 0 0,1 0 0,-1 0 0,1 0 0,0 0 0,0 0 0,1 0 0,-1 0 0,1 0 0,-1 0 0,-2 0 0,0 0 0,0 0 0,0 0 0,0 0 0,0 0 0,0 0 0,1 0 0,-1 0 0,1 0 0,0 0 0,0 0 0,-1 0 0,-1 0 0,1 0 0,0 0 0,0 0 0,1 0 0,-1 0 0,1 0 0,-1 0 0,0 0 0,1 0 0,-1 0 0,0 0 0,-1 0 0,0 0 0,-1 0 0,1 0 0,0 0 0,0 0 0,0 0 0,-1 0 0,1-1 0,-1 1 0,0 0 0,1-1 0,-1 1 0,2-1 0,0 0 0,0 0 0,-1 0 0,1 0 0,-1 0 0,1-1 0,-1 1 0,0-1 0,0 1 0,1-1 0,-1 0 0,3 0 0,1 0 0,-1 0 0,1-1 0,-1 1 0,0-1 0,0 1 0,0-1 0,-1 0 0,0 0 0,-1 1 13,1-1 1,-2-1-1,1 1 1,-1-1 0,0 1-1,-1-1 1,0 1 0,1-1-1,-1 1 1,1 0-14,0 0 0,-1-1 0,1 1 0,-1 0 0,1 0 0,-1 0 0,0 0 0,0 0 0,0 1 0,-1-1 0,3 1 0,0 0 0,-1 0 0,0 0 0,-1 0 0,1 1 0,-1-1 0,1 1 0,0 1 0,0-1 0,0 1 0,-1 0 0,1 0 0,0 0 0,0 0 0,0 1 0,0 0 0,0 0 0,2 0 0,0 1 0,0 0 0,0 0 0,0 0 0,-1 0 0,1 1 0,-1 0 0,-1-1 81,2 1 1,-1 0-1,0 0 1,-1 1-1,0-1 1,0 0-1,-1 1 1,0-1-82,3 1 0,-1 0 0,1 1 0,-2-1 0,0 0 0,0 0 0,-1-1 213,2 1 1,-1-1-1,0 0 1,-1 1-1,0-2 1,-1 1-214,4-1 0,0-1 0,-1 1 0,-1-1 0,1 0 388,-3-1 1,0 1 0,0-1 0,-1 0 0,0 1-389,-3-1 0,0 0 0,0 0 0,-1 0 0,0 0 0,8 0 0,0 0 0,0 0 0,-1 0 694,-3 0 1,0 0-1,-1 0 1,-1 0-695,-3 0 0,0 0 0,-1 0 0,0 0 938,7 0 1,0 0 0,-2 0-939,-5-1 0,-2 1 0,-1-1 1265,11 0 0,-2 0-1265,-2 0 0,0 1 0,1-1 0,2 0 467,-11 1 1,2 0 0,1 0-468,6 0 0,0 0 0,1 0 0,4 0 0,0 0 0,1 0 28,-11 0 0,0 1 0,0-1 0,0 1-28,11 0 0,1 0 0,0-1 0,-13 1 0,1 0 0,0-1 0,0 1 0,2-1 0,0 1 0,0-1 0,1 1-284,2-1 0,1 0 0,1 1 1,-1 0 283,0 0 0,0-1 0,0 2 0,-1-1 0,-1 1 0,-1 0 0,-1 0 0,-1 1-98,7 0 0,-1 0 0,-3 1 98,7 1 0,-4 0 378,-11-2 1,-3 1-379,6-1 1216,-19-1-1216,-10-1 0,-5 0 0,-2-1 0</inkml:trace>
+  <inkml:trace contextRef="#ctx0" brushRef="#br0" timeOffset="272803">24237 3321 24575,'42'0'0,"-14"0"0,1 0 0,9 0 0,2 0 0,4 0 0,1 0 0,0 0 0,0 0 0,-2 0 0,-1 0 0,-5 0 0,0 0 0,-6 0 0,-2 0 0,15 0 0,-16 1 0,-12 3 0,-6 1 0,-2 1 0,-1 0 0,0 0 0,3 1 0,6 1 0,7 3 0,6 4 0,5 4 0,4 3 0,6 0 0,-21-12 0,1 1 0,1 0 0,-1-1 0,0 0 0,-1 1 0,15 8 0,-8 0 0,-11-3 0,-7 0 0,-5-1 0,-4 0 0,-2 2 0,-1 3 0,0 4 0,0 8 0,0 11 0,0-17 0,0 2 0,0 4 0,1 0 0,0 2 0,1 1 0,0 0 0,0-1 0,0-1 0,0-1 0,0-1 0,1 0 0,0 0 0,0 1 0,0 1 0,1 0 0,-1 2 0,1 0 0,-1 1 0,0 1 0,-1-2 0,0 1 0,-1-3 0,1 0 0,-1-1 0,1 1 0,-1-2 0,0-1 0,0 0 0,2 0 0,-1-1 0,1 1 0,-1-4 0,1 0 0,3 20 0,0-11 0,-2-9 0,0-4 0,-1-1 0,2 4 0,-1 3 0,1 2 0,1 2 0,0 1 0,-1 2 0,0 0 0,-1-4 0,-2-6 0,-1-7 0,0-15 0,-1 1 0,0-9 0</inkml:trace>
+  <inkml:trace contextRef="#ctx0" brushRef="#br0" timeOffset="274502">25254 5057 24575,'8'10'0,"4"1"0,6 4 0,4 4 0,0 4 0,1 4 0,-2-2 0,-4-3 0,0-2 0,-3-3 0,-1-2 0,-2-2 0,-3-3 0,-3-3 0,-1-2 0,-2-1 0,1-1 0,1 1 0,-2 1 0,2-2 0,-2-1 0,2 1 0,-1 2 0,3 1 0,1 3 0,1 1 0,1 1 0,0 1 0,-2 0 0,0 0 0,-1 0 0,0-1 0,0-2 0,-1-4 0,0-2 0,-1-3 0,0-4 0,2-6 0,2-6 0,2-5 0,8-7 0,12-9 0,-9 15 0,2 0 0,3-2 0,2-1 0,0 1 0,0 0 0,-4 4 0,-2 0 0,12-12 0,-13 11 0,-12 8 0,-4 3 0,-4 4 0,-1 1 0,0 1 0,0 3 0</inkml:trace>
+  <inkml:trace contextRef="#ctx0" brushRef="#br0" timeOffset="278616">15467 6170 24575,'0'10'0,"0"17"0,0 1 0,0 5 0,0 13 0,1 5-673,-1-10 0,1 1 0,0 1 673,1 2 0,1 0 0,0 0 0,1-1 0,0-1 0,0 0 165,0-6 1,1-1 0,-1-1-166,3 11 0,-1-4 185,-1-8 0,0-3-185,4 12 0,-1-14 0,-4-13 0,-1-9 0,-2-5 1029,1-2-1029,1-3 123,2 1-123,1-1 0,5 0 0,7-1 0,18-3 0,-6 3 0,4 2 0,2 0 0,4 0 0,3 1-820,2 0 1,3 0 0,4 0 0,3 1 647,-11-1 1,2 1 0,3 1 0,1-1 0,2 0 0,0 0 0,1-1-157,-10 1 0,1-1 0,0 0 1,1 1-1,1-1 0,0 0 1,0 0-1,1-1 0,1 1 1,-1 0 142,1-1 1,0 1 0,1-1 0,1 0 0,0 0 0,0 0 0,0 0 0,0 0 0,1 0 0,-1 0 0,0-1-90,-4 1 1,0 0 0,0 0 0,1-1 0,-1 1 0,0-1 0,0 1 0,1-1 0,-1 1 0,0-1 0,-1 1 0,1-1 248,2 0 1,0 0-1,0 0 1,0 0 0,0 0-1,0 0 1,-1-1 0,0 1-1,1 0 1,-1 0 0,-1 1-188,4-1 0,0 0 0,-1 0 0,1 0 1,-1 1-1,0-1 0,0 0 0,-1 1 1,-1 0-1,0-1 212,0 1 0,-1 0 0,-1 0 0,0 1 0,0-1 0,-1 0 0,0 1 0,1-1 0,-1 1-9,5-1 0,-1 1 0,1 0 1,0-1-1,-1 1 0,-1 0 1,0 1-1,-1-1 9,0 0 0,0 1 0,-1-1 0,-1 1 0,0 0 0,0-1 0,-1 1 202,6 0 1,-1 0 0,-1 0-1,1 0 1,-1 0 0,0 0-203,-2 0 0,1 1 0,-1-1 0,0 1 0,-1-1 0,0 1 0,3 0 0,0 1 0,-1-1 0,-1 1 0,1-1 0,1 1 0,-1-1 0,0 1 0,0-1 0,-1 1 0,-2-1 0,-1 1 0,0-1 0,0 1 0,0-1 0,-1 0 0,1 0 0,-1-1 0,1 1 0,-1-1 393,0 0 1,0 0-1,0-1 1,0 1 0,0-1-394,-1 1 0,1-1 0,-1 1 0,1-1 0,0 0 0,1 1 0,1-1 0,0 1 0,0-1 0,-1 1 0,0-1 0,-1 1 0,0-1 0,0 1 0,0 0 0,0 0 0,0 0 0,1 0 0,-1 0 0,0 0 0,0 0 0,1 0 0,-1 0 0,0 0 0,0 0 0,9 1 0,-1 0 0,1 0 0,-1 1 602,-2 0 1,1 1-1,-1 0 1,-1 1-603,-3-1 0,-2 1 0,1 1 0,-2-1 816,10 3 1,-1-1 0,-1 1-817,-3-1 0,0 0 0,-1 0 0,-4 0 0,0-1 0,0-1 0,-1 0 0,0 0 0,0-1 0,1 0 0,0-1 0,0 0 0,1-1 0,0 0 0,1-1 0,0 1 0,-1-1 0,1-1 0,-2 1 0,0 0 0,-1-1 737,-1 0 1,0-1 0,0 0-738,-1 0 0,-1-1 0,0-1 0,1 0 0,0 0 0,0-1 0,2 0 0,0-1 0,0 1 0,2 0 0,0 0 0,0-1 0,-1 1 0,0 0 0,0 0 0,-2-1 0,0 1 0,-1 0 0,12-2 0,-2 0 1024,-6 0 0,-2 0-1024,-6 0 0,-2 0 830,-2-1 1,-1 0-831,2-3 0,1 0 505,2-1 1,0-1-506,4-1 0,0-1 266,-1 0 1,-1 0-267,-4 3 0,-2 0 0,15-7 0,-17 6 0,-13 5 0,-8 0 0,-3 0 0,-2 0 0,-1 0 0,0-5 0,0-6 0,-1-10 0,-2-9 0,-2-6 0,-3 2 0,0 6 0,-1 9 0,2 8 0,0 1 0,0-1 0,-4-5 0,-2-6 0,-2-3 0,-1 0 0,4 6 0,2 8 0,6 9 0,1 5 0</inkml:trace>
+  <inkml:trace contextRef="#ctx0" brushRef="#br0" timeOffset="280166">25455 6443 24575,'0'-20'0,"2"-4"0,2-5 0,4-2 0,3 1 0,2 4 0,0 5 0,1 2 0,0 3 0,0 1 0,0 1 0,-1 3 0,-1 1 0,-3 3 0,-2 1 0,-1 2 0,-1 2 0,1 1 0,-1 0 0,0 1 0,0 0 0,1 0 0,1 0 0,2 2 0,2 4 0,6 5 0,6 5 0,4 2 0,1 0 0,-2-1 0,-5 0 0,-4-1 0,-3-1 0,-2-1 0,-2-5 0,-2-2 0,-3-3 0,-2-2 0,-2-1 0</inkml:trace>
+  <inkml:trace contextRef="#ctx0" brushRef="#br0" timeOffset="283553">17837 6166 24575,'0'18'0,"0"7"0,0 9 0,0 5 0,0-5 0,0-5 0,0-9 0,0-8 0,0-4 0,0-3 0,0-1 0,1 0 0,1-1 0,2 1 0,4 4 0,9 6 0,7 8 0,10 8 0,-15-14 0,2 1 0,3 0 0,1-1 0,4 1 0,2-1 0,5 2 0,3-1 0,-9-5 0,2 0 0,0 0-181,2 0 0,1 0 0,1 0 181,1-1 0,-1 0 0,2 0 0,1-1 0,2 0 0,0-1-404,1-1 0,2 0 0,0 0 404,3-1 0,2-1 0,0 0 0,-9-2 0,1 0 0,0 0 0,0 0-387,0-1 0,0 0 0,0 0 0,1-1 387,0 0 0,1 1 0,-1-1 0,0 0 0,-1-1 0,0 1 0,0 0 0,0-1 0,-1 0 0,0-1 0,0 1 0,-1-1 0,1 1 0,0-1 0,0 0 0,1 0 0,1-1 0,1 0 0,1-1 0,0 0-550,3 0 1,1-1 0,1 0 0,1 0 549,-7 0 0,1 0 0,0-1 0,0 1 0,2 0-381,-5 0 1,0 0 0,1 0 0,1 1 0,-1-1 0,1 1 380,1-1 0,1 1 0,0 0 0,0 0 0,1 0 0,-1 1 0,1-1 0,1 1 0,0-1 0,0 1 0,0 0 0,1-1-461,1 0 1,0 0 0,1 0 0,0 0 0,-1-1 0,0 0 460,-3 1 0,0-1 0,-1 0 0,1 0 0,-1-1 0,0 0 0,0 0 0,-1 0 0,1 0 0,-1-1 0,0 0 0,0 0-145,-1-1 1,1 0-1,-1 0 1,0 0 0,0 0-1,-1 0 145,7-1 0,0 0 0,-1 0 0,1 1 0,0-1 0,-7 1 0,1 1 0,0-1 0,0 0 0,0 1 0,-1 0 0,6 0 0,-1 0 0,0 1 0,0-1 0,-1 1 46,-2 1 1,-1 0-1,1 0 1,-2 1-1,0 0-46,6-1 0,-1 1 0,-1 0 0,-2 0 491,8 0 0,-3 0 0,0 0-491,-5 0 0,-2 0 0,-1 0 1638,10-1 0,-3 0-1367,-4 1 0,-1 0-271,-1 1 0,0 0 0,0 0 0,0 1 0,4 0 0,1 0 0,2 0 0,0 0 0,0 0 0,-1 0 0,-1 0 0,-1 0 0,-4 0 0,-2 0 1417,-4 0 0,0 0-1417,-5 0 0,-1 0 1029,-3 0 1,-2 0-1030,17 0 898,-8 0-898,-7 0 95,-4 0-95,-1 0 0,4 0 0,4 0 0,10 0 0,8 3 0,-22 0 0,0 1 0,0 0 0,-1 1 0,20 7 0,-8-3 0,-2-4 0,-1-3 0,-2-2 0,-2 0 0,-7 0 0,-7 0 0,-6-2 0,-6-2 0,-2-2 0,0-3 0,3-3 0,2-3 0,1-2 0,-1 0 0,-1 1 0,-4 3 0,-1 4 0,-1 3 0,0 0 0,0 3 0,0-1 0,0 3 0,0 0 0</inkml:trace>
+  <inkml:trace contextRef="#ctx0" brushRef="#br0" timeOffset="287336">23066 6192 24575,'7'4'0,"-1"0"0,0 1 0,0 0 0,1 0 0,1-1 0,5-2 0,8 1 0,13 1 0,-9-2 0,2 1 0,8 0 0,1 0 0,4 0 0,2 0 0,2-1 0,0-1 0,4 0 0,0 0 0,0-1 0,-1 0 0,0 0 0,0 0 0,-2 0 0,0 0 0,-3 0 0,0 0 0,-2 0 0,0 0 0,-3 0 0,-1 0 0,-3 0 0,-1 0 0,-5 0 0,-1 0 0,20 0 0,-1 0 0,1 0 0,3 0 0,-20 0 0,1 0 0,0 0 0,1 0 0,2 0 0,1 0 0,1 0 0,0 0 0,0 0 0,0 1 0,3 1 0,0-1 0,-2 1 0,-1 0 0,-2 0 0,-2 1 0,-4-2 0,-2 1 0,13 0 0,-11-1 0,-10-1 0,-4 0 0,-2 0 0,-2 0 0,2 0 0,0-1 0,2-1 0,5-4 0,4-4 0,7-4 0,2-3 0,0-3 0,-4-1 0,-6 3 0,-7 5 0,-6 4 0,-3 2 0,-1 0 0,-1 0 0,2-3 0,1-1 0,0 0 0,-1 2 0,-3 3 0,-1 2 0,-1 3 0</inkml:trace>
+  <inkml:trace contextRef="#ctx0" brushRef="#br0" timeOffset="289052">25058 6077 24575,'16'0'0,"3"0"0,0 0 0,1 0 0,-2 0 0,-3 0 0,0 0 0,-3 0 0,-2 0 0,-1 0 0,-3 0 0,-1 0 0,-1 0 0,-3 1 0,0 2 0,-1 1 0,0 1 0,1-1 0,0-1 0,1-1 0,4-2 0,4 0 0,6 0 0,4 0 0,-2 0 0,-4 0 0,-1 0 0,-6 0 0,-1 1 0,-4 1 0,-2 4 0,0 2 0,0 3 0,0 1 0,0 0 0,0-1 0,0-1 0,0-2 0,0-1 0,0-2 0,1 0 0,1 0 0,-1 0 0,1 0 0,0 2 0,2 1 0,0 1 0,1 0 0,2 2 0,-3-5 0,2 1 0,-5-6 0,0 0 0</inkml:trace>
+  <inkml:trace contextRef="#ctx0" brushRef="#br0" timeOffset="290934">25289 6390 24575,'14'0'0,"3"0"0,2-2 0,3-5 0,-1-3 0,0-3 0,-4 1 0,-4 2 0,-1 0 0,-3 2 0,-2 1 0,0 2 0,-2 0 0,0 0 0,1-1 0,1-4 0,3-2 0,2 0 0,1 0 0,-2 2 0,-5 5 0,0 0 0,-5 1 0,1 0 0,1 0 0,0 0 0,-1 3 0,0 4 0,-1 6 0,0 4 0,0 2 0,1-1 0,-1 0 0,1-1 0,2 0 0,2 0 0,1 1 0,0-1 0,2-1 0,-2-1 0,0-1 0,-2-1 0,-1-2 0,-1-1 0,-1 0 0,0 0 0,1 0 0,-1-1 0,1 0 0,0-1 0,-1-1 0,0-1 0,0 0 0,0 0 0,-1-1 0</inkml:trace>
+  <inkml:trace contextRef="#ctx0" brushRef="#br0" timeOffset="320918">7673 5442 24575,'0'-47'0,"0"17"0,0-3 0,0-4 0,0-3 0,0 0 0,0 0 0,0 4 0,0 3 0,0 5 0,0 1 0,0-22 0,0 1 0,0 22 0,0-1 0,0 0 0,0 0 0,0-22 0,0 13 0,0 13 0,0 7 0,0 4 0,0 2 0,0-1 0,0 1 0,0 1 0,0 1 0,0 1 0,0 2 0,2 1 0,1 3 0,5 1 0,6 0 0,8 1 0,17 0 0,-11 0 0,2 0 0,8 0 0,3 0 0,6 0 0,3-1-315,-13 1 0,1-2 1,1 1 314,3 0 0,2 0 0,0 0 0,3 0 0,0 0 0,0 0 0,1 1 0,-1 0 0,1 0 0,-1 0 0,-1 1 0,0 0 0,-1 0 0,-1 1 0,1 1 0,-1 0 0,1 0 0,-1 0 0,2 0 0,0 1 0,0-1 0,-1 0 0,1 0 0,1 1 0,0-2 0,2 1 0,-1 0-440,-9-1 0,1-1 1,0 1-1,0-1 440,2 0 0,1 0 0,0 0 0,1 0 0,3-1 0,0 1 0,1 0 0,1-1-485,-8 1 1,0-1 0,1 0 0,0 1-1,1-1 485,1 0 0,1 1 0,-1-1 0,1 1 0,1 0 0,1-1 0,1 1 0,-1 0 0,1 0 0,0 0 0,1 0 0,0 0 0,-1 0 0,1 0 0,0 0 0,-2 0 0,1 0 0,-1-1 0,0 1 0,-1-1 0,-1 0 0,-1 1 0,-1-1 0,0 0 0,0-1-326,6 1 1,0 0 0,-2 0 0,0-1 325,-3 0 0,-2 0 0,0 0 0,-1 0 41,7 0 1,-1 0 0,-2 0-42,-4 0 0,-2 0 0,0 0 0,12 0 0,-3 0 701,-8 0 0,-3 0-701,-6 0 0,-2 0 2458,16 0-2458,-6 0 1670,1 0-1670,-14 0 0,2 0 385,5 0 1,2 0-386,6 0 0,1 0 0,4 0 0,0 0 0,-1 1 0,0 0 0,-1 1 0,-2 1 0,-4 0 0,-1 1 0,-4 1 0,-1 0 0,-3-1 0,-1 1 0,-3-1 0,1 0 0,19 3 0,-3-3 0,-2-1 0,-1-1 0,0-2 0,1 0 0,-6 0 0,-7 0-3277,-9 0 0,-8 0 3047,-5 0 230,-3 4 0,-2-2 0,0 6 0,0 3 0,-2 7 3276,-2 5 0,-3 3-3044,-2 1-232,1-3 0,0 0 0,3 2 0,0 3 0,1 7 0,1 7 0,0 3 0,0 0 0,2-4 0,-1-4 0,2-5 0,0-3 0,-1-2 0,-1-7 0,1-5 0,0-6 0,1-6 0,0-2 0</inkml:trace>
+  <inkml:trace contextRef="#ctx0" brushRef="#br0" timeOffset="322506">13031 5273 24575,'13'25'0,"6"2"0,13 7 0,-15-16 0,2 1 0,1 0 0,-1 1 0,0 0 0,-1-1 0,12 15 0,-5-6 0,-8-8 0,-4-6 0,-5-2 0,-3-4 0,-2-1 0,-1 0 0,1 1 0,2 3 0,1 3 0,0 0 0,-2-3 0,-1-3 0,-2-4 0,1-2 0,-1-7 0,1-8 0,1-6 0,0-5 0,1 2 0,-1 1 0,2 1 0,2 2 0,0 0 0,0 2 0,1 0 0,0-2 0,3-1 0,2-2 0,1 0 0,0 4 0,-3 4 0,-5 7 0,-3 4 0</inkml:trace>
+  <inkml:trace contextRef="#ctx0" brushRef="#br0" timeOffset="325150">7458 5568 24575,'0'-20'0,"0"-23"0,0 4 0,0-4 0,0 6 0,0-3 0,0 0-675,0-5 1,0-2 0,0 1 674,0 0 0,0 1 0,0 0 0,0 3 0,0 1 0,0 0 0,0 2 0,0 1 0,0 1 85,0 1 0,0 1 0,0 1-85,0-1 0,1 1 0,-1 1 0,2-14 0,0 2 213,0 3 1,1 2-214,0 3 0,1 2 0,-2 2 0,1 2 0,0 3 0,-1 1 1022,3-23-1022,0 4 319,1 3-319,0 5 0,-2 8 0,1 11 0,0 8 0,0 7 0,1 2 0,0 2 0,1 0 0,3 2 0,3 2 0,6 5 0,8 4 0,15 4 0,-12-6 0,3 0 0,12 1 0,4-1-713,-8-2 0,3 0 1,3-1 712,-11-2 0,3 0 0,1-1 0,1 0 0,1 1-547,-1-1 1,2 0 0,0 0 0,2-1 0,0 1 0,1-1 458,-1 0 1,0-1 0,1 1 0,1-1-1,0 0 1,0-1 0,0 1 87,2 0 0,0-1 0,0 0 0,0 0 0,1 0 0,-1 0 0,0-1 0,0 0 0,-1 0 0,0 0 0,0 0 0,0-1 0,0 1 0,-1-1 0,-1 0 0,-1 0 0,1 0 0,-1 0 0,0 0 0,0 0 0,0 0 0,4 1 0,0-1 0,0 1 0,0-1 0,0 1 0,-1-1-453,1 1 0,-1 0 1,0 0-1,1 0 1,-1 0-1,0 1 453,-1-1 0,0 0 0,0 1 0,0-1 0,0 1 0,1 0 0,-5 0 0,0 0 0,0 0 0,1 0 0,-1 0 0,1 0 0,-1 0 0,0 0 0,0 1 0,0-1 0,0 1 0,0-1 0,0 1 0,1-1 0,0 1 0,0-1 0,0 1 0,1 0 0,-1-1 0,1 1 0,-1 0-343,1-1 0,0 1 0,1-1 0,-1 0 1,0 0-1,0 1 0,0-2 343,5 1 0,-1 0 0,1 0 0,-1-1 0,0 1 0,0-1 0,0 0 0,1 0 0,-1-1 0,0 1 0,0-1 0,-1 1-81,-2-1 1,-1 0-1,-1 0 1,1 0-1,-2 0 1,1 1 80,4 0 0,-1 0 0,0 0 0,0 0 0,0 1 0,-1 1 0,-1 0 0,0 0 0,1 1 0,0 0 0,-5 1 0,1 0 0,-1 0 0,1 1 0,1 0 0,0-1 6,4 2 1,1-1 0,1 1-1,0 0 1,0-1 0,1 1-7,-7-2 0,1 1 0,0-1 0,0 1 0,0-1 0,0 0 0,1 0 0,0 0 0,1 0 0,0 0 0,0-1 0,-1 1 0,1-1 0,-1 0 0,5 0 0,1 0 0,-1 0 0,-1-1 0,1 1 0,-2-1 72,-3 1 1,0-1 0,-1 1 0,0-1-1,-1 0 1,0 1-73,6 0 0,0 0 0,-1 0 0,0 0 0,-2 0 242,-4-1 0,-1 1 0,-1-1 0,0 1 0,-1-1-242,7 1 0,-1-1 0,0 1 0,0-1 0,1-1 0,0 1 0,0-1 0,0 0 0,1 0 0,0-1 0,1 0 0,-1 0 0,0-1 0,1 0 0,-1-1 0,0 0 0,-3 0 0,-1-1 0,0 0 0,-2-1 478,8-1 0,-1-1 1,-2 0-479,-6 0 0,-2 0 0,-1-1 1576,9 0 0,-2-1-1576,-3 3 0,-1 0 1315,-3 2 0,-1 0-1315,-2 2 0,0-1 1001,-1 1 0,0 0-1001,1 1 0,0 0 0,4 1 0,2 2 0,3 0 0,2 2 0,3-1 0,-1 1 0,2-1 0,-2-1 0,-2-2 0,0 0 360,-5-1 0,-1-1-360,-5 0 0,-2 0 0,-6 0 0,-2 0 0,12 0 0,-18 0 0,-9 0 0</inkml:trace>
+  <inkml:trace contextRef="#ctx0" brushRef="#br0" timeOffset="328587">17687 4540 24575,'14'0'0,"22"0"0,-4 0 0,6 0 0,-3 0 0,3 0 0,3 0-820,-2 0 1,2 0 0,2 0 0,0 0 614,4 0 0,1 0 0,1 0 0,1 0 205,-8 0 0,1 0 0,0 0 0,0 0 0,1 0-359,0 0 0,1 0 0,1 0 0,-1 0 0,0 0 359,-1 0 0,-1 0 0,1 0 0,-1 0 0,0 0 0,-1 0 0,0 0 0,-1 1 0,0-1 0,-1 0 49,7 1 0,-1 0 0,-1 0 1,-1 0-50,-5 0 0,-1 0 0,0 0 0,-2 1-137,8-1 1,-1 2 0,-1-2 136,-5 1 0,-1-1 0,0 1 0,14 0 0,-2 0 848,-3 1 0,-1-1-848,-4 1 0,-2-1 1234,-2 0 0,-1 1-1234,-8-1 0,-2-1 1372,13 1-1372,-12-1 567,-8-1-567,-3 0 1,-3 0-1,3 0 0,6 1 0,7 0 0,8 2 0,5 1 0,4-1 0,4 3 0,-19-5 0,13 4 0,-13-4 0,7 1 0,-3-1 0,-11 0 0,-6 0 0,-5 1 0,-6 0 0,-2-1 0,-4 2 0,0 1 0,-1-1 0,-1 1 0,-3-2 0,-1 0 0,-1-1 0,2-1 0,3 0 0,1 0 0,6 0 0,-2 0 0,2 0 0,-2 0 0,0 0 0,0 0 0,0 0 0,1 0 0,0 0 0,2 0 0,2 0 0,4 0 0,1 0 0,1 0 0,0 0 0,-8 1 0,-1 1 0,-5 1 0,0 2 0,0 2 0,0 2 0,-2 3 0,0 2 0,-1 0 0,0 0 0,1 1 0,0 1 0,0 1 0,0 2 0,-1 3 0,2 3 0,0 6 0,-1 5 0,1 5 0,-1 4 0,1 1 0,1-1 0,0-8 0,0-7 0,0-9 0,0-7 0,0-5 0,0-4 0,0-1 0,0-1 0,0 1 0,0 3 0,0 6 0,0 5 0,0 6 0,0 1 0,0-5 0,0-5 0,0-3 0,0-7 0,0-1 0</inkml:trace>
+  <inkml:trace contextRef="#ctx0" brushRef="#br0" timeOffset="333715">15485 5617 24575,'0'-24'0,"0"-3"0,0-9 0,0-5 0,0 0 0,0 4 0,0 10 0,0 8 0,0 7 0,0 2 0,0 5 0,0 0 0,0 3 0,0-1 0,0 1 0,0-1 0,0-1 0,0 0 0,0-1 0,0 1 0,0-2 0,0-5 0,0-11 0,0-8 0,0-6 0,0-3 0,0 3 0,0 4 0,0 7 0,0 6 0,0 5 0,0 3 0,0 1 0,0 3 0,0 0 0,0 0 0,0 0 0,0 0 0,0 0 0,0 1 0,2 2 0,4 2 0,7 4 0,8 3 0,12 4 0,-9-4 0,1 0 0,9 0 0,2-2 0,11 0 0,3-1-416,-11-1 1,2-1 0,2 1 415,4-1 0,2 0 0,0 0 0,-10 0 0,0 0 0,0 0 0,1 0 0,0 0 0,0 0 0,1 0 0,0 0 0,-1 0 0,0 0 0,0 0 0,0 0 0,-2 0 0,0 0 0,0 0 0,-1 0 0,8 0 0,1 0 0,-2 0-146,-6 0 1,0 0-1,-1 0 146,-2 0 0,0 1 0,-1-1 0,16 2 0,0 0 0,0 1 0,-1-1 0,-1 1 0,-1-1 0,-2 1 0,-1 0 0,-3-1 0,1 1 0,2 1 0,1 0 0,3 0 0,1 1 0,-15-2 0,1 0 0,0 0 0,3 0 0,0-1 0,1 1 0,0-1 0,0-1 0,0 1 0,2-1 0,0-1 0,1 1-387,2-1 1,0 0 0,2 0 386,2 0 0,1 1 0,0-1 0,-9 1 0,0 0 0,1 0 0,-1 1 0,2-1 0,0 1 0,-1 1 0,1-1 0,-2 1 0,0 0 0,1 0 0,-1 1 0,-1-1 0,0 0 0,1 1 0,-1-1 0,1 0 0,0 0 0,0 1 0,0-2-372,1 1 0,1-1 0,-1 0 0,1 0 372,1 0 0,0 0 0,0-1 0,0 1 0,0-1 0,0 0 0,0 1 0,-1-1 0,-3-1 0,-1 1 0,0 0 0,-1-1 158,10 1 1,-2 0 0,-1-1-159,-4 0 0,-1 0 0,-2 0 0,10 0 0,-1 0 193,-6 0 0,-1 0-193,-8 0 0,-2 0 1119,16-1-1119,-11 0 1670,-8-1-1670,-6 0 679,-4 1-679,-2 0 0,-1 0 0,3 1 0,1 0 0,1 0 0,-2 0 0,-3 0 0,-6 1 0,-2 1 0,-9 4 0,-6 2 0,-5 2 0,-4 0 0,-1 0 0,0-2 0,3-3 0,2-3 0,4-1 0,1-1 0,2 0 0,1 0 0,0 0 0,2 0 0,0 0 0,0 0 0,0 0 0,0 0 0,3 1 0,1 2 0,1 5 0,0 8 0,-1 7 0,-1 6 0,-2 2 0,-3-2 0,-1-6 0,3-7 0,2-5 0,2-5 0,1-1 0,0-3 0,0 0 0,0 1 0,0-1 0,0 1 0,-2 0 0,1-1 0,-1 1 0,2-1 0,0 1 0,-1 0 0,-1 2 0,0 1 0,-1 0 0,0 2 0,0 1 0,1-4 0,0-1 0,3-15 0,-1 7 0,1-8 0</inkml:trace>
+  <inkml:trace contextRef="#ctx0" brushRef="#br0" timeOffset="425936">31115 13177 24575,'0'0'0</inkml:trace>
+</inkml:ink>
+</file>
+
+<file path=ppt/ink/ink23.xml><?xml version="1.0" encoding="utf-8"?>
+<inkml:ink xmlns:inkml="http://www.w3.org/2003/InkML">
+  <inkml:definitions>
+    <inkml:context xml:id="ctx0">
+      <inkml:inkSource xml:id="inkSrc0">
+        <inkml:traceFormat>
+          <inkml:channel name="X" type="integer" min="-2.14748E9" max="2.14748E9" units="cm"/>
+          <inkml:channel name="Y" type="integer" min="-2.14748E9" max="2.14748E9" units="cm"/>
+          <inkml:channel name="F" type="integer" max="32767" units="dev"/>
+        </inkml:traceFormat>
+        <inkml:channelProperties>
+          <inkml:channelProperty channel="X" name="resolution" value="1000" units="1/cm"/>
+          <inkml:channelProperty channel="Y" name="resolution" value="1000" units="1/cm"/>
+          <inkml:channelProperty channel="F" name="resolution" value="0" units="1/dev"/>
+        </inkml:channelProperties>
+      </inkml:inkSource>
+      <inkml:timestamp xml:id="ts0" timeString="2023-07-05T09:37:18.212"/>
+    </inkml:context>
+    <inkml:brush xml:id="br0">
+      <inkml:brushProperty name="width" value="0.05292" units="cm"/>
+      <inkml:brushProperty name="height" value="0.05292" units="cm"/>
+      <inkml:brushProperty name="color" value="#FF0000"/>
+    </inkml:brush>
+  </inkml:definitions>
+  <inkml:trace contextRef="#ctx0" brushRef="#br0">8224 11884 24575,'21'0'0,"18"0"0,-8 0 0,3 0 0,9 0 0,3 0-585,-9 0 0,1 0 1,0 0 584,4 0 0,1 0 0,-1 0 0,3 0 0,0 0 0,-1 0 0,1 0 0,-1 0 0,-1 0 0,-2 0 0,-2 0 0,0 0 0,0 0 0,0 0 0,-2 0 89,-2 0 0,0 0 0,-1 0-89,15 0 0,0 0 0,-3 0 0,0 0 0,-6 0 0,0 0 181,-2 0 0,-1 0-181,-4 0 0,0 0 0,-3 0 0,0 0 0,0 0 0,-1 0 443,1 0 0,-1 0-443,0 0 0,0 0 119,-1 0 1,-1 0-120,22 0 0,-7 0 0,-5 0 0,-6 0 0,-1-1 0,2-1 0,8 1 0,-15-1 0,1 1 0,5 0 0,2 0 0,2 0 0,2 0 0,0 0 0,0 1 0,-3 0 0,-1 0 0,-4 0 0,-1 0 0,16 0 0,-12 0 0,-11 0 0,-5 0 0,-9 0 0,0 0 0,-5 0 0,0 0 0,1 0 0,0 0 0,0 0 0,-1 0 0,1 1 0,0 1 0,-2 0 0,-1 0 0,-4-1 0,2-1 0,-2 0 0</inkml:trace>
+  <inkml:trace contextRef="#ctx0" brushRef="#br0" timeOffset="2449">8165 12899 24575,'22'0'0,"18"0"0,-10 0 0,2 0 0,9 0 0,3 0 0,-11 0 0,2 0 0,1 0-342,2 0 1,2 1-1,0 0 342,1 0 0,0 1 0,0 1 0,0-1 0,1 2 0,-1-1 0,-2 1 0,-1 0 0,0 0 0,-3 0 0,-1 0 0,-1 0 126,14 0 0,-2 0-126,-6-1 0,-1-1 0,-3 1 0,-2-1 0,-3 0 0,-1-1 0,-2 0 0,-1 1 0,20 0 773,-4 1-773,-3 1 0,-5 1 0,-4-1 0,-5-1 0,-5 0 0,-3-1 0,-2-1 0,-1 0 0,1 0 0,3 0 0,4 2 0,5 0 0,2 1 0,0 0 0,2 0 0,-4-1 0,-1-2 0,-7 0 0,-4-1 0,-5 1 0,-3 1 0,-3-1 0,-2 1 0,-1 0 0,0 1 0,0-2 0,-1 0 0,0-1 0</inkml:trace>
+</inkml:ink>
+</file>
+
+<file path=ppt/ink/ink24.xml><?xml version="1.0" encoding="utf-8"?>
+<inkml:ink xmlns:inkml="http://www.w3.org/2003/InkML">
+  <inkml:definitions>
+    <inkml:context xml:id="ctx0">
+      <inkml:inkSource xml:id="inkSrc0">
+        <inkml:traceFormat>
+          <inkml:channel name="X" type="integer" min="-2.14748E9" max="2.14748E9" units="cm"/>
+          <inkml:channel name="Y" type="integer" min="-2.14748E9" max="2.14748E9" units="cm"/>
+          <inkml:channel name="F" type="integer" max="32767" units="dev"/>
+        </inkml:traceFormat>
+        <inkml:channelProperties>
+          <inkml:channelProperty channel="X" name="resolution" value="1000" units="1/cm"/>
+          <inkml:channelProperty channel="Y" name="resolution" value="1000" units="1/cm"/>
+          <inkml:channelProperty channel="F" name="resolution" value="0" units="1/dev"/>
+        </inkml:channelProperties>
+      </inkml:inkSource>
+      <inkml:timestamp xml:id="ts0" timeString="2023-07-05T09:37:34.861"/>
+    </inkml:context>
+    <inkml:brush xml:id="br0">
+      <inkml:brushProperty name="width" value="0.05292" units="cm"/>
+      <inkml:brushProperty name="height" value="0.05292" units="cm"/>
+      <inkml:brushProperty name="color" value="#FF0000"/>
+    </inkml:brush>
+  </inkml:definitions>
+  <inkml:trace contextRef="#ctx0" brushRef="#br0">14346 5797 24575,'0'-5'0,"0"-1"0,0 1 0,0-1 0,-1 0 0,-1-4 0,0-5 0,-2-9 0,0-15 0,1 14 0,1-3 0,-2-5 0,1-1 0,0-2 0,-1 1 0,1 0 0,0 2 0,0 4 0,0 1 0,-1-20 0,0 4 0,1-3 0,0-2 0,1 23 0,1 1 0,-3-20 0,2 5 0,-1 7 0,-1 6 0,1 7 0,1 5 0,0 6 0,3 4 0,1 3 0,2 4 0,2 2 0,2 2 0,7 2 0,16 1 0,-4-4 0,4-1 0,14 1 0,4 1-448,-9-2 0,3 0 0,0 1 448,-6-2 0,1 1 0,1 0 0,0 0 0,2 0 0,0 0 0,0 0 0,1 0 0,0 0 0,1 0 0,-1 0 0,1 0 0,-1-1 0,1 1 0,-1-1 0,0 1 0,-1-1 0,0 0 0,-1 1 0,1-1 0,-3 0 0,0 0 0,0 0 0,-1 0 0,11 1 0,-2-1 0,0 1 0,-1-1 0,-2 1 0,0-1-254,-1 1 0,0-1 0,-1 0 254,0 1 0,0-1 0,-1 1 0,0-1 0,0 1 0,-1-1 0,0 1 0,-1-1 0,1 0 0,0 0 0,-1-1 0,1 0 0,-1 0 0,0-1 0,0 0 0,1 0 0,-1 0 0,1-1 0,-2 1 0,0-1 0,0 1 0,-2 0 0,0-1 0,1 1 0,0 0 0,1-1 0,0 1 0,1 0 0,0-1 0,0 1 0,4-1 0,0 1 0,1 0 0,-1-1 0,0 1 0,1 0 0,0 0 0,1-1 0,0 1 0,0 0 0,0-1 0,0 0 0,-1 1 0,1-1 0,-1 1 0,3 0 0,-1 1 0,0-1 0,-3 1 0,0 0 0,-1 0 0,-2 0 0,-1 0 0,0 0-5,-3-1 1,-1 1 0,-1-1 4,9 1 0,-2 0 0,-7-1 0,-2 1 0,14-1 1290,-14 1-1290,-6-1 815,-2 0-815,5 1 14,9-2-14,10 0 0,-20 0 0,1 0 0,2 0 0,1 0 0,-1 0 0,-1 0 0,-3 0 0,-2 0 0,15 0 0,-15 0 0,-7 0 0,-3 0 0,5 0 0,8 0 0,9 0 0,8 0 0,6 0 0,-25 0 0,0 0 0,24 0 0,-3 0 0,-5 0 0,-6 0 0,-4-1 0,-9-1 0,-5 1 0,-4-1 0,-7 3 0,-3 6 0,-6 6 0,-3 7 0,0 4 0,-1 0 0,1 0 0,1-2 0,0-2 0,1-2 0,-1-2 0,2-1 0,-1-1 0,2 0 0,-1-1 0,0 1 0,0 2 0,-1 4 0,0 1 0,0 1 0,1 1 0,0-1 0,0 1 0,2 1 0,0-2 0,0-2 0,-1-5 0,1-3 0,0-9 0,1 1 0,0-6 0</inkml:trace>
+  <inkml:trace contextRef="#ctx0" brushRef="#br0" timeOffset="1300">19123 5558 24575,'4'23'0,"6"7"0,5 4 0,5 2 0,-1-5 0,-1-5 0,-5-7 0,-4-9 0,-2-6 0,-4-3 0,1 0 0,-2 0 0,0 0 0,1 0 0,0-1 0,3-1 0,4-4 0,13-11 0,13-9 0,-12 8 0,1-1 0,2-1 0,1 0 0,-2 2 0,-1 1 0,17-11 0,-13 10 0,-9 8 0,-12 5 0,-2 3 0</inkml:trace>
+  <inkml:trace contextRef="#ctx0" brushRef="#br0" timeOffset="6300">16772 6618 24575,'2'26'0,"0"3"0,-2 3 0,0 1 0,0-2 0,0-1 0,0-2 0,0-4 0,0-5 0,0-3 0,0-3 0,0-3 0,0 0 0,0-5 0,0 1 0,2-5 0,2 1 0,0 0 0,1 0 0,1 1 0,0 1 0,2 4 0,4 2 0,4 4 0,8 3 0,14 2 0,-13-9 0,3-1 0,6 0 0,2 0 0,4-1 0,1-1 0,7 0 0,1-1-224,-14-2 0,0-1 1,1 1 223,2-1 0,0 0 0,1 0 0,3 0 0,1-1 0,0 1 0,0 0 0,0 1 0,0-1 0,-1 0 0,-1 1 0,0 0 0,-2-1 0,0 0 0,-1 1 0,-3 0 0,0-1 0,-1 1 0,0 0 0,-1-1 0,1 0 0,1 1 0,1 0 0,0-1 0,-1 1 0,-1-1 0,1 1 0,1-1 0,-1 0 0,1-1 0,0 1 0,0 0 0,0-1 0,-2 1 0,0-1 0,-1 0-40,16 1 1,0 0 39,-3 0 0,-1 0 0,-3-1 0,-1 0 0,-2 0 0,0 0 0,-3-1 0,-2 0 0,-3 0 0,-1 0 0,-4-1 0,0 0 668,19 0-668,-6 0 82,-5 0-82,-2 0 0,-3 0 0,-4 0 0,-6 0 0,-6 0 0,-5 0 0,-4-1 0,-2-1 0,-1-2 0,-1-2 0,0-1 0,0-2 0,-1 1 0,0 0 0,-1 1 0,-1 2 0,0-3 0,1-4 0,-2-6 0,0-7 0,1-12 0,2-9 0,0 20 0,1-2 0,0 0 0,0 0 0,0 3 0,0-1 0,0-20 0,-1 8 0,0 7 0,-1 8 0,1 7 0,0 6 0,0 4 0,0 2 0,0-1 0,1-3 0,0-2 0,0 1 0,-1 2 0,1 4 0,-1 3 0</inkml:trace>
+  <inkml:trace contextRef="#ctx0" brushRef="#br0" timeOffset="7785">19134 6820 24575,'0'-8'0,"2"-3"0,4-1 0,3-3 0,3 1 0,-1-1 0,0 1 0,1 0 0,2 0 0,-1-1 0,1 0 0,-1 0 0,0 0 0,1-1 0,1-2 0,-1 2 0,-1 2 0,-2 4 0,-4 5 0,-2 2 0,-3 3 0,-1 2 0,1 5 0,1 8 0,6 11 0,7 9 0,8 5 0,-8-19 0,1 0 0,0-1 0,1-1 0,17 16 0,-7-8 0,-7-7 0,-6-7 0,-6-5 0,-4-2 0,-2-4 0,-2-1 0</inkml:trace>
+  <inkml:trace contextRef="#ctx0" brushRef="#br0" timeOffset="17951">3392 6498 24575,'4'9'0,"3"4"0,4 2 0,3-1 0,0-3 0,1-6 0,2-3 0,1-2 0,0-1 0,-2-2 0,-2-4 0,-3-4 0,-5-2 0,-6-2 0,-7 0 0,-5 0 0,-5 3 0,-1 3 0,2 4 0,3 3 0,1 2 0,1 1 0,2 4 0,0 6 0,1 5 0,2 1 0,2 2 0,2 0 0,2-1 0,2 0 0,3-3 0,3-2 0,4-4 0,0-4 0,-1-3 0,-1-3 0,-1-3 0,-2-3 0,-1-4 0,-4 0 0,-1 0 0,-1 0 0,0 6 0,0 1 0</inkml:trace>
+  <inkml:trace contextRef="#ctx0" brushRef="#br0" timeOffset="20000">3603 6490 24575,'33'0'0,"8"0"0,-14 0 0,2 0 0,3 0 0,0 0 0,3 0 0,0 0 0,0 0 0,-1 0 0,-1 0 0,-2 0 0,-2 0 0,-1 0 0,18 3 0,-8 5 0,-6 5 0,-5 6 0,-3 2 0,-1 2 0,-3 3 0,-2-1 0,-2 2 0,-3-2 0,-3-2 0,-4-1 0,-2-2 0,-4 2 0,-5 2 0,-8 2 0,-10 6 0,6-12 0,-2 0 0,-4 4 0,0 0 0,-3 4 0,1 0 0,-2 2 0,0 1 0,0 0 0,1 1 0,1-1 0,0-2 0,2-2 0,1-1 0,4-6 0,1-1 0,-9 6 0,10-9 0,7-7 0,2-4 0,3-3 0,1-1 0,-1 0 0,0 0 0,0-1 0,2-4 0,2 2 0,0-2 0</inkml:trace>
+  <inkml:trace contextRef="#ctx0" brushRef="#br0" timeOffset="21616">3890 7109 24575,'0'14'0,"0"11"0,-1 11 0,-4 13 0,-2 0 0,2-25 0,-1 1 0,-6 23 0,1-11 0,2-7 0,3-11 0,4-8 0,2-5 0,0-3 0,0-1 0,0 1 0,0 0 0,1 0 0,0 1 0,3-1 0,-2-1 0,3-1 0,1-1 0,1 0 0,1-3 0,4-1 0,7 0 0,8 2 0,8 2 0,6 0 0,1 0 0,-5 0 0,-6 0 0,-10 0 0,-6 0 0,-1 0 0,-9 0 0,1 0 0</inkml:trace>
+  <inkml:trace contextRef="#ctx0" brushRef="#br0" timeOffset="24168">3522 7570 24575,'-11'0'0,"-5"0"0,-7 4 0,-7 5 0,-6 5 0,-1 6 0,0 0 0,5 0 0,8-4 0,6-4 0,8-1 0,3-2 0,3 2 0,0 2 0,1 6 0,-2 4 0,-1 5 0,-1 2 0,-1 3 0,2 1 0,1 0 0,1 0 0,2-6 0,1-6 0,0-6 0,1-5 0,1-5 0,2-2 0,2-2 0,2 0 0,1-1 0,0 1 0,1-1 0,0 1 0,1 1 0,1-1 0,3 2 0,4 1 0,4 2 0,5-1 0,3 1 0,4-3 0,2-2 0,0 0 0,-2-2 0,-2-1 0,-3-3 0,-4-3 0,-3-3 0,-5-2 0,-3 1 0,-3 0 0,-2 0 0,-3-1 0,-1 0 0,-2-2 0,0-7 0,2-13 0,3-12 0,-2 16 0,0-2 0,0-2 0,0-2 0,-2 1 0,0 0 0,-1 4 0,-1 1 0,0-13 0,-2 17 0,-1 16 0,-1 5 0,-3 5 0,-3 0 0,-3 0 0,-1 0 0,-1 0 0,0 0 0,2 0 0,1 0 0,3 0 0,0 0 0,1 0 0,1 0 0,1 0 0,0 0 0,2 0 0,0 0 0,-1 0 0,1 0 0,0 0 0,1 1 0,0 0 0,-4 2 0,4-1 0,-3-1 0</inkml:trace>
+  <inkml:trace contextRef="#ctx0" brushRef="#br0" timeOffset="26417">4522 6820 24575,'0'-26'0,"1"-19"0,1 11 0,3-2 0,1-6 0,1-1 0,3-3 0,2 2 0,1 2 0,1 2 0,0 5 0,-1 2 0,-2 5 0,1 3 0,5-12 0,-4 16 0,-5 10 0,-2 8 0,-2 3 0,-1 2 0,0 6 0,-1 9 0,0 10 0,-1 8 0,1 9 0,0-19 0,1 1 0,1 4 0,0 0 0,2 3 0,0 0 0,1 2 0,-1 0 0,1 0 0,0-1 0,-1-2 0,1-1 0,-1-3 0,0-2 0,3 16 0,-2-10 0,-4-8 0,-1-9 0,-2-2 0,0-6 0,0-1 0,0-6 0,0-1 0</inkml:trace>
+  <inkml:trace contextRef="#ctx0" brushRef="#br0" timeOffset="27634">4556 6728 24575,'17'0'0,"5"0"0,7 0 0,2 0 0,2 0 0,-5 0 0,-4 0 0,-4 0 0,-5 0 0,-3 0 0,-3 0 0,-3 0 0,-1 0 0,-3 0 0,1 0 0,-1 0 0,0 1 0,-1 0 0,0 0 0,0 0 0</inkml:trace>
+  <inkml:trace contextRef="#ctx0" brushRef="#br0" timeOffset="33169">3697 7977 24575,'14'0'0,"7"2"0,1 5 0,5 6 0,0 8 0,-3 4 0,-1 0 0,-6-1 0,-4-3 0,-4-3 0,-3 0 0,-2-2 0,-2 2 0,-1 1 0,0 0 0,-1 3 0,0 1 0,0 3 0,0 1 0,0 1 0,0 1 0,-2 1 0,-5 1 0,-5-1 0,-7 2 0,-5 3 0,9-16 0,-2 1 0,-3 2 0,-1 0 0,-6 3 0,-1-1 0,-2 1 0,-1-1 0,-2 0 0,-1 0 0,1-1 0,0-1 0,4-4 0,0 0 0,5-4 0,1-1 0,-9 4 0,14-8 0,11-7 0,4 0 0,2-4 0</inkml:trace>
+  <inkml:trace contextRef="#ctx0" brushRef="#br0" timeOffset="34617">3396 8756 24575,'0'24'0,"-3"3"0,-5 2 0,-2-1 0,-2-5 0,3-7 0,3-4 0,3-3 0,2-3 0,1-1 0,0 1 0,0 0 0,0-1 0,0-1 0,1-1 0,1 0 0,0 1 0,0-1 0,1 1 0,-2-3 0,1 0 0,2-1 0,-1 0 0,2 0 0,2 0 0,1 0 0,2-1 0,2 0 0,5 0 0,4 0 0,5 1 0,-1 0 0,-3 2 0,-5 2 0,-5 1 0,-4 3 0,-5-3 0,-1 0 0,-2-4 0,0 0 0</inkml:trace>
+  <inkml:trace contextRef="#ctx0" brushRef="#br0" timeOffset="35416">2782 9039 24575,'0'0'0</inkml:trace>
+  <inkml:trace contextRef="#ctx0" brushRef="#br0" timeOffset="37818">2868 8737 24575,'-14'0'0,"-5"0"0,-4 0 0,-4 0 0,1 0 0,1 0 0,3 1 0,1 3 0,1 5 0,0 4 0,-1 3 0,1-1 0,-2-1 0,-1-1 0,2-1 0,3 0 0,5-3 0,5-1 0,5-2 0,1 0 0,2-1 0,1 1 0,1 0 0,2 1 0,3-1 0,1 2 0,0 1 0,-1 5 0,1 7 0,-1 5 0,0 4 0,2 5 0,-2 0 0,1 0 0,0-4 0,-2-5 0,0-1 0,-1-2 0,-1-1 0,1-1 0,-1-4 0,1-3 0,-1-3 0,1-3 0,1 0 0,2 0 0,0 1 0,1 2 0,1-1 0,-1 1 0,0-2 0,1-4 0,1-2 0,6-1 0,4-1 0,6-1 0,2 0 0,-2-1 0,-2-1 0,-4-6 0,-4-3 0,-2-3 0,-3 0 0,-2 2 0,-1 0 0,-1 0 0,-1 0 0,-1 2 0,0-2 0,-2 2 0,-1-3 0,1-3 0,2-1 0,0-1 0,1 1 0,-3 3 0,-1 4 0,-2 2 0,-1 1 0,0 1 0,0 1 0,0 0 0,0 1 0,-1-1 0,-1 1 0,-2-1 0,-1-2 0,-3-5 0,-2-4 0,-1-5 0,-3-1 0,0 2 0,2 3 0,0 2 0,1 1 0,1 2 0,2 2 0,1 2 0,3 5 0,1 0 0,1 3 0,2 0 0</inkml:trace>
+  <inkml:trace contextRef="#ctx0" brushRef="#br0" timeOffset="40421">4128 8907 24575,'0'-21'0,"0"-11"0,0-16 0,0 22 0,0 0 0,0-22 0,0 15 0,0 15 0,0 10 0,0 2 0,0-4 0,0-8 0,0-6 0,0-3 0,2 4 0,-1 6 0,1 6 0,1 4 0,-2 3 0,1 0 0,1 2 0,0 1 0,1 1 0,-1 0 0,1 0 0,1 0 0,0 0 0,1 0 0,3-2 0,2 0 0,3 0 0,3 0 0,-1 1 0,1 1 0,-3 0 0,-2 2 0,-3 3 0,-2 3 0,-2 3 0,-2 2 0,-2 0 0,0-1 0,0 0 0,0 0 0,0 0 0,-1 2 0,-1-1 0,-3 1 0,-5-1 0,-4 1 0,-4-2 0,0-3 0,-2-3 0,2-4 0,1-2 0,3 0 0,4 0 0,3-3 0,3-2 0,1-1 0,1 0 0,1 0 0,0 1 0,1-1 0,3 0 0,4 3 0,5 1 0,3 2 0,0 0 0,2 0 0,-1 0 0,3 2 0,0 3 0,1 3 0,0 2 0,-1 0 0,-2 0 0,-4 0 0,0 0 0,-2 3 0,-1 0 0,-2 1 0,-2-1 0,-2-1 0,-3-1 0,-1 1 0,-1-1 0,0-1 0,-3 0 0,-3-2 0,-3 0 0,-3-2 0,0-2 0,-1-1 0,-2-2 0,1 0 0,1-1 0,0-1 0,1 0 0,1-2 0,0 0 0,2 0 0,2 0 0,0 1 0,0 1 0,2 0 0,1 0 0,1 0 0,1 0 0,0-1 0,1-1 0,0-2 0,1 2 0,0-1 0</inkml:trace>
+  <inkml:trace contextRef="#ctx0" brushRef="#br0" timeOffset="44138">3251 7747 24575,'-12'-10'0,"-6"-4"0,-5-10 0,-5-10 0,14 14 0,-1-2 0,0-2 0,1-1 0,0-2 0,1 0 0,-1 0 0,1 0 0,2 1 0,0 1 0,-8-19 0,5 5 0,3 4 0,2-1 0,2-2 0,2 1 0,0 0 0,1 2 0,1 1 0,1-2 0,1 0 0,1-4 0,0 1 0,0-1 0,0 3 0,1 4 0,2 3 0,4 1 0,4-1 0,7-2 0,5 1 0,2 4 0,-2 8 0,-5 8 0,-4 6 0,-3 4 0,2 1 0,0-1 0,2-2 0,-2 1 0,0 0 0,-7 2 0,0 1 0,-7 1 0</inkml:trace>
+  <inkml:trace contextRef="#ctx0" brushRef="#br0" timeOffset="47085">2939 6515 24575,'0'14'0,"0"3"0,0 4 0,0 1 0,0-1 0,0-1 0,1-2 0,1-2 0,0-4 0,1-3 0,-2-2 0,-1-5 0,-5-16 0,-3-3 0,-5-14 0,-6-7 0,6 11 0,-1-6 0,6 14 0,1 0 0,-1-3 0,-1-4 0,-4-1 0,2 0 0,2 7 0,3 5 0,2 6 0,4 6 0,3 5 0,3 4 0,3 2 0,0 0 0,1 0 0,0 1 0,2 0 0,4 1 0,6 1 0,5 4 0,5 2 0,4 3 0,-2-2 0,0-2 0,-4-3 0,-5-2 0,-4-1 0,-7-2 0,-3-1 0,-6-1 0,-2-2 0,-2 0 0,-1 1 0,0 1 0,0 2 0,0 0 0,0 1 0,0 0 0,0 1 0,0-1 0,-2 1 0,0 1 0,0 1 0,-1 2 0,1 1 0,0 3 0,1-2 0,1-2 0,0-2 0,-1-3 0,-2-2 0,-2-2 0,-1-1 0,-1-1 0,-2-1 0,0 0 0,1 0 0,3 0 0,1 0 0,2 0 0,2 1 0,1 0 0,0 1 0,0-2 0,0 2 0,-8-12 0,-4-5 0,-8-11 0,2-5 0,3-1 0,2-3 0,1-2 0,0 3 0,-2 3 0,3 8 0,3 7 0,1 4 0,3 3 0,0 2 0,-1-1 0,1 2 0,0 2 0,2 1 0</inkml:trace>
+  <inkml:trace contextRef="#ctx0" brushRef="#br0" timeOffset="49652">2457 7610 24575,'0'-10'0,"0"-11"0,0-19 0,0 11 0,0 0 0,-1-5 0,2 0 0,-2 1 0,2 2 0,0 4 0,0 2 0,3-12 0,1 13 0,0 9 0,-1 5 0,0 1 0,-1 1 0,2 1 0,-1 3 0,-1 2 0,-2 1 0,1 0 0,0 1 0,0 3 0,0 6 0,0 7 0,1 7 0,-2 4 0,2-2 0,-2-2 0,2-3 0,1-2 0,0 0 0,2 2 0,2 2 0,1 2 0,0 1 0,1 1 0,-1 2 0,1-1 0,0-1 0,0-5 0,-2-5 0,-2-3 0,-2-5 0,-1-1 0,0-4 0,-1-1 0,0-2 0,-1 0 0</inkml:trace>
+  <inkml:trace contextRef="#ctx0" brushRef="#br0" timeOffset="50816">2482 7530 24575,'12'0'0,"4"0"0,4 0 0,2 0 0,-3 0 0,-4 0 0,-2 0 0,-5 0 0,-1 0 0,-4 0 0,-2 0 0</inkml:trace>
+  <inkml:trace contextRef="#ctx0" brushRef="#br0" timeOffset="74285">16825 6305 24575,'0'0'0</inkml:trace>
+  <inkml:trace contextRef="#ctx0" brushRef="#br0" timeOffset="77283">1249 7483 24575,'0'10'0,"0"5"0,0 3 0,0 2 0,0-2 0,0-6 0,0-3 0,0-2 0,0-1 0,0-1 0,0-2 0,0-1 0,0-9 0,1-2 0,2-10 0,2-1 0,1 0 0,1-2 0,0 1 0,-1 3 0,1 3 0,1 7 0,0 3 0,0 1 0,-1 3 0,0 0 0,0 2 0,0 1 0,0 4 0,2 4 0,1 4 0,0 3 0,-1 4 0,-1 1 0,-2 5 0,-3 2 0,-1 3 0,-1 2 0,0-2 0,1-3 0,0-6 0,0-6 0,0-6 0,1-2 0,-1-5 0,0-1 0,-1-5 0,0 0 0</inkml:trace>
+  <inkml:trace contextRef="#ctx0" brushRef="#br0" timeOffset="79119">1630 7506 24575,'-4'10'0,"-1"2"0,2 4 0,0 3 0,1-1 0,1-2 0,1-2 0,0-2 0,0-3 0,0-1 0,0-3 0,1 0 0,1 0 0,1 3 0,-1 1 0,-1 3 0,-1 1 0,0-1 0,0-4 0,0-3 0,2-2 0,3-3 0,2-1 0,7-4 0,5-3 0,3-2 0,4 1 0,-1 3 0,-1 0 0,-3 1 0,-6-1 0,-3 0 0,-2-1 0,-3 1 0,-3-3 0,-2 1 0,-2-2 0,0 0 0,-2 2 0,-3 0 0,-4 3 0,-4 2 0,-5-1 0,-3 2 0,0 0 0,0 1 0,4 1 0,3 0 0,3 0 0,3 0 0,3 0 0,1 0 0,3 0 0,0 0 0</inkml:trace>
+  <inkml:trace contextRef="#ctx0" brushRef="#br0" timeOffset="80316">2155 7195 24575,'0'25'0,"0"4"0,0 7 0,0 4 0,0 1 0,0-1 0,0-3 0,0-1 0,0-5 0,0-2 0,0-4 0,-1-5 0,-1-3 0,1-2 0,0-2 0,1-1 0,0 0 0,0 0 0,-1 0 0,0 0 0,-1-2 0,1-4 0,1-3 0,0-2 0</inkml:trace>
+  <inkml:trace contextRef="#ctx0" brushRef="#br0" timeOffset="81650">1956 7423 24575,'10'0'0,"2"0"0,0 0 0,1 0 0,2 0 0,3 0 0,3 0 0,1 0 0,-1 0 0,-4 0 0,-2 0 0,-4 0 0,-2 0 0,-2 0 0,-3 0 0,-1 0 0,-1 0 0,-1 0 0</inkml:trace>
+</inkml:ink>
+</file>
+
+<file path=ppt/ink/ink25.xml><?xml version="1.0" encoding="utf-8"?>
+<inkml:ink xmlns:inkml="http://www.w3.org/2003/InkML">
+  <inkml:definitions>
+    <inkml:context xml:id="ctx0">
+      <inkml:inkSource xml:id="inkSrc0">
+        <inkml:traceFormat>
+          <inkml:channel name="X" type="integer" min="-2.14748E9" max="2.14748E9" units="cm"/>
+          <inkml:channel name="Y" type="integer" min="-2.14748E9" max="2.14748E9" units="cm"/>
+          <inkml:channel name="F" type="integer" max="32767" units="dev"/>
+        </inkml:traceFormat>
+        <inkml:channelProperties>
+          <inkml:channelProperty channel="X" name="resolution" value="1000" units="1/cm"/>
+          <inkml:channelProperty channel="Y" name="resolution" value="1000" units="1/cm"/>
+          <inkml:channelProperty channel="F" name="resolution" value="0" units="1/dev"/>
+        </inkml:channelProperties>
+      </inkml:inkSource>
+      <inkml:timestamp xml:id="ts0" timeString="2023-07-05T09:39:29.429"/>
+    </inkml:context>
+    <inkml:brush xml:id="br0">
+      <inkml:brushProperty name="width" value="0.05292" units="cm"/>
+      <inkml:brushProperty name="height" value="0.05292" units="cm"/>
+      <inkml:brushProperty name="color" value="#FF0000"/>
+    </inkml:brush>
+  </inkml:definitions>
+  <inkml:trace contextRef="#ctx0" brushRef="#br0">11601 5531 24575,'0'-11'0,"0"-2"0,0 1 0,0-1 0,0 1 0,0-3 0,0-5 0,-2-9 0,1-9 0,-2-8 0,2 21 0,-1 0 0,1-1 0,-1 1 0,-1-24 0,0 2 0,-2 5 0,1 4 0,0 4 0,0 4 0,0 3 0,1 2 0,0 5 0,1 2 0,0 2 0,0 2 0,0 3 0,0 2 0,1 4 0,0 2 0,1 1 0,2 2 0,-1 0 0,3 0 0,-2 0 0,0 0 0,1 0 0,-1 0 0,0 0 0,0 0 0,0 0 0,0 0 0,0 0 0,0 0-3277,0 0 0,0 0 3047,1 0 230,0 0 0,-1 0 0,1 0 0,0 0 0,0 0 3276,0 1 0,0 1-3044,1 0-232,0-1 0,1 1 0,1-1 0,5-1 0,14 0 0,20 0 0,-10 0 0,2 0 0,9 1 0,3 0-271,-13 0 0,2 0 1,-1 0 270,4-1 0,1 2 0,0-1 0,1 0 0,1 0 0,-1 1 0,0-1 0,-1 1 0,-1 0 0,-1 1 0,0-1 0,-2 1 0,-3 0 0,-1-1 0,0 1 0,10 1 0,-2 0 0,-5-1 0,-2 0 0,-7 0 0,-2-1 0,14 1 0,-8-1 0,-8-2 812,-1 0-812,3 0 0,3 0 0,3 0 0,6 0 0,2 0 0,3 0 0,3 0 0,4 0 0,-22 0 0,2 0 0,4 0 0,2 0 0,4 0 0,1 0 0,5 0 0,1 0 0,2 0 0,1 0-181,-16 0 0,0 0 0,1 0 181,1 0 0,0 0 0,1 0 0,1 0 0,0 0 0,1 0 0,2 0 0,0 0 0,1 0-405,3 0 1,1 0 0,0 0 404,2 0 0,1 0 0,0 0 0,-11 0 0,0 0 0,0 0 0,0 0 0,12 0 0,-1 0 0,-1 0 0,-2 0 0,-2 0 0,0 0-87,-5 0 0,0 0 0,-1 0 87,9 0 0,-2 0 0,-7-1 0,-2 1 0,-8-1 0,-1-1 502,17-2-502,-3-2 1228,8 0-1228,-18 2 0,2 0 0,8-1 0,1 1 0,3-1 0,1 0 0,-13 1 0,0 0 0,1 1 0,0 0 0,0 0 0,1 1 0,-1-1 0,1 1 0,-1 1 0,0-1 0,0 1 0,0 1 0,12-1 0,0 2 143,-3-1 1,-2 0-144,-3 0 0,-1 0 0,0 0 0,-1 0 0,-2 0 0,0 0 0,-1 0 0,1 0 0,3 0 0,1 0 0,3 0 0,2 0 0,5 0 0,2 0-211,-14 0 1,0 0-1,1 0 211,1 0 0,-1 0 0,0 0 0,0 0 0,-1 0 0,0 0 0,11 0 0,-1 0 0,-8-1 0,-2 2 0,-7-1 0,-2 0 0,12 2 0,-9 1 0,-6 0 632,-4 1-632,-3 0 0,-5-1 0,-4-1 0,-4 0 0,-3 2 0,-1 1 0,0 2 0,0 0 0,0 0 0,0-3 0,0-2 0</inkml:trace>
+  <inkml:trace contextRef="#ctx0" brushRef="#br0" timeOffset="1517">17550 4645 24575,'3'21'0,"8"7"0,11 10 0,-7-16 0,2 0 0,2 1 0,2 0 0,1 1 0,1-1 0,0 1 0,0 1 0,-1-2 0,-1-1 0,-3-2 0,-2-1 0,12 13 0,-6-6 0,-5-5 0,-3-4 0,-4-3 0,-2-4 0,-4-4 0,1-1 0,-4-3 0,1-1 0,-1 0 0</inkml:trace>
+  <inkml:trace contextRef="#ctx0" brushRef="#br0" timeOffset="2815">17421 5120 24575,'38'-31'0,"-14"13"0,1-1 0,5-4 0,1 0 0,4-4 0,-1-1 0,2-2 0,-1 0 0,0-1 0,-1 0 0,-1 1 0,-1 1 0,-3 3 0,-2 1 0,-2 3 0,-2 3 0,-3 2 0,-1 1 0,14-9 0,-4 4 0,-3 1 0,-1 2 0,-2 2 0,-4 2 0,-4 4 0,-2 4 0,-8 4 0,-2 1 0,-7 1 0</inkml:trace>
+  <inkml:trace contextRef="#ctx0" brushRef="#br0" timeOffset="5385">17005 6474 24575,'0'30'0,"0"0"0,0 6 0,0 3 0,0 8 0,0 1 0,0 2 0,0-1 0,0-6 0,0-3 0,0-8 0,0-2 0,0 11 0,0-17 0,0-12 0,0-6 0,0-5 0,5-5 0,2 1 0,5 0 0,0 2 0,0 1 0,0 0 0,-1 0 0,-1 0 0,0 0 0,-1 0 0,3 0 0,2 0 0,4 0 0,4 0 0,7 0 0,11 0 0,10 0 0,-20 0 0,1 1 0,4 1 0,2 0 0,3 1 0,1 1 0,4 1 0,2 0 0,-13-1 0,2 1 0,-1 0-314,5 0 1,-1 1-1,2 0 314,2 0 0,0 1 0,2 0 0,-9-1 0,1 0 0,0 0 0,1 0-426,2 0 1,1 0 0,0 1 0,0-1 425,1 1 0,1 0 0,0-1 0,0 1 0,2 0 0,-1-1 0,1 1 0,-1 0 0,-2-1 0,0 0 0,0 0 0,0 0 0,-1 0 0,0 0 0,-1 0 0,1 0 0,-1 0 0,0 0 0,0 0 0,0 0 0,1-1 0,-1 1 0,0-1 0,-1 1-209,0-1 0,-1 0 1,-1 0-1,0 0 209,7 1 0,0-1 0,-2 1-4,-6-2 0,0 0 0,-3 0 4,8 1 0,-4 0 408,-6 0 1,-2-1-409,12 2 1699,-13-2-1699,-5-2 958,0-1-958,5-1 15,9 0-15,9 0 0,-21 0 0,0 0 0,2 0 0,0-1 0,2-1 0,0-1 0,4 0 0,1 0 0,6-2 0,4-1 0,-6 1 0,4 0 0,0-1-403,-5 2 0,1 0 0,0 0 0,1 0 403,2-1 0,0 1 0,1 0 0,-1 0 0,0 1 0,0 0 0,0 0 0,-2 1-124,6-1 1,-2 2 0,-2 0 123,11-1 0,-5 2 0,-10 0 0,-4 0 0,9 1 0,-17 3 0,-14-2 0,-3 0 0</inkml:trace>
+  <inkml:trace contextRef="#ctx0" brushRef="#br0" timeOffset="6484">21311 7291 24575,'0'-11'0,"0"-6"0,0-10 0,0-6 0,0-1 0,0-4 0,0 0 0,0-7 0,0 19 0,0 0 0,0-1 0,1-1 0,1 1 0,0 0 0,3-18 0,-1 12 0,-1 11 0,-3 7 0,0 9 0,0 2 0</inkml:trace>
+  <inkml:trace contextRef="#ctx0" brushRef="#br0" timeOffset="7883">21081 6855 24575,'0'-12'0,"4"-11"0,9-10 0,10-9 0,-7 21 0,1 1 0,15-12 0,-6 11 0,-8 12 0,-8 3 0,-2 2 0,0-1 0,1 0 0,-2 3 0,0 1 0,-3 1 0,-1 0 0,0 4 0,-1 3 0,1 4 0,2 4 0,1 1 0,2 0 0,2 2 0,3 0 0,3 2 0,5 2 0,3 0 0,1 2 0,2-1 0,-3-3 0,-3-1 0,-3-4 0,-3-3 0,-3-1 0,-2-3 0,-2-1 0,-3-4 0,-2-1 0</inkml:trace>
+  <inkml:trace contextRef="#ctx0" brushRef="#br0" timeOffset="10501">2250 5764 24575,'-10'0'0,"0"0"0,2 0 0,0 0 0,3 2 0,3 3 0,1 6 0,1 4 0,3 3 0,4-1 0,5-3 0,3-5 0,-1-4 0,0-3 0,-2-4 0,-2-2 0,-3-2 0,-3-1 0,-2 2 0,-1 1 0,-2 2 0,-3 1 0,-1 1 0,-3 0 0,2 2 0,3 1 0,2 5 0,1-4 0,0 1 0</inkml:trace>
+  <inkml:trace contextRef="#ctx0" brushRef="#br0" timeOffset="12134">2494 5802 24575,'20'0'0,"22"0"0,-9 0 0,5 0 0,3 0 0,2 0 0,1 0 0,0 0 0,-4 0 0,0 0 0,-6 0 0,-1 0 0,-2 0 0,-1 1 0,18 2 0,-11 5 0,-8 6 0,-6 5 0,-5 6 0,2 7 0,3 8 0,-9-17 0,0 0 0,2 1 0,-2 1 0,0-3 0,-1 1 0,8 17 0,-6-6 0,-7-2 0,-4-1 0,-3-2 0,-1 0 0,-5 0 0,-5 0 0,-5 1 0,-7 1 0,-4 3 0,-3 3 0,0-2 0,2-2 0,5-6 0,7-9 0,6-4 0,4-6 0,2-5 0,2-1 0,0-5 0</inkml:trace>
+  <inkml:trace contextRef="#ctx0" brushRef="#br0" timeOffset="13683">3083 6406 24575,'0'26'0,"0"2"0,0 9 0,0 1 0,0-1 0,0-2 0,0-7 0,0-3 0,0-3 0,-1-2 0,-1-4 0,1-2 0,0-2 0,1-5 0,1 0 0,1-6 0,3 0 0,2-1 0,4 0 0,3-1 0,7 0 0,11-1 0,8 1 0,6 1 0,2 0 0,-5 0 0,-7 0 0,-8 0 0,-9 0 0,-6 0 0,-4 0 0,-3 0 0,-2 0 0,-3 0 0,0 0 0</inkml:trace>
+  <inkml:trace contextRef="#ctx0" brushRef="#br0" timeOffset="15715">3845 5854 24575,'0'-11'0,"0"-13"0,0-20 0,0 15 0,0-1 0,0-3 0,0 1 0,0 2 0,0 1 0,0-16 0,1 16 0,1 10 0,3 6 0,4 4 0,2 1 0,1 3 0,-2 3 0,0 4 0,1 7 0,2 9 0,2 11 0,1 12 0,-7-15 0,0 1 0,1 4 0,0 1 0,0 2 0,-1 1 0,0 0 0,-1 1 0,0-4 0,-1 0 0,-1-3 0,0-1 0,3 18 0,-3-10 0,-4-8 0,0-7 0,-2-5 0,0-2 0,0-8 0,0 0 0</inkml:trace>
+  <inkml:trace contextRef="#ctx0" brushRef="#br0" timeOffset="17149">3901 5896 24575,'-3'0'0,"9"0"0,2 0 0,8 0 0,-4 0 0,-2 0 0,-1 0 0,0 1 0,-1 0 0,-2 1 0,-1 0 0,0 0 0,-1-2 0,-1 0 0,1 0 0,0 0 0,0 0 0,0 0 0,-1 0 0,0 0 0,-1 0 0,-1 0 0</inkml:trace>
+  <inkml:trace contextRef="#ctx0" brushRef="#br0" timeOffset="18599">3921 5931 24575,'-2'6'0,"0"1"0,2 0 0,0 0 0,0 1 0,0 1 0,0-1 0,0 0 0,0-2 0,0-2 0,0 0 0,0 1 0,0-1 0,-2 2 0,-1 1 0,-1 3 0,-2 3 0,0 2 0,-1 2 0,0-2 0,1-3 0,2-3 0,2-4 0,-1 0 0,2-3 0,0 0 0,0-1 0</inkml:trace>
+  <inkml:trace contextRef="#ctx0" brushRef="#br0" timeOffset="20651">2831 7069 24575,'-20'0'0,"-16"0"0,10 0 0,-2 0 0,-4 0 0,-1 0 0,0 0 0,0 0 0,2 0 0,2-1 0,3 2 0,1 2 0,-17 9 0,11 11 0,5 16 0,14-17 0,2 2 0,-1 2 0,1 1 0,0 3 0,0 0 0,1-1 0,1 1 0,0 1 0,0-1 0,1-1 0,0 0 0,2-2 0,0-2 0,-2 22 0,3-7 0,3-8 0,2-8 0,4-6 0,7-1 0,9 1 0,9 2 0,9 2 0,-15-11 0,2-1 0,3-1 0,0-2 0,2-1 0,0-2 0,0-1 0,0-1 0,-2-2 0,1-2 0,-1-2 0,0-1 0,0-3 0,0-1 0,1-3 0,-1-2 0,-1-1 0,-1-1 0,-2 1 0,-2-1 0,15-11 0,-13 3 0,-9 3 0,-5 2 0,-5 0 0,-3-3 0,-2-1 0,-1-4 0,0-7 0,-1-4 0,-2 0 0,-5 5 0,-3 8 0,-4 8 0,-2 4 0,-4 0 0,-4 0 0,-4-3 0,-5 1 0,-2 1 0,1 1 0,3 2 0,3 1 0,15 4 0,3 1 0</inkml:trace>
+  <inkml:trace contextRef="#ctx0" brushRef="#br0" timeOffset="22032">3069 7516 24575,'14'2'0,"11"0"0,11-2 0,9 5 0,-19 1 0,0 3 0,-2 2 0,-1 4 0,2 4 0,0 2 0,-1 3 0,-1 2 0,-1 0 0,-2-1 0,1 0 0,-2 0 0,-4-5 0,-1 0 0,8 12 0,-8-7 0,-6-3 0,-4-2 0,-2 2 0,-2 3 0,0 2 0,0 2 0,-1-1 0,-7 0 0,-9 0 0,-14 5 0,11-14 0,-1 1 0,-3 3 0,0 2 0,-1 2 0,1 1 0,-1-1 0,1 1 0,0-1 0,1 0 0,1-2 0,0 0 0,1-1 0,1-1 0,-1 0 0,2 1 0,0-1 0,1 0 0,1-1 0,0 0 0,-13 17 0,7-6 0,5-10 0,6-9 0,7-8 0,2-5 0</inkml:trace>
+  <inkml:trace contextRef="#ctx0" brushRef="#br0" timeOffset="23583">2934 8459 24575,'0'14'0,"0"6"0,0 9 0,0 6 0,0-1 0,0-3 0,0-5 0,0-6 0,0-1 0,0-3 0,-2-2 0,0-1 0,-2-1 0,1 0 0,0-1 0,0 0 0,2-1 0,0-3 0,1-1 0,1-3 0,1-1 0,2-3 0,4-2 0,1-3 0,5-2 0,5 1 0,5 2 0,6 3 0,2 1 0,1 1 0,-3 1 0,-5 3 0,-4 1 0,-6 1 0,-2 0 0,-2 0 0,-2-1 0,-1-1 0,-3-1 0,-3-2 0,-1 0 0</inkml:trace>
+  <inkml:trace contextRef="#ctx0" brushRef="#br0" timeOffset="25702">3641 8588 24575,'3'-9'0,"-2"-17"0,-1-23 0,0 18 0,0-2 0,0-3 0,0 0 0,0 6 0,0 1 0,0-13 0,0 14 0,0 14 0,0 4 0,0 3 0,0 1 0,1 2 0,2 1 0,1 2 0,2 0 0,5 0 0,7 0 0,8-2 0,5 0 0,0 2 0,-3-1 0,-7 6 0,-5 6 0,-5 7 0,-4 7 0,-3 3 0,-3-2 0,-1 1 0,0-4 0,-1-2 0,-1-2 0,-3-3 0,-2-2 0,-3-3 0,0-2 0,-1-4 0,-2-2 0,0-2 0,-1 0 0,1 0 0,2 0 0,2 0 0,3 0 0,2-1 0,2-1 0,2-3 0,6-1 0,6-2 0,7 2 0,3 2 0,-1 3 0,-1 1 0,-2 0 0,-1 0 0,1 1 0,-1 3 0,-1 2 0,-3 3 0,-1 0 0,-3 1 0,-1 1 0,-2 0 0,0 1 0,-3-1 0,0 0 0,-2 0 0,-1 1 0,-1 0 0,-4 1 0,-6 1 0,-5-1 0,-4 0 0,-1-3 0,0-3 0,-2-3 0,0-3 0,-2-1 0,-1 0 0,1 0 0,2 0 0,4 0 0,6 0 0,5-1 0,3 0 0,4 0 0</inkml:trace>
+  <inkml:trace contextRef="#ctx0" brushRef="#br0" timeOffset="26632">2645 9162 24575,'0'0'0</inkml:trace>
+  <inkml:trace contextRef="#ctx0" brushRef="#br0" timeOffset="28999">2690 8966 24575,'-16'0'0,"-4"0"0,-4 0 0,-3 0 0,0 0 0,3 0 0,3 0 0,4 0 0,5 1 0,0 2 0,2 2 0,0 2 0,3 0 0,3 0 0,1 0 0,2 2 0,-1 0 0,1 1 0,1 3 0,0 0 0,0 4 0,0 2 0,0 3 0,0 3 0,0 1 0,0 0 0,1 0 0,2 1 0,1 1 0,1-2 0,1-1 0,-1-3 0,2-2 0,-1-2 0,0-1 0,0-3 0,1 0 0,1-1 0,1-1 0,3 2 0,1-2 0,2-1 0,3 1 0,-2-3 0,0 0 0,-1-2 0,-1-1 0,-2-2 0,-2-2 0,0-1 0,0-1 0,-1 0 0,0 0 0,0-1 0,1-4 0,0-5 0,1-5 0,2-3 0,1-1 0,0-1 0,-2 2 0,-3 3 0,-3 0 0,-4 2 0,-2 0 0,0 0 0,0-1 0,0-4 0,0-5 0,0-7 0,2-6 0,-1-1 0,1 3 0,-1 6 0,-1 6 0,0 7 0,0 3 0,0 4 0,-3 1 0,-2 1 0,-2 1 0,-2-1 0,0-1 0,-1 0 0,0 0 0,-1-2 0,0-1 0,0-2 0,2 0 0,3-1 0,2 7 0,2 1 0</inkml:trace>
+  <inkml:trace contextRef="#ctx0" brushRef="#br0" timeOffset="31152">2264 7397 24575,'-36'-4'0,"-3"-5"0,-6-10 0,21 6 0,1-3 0,2-1 0,1-3 0,-1-3 0,1-2 0,2-1 0,0-1 0,0-1 0,2 0 0,-1-1 0,1 1 0,2 2 0,1 0 0,1-2 0,1 0 0,0-3 0,2-1 0,2-1 0,1-2 0,0-2 0,1-2 0,0 0 0,1 1 0,1 4 0,1 0 0,-1 5 0,1 1 0,1-11 0,1 16 0,0 5 0,2 4 0,3-2 0,4-1 0,5-4 0,8-6 0,7-9 0,-12 15 0,0-1 0,2-1 0,-1 0 0,-2 2 0,0 1 0,11-17 0,-5 7 0,-5 5 0,-4 5 0,-2 8 0,-1 4 0,-4 6 0,1 1 0,-6 2 0,0 1 0,-1 0 0,0 1 0</inkml:trace>
+  <inkml:trace contextRef="#ctx0" brushRef="#br0" timeOffset="32882">1775 6158 24575,'17'0'0,"3"0"0,7 0 0,3 0 0,-1 0 0,-1 0 0,-2-1 0,-1-3 0,-1-1 0,-4-1 0,-4 0 0,-3 3 0,-6 2 0,-2 1 0,-3 1 0,0 0 0,0 0 0,0 1 0,1 0 0,-1-1 0,2 0 0,-1-1 0,1 0 0,-2 1 0,0 1 0,-2 5 0,0 5 0,0 5 0,0 3 0,0 0 0,-1-1 0,0 0 0,0-2 0,-2-2 0,1 1 0,1-4 0,0 1 0,1-1 0,0 0 0,0 2 0,0 0 0,0 3 0,0-1 0,0 0 0,1 0 0,1-1 0,0-1 0,0-3 0,0-2 0,0-2 0,-2-2 0,1-4 0</inkml:trace>
+  <inkml:trace contextRef="#ctx0" brushRef="#br0" timeOffset="34867">364 7135 24575,'17'2'0,"2"4"0,8 8 0,2 7 0,4 4 0,-2 1 0,-4-2 0,-5-3 0,-6-3 0,-4-4 0,-3-2 0,-5-2 0,-2 0 0,-2 1 0,0 1 0,-2 0 0,-3 0 0,-7-1 0,-6-1 0,-3-1 0,-1 0 0,0 0 0,1 0 0,2 2 0,1 0 0,5 1 0,2-2 0,4 0 0,3-2 0,1 0 0,2-3 0,1 0 0,-1-3 0,0 1 0,-1 0 0,1 0 0,1 1 0,0 1 0,-1 0 0,0 1 0,-1 1 0,0-2 0,1-1 0,0-3 0</inkml:trace>
+  <inkml:trace contextRef="#ctx0" brushRef="#br0" timeOffset="37049">833 7316 24575,'0'-10'0,"0"-2"0,0 1 0,1 1 0,4 3 0,5 3 0,5 1 0,1 2 0,-1 0 0,-3 0 0,-2 1 0,-1-1 0,-2-1 0,-1-1 0,-1 0 0,-2 1 0,0 0 0,0 1 0,0 1 0,0 1 0,1 2 0,2 6 0,2 6 0,4 4 0,2 4 0,1-2 0,-1 2 0,-3 0 0,-5 3 0,-3 6 0,-7 2 0,-9 2 0,-6-4 0,-5-4 0,-2-5 0,2-6 0,-2-3 0,2-5 0,3-3 0,2-1 0,3-2 0,5 0 0,3 2 0,3 2 0,3 1 0,1 1 0,1 0 0,0 1 0,0-3 0,1-3 0,2-4 0,5-6 0,4-1 0,4 1 0,2 2 0,0 3 0,1 1 0,0 0 0,3 0 0,2 0 0,1 0 0,2 0 0,-3-1 0,-4 0 0,-4-1 0,-4 1 0,-2 1 0,-2 0 0,-2 0 0,-2 0 0,-2 0 0,-1 0 0</inkml:trace>
+  <inkml:trace contextRef="#ctx0" brushRef="#br0" timeOffset="39034">1431 7479 24575,'-18'0'0,"0"0"0,-2 0 0,1 0 0,2 2 0,3 1 0,1 3 0,0 2 0,-2 1 0,1 0 0,1 1 0,2-1 0,5 1 0,2-1 0,3-1 0,1 2 0,1-6 0,1 1 0,5-5 0,5-1 0,4 0 0,3-2 0,-1 0 0,-2 1 0,-1 2 0,-1 0 0,-1 0 0,-1 2 0,0 3 0,-1 4 0,-1 3 0,0 1 0,-2-1 0,-1-1 0,-1-1 0,-1-2 0,-1 0 0,1 0 0,-1 0 0,0 0 0,-2-1 0,-1-1 0,-1 0 0,0-1 0,0 2 0,0 1 0,-2 1 0,-4 0 0,-5-1 0,-5-2 0,-3-3 0,-3-2 0,-2-3 0,1-4 0,3-4 0,3-3 0,5 0 0,4 0 0,5 3 0,1 4 0,2 3 0</inkml:trace>
+</inkml:ink>
+</file>
+
+<file path=ppt/ink/ink26.xml><?xml version="1.0" encoding="utf-8"?>
+<inkml:ink xmlns:inkml="http://www.w3.org/2003/InkML">
+  <inkml:definitions>
+    <inkml:context xml:id="ctx0">
+      <inkml:inkSource xml:id="inkSrc0">
+        <inkml:traceFormat>
+          <inkml:channel name="X" type="integer" min="-2.14748E9" max="2.14748E9" units="cm"/>
+          <inkml:channel name="Y" type="integer" min="-2.14748E9" max="2.14748E9" units="cm"/>
+          <inkml:channel name="F" type="integer" max="32767" units="dev"/>
+        </inkml:traceFormat>
+        <inkml:channelProperties>
+          <inkml:channelProperty channel="X" name="resolution" value="1000" units="1/cm"/>
+          <inkml:channelProperty channel="Y" name="resolution" value="1000" units="1/cm"/>
+          <inkml:channelProperty channel="F" name="resolution" value="0" units="1/dev"/>
+        </inkml:channelProperties>
+      </inkml:inkSource>
+      <inkml:timestamp xml:id="ts0" timeString="2023-07-05T09:40:59.312"/>
+    </inkml:context>
+    <inkml:brush xml:id="br0">
+      <inkml:brushProperty name="width" value="0.05292" units="cm"/>
+      <inkml:brushProperty name="height" value="0.05292" units="cm"/>
+      <inkml:brushProperty name="color" value="#FF0000"/>
+    </inkml:brush>
+  </inkml:definitions>
+  <inkml:trace contextRef="#ctx0" brushRef="#br0">12102 13342 24575,'23'0'0,"4"0"0,-10 0 0,4 0 0,-10 0 0,3 0 0,-2-1 0,-3-3 0,-3-3 0,0-3 0,-1-1 0,-2 1 0,-2-1 0,-3 3 0,-3 1 0,-5 1 0,-6 2 0,-4 1 0,-3 2 0,-1 1 0,-2 0 0,0 0 0,-2 0 0,0 0 0,2 0 0,5 0 0,5 1 0,5 4 0,4 5 0,4 7 0,2 4 0,3 1 0,4 0 0,2-4 0,2-2 0,1-2 0,1-5 0,2-3 0,1-1 0,2-3 0,1-1 0,3 0 0,4 3 0,2 1 0,1 3 0,-4 0 0,-6-1 0,-4-1 0,-5 0 0,-4-3 0,-3 0 0</inkml:trace>
+  <inkml:trace contextRef="#ctx0" brushRef="#br0" timeOffset="1682">12363 13336 24575,'1'17'0,"1"2"0,4 2 0,4 2 0,1-3 0,0-3 0,-1-4 0,-3-3 0,-2-2 0,-1-3 0,0 0 0,-2-1 0,3 0 0,-3-3 0,2 0 0,-2-1 0,0 0 0,0 0 0,0 0 0,1 0 0,0 0 0,0 0 0,1-2 0,2-6 0,2-8 0,7-8 0,4-5 0,4-1 0,0 3 0,-5 8 0,-4 8 0,-5 4 0,-3 4 0,-3 2 0,0-1 0,-1 0 0,0-2 0,0-2 0,0-2 0,0-2 0,2-2 0,-2 3 0,-1 3 0,0 3 0</inkml:trace>
+  <inkml:trace contextRef="#ctx0" brushRef="#br0" timeOffset="3482">12803 13415 24575,'8'0'0,"-2"0"0,-1 0 0,-1 0 0,3-1 0,3-3 0,2-5 0,0-3 0,-2-2 0,-4 2 0,-2 3 0,-3 2 0,-1 2 0,-2 0 0,-1 2 0,-5 0 0,-3-1 0,-3 1 0,1-1 0,1 0 0,2 2 0,1 1 0,1 0 0,0 1 0,2 0 0,0 0 0,2 1 0,1 2 0,1 2 0,0 4 0,1 4 0,-2 3 0,1 2 0,-1-1 0,1-2 0,1-3 0,0-1 0,1-2 0,2 0 0,1 1 0,3-1 0,1 0 0,0-1 0,0-1 0,0-2 0,-1 0 0,1 0 0,0-1 0,-1 0 0,1-1 0,1 0 0,0 0 0,1 1 0,0 1 0,0 0 0,0 2 0,-3 0 0,-2-1 0,-3-1 0,-1-3 0,0-1 0</inkml:trace>
+  <inkml:trace contextRef="#ctx0" brushRef="#br0" timeOffset="4968">13177 13567 24575,'0'-16'0,"0"-6"0,0-3 0,0-3 0,0 3 0,0 6 0,0 6 0,0 4 0,0 4 0,-2 1 0,1 2 0,-2-1 0,0 1 0,1 0 0,-1 1 0,1-2 0,0 0 0,0-1 0,1-2 0,-1-1 0,0 0 0,1 0 0,0 1 0,1 2 0,1 2 0,2 1 0,5 1 0,5 0 0,5 0 0,4 0 0,2 0 0,4 0 0,1 0 0,0 0 0,-4-1 0,-5 0 0,-4-1 0,-5-1 0,-5 1 0,-2 0 0,-4 1 0,0 0 0</inkml:trace>
+  <inkml:trace contextRef="#ctx0" brushRef="#br0" timeOffset="6167">13536 13342 24575,'0'9'0,"0"2"0,0-1 0,0 1 0,0 1 0,1 3 0,3 4 0,2 2 0,4 0 0,-1-2 0,-2-5 0,-2-3 0,-3-3 0,-1-3 0,-1-3 0</inkml:trace>
+  <inkml:trace contextRef="#ctx0" brushRef="#br0" timeOffset="7649">13807 13392 24575,'-9'1'0,"-8"9"0,-5 12 0,-4 9 0,0 3 0,5-3 0,2-6 0,3-5 0,-2-2 0,-7 4 0,-8 5 0,-5 2 0,1-1 0,8-5 0,7-5 0,7-4 0,4-3 0,3 0 0,0-2 0,4 1 0,1-5 0,2 0 0</inkml:trace>
+  <inkml:trace contextRef="#ctx0" brushRef="#br0" timeOffset="38767">33073 14182 24575,'0'0'0</inkml:trace>
+</inkml:ink>
+</file>
+
+<file path=ppt/ink/ink3.xml><?xml version="1.0" encoding="utf-8"?>
+<inkml:ink xmlns:inkml="http://www.w3.org/2003/InkML">
+  <inkml:definitions>
+    <inkml:context xml:id="ctx0">
+      <inkml:inkSource xml:id="inkSrc0">
+        <inkml:traceFormat>
+          <inkml:channel name="X" type="integer" min="-2.14748E9" max="2.14748E9" units="cm"/>
+          <inkml:channel name="Y" type="integer" min="-2.14748E9" max="2.14748E9" units="cm"/>
+          <inkml:channel name="F" type="integer" max="32767" units="dev"/>
+        </inkml:traceFormat>
+        <inkml:channelProperties>
+          <inkml:channelProperty channel="X" name="resolution" value="1000" units="1/cm"/>
+          <inkml:channelProperty channel="Y" name="resolution" value="1000" units="1/cm"/>
+          <inkml:channelProperty channel="F" name="resolution" value="0" units="1/dev"/>
+        </inkml:channelProperties>
+      </inkml:inkSource>
+      <inkml:timestamp xml:id="ts0" timeString="2023-07-04T10:23:21.669"/>
+    </inkml:context>
+    <inkml:brush xml:id="br0">
+      <inkml:brushProperty name="width" value="0.05292" units="cm"/>
+      <inkml:brushProperty name="height" value="0.05292" units="cm"/>
+      <inkml:brushProperty name="color" value="#FF0000"/>
+    </inkml:brush>
+  </inkml:definitions>
+  <inkml:trace contextRef="#ctx0" brushRef="#br0">24505 5482 24575,'-9'-3'0,"-4"1"0,-7 4 0,-3 3 0,1 4 0,3 5 0,1 3 0,-1 4 0,-4 5 0,-4 4 0,0 0 0,4-2 0,4-4 0,6-2 0,4-4 0,2-3 0,5-3 0,0-4 0,3-3 0,1-3 0,5-2 0,7 0 0,13 2 0,10 2 0,7 4 0,2 3 0,-5 1 0,-10 0 0,-9 0 0,-10-1 0,-7-1 0,-4-2 0,-1 0 0,0 1 0,0 5 0,0 8 0,-4 9 0,-3 5 0,-4 1 0,-7 0 0,-4-4 0,-7-4 0,-7-5 0,-7-3 0,19-11 0,-1-1 0,0-1 0,0 1 0,-19 6 0,9-4 0,11-4 0,13-5 0,5-2 0</inkml:trace>
+  <inkml:trace contextRef="#ctx0" brushRef="#br0" timeOffset="9267">10535 7562 24575,'27'0'0,"1"0"0,6 0 0,3 0 0,10 0 0,3 0-719,-11 0 0,0 0 0,1 0 719,6 0 0,0 0 0,2 0 0,-10 0 0,1 0 0,0 0 0,1 0 0,0 0 0,1 0 0,-1 0 0,0 0 0,1 0 0,-1 0 0,0 0 0,-1 0 0,10 0 0,0 0 0,-1 0 0,-5 0 0,0 0 0,-2 0 49,-1 0 1,-2 0-1,0 0-49,-3 0 0,0 0 0,-1 0 0,14 0 0,-2 0 0,0 0 0,-2 0 241,-3 0 1,-2 0-242,-4 0 0,-3 0 0,-4 0 0,-3 0 0,12 0 1085,-13 0-1085,-9 0 110,-7 0 0,-5 0 0,-1 0 1</inkml:trace>
+  <inkml:trace contextRef="#ctx0" brushRef="#br0" timeOffset="19451">5130 8716 24575,'26'0'0,"-2"0"0,4 0 0,14 0 0,5 0 0,-8 0 0,2 0 0,2 0-710,3 0 1,1 0 0,0 0 709,-1 0 0,0 0 0,-1 0 0,-3 0 0,0 0 0,-2 0 227,-5 0 1,-2 0 0,-1 0-228,8 0 0,-4 0 176,-6 0 0,-2 0-176,12 0 0,-9 0 0,-3 0 1093,1 0-1093,2 0 0,-1 0 0,2 0 0,4 0 0,3 0 0,7 0 0,-1 0 0,-5 0 0,-11 0 0,-11 0 0,-8 0 0,-6 0 0,-2 0 0,-8 0 0,-2 0 0,-3 0 0,2 0 0,-1 1 0,7-1 0,-1 1 0</inkml:trace>
+  <inkml:trace contextRef="#ctx0" brushRef="#br0" timeOffset="23249">6521 11025 24575,'26'-1'0,"0"-1"0,11 1 0,4 1 0,-4-1 0,5 1 0,0 1-820,-3-1 1,1 0 0,1 0 0,0 0 678,5 0 1,1 0-1,1 0 1,0 0 140,-8 0 0,1 0 0,0 0 0,-1 0 0,0 0 0,7 0 0,0 0 0,0 0 0,-2 0 0,-3 0 0,-1 0 0,-1 0 0,-1 0 246,6-1 1,-1 1-1,-3 1-246,9-1 0,-5 1 364,-8-1 0,-4 1-364,9 1 0,-21-1 0,-9-1 1981,-8 0-1981,-4-1 0,-4-1 0</inkml:trace>
+  <inkml:trace contextRef="#ctx0" brushRef="#br0" timeOffset="33170">11773 13752 24575,'12'0'0,"15"0"0,-2 0 0,5 0 0,11 0 0,4 0 0,-7 0 0,2 0 0,1 0-620,5 0 0,1 0 0,1 0 620,-10 0 0,1 0 0,1 0 0,0 0 0,0 0 0,1 0 0,1 0 0,-1 0 0,0 0 0,1 0 0,-1 0 0,0 0 0,-1 0 0,-1 0 0,-1 0 0,-1 0 0,9 0 0,-2 0 0,0 0 63,-6 0 0,0 0 1,-2 0-64,11 0 0,-2 0 0,-5 0 0,-1 0 0,-4 0 0,-1 0 0,-5 0 0,0 0 0,-2 0 0,-1 0 696,1 0 0,0 0-696,-1 0 0,1 0 139,1 0 0,-1 0-139,0 0 0,-1 0 0,22 0 0,-4 0 0,-10 0 0,-8 0 0,-7 0 0,-6 0 0,-3 0 0,-3 0 0,-3 1 0,-2 0 0,-2 0 0,-3 0 0,0-1 0,-3 0 0,4 0 0,0 0 0</inkml:trace>
+  <inkml:trace contextRef="#ctx0" brushRef="#br0" timeOffset="35652">4793 14936 24575,'44'0'0,"-18"0"0,2 0 0,4 0 0,2 0 0,5 0 0,0 0 0,2 0 0,-1 0 0,1 0 0,0 0 0,3 0 0,2 0 0,-13 0 0,0 0 0,2 0-278,4 0 0,3 0 0,-1 0 278,1 0 0,0 0 0,0 0 0,0 0 0,0 0 0,-1 0 0,0 0 0,-1 0 0,-1 0 0,-4 0 0,-1 0 0,-1 0 0,12 0 0,-1 0 0,-8 0 0,-2 0 0,-7 0 0,-1 0 0,14 0 0,-14 0 0,-9 0 834,-7 0-834,-6 0 0,-3 0 0,-8-1 0,4 1 0,-3-1 0</inkml:trace>
+</inkml:ink>
+</file>
+
+<file path=ppt/ink/ink4.xml><?xml version="1.0" encoding="utf-8"?>
+<inkml:ink xmlns:inkml="http://www.w3.org/2003/InkML">
+  <inkml:definitions>
+    <inkml:context xml:id="ctx0">
+      <inkml:inkSource xml:id="inkSrc0">
+        <inkml:traceFormat>
+          <inkml:channel name="X" type="integer" min="-2.14748E9" max="2.14748E9" units="cm"/>
+          <inkml:channel name="Y" type="integer" min="-2.14748E9" max="2.14748E9" units="cm"/>
+          <inkml:channel name="F" type="integer" max="32767" units="dev"/>
+        </inkml:traceFormat>
+        <inkml:channelProperties>
+          <inkml:channelProperty channel="X" name="resolution" value="1000" units="1/cm"/>
+          <inkml:channelProperty channel="Y" name="resolution" value="1000" units="1/cm"/>
+          <inkml:channelProperty channel="F" name="resolution" value="0" units="1/dev"/>
+        </inkml:channelProperties>
+      </inkml:inkSource>
+      <inkml:timestamp xml:id="ts0" timeString="2023-07-04T10:25:14.773"/>
+    </inkml:context>
+    <inkml:brush xml:id="br0">
+      <inkml:brushProperty name="width" value="0.05292" units="cm"/>
+      <inkml:brushProperty name="height" value="0.05292" units="cm"/>
+      <inkml:brushProperty name="color" value="#FF0000"/>
+    </inkml:brush>
+  </inkml:definitions>
+  <inkml:trace contextRef="#ctx0" brushRef="#br0">15776 7377 24575,'26'0'0,"9"0"0,10 0 0,-20 0 0,1 0 0,23 0 0,-1 0 0,-3 0 0,0 0 0,3 0 0,1 0 0,-23-1 0,-1 2 0,22 0 0,-11 1 0,-8 1 0,-10 1 0,-9-1 0,-2 0 0,-5-1 0,-4-2 0,-1 0 0</inkml:trace>
+  <inkml:trace contextRef="#ctx0" brushRef="#br0" timeOffset="10201">25623 15107 24575,'28'0'0,"0"0"0,12 0 0,4 0 0,-3 0 0,4 0 0,1 0-820,-5 0 1,2 0 0,1 0 0,1 0 554,-4 0 1,1 0-1,2 0 1,0 0-1,-1 0 265,2 0 0,1 0 0,-1 0 0,1 0 0,-1 0 0,2 0 0,-1 0 0,1 0 0,-1 0 0,-1 0 0,-2 0 0,0 0 0,-1 0 0,-1 0 0,-1 0 0,4 0 0,-2 0 0,-1 0 0,0 0 346,6 0 0,-1 0 0,-3 0-346,5 1 0,-5-1 413,-10 1 1,-4 0-414,7 0 0,-21 0 0,-6-1 2407,-8 0-2407,-1 0 328,-4 0-328,-2-3 0,2 1 0,-1-1 0</inkml:trace>
+</inkml:ink>
+</file>
+
+<file path=ppt/ink/ink5.xml><?xml version="1.0" encoding="utf-8"?>
+<inkml:ink xmlns:inkml="http://www.w3.org/2003/InkML">
+  <inkml:definitions>
+    <inkml:context xml:id="ctx0">
+      <inkml:inkSource xml:id="inkSrc0">
+        <inkml:traceFormat>
+          <inkml:channel name="X" type="integer" min="-2.14748E9" max="2.14748E9" units="cm"/>
+          <inkml:channel name="Y" type="integer" min="-2.14748E9" max="2.14748E9" units="cm"/>
+          <inkml:channel name="F" type="integer" max="32767" units="dev"/>
+        </inkml:traceFormat>
+        <inkml:channelProperties>
+          <inkml:channelProperty channel="X" name="resolution" value="1000" units="1/cm"/>
+          <inkml:channelProperty channel="Y" name="resolution" value="1000" units="1/cm"/>
+          <inkml:channelProperty channel="F" name="resolution" value="0" units="1/dev"/>
+        </inkml:channelProperties>
+      </inkml:inkSource>
+      <inkml:timestamp xml:id="ts0" timeString="2023-07-04T10:30:21.507"/>
+    </inkml:context>
+    <inkml:brush xml:id="br0">
+      <inkml:brushProperty name="width" value="0.05292" units="cm"/>
+      <inkml:brushProperty name="height" value="0.05292" units="cm"/>
+      <inkml:brushProperty name="color" value="#FF0000"/>
+    </inkml:brush>
+  </inkml:definitions>
+  <inkml:trace contextRef="#ctx0" brushRef="#br0">4492 10766 24575,'27'0'0,"0"0"0,4 0 0,3 0 0,3 0 0,1 0 0,4 0 0,1 0 0,2 0-656,-2 0 1,2 0-1,2 0 1,-1 0 0,1 0 208,-5 0 1,0 0-1,0 0 1,0 0-1,1 0 1,-1 0 446,1 0 0,0 0 0,-1 0 0,1 0 0,-1 0 0,0 0 0,6 0 0,0 0 0,0 0 0,-1 0 0,-1 0-91,-2 0 1,-1 0-1,0 0 1,-1 0-1,-1 0 91,7 0 0,-1 0 0,-1 0 0,-2 0 179,-4 0 0,-2 0 0,-1 0 1,-1 0-180,7 0 0,-1 0 0,-2 0 0,10 0 0,-3 0 0,-5 0 0,-1 0 1386,-4 0 0,-1 0-1386,-3 0 0,0 0 1017,1 0 1,0 0-1018,1 0 0,0 0 442,1 0 1,0 0-443,-2 0 0,1 0 0,-4 0 0,0 0 0,-1 0 0,-1 0 0,2 0 0,0 0 0,5 0 0,1 0 0,5 0 0,2 0 0,3 0 0,1 0 0,2 0 0,-1 0 0,0 0 0,-1 0 0,-3 0 0,0 0 0,-5 0 0,-1 0 0,-5 0 0,-1 0 0,-6 0 0,-1 0 0,15 0 0,-6 0 0,1 0 0,3 0 0,8 0 0,-21 0 0,1 0 0,0 0 0,-1 0 0,24 0 0,-10 0 0,-12 0 0,-9 0 0,-4 0 0,-8 0 0,0 0 0,-6-1 0,-1 0 0,-1-1 0</inkml:trace>
+  <inkml:trace contextRef="#ctx0" brushRef="#br0" timeOffset="3288">4038 12947 24575,'21'2'0,"6"0"0,8-2 0,3 0 0,-3 0 0,-5-2 0,-7-2 0,-5-1 0,-6 0 0,-4 3 0,-2 1 0,-1 1 0,-2 0 0,0 0 0,1 0 0,0 0 0,0 0 0,1 0 0,0 0 0,0 0 0,-1 0 0,-1 0 0,0 0 0,0 1 0,-2 1 0,0 0 0,-2 0 0,0-1 0,-2-1 0,-1 0 0,0 0 0,1 0 0,0 0 0,1 0 0,1 0 0,0 0 0</inkml:trace>
+  <inkml:trace contextRef="#ctx0" brushRef="#br0" timeOffset="4887">6318 13090 24575,'40'0'0,"2"0"0,7 0 0,-13 0 0,3 0 0,2 0 0,2 0-656,1 0 1,3 0-1,1 0 1,1 0 0,0 0 108,-1 0 1,1 0 0,1 0 0,0 0 0,0 0 0,1 0 482,-7 0 0,0 0 0,0 0 1,0 0-1,0 0 0,0 0 0,0 0 64,0 0 0,1 0 0,-1 0 0,0 0 0,-1 0 0,0 0 0,-1 0 0,2 0 0,0 0 0,-1 0 0,-1 0 0,-1 0 0,-1 0 239,9 0 0,-1 0 1,-2 0-1,-2 0-239,4 0 0,-3 0 0,-5 0 659,-2 0 1,-5 0-660,8 0 0,-23 0 0,-15-1 819,-11-3 0,3 2 0,-5-2 0</inkml:trace>
+  <inkml:trace contextRef="#ctx0" brushRef="#br0" timeOffset="6286">11835 13090 24575,'42'0'0,"-11"0"0,6 0 0,3 0 0,-3 0 0,2 0 0,3 0 0,2 0 0,1 0-469,-4 0 1,2 0 0,0 0 0,2 0 0,1 0 0,0 0 0,-1 0 58,-2 0 0,1 0 1,0 0-1,0 0 1,1 0-1,-1 0 0,0 0 1,0 0 127,4 0 0,1 0 1,0 0-1,-1 0 1,0 0-1,-2 0 0,0 0 348,0 0 1,0 0 0,-1 0 0,-1 0 0,-2 0 0,-1 0-67,7 0 0,-2 0 0,-3 0 0,-2 0 342,-1 0 0,-2 0 1,-5 0-343,-1 0 0,-5 0 0,-1 0 0,-18 0 3276,-9-1-2419,-2-1 1177,0-1-2034,-3 1 0,4 2 0,-2 0 0</inkml:trace>
+  <inkml:trace contextRef="#ctx0" brushRef="#br0" timeOffset="96240">3523 15065 24575,'28'0'0,"-4"0"0,3 0 0,14 0 0,6 0 0,-7 0 0,3 0 0,1 0-803,-6 0 0,1 0 1,0 0-1,1 0 803,2 0 0,1 0 0,-1 0 0,1 0 0,0 0 0,0 0 0,0 0 0,0 0 0,-1 0 0,-1 0 0,0 0 0,0 0 0,-2 0 0,0-1 0,0 1 0,-1-1 19,10 0 0,-2 0 0,0-1-19,-5 0 0,0-1 0,-1 0 0,-2 0 0,-2 0 0,0 0 318,13-1 1,-2 0-319,-1 0 0,0 0 0,-5 1 0,0 0 0,-3 0 0,0 0 0,-4 0 0,-1 0 799,-4 1 1,-1-1-800,-1 0 0,-1 0 401,0 0 0,0-1-401,3 1 0,2-1 58,3 1 0,2-1-58,3 0 0,0 1 0,3-1 0,0 1 0,-1-1 0,0 1 0,-1 0 0,0 1 0,0-1 0,1 1 0,-1 0 0,1 0 0,0 0 0,0 0 0,0 0 0,0 0 0,-1-1 0,0 1 0,-4-1 0,0 1 0,-3-1 0,-2 1 0,-3-1 0,-1 1 0,19-3 0,-4 1 0,-5 1 0,-5 2 0,-7 1 0,-7 0 0,-4 0 0,-5 0 0,-3 0 0,-3 0 0,-2 0 0</inkml:trace>
+  <inkml:trace contextRef="#ctx0" brushRef="#br0" timeOffset="122591">19200 14256 24575,'0'17'0,"0"21"0,0-6 0,0 4 0,0-4 0,0 3 0,0 0-637,0 6 0,0 1 0,0 0 637,0 3 0,0 1 0,0 0 0,0-1 0,0 1 0,0-1 0,0-2 0,0 0 0,0 0 0,0-3 0,0 0 0,0 0 128,0-4 0,0 0 0,0-2-128,0 13 0,0-1 185,0-7 0,0-2-185,0-5 0,0-1 0,0-4 0,0 0 0,0-1 0,0 1 485,0 0 1,0 1-486,0-1 0,0 1 93,0 0 0,0-2-93,0 19 0,0-15 0,0-9 0,0-15 0,-5-12 0,4 1 0,-4-7 0</inkml:trace>
+  <inkml:trace contextRef="#ctx0" brushRef="#br0" timeOffset="124292">19362 14501 24575,'0'16'0,"0"14"0,0-5 0,0 2 0,0 7 0,0 2 0,0 2 0,0 2 0,0-3 0,0 0 0,0-2 0,0-1 0,0-1 0,0-1 0,0-1 0,0-1 0,0 0 0,0 0 0,0-1 0,0-1 0,0 21 0,0-8 0,0-7 0,0-6 0,0 0 0,0 0 0,2 3 0,-1 0 0,2-3 0,0-3 0,-2-8 0,0-4 0,-1-4 0,0-5 0,1 0 0,0-1 0,0 0 0,1 0 0,-1 1 0,1 0 0,1 0 0,-2 1 0,1 0 0,0 1 0,1 0 0,0-3 0,-2-1 0,0-1 0</inkml:trace>
+</inkml:ink>
+</file>
+
+<file path=ppt/ink/ink6.xml><?xml version="1.0" encoding="utf-8"?>
+<inkml:ink xmlns:inkml="http://www.w3.org/2003/InkML">
+  <inkml:definitions>
+    <inkml:context xml:id="ctx0">
+      <inkml:inkSource xml:id="inkSrc0">
+        <inkml:traceFormat>
+          <inkml:channel name="X" type="integer" min="-2.14748E9" max="2.14748E9" units="cm"/>
+          <inkml:channel name="Y" type="integer" min="-2.14748E9" max="2.14748E9" units="cm"/>
+          <inkml:channel name="F" type="integer" max="32767" units="dev"/>
+        </inkml:traceFormat>
+        <inkml:channelProperties>
+          <inkml:channelProperty channel="X" name="resolution" value="1000" units="1/cm"/>
+          <inkml:channelProperty channel="Y" name="resolution" value="1000" units="1/cm"/>
+          <inkml:channelProperty channel="F" name="resolution" value="0" units="1/dev"/>
+        </inkml:channelProperties>
+      </inkml:inkSource>
+      <inkml:timestamp xml:id="ts0" timeString="2023-07-04T10:32:38.299"/>
+    </inkml:context>
+    <inkml:brush xml:id="br0">
+      <inkml:brushProperty name="width" value="0.05292" units="cm"/>
+      <inkml:brushProperty name="height" value="0.05292" units="cm"/>
+      <inkml:brushProperty name="color" value="#FF0000"/>
+    </inkml:brush>
+  </inkml:definitions>
+  <inkml:trace contextRef="#ctx0" brushRef="#br0">9707 6257 24575,'20'0'0,"12"0"0,-7 0 0,3 0 0,7 0 0,3 0 0,5 0 0,1 0 0,5 0 0,2 0-254,-16 0 0,2 0 0,-1 0 254,0 0 0,0 0 0,0 0 0,-1 0 0,1 0 0,-1 0 0,0 0 0,-1 0 0,-1 0 0,14 0 0,-1 0 94,-5 0 0,0 0-94,-7 0 0,-2 0 0,-5 0 0,-3 0 0,12 0 0,-11 0 0,-8 0 574,-10 0-574,-1 0 0,-4 0 0,0 0 0,0 0 0,1 0 0,1 0 0,3 0 0,8 0 0,12 0 0,14 0 0,7 0 0,0 0 0,-7 0 0,-8 0 0,-6 0 0,-8 0 0,-4 2 0,-7-1 0,-2 1 0,-5-2 0,-6 0 0,3 0 0,-4 0 0</inkml:trace>
+  <inkml:trace contextRef="#ctx0" brushRef="#br0" timeOffset="5567">12793 5653 24575,'0'28'0,"0"15"0,0-16 0,0 1 0,0 3 0,0 0 0,0-2 0,0-2 0,0 18 0,0-8 0,0-10 0,0-7 0,0-7 0,0-4 0,0-3 0,0-2 0,0-16 0,-2-9 0,-2-20 0,0 16 0,0-3 0,-1-5 0,0-2 0,-1-6 0,1 0 0,0-5 0,0 0 0,1 1 0,0 0 0,1 5 0,0 2 0,1 8 0,1 1 0,1-9 0,1 21 0,1 7 0,1 9 0,2 0 0,0 0 0,0 0 0,0 1 0,5 0 0,10 2 0,12 6 0,-9 1 0,1 2 0,3 3 0,1 3 0,-1 2 0,-1 2 0,-1 1 0,-3 1 0,-3 0 0,-2 0 0,-4 1 0,-1 0 0,-2 0 0,-2 1 0,-1-1 0,-1 0 0,1 22 0,-4-6 0,-1-6 0,-2-8 0,-3-6 0,-6-3 0,-11-4 0,-16 1 0,12-7 0,-1 0 0,-7 2 0,0-1 0,-3 1 0,0-1 0,2-1 0,2 1 0,3-2 0,2 1 0,-10 1 0,19-4 0,8-2 0,9-3 0</inkml:trace>
+  <inkml:trace contextRef="#ctx0" brushRef="#br0" timeOffset="7367">13653 5467 24575,'-9'-2'0,"-6"0"0,-6 2 0,-7 0 0,-4 0 0,-2 0 0,3 0 0,2 5 0,0 12 0,-2 14 0,14-10 0,1 1 0,-1 2 0,1 1 0,1-1 0,1 1 0,2-2 0,1-1 0,-8 17 0,7-10 0,5-9 0,8-10 0,9-6 0,13-3 0,11 2 0,15 5 0,-21-2 0,1 1 0,0 1 0,0 1 0,-1 0 0,-1 0 0,13 5 0,-13-2 0,-13-2 0,-7-1 0,-3 0 0,-4 1 0,-4-1 0,-5 1 0,-11 3 0,-10 2 0,-8 5 0,-8 1 0,2-3 0,4-6 0,9-6 0,10-4 0,8-2 0,6-1 0,5 0 0,1 0 0,1 0 0</inkml:trace>
+  <inkml:trace contextRef="#ctx0" brushRef="#br0" timeOffset="8933">13858 6144 24575,'0'-26'0,"0"-10"0,0-11 0,0 20 0,0-1 0,0-1 0,0-1 0,0 0 0,0 0 0,0-3 0,0-2 0,0 1 0,0 0 0,0-3 0,0 1 0,0 0 0,0 0 0,0 5 0,0 2 0,0-19 0,1 24 0,2 14 0,3 17 0,3 6 0,8 5 0,8 1 0,11-2 0,-12-10 0,2-2 0,2-2 0,1 0 0,2-2 0,0-3 0,-2-2 0,-2-2 0,17-10 0,-14-3 0,-14 4 0,-9 9 0,-4 13 0,-2 15 0,-2 15 0,0 10 0,-1-22 0,1 0 0,-3 23 0,2-6 0,1-8 0,1-6 0,0-1 0,0 2 0,0 1 0,0-1 0,0-5 0,0-6 0,0-4 0,0-5 0,1-5 0,0-1 0,0-3 0</inkml:trace>
+  <inkml:trace contextRef="#ctx0" brushRef="#br0" timeOffset="10602">14929 5380 24575,'-20'0'0,"-8"0"0,-12 0 0,-6 5 0,-1 8 0,3 8 0,6 5 0,8-3 0,8-4 0,10-5 0,7-2 0,5-1 0,0 1 0,4 1 0,8 3 0,10 3 0,8 1 0,7 0 0,4-1 0,5 1 0,-22-12 0,0 1 0,0-1 0,0 0 0,20 7 0,-8-2 0,-8-3 0,-10-3 0,-7-1 0,-5-2 0,-3 3 0,-2-1 0,-1 1 0,-5 3 0,-12 4 0,-13 5 0,8-7 0,-2 0 0,-4 2 0,-2-1 0,-2 1 0,-1 0 0,0-2 0,1 0 0,2-2 0,1-2 0,-14 4 0,14-7 0,13-3 0,9-3 0,4 1 0,2-1 0</inkml:trace>
+  <inkml:trace contextRef="#ctx0" brushRef="#br0" timeOffset="16335">12157 11082 24575,'24'-3'0,"-1"2"0,6 0 0,17 1 0,6 0-1093,-6 0 1,2 0 0,3 0 973,-6 0 1,1 0 0,1 0-1,1 0-266,-6 0 1,1 0-1,0 0 1,1 0-1,-1 0 385,1 0 0,1 0 0,0 0 0,-1 0 0,0 0 0,-3 1 0,1-1 0,-1 0 0,-1 0 0,-1-1 96,6 1 0,-2 0 0,-1-1 0,-1 1-96,5-1 0,-1 1 0,-3-1 0,9 0 0,-5 0 0,-11 0 0,-3 0 1617,8 1-1617,-19 0 641,-9 0 1,-7 0 0,-3 0 0</inkml:trace>
+  <inkml:trace contextRef="#ctx0" brushRef="#br0" timeOffset="32501">11291 8829 24575,'13'0'0,"20"0"0,-3 0 0,5 0 0,-2 0 0,3 0 0,2 0-835,9 0 1,2 0 0,1 0 834,-1 0 0,0 0 0,0 0 0,-2 0 0,0 0 0,-2 0 254,-6 0 0,-2 0 0,-2 0-254,5 0 0,-3 0 210,-8 0 1,-3 0-211,5 0 0,-15 0 0,-6 0 322,-7 0 1,-2 0-1,-2 0 1</inkml:trace>
+</inkml:ink>
+</file>
+
+<file path=ppt/ink/ink7.xml><?xml version="1.0" encoding="utf-8"?>
+<inkml:ink xmlns:inkml="http://www.w3.org/2003/InkML">
+  <inkml:definitions>
+    <inkml:context xml:id="ctx0">
+      <inkml:inkSource xml:id="inkSrc0">
+        <inkml:traceFormat>
+          <inkml:channel name="X" type="integer" min="-2.14748E9" max="2.14748E9" units="cm"/>
+          <inkml:channel name="Y" type="integer" min="-2.14748E9" max="2.14748E9" units="cm"/>
+          <inkml:channel name="F" type="integer" max="32767" units="dev"/>
+        </inkml:traceFormat>
+        <inkml:channelProperties>
+          <inkml:channelProperty channel="X" name="resolution" value="1000" units="1/cm"/>
+          <inkml:channelProperty channel="Y" name="resolution" value="1000" units="1/cm"/>
+          <inkml:channelProperty channel="F" name="resolution" value="0" units="1/dev"/>
+        </inkml:channelProperties>
+      </inkml:inkSource>
+      <inkml:timestamp xml:id="ts0" timeString="2023-07-04T10:33:49.643"/>
+    </inkml:context>
+    <inkml:brush xml:id="br0">
+      <inkml:brushProperty name="width" value="0.05292" units="cm"/>
+      <inkml:brushProperty name="height" value="0.05292" units="cm"/>
+      <inkml:brushProperty name="color" value="#FF0000"/>
+    </inkml:brush>
+  </inkml:definitions>
+  <inkml:trace contextRef="#ctx0" brushRef="#br0">2603 7046 24575,'32'0'0,"-7"0"0,4 0 0,10 0 0,5 0 0,-9 0 0,3 0 0,0 0-746,5 0 1,0 0 0,2 0 745,2 0 0,1 1 0,0-2 0,-10 1 0,1 0 0,0-1 0,0 0-297,2 1 0,0-1 0,1 0 0,-1 0 297,-1 0 0,1 0 0,-1-1 0,-1 1 0,12-2 0,-1 0 0,-1 1 66,-5-1 1,0 1 0,-2-1-67,-4 0 0,-2-1 0,0 1 0,-2 0 0,0 0 0,-1 0 0,13-1 0,-1 0 0,-3 0 0,-1 1 513,-2 0 0,-1 1-513,-2 0 0,-1 0 755,-2 0 1,-1 1-756,0 1 0,-1-1 343,1 0 1,-1 0-344,2 0 0,1-1 0,2 0 0,1 0 0,2 0 0,0 0 0,1-1 0,-1 1 0,0 0 0,-1 0 0,-2 0 0,-1 1 0,-2 0 0,-1 1 0,-2-1 0,-2 2 0,18-1 0,-14 0 0,-9 0 0,-14 0 0,-2 2 0,-7 0 0,0 0 0,0 1 0,0 0 0,0-1 0,-1-1 0,-1 0 0,-2-1 0,2 0 0,-1 0 0</inkml:trace>
+  <inkml:trace contextRef="#ctx0" brushRef="#br0" timeOffset="7115">2690 7825 24575,'28'0'0,"9"0"0,-12 0 0,2 0 0,4 0 0,1 0 0,3 0 0,2 0 0,0 0 0,1 0 0,0 0 0,0 0 0,-1 0 0,0 0 0,-2 0 0,1 0 0,-2 0 0,0 0 0,-1 0 0,0 0 0,0 0 0,1 0 0,-1 0 0,2 0 0,1 0 0,0 0 0,1 1 0,0 0 0,0 0 0,-1 0 0,-3 0 0,0 1 0,-5 0 0,-1 1 0,21 4 0,-6 0 0,-6 0 0,-6-2 0,-6 0 0,-1-1 0,3 1 0,6 1 0,5 1 0,5 0 0,1-3 0,-1-2 0,-3-1 0,-6-1 0,-6 0 0,-5 0 0,-6 0 0,-3 0 0,-4 0 0,-3 0 0,-2 0 0,-1 0 0,-1 0 0,0 2-3277,0 0 0,0 1 3047,0-2 230,0 1 0,0-1 0,-2 0 0,0-1 0</inkml:trace>
+  <inkml:trace contextRef="#ctx0" brushRef="#br0" timeOffset="32375">3439 10455 24575,'27'0'0,"14"0"0,-12 0 0,2 0 0,7 0 0,2 0 0,1 0 0,0 0 0,-2 0 0,0 0 0,-1 0 0,-1 0 0,-3 0 0,1 0 0,0 0 0,1 0 0,-2 0 0,1 0 0,-2 0 0,1 0 0,-2-1 0,0 0 0,-2-1 0,-1 0 0,-3 0 0,0-1 0,16-1 0,-7 0 0,-6 2 0,7-2 0,-12 2 0,5 0 0,-14 2 0,-1 0 0,-6 0 0,-1 0 0,-4 0 0,-1 0 0,1 0 0,-9 0 0,6 0 0,-7 0 0</inkml:trace>
+  <inkml:trace contextRef="#ctx0" brushRef="#br0" timeOffset="46651">4298 11384 24575,'15'0'0,"16"0"0,15 0 0,8 0 0,-9 0 0,3 0-563,-11 0 1,2 0 0,1 0 0,-2 0 562,4 0 0,-1 0 0,1 0 0,4 0 0,2-1 0,-1 0 0,1 0 0,1 0 0,-1 0 0,-3-1 0,-1 0 0,0-1 126,-4 1 1,0-1 0,-2 1-127,9-1 0,-3 0 225,-9 0 1,-2 1-226,14-1 0,-21 1 0,-10 2 1141,-7 0-1141,-3 0 277,-1 0-277,-3 0 0,1 0 0,-1 0 0,-1 0 0,2 2 0,-2 0 0,1 0 0,-2 0 0,0 1 0,0 0 0,0 0 0,-3-1 0,2-2 0,-2 0 0</inkml:trace>
+  <inkml:trace contextRef="#ctx0" brushRef="#br0" timeOffset="48552">3908 12398 24575,'21'0'0,"21"0"0,-6 0 0,4 0 0,-7 0 0,3 0 0,0 0 0,1 0 0,0 0 0,0 0 0,-1 0 0,-1 0 0,-1 0 0,12 0 0,-3 0 0,-9 0 0,-1 0 0,-5 0 0,-3 0 0,9 0 0,-13 1 0,-9 2 0,-5 0 0,-3 2 0,-2-1 0,-1-1 0,0-1 0,0 0 0,0 1 0,-1 0 0,0-1 0,0-1 0</inkml:trace>
+  <inkml:trace contextRef="#ctx0" brushRef="#br0" timeOffset="56816">1501 12925 24575,'44'0'0,"-15"0"0,2 0 0,5 0 0,2 0 0,2 0 0,-1 0 0,-3 0 0,-2 0 0,-8 0 0,-1 0 0,13 0 0,-19 0 0,-7 0 0,-7 0 0,-1 0 0</inkml:trace>
+  <inkml:trace contextRef="#ctx0" brushRef="#br0" timeOffset="58504">2005 12553 24575,'10'10'0,"1"1"0,2-1 0,2 2 0,3 0 0,3 3 0,3 1 0,-3-2 0,-3-1 0,-5-5 0,-6-2 0,-3-2 0,-3-1 0,-1-1 0,0 0 0,0 0 0,0 1 0,-2 0 0,-3 0 0,-3 2 0,-5 1 0,-2 1 0,-1 4 0,-4 6 0,-6 11 0,9-9 0,0 1 0,-3 3 0,1 2 0,-2 1 0,0 1 0,1 0 0,0 0 0,2-1 0,0-1 0,2-3 0,2-2 0,-6 11 0,8-11 0,6-6 0,5-7 0,1-2 0,0-3 0,0 0 0,0 0 0,0 0 0,0 1 0,0 0 0,0 0 0,0 0 0,0-3 0,0 0 0</inkml:trace>
+  <inkml:trace contextRef="#ctx0" brushRef="#br0" timeOffset="146773">1044 12489 24575,'-6'0'0,"-3"0"0,-4 0 0,-5 0 0,-2 0 0,1 0 0,1 0 0,3 0 0,-1 1 0,0 3 0,0 5 0,0 6 0,1 3 0,-1 2 0,1 1 0,1 0 0,1-1 0,2-3 0,3-3 0,2-3 0,3-2 0,2-1 0,1 2 0,-1 4 0,0 8 0,-1 7 0,1 7 0,1 2 0,0-2 0,0-5 0,0-5 0,0-3 0,2-2 0,3-1 0,3-2 0,3 0 0,2-3 0,0-3 0,2-1 0,0-3 0,0 0 0,0-2 0,2-1 0,2 0 0,2-1 0,3-2 0,1-2 0,1 0 0,5 0 0,4 0 0,2-5 0,-3-2 0,-6-2 0,-9-2 0,-6 3 0,-5-1 0,-2-3 0,-2-2 0,-3-1 0,0-2 0,-1-1 0,0 0 0,0 2 0,0 1 0,0 2 0,-1-1 0,-2-2 0,-1-6 0,-1-5 0,0-1 0,-1-2 0,-2 0 0,-2 4 0,0 4 0,1 8 0,-2 7 0,-1 4 0,-1 2 0,-2 0 0,-2-2 0,0-1 0,0-1 0,1-1 0,2-1 0,3-1 0,2 2 0,2 1 0,3 3 0,0 1 0,1 1 0,-1-1 0,1-2 0,-1 0 0,1 1 0,0-2 0,0 2 0,1 0 0,1 2 0,0 0 0</inkml:trace>
+  <inkml:trace contextRef="#ctx0" brushRef="#br0" timeOffset="147675">961 12918 24575,'0'0'0</inkml:trace>
+  <inkml:trace contextRef="#ctx0" brushRef="#br0" timeOffset="151405">20221 8100 24575,'0'14'0,"1"12"0,1 12 0,4 8 0,4 0 0,3-8 0,2-6 0,1-9 0,3-5 0,4-2 0,5-1 0,0-1 0,0-3 0,-5-4 0,-4-3 0,-5-3 0,-3-1 0,-3 0 0,-3 0 0,-1-3 0,1-6 0,1-8 0,1-11 0,2-11 0,4-8 0,-5 21 0,0-1 0,1 1 0,0 0 0,9-17 0,-2 8 0,-4 12 0,-3 9 0,-3 7 0,-4 8 0,-1 1 0,-1 0 0</inkml:trace>
+  <inkml:trace contextRef="#ctx0" brushRef="#br0" timeOffset="153308">20454 8096 24575,'9'8'0,"2"3"0,0 4 0,1 1 0,-2-3 0,-1-6 0,-3-1 0,-1-3 0,-1 0 0,-1 0 0,0-2 0,-2 2 0,1-1 0,0 3 0,5 4 0,5 4 0,6 6 0,5 3 0,1 2 0,0-1 0,-2-4 0,-6-3 0,-4-5 0,-4-4 0,-3-1 0,-3-2 0,-1-1 0,-1 0 0,2 2 0,3 3 0,1 5 0,3 2 0,-2-1 0,0 0 0,-3-7 0,0-1 0,-2-6 0,1 0 0,0 0 0,1 0 0,1-2 0,1-7 0,0-9 0,0-9 0,-1-4 0,-1 2 0,-1 7 0,0 6 0,-2 6 0,-1 2 0,0 0 0,1-3 0,1-2 0,0 0 0,0 3 0,-1 3 0,1 3 0,0 1 0,0 1 0,1 0 0,-1 1 0,-1-1 0,-2-1 0,1 2 0,-2 0 0</inkml:trace>
+  <inkml:trace contextRef="#ctx0" brushRef="#br0" timeOffset="154291">21100 8185 24575,'0'8'0,"0"4"0,0 8 0,0 6 0,0 3 0,0-3 0,0-2 0,0-2 0,0 2 0,1 0 0,1-3 0,2-4 0,1-6 0,-2-3 0,0-1 0,-2-1 0,-1-2 0,0 2 0,0 0 0,0-3 0,0-1 0</inkml:trace>
+  <inkml:trace contextRef="#ctx0" brushRef="#br0" timeOffset="156212">21311 8298 24575,'0'40'0,"1"5"0,0-17 0,1 0 0,2 0 0,1-1 0,0 0 0,1-1 0,8 20 0,-2-7 0,-1-7 0,-3-7 0,-2-7 0,-3-5 0,-2-5 0,0-1 0,0 1 0,1 3 0,1 1 0,0 0 0,0-3 0,-1-3 0,0-2 0,0-4 0,0-7 0,0-7 0,-1-11 0,-1-8 0,0-1 0,0 0 0,-2 6 0,1 4 0,0 1 0,0-4 0,1-7 0,0-9 0,0-4 0,0 3 0,0 9 0,3 14 0,2 11 0,3 8 0,1 2 0,5 0 0,7 1 0,10 1 0,9 4 0,4 4 0,1 5 0,-7 3 0,-11 1 0,-11 0 0,-8-1 0,-5-1 0,-1 0 0,-2 2 0,0 2 0,0 0 0,0-2 0,0-3 0,0-3 0,0-2 0,0-3 0,0-4 0,0-2 0</inkml:trace>
+  <inkml:trace contextRef="#ctx0" brushRef="#br0" timeOffset="158975">21046 7210 24575,'-7'0'0,"-4"0"0,0 0 0,0 0 0,2 0 0,4 0 0,0 1 0,-1 7 0,-3 10 0,-5 13 0,-3 10 0,2 2 0,3-2 0,5-8 0,3-6 0,3-9 0,1-5 0,1-5 0,1-1 0,3 0 0,3 1 0,2 2 0,1 5 0,1 2 0,-1 1 0,-1 0 0,0-2 0,0-4 0,2-1 0,2-1 0,4-1 0,2-2 0,1-2 0,-1-2 0,5-4 0,6-8 0,4-4 0,-1-3 0,-6 2 0,-8 3 0,-6 4 0,-6 0 0,-5-2 0,-2-4 0,-1-4 0,0-1 0,0 0 0,0 2 0,0 4 0,0 0 0,-1 2 0,-1 1 0,0 0 0,-2 0 0,-1 1 0,-1-5 0,-3-8 0,-1-11 0,-2-10 0,-1-2 0,0 6 0,-1 11 0,1 12 0,2 9 0,1 5 0,1 2 0,0 3 0,-1 1 0,-1 1 0,0-1 0,-1-1 0,-1-2 0,2-1 0,-1-1 0,6 0 0,0 0 0,3 0 0,0 0 0,0 1 0,0 3 0,0-3 0,1 2 0,1-3 0,0 0 0</inkml:trace>
+  <inkml:trace contextRef="#ctx0" brushRef="#br0" timeOffset="166044">21076 13482 24575,'0'22'0,"0"11"0,0 13 0,0-17 0,0 2 0,0 3 0,0 1 0,0 5 0,0 2 0,0 5 0,0 2 0,0-15 0,0 2 0,0-1 0,1 0 0,0 0 0,0 0 0,0 0 0,1 0 0,0-1 0,2 16 0,0-1 0,-1-16 0,1 1 0,0 0 0,0 0 0,0 0 0,0 0 0,0-1 0,0 1 0,1-1 0,0 17 0,0-1 0,0-3 0,-1-2 0,-1-3 0,0 0 0,-1-5 0,-1-1 0,0-3 0,-1-1 0,1-4 0,-1-1 0,0 18 0,0-9 0,0-9 0,1-6 0,0-7 0,0-2 0,2-4 0,-2-5 0,1-4 0,-2-1 0,0-2 0</inkml:trace>
+  <inkml:trace contextRef="#ctx0" brushRef="#br0" timeOffset="167059">21555 14328 24575,'30'0'0,"11"0"0,-12 0 0,1 0 0,6 0 0,2 0 0,0 0 0,1 0 0,0 0 0,-1 0 0,-4 0 0,0 0 0,-6 0 0,-1 0 0,16 0 0,-14 0 0,-12 0 0,-5 0 0,-7 1 0,0-1 0,-5 1 0</inkml:trace>
+  <inkml:trace contextRef="#ctx0" brushRef="#br0" timeOffset="169010">21829 14085 24575,'-9'0'0,"-1"0"0,-3 0 0,-2 1 0,0 5 0,-1 3 0,2 4 0,0 2 0,1-2 0,-4 2 0,-3 0 0,-4 3 0,-3 0 0,0-2 0,3-2 0,8-4 0,5-3 0,7-2 0,3-2 0,1 1 0,0 1 0,0 1 0,0 2 0,-1 3 0,-6 5 0,-6 5 0,-7 5 0,-5-1 0,3-4 0,5-6 0,5-6 0,7-4 0,4-3 0,7-2 0,4 0 0,5-1 0,3 0 0,3-1 0,5 1 0,3 2 0,4 3 0,0 4 0,-2 4 0,-3 2 0,-4-3 0,-5-1 0,-5-2 0,-3-2 0,-3-1 0,-1-1 0,-1-2 0,-3 0 0,0-1 0,-1 0 0,0 1 0,-1 0 0,-1-1 0,0 0 0</inkml:trace>
+  <inkml:trace contextRef="#ctx0" brushRef="#br0" timeOffset="171168">23043 14281 24575,'-13'-2'0,"-6"0"0,-4 2 0,0 0 0,6 0 0,9 2 0,4 2 0,3 4 0,1 6 0,0 4 0,0 4 0,3-1 0,4-3 0,4-3 0,5-3 0,3-2 0,4-2 0,1-3 0,-2-2 0,-3-5 0,-1-13 0,6-23 0,-8 8 0,1-4 0,3-8 0,1-2 0,0-2 0,-1 1 0,-3 4 0,-2 0 0,-3-6 0,-4 1 0,-5 14 0,-2 0 0,-3-5 0,-4 0 0,-1 12 0,-2 3 0,-13-19 0,0 8 0,2 10 0,2 4 0,7 10 0,4 4 0</inkml:trace>
+  <inkml:trace contextRef="#ctx0" brushRef="#br0" timeOffset="172280">23369 14314 24575,'0'17'0,"0"9"0,0 3 0,0 1 0,0-9 0,0-8 0,0-4 0,0-2 0,0-3 0,0 0 0,0-3 0</inkml:trace>
+  <inkml:trace contextRef="#ctx0" brushRef="#br0" timeOffset="174008">23649 14387 24575,'9'-12'0,"8"-6"0,10-8 0,6-6 0,-4-4 0,-7-1 0,-7-5 0,-4-5 0,-5-1 0,-1 1 0,-3 6 0,-3 5 0,-2 6 0,-3 8 0,-4 8 0,-1 7 0,1 3 0,1 6 0,0 6 0,-2 9 0,-2 9 0,2 4 0,2 1 0,4 1 0,3 5 0,1 10 0,1-18 0,0 1 0,0 4 0,0 1 0,0 0 0,0 1 0,0 1 0,0-1 0,0-3 0,0 0 0,0-3 0,0 0 0,0-1 0,1 0 0,1-2 0,0 0 0,-1-2 0,1 1 0,1 21 0,-2-4 0,-1-1 0,0-2 0,0-2 0,0-4 0,0-2 0,0-4 0,0-4 0,0-3 0,0-11 0,0-3 0</inkml:trace>
+  <inkml:trace contextRef="#ctx0" brushRef="#br0" timeOffset="175593">23976 14487 24575,'15'-9'0,"8"-9"0,5-7 0,3-5 0,-7 2 0,-10 6 0,-9 5 0,-4 1 0,-1-4 0,-3-5 0,-4-4 0,-4 1 0,-5 5 0,-1 4 0,-1 6 0,3 5 0,4 4 0,4 2 0,3 2 0,1 0 0,1 0 0,-1 0 0,-1 0 0,0 0 0,-2 0 0,1 1 0,0 3 0,3 6 0,0 6 0,2 8 0,0 8 0,0 10 0,0-17 0,0 1 0,0 3 0,0 0 0,0 4 0,0 0 0,0 0 0,0 1 0,1-1 0,0 1 0,0 3 0,1 1 0,1 1 0,1 1 0,1 2 0,-1-1 0,1 1 0,1 0 0,-1-4 0,0-2 0,0-4 0,-1-2 0,3 19 0,-3-16 0,-2-11 0,-1-15 0,-1-1 0,0-8 0</inkml:trace>
+  <inkml:trace contextRef="#ctx0" brushRef="#br0" timeOffset="179026">24232 14460 24575,'14'-2'0,"5"0"0,5 2 0,0 0 0,-5 0 0,-9 0 0,-5-2 0,-3-1 0,-2-1 0,0-1 0,0 0 0,0 0 0,0 0 0,0 0 0,0 1 0,-3 0 0,-3 0 0,-3 1 0,-2 0 0,-1 2 0,-1 1 0,1 0 0,0 0 0,2 0 0,-1 1 0,2 3 0,0 1 0,2 3 0,2-1 0,4 2 0,1 3 0,0 3 0,0 3 0,0 0 0,1-1 0,1-3 0,2-2 0,0-3 0,1-3 0,1-2 0,0 0 0,3 1 0,6 4 0,7 5 0,6 3 0,4-2 0,-1-3 0,-2-6 0,-2-3 0,-1-2 0,-2-4 0,-2-4 0,-3-6 0,-4-4 0,-3 0 0,-5-2 0,-2-1 0,-3-2 0,1-5 0,-1-1 0,0-1 0,-1 3 0,-1 8 0,0 8 0,0 8 0,0 13 0,0-2 0,0 7 0,1-8 0,1-1 0,1-2 0,3-2 0,1-2 0,1-2 0,4-7 0,5-5 0,4-8 0,4-2 0,-2 3 0,-6 4 0,-6 7 0,-6 4 0,-3 3 0</inkml:trace>
+  <inkml:trace contextRef="#ctx0" brushRef="#br0" timeOffset="180861">24846 14535 24575,'10'0'0,"1"0"0,-5 0 0,4 0 0,4-1 0,0-2 0,-2-2 0,-3-1 0,-3-2 0,-3 0 0,-2-1 0,1 1 0,-1 1 0,-1 2 0,0 0 0,0 0 0,0 2 0,-1 0 0,-4 1 0,-3 0 0,-5 1 0,-3 1 0,0 0 0,1 0 0,2 1 0,2 1 0,3 3 0,2 3 0,0 2 0,3 2 0,1 2 0,1 1 0,1-1 0,0-1 0,0-1 0,0-1 0,0-1 0,1-1 0,1-1 0,3-1 0,1-4 0,1-2 0,0-1 0,1 0 0,1 0 0,0 0 0,0 0 0,0 0 0,1 0 0,-2 0 0,-4 0 0,-1 0 0</inkml:trace>
+  <inkml:trace contextRef="#ctx0" brushRef="#br0" timeOffset="183025">25138 14394 24575,'0'10'0,"0"4"0,0 6 0,0-1 0,0 0 0,0 0 0,0-7 0,0 1 0,0-7 0,0-1 0,0 0 0,0 1 0,0-1 0,0 2 0,0 0 0,0 1 0,0 4 0,1 1 0,1 1 0,2-2 0,0-4 0,-1-3 0,0-3 0,-1-4 0,1-5 0,0-8 0,1-6 0,0-5 0,1 0 0,0 4 0,-1 7 0,2 6 0,0 6 0,1 2 0,0 1 0,2 0 0,1 0 0,2 0 0,1 0 0,3 0 0,1 1 0,-1 2 0,-1 4 0,-3 4 0,-4 1 0,-3 2 0,-3-2 0,-1 0 0,-1 0 0,0 0 0,0 0 0,0-1 0,0-1 0,0-4 0,0-2 0,0-2 0</inkml:trace>
+  <inkml:trace contextRef="#ctx0" brushRef="#br0" timeOffset="184076">25638 13613 24575,'0'12'0,"0"9"0,0 11 0,0 8 0,0-1 0,0 5 0,0-1 0,0 6 0,0-22 0,0 0 0,0-1 0,0-1 0,0 24 0,0-8 0,0-8 0,0-6 0,0 1 0,2 9 0,-1-10 0,1 1 0,2 6 0,0 0 0,0 2 0,1 0 0,0-5 0,0-2 0,3 12 0,-3-14 0,-2-15 0,-2-5 0</inkml:trace>
+  <inkml:trace contextRef="#ctx0" brushRef="#br0" timeOffset="184943">25222 13866 24575,'10'0'0,"19"0"0,-4 0 0,4 0 0,9 0 0,3 0 0,4 0 0,-1 0 0,-3 0 0,-2 0 0,-6 0 0,-2 0 0,12 0 0,-14 0 0,-13 0 0,-9 0 0,0 0 0,-3 0 0,2 0 0,-5 0 0,0 0 0</inkml:trace>
+  <inkml:trace contextRef="#ctx0" brushRef="#br0" timeOffset="186382">26907 14330 24575,'-10'0'0,"-3"1"0,0 0 0,4 0 0,11 1 0,11-2 0,8 0 0,5 0 0,3 0 0,0 0 0,-2 0 0,-2 3 0,0 7 0,1 8 0,-1 8 0,-2 2 0,-4 0 0,-7-2 0,-5-2 0,-5-3 0,-3-3 0,-3-2 0,-4-2 0,-4-2 0,-6-1 0,-2-3 0,-2-3 0,0-3 0,5-2 0,4 0 0,5 0 0,6 0 0</inkml:trace>
+  <inkml:trace contextRef="#ctx0" brushRef="#br0" timeOffset="187459">26850 14321 24575,'8'0'0,"7"0"0,11 0 0,8 0 0,2 0 0,-8 0 0,-12 0 0,-7 0 0,-6 0 0,-1 1 0,-2 2 0,0 1 0,0 2 0,0-2 0,0-2 0</inkml:trace>
+  <inkml:trace contextRef="#ctx0" brushRef="#br0" timeOffset="189743">26905 14387 24575,'-2'-8'0,"0"-5"0,2-3 0,0-2 0,0 0 0,0 5 0,0 3 0,0 2 0,0 3 0,0 0 0,0 0 0,0 1 0,0 0 0,0 1 0,0-2 0,0-2 0,1-3 0,2-3 0,0-1 0,1 2 0,0 4 0,0 3 0,0 3 0,1 0 0,1 0 0,2 0 0,0-1 0,2 2 0,0-1 0,2 0 0,2 1 0,0 0 0,2 0 0,2-2 0,2-2 0,3-1 0,-1 1 0,-2 2 0,-4 1 0,-3 2 0,-1 0 0,-3 1 0,0 0 0,-2 1 0,0 0 0,0 0 0,-1-1 0,1-1 0,-2 0 0,-3 0 0,-1 0 0</inkml:trace>
+  <inkml:trace contextRef="#ctx0" brushRef="#br0" timeOffset="191925">27373 14661 24575,'6'3'0,"2"-3"0,4-5 0,1-4 0,3-3 0,1-2 0,5-2 0,4-3 0,1-2 0,-2 1 0,-7 3 0,-7 1 0,-5 4 0,-5 1 0,-1 2 0,0 1 0,0 1 0,0-1 0,0 0 0,-1 1 0,-2 1 0,-4 0 0,-3 2 0,-3 1 0,-5 0 0,-2 2 0,-4 0 0,2 1 0,4 3 0,4 5 0,5 5 0,3 7 0,1-1 0,1 1 0,0-3 0,0-3 0,-1 1 0,0-1 0,-1 3 0,0 1 0,1-1 0,2-2 0,1-1 0,2-6 0,0-1 0,2-4 0,2 0 0,2 0 0,4 0 0,3-1 0,3-1 0,4-1 0,1 0 0,2 0 0,-2 0 0,1 1 0,1 2 0,0 1 0,0 1 0,-4 0 0,-1 0 0,-2-1 0,1 2 0,-2 0 0,-2 1 0,-7-4 0,-2-1 0</inkml:trace>
+  <inkml:trace contextRef="#ctx0" brushRef="#br0" timeOffset="193043">27758 14464 24575,'0'15'0,"0"10"0,0 13 0,0 9 0,1 1 0,2-6 0,0-3 0,1-6 0,-1-1 0,2 1 0,0-2 0,0 0 0,1-7 0,0-5 0,-1-6 0,-1-4 0,0-3 0,-2-1 0,1-4 0,-1 0 0,1-2 0,-1-1 0,1-7 0,-2 5 0,0-4 0</inkml:trace>
+  <inkml:trace contextRef="#ctx0" brushRef="#br0" timeOffset="193643">27998 14576 24575,'2'5'0,"0"0"0,-2-3 0,0-1 0</inkml:trace>
+  <inkml:trace contextRef="#ctx0" brushRef="#br0" timeOffset="195294">27773 14654 24575,'7'-4'0,"2"0"0,-1-3 0,4-2 0,4-4 0,7-2 0,7-5 0,5-1 0,5 2 0,3 2 0,-1 6 0,-6 6 0,-8 2 0,-8 3 0,-6 2 0,-5 4 0,-4 5 0,-1 6 0,-3 3 0,0 0 0,-1-1 0,0-2 0,0-1 0,0-2 0,0 0 0,0 0 0,0-1 0,0-1 0,0-1 0,0-2 0,0 0 0,0 1 0,0-1 0,0-1 0,0-1 0,0-3 0,0-2 0</inkml:trace>
+  <inkml:trace contextRef="#ctx0" brushRef="#br0" timeOffset="199543">28194 14629 24575,'0'-4'0,"11"-2"0,12-1 0,14-1 0,9-1 0,-1 2 0,-2 2 0,-11 1 0,-10 3 0,-7 2 0,-5 5 0,-4 4 0,-2 5 0,-3 3 0,-1-1 0,0 2 0,0 1 0,0-1 0,0-1 0,0-2 0,0-2 0,0 0 0,0-3 0,0-1 0,0 0 0,-1-1 0,-2 0 0,0-1 0,0-2 0,1-2 0,0-2 0</inkml:trace>
+  <inkml:trace contextRef="#ctx0" brushRef="#br0" timeOffset="200374">28723 14789 24575,'0'0'0</inkml:trace>
+  <inkml:trace contextRef="#ctx0" brushRef="#br0" timeOffset="203210">1427 16276 24575,'-40'0'0,"4"0"0,-2 1 0,8 3 0,0 0 0,-10 0 0,0 2 0,10 2 0,2 2 0,-8 5 0,-3 1 0,25-5 0,6 1 0,5 0 0,3 5 0,0 4 0,0 4 0,0 1 0,0-2 0,0-5 0,0-2 0,5 1 0,8 2 0,9 3 0,6 0 0,1-5 0,-2-7 0,-2-5 0,1-6 0,3-8 0,8-7 0,6-6 0,-19 9 0,0 0 0,1 0 0,-1 1 0,19-10 0,-8 4 0,-11 4 0,-9 2 0,-6 1 0,-3-1 0,-3-4 0,-3-4 0,0-4 0,0-1 0,-3-1 0,-2-4 0,-1-4 0,-2-4 0,0 1 0,0 7 0,-2 10 0,-2 9 0,-2 7 0,1 2 0,3 2 0,4-1 0,4 1 0</inkml:trace>
+  <inkml:trace contextRef="#ctx0" brushRef="#br0" timeOffset="204044">1201 16474 24575,'0'0'0</inkml:trace>
+  <inkml:trace contextRef="#ctx0" brushRef="#br0" timeOffset="205178">2173 16244 24575,'0'29'0,"0"17"0,0-16 0,0 2 0,0 4 0,0 2 0,0-3 0,0 0 0,0-6 0,0-3 0,0 16 0,0-18 0,0-14 0,0-4 0,1-4 0,1-1 0,2-1 0,2-2 0,0-1 0,2-3 0,1-1 0,6 2 0,6 0 0,6 3 0,3 0 0,0 0 0,-4 0 0,-7 1 0,-4-1 0,-5 2 0,-5 0 0,-2 0 0</inkml:trace>
+  <inkml:trace contextRef="#ctx0" brushRef="#br0" timeOffset="206211">2169 16470 24575,'12'0'0,"3"0"0,5 0 0,2 0 0,2 0 0,0 0 0,-3 0 0,-4 0 0,-6 0 0,-4 0 0,-4 0 0,-1 0 0</inkml:trace>
+  <inkml:trace contextRef="#ctx0" brushRef="#br0" timeOffset="207409">2157 16291 24575,'30'0'0,"-6"0"0,14 0 0,-12 0 0,-5 0 0,-9 0 0,-3 0 0,-5 0 0,0 0 0,-1 0 0,-1 0 0</inkml:trace>
+  <inkml:trace contextRef="#ctx0" brushRef="#br0" timeOffset="209427">2605 16724 24575,'0'-5'0,"0"-7"0,0-8 0,0-11 0,0-12 0,0-2 0,0 0 0,0 3 0,0 6 0,0 9 0,0 9 0,1 8 0,2 6 0,1 3 0,3 1 0,0 0 0,1 0 0,0 1 0,0 1 0,0 5 0,2 2 0,2 2 0,2 0 0,0-2 0,-1 0 0,-3 0 0,-3-2 0,-2 0 0,-1 0 0,1 0 0,-1 0 0,-1 0 0,-1 0 0,-1 0 0,0 1 0,-1-1 0,0 0 0,0 0 0,0 2 0,-1 1 0,-1 1 0,-5 0 0,-7-3 0,-4-3 0,-2-3 0,0-2 0,1 0 0,3 0 0,2-2 0,7 1 0,2 0 0</inkml:trace>
+  <inkml:trace contextRef="#ctx0" brushRef="#br0" timeOffset="211029">3020 16448 24575,'-2'26'0,"0"10"0,2-11 0,0 2 0,0 4 0,0 1 0,0 0 0,0 1 0,0-1 0,0-2 0,0 19 0,0-15 0,0-12 0,0-11 0,0-5 0,0-2 0,0-4 0,4-2 0,2-4 0,5-1 0,1-2 0,4 2 0,4 1 0,6 1 0,2 3 0,1 1 0,-4 1 0,-6 0 0,-6 0 0,-4 0 0,-3 0 0,-3 0 0,-1 0 0,0 0 0,1 0 0,-2 0 0,0 0 0</inkml:trace>
+</inkml:ink>
+</file>
+
+<file path=ppt/ink/ink8.xml><?xml version="1.0" encoding="utf-8"?>
+<inkml:ink xmlns:inkml="http://www.w3.org/2003/InkML">
+  <inkml:definitions>
+    <inkml:context xml:id="ctx0">
+      <inkml:inkSource xml:id="inkSrc0">
+        <inkml:traceFormat>
+          <inkml:channel name="X" type="integer" min="-2.14748E9" max="2.14748E9" units="cm"/>
+          <inkml:channel name="Y" type="integer" min="-2.14748E9" max="2.14748E9" units="cm"/>
+          <inkml:channel name="F" type="integer" max="32767" units="dev"/>
+        </inkml:traceFormat>
+        <inkml:channelProperties>
+          <inkml:channelProperty channel="X" name="resolution" value="1000" units="1/cm"/>
+          <inkml:channelProperty channel="Y" name="resolution" value="1000" units="1/cm"/>
+          <inkml:channelProperty channel="F" name="resolution" value="0" units="1/dev"/>
+        </inkml:channelProperties>
+      </inkml:inkSource>
+      <inkml:timestamp xml:id="ts0" timeString="2023-07-04T10:37:54.673"/>
+    </inkml:context>
+    <inkml:brush xml:id="br0">
+      <inkml:brushProperty name="width" value="0.05292" units="cm"/>
+      <inkml:brushProperty name="height" value="0.05292" units="cm"/>
+      <inkml:brushProperty name="color" value="#FF0000"/>
+    </inkml:brush>
+  </inkml:definitions>
+  <inkml:trace contextRef="#ctx0" brushRef="#br0">21549 10904 24575,'-2'7'0,"0"6"0,2 15 0,0 13 0,0-11 0,0 1 0,0 9 0,0 3 0,0-8 0,0 3 0,0 0-566,0 9 0,0 1 0,0 2 566,0-8 0,0 1 0,0 1 0,0 1-537,0 3 1,0 1 0,0 1 0,0-1 536,0-8 0,0-1 0,0 0 0,0 1 0,0-1 0,0 1 0,0 0 0,0 0 0,0 0 0,0 0 0,0-1 0,0 0 0,0 0 0,0 0 0,0 0 0,0 9 0,0 1 0,0-1 0,0 1 0,0-10 0,0-1 0,0 1 0,0 1 0,0-1 0,0 1 0,0 1 0,0 0 0,0 0 0,0 0 0,0 2 0,0 1 0,0-1 0,0 1 0,0 0-494,0 2 0,0-1 0,0 2 0,0-1 0,0 0 494,0 1 0,0 0 0,0 1 0,0-1 0,0 0 0,0 0 0,0-1 0,0 0 0,0 0 0,0-1 0,0-1 0,0-1 0,0-1 0,0 0 0,0 0-326,0 6 0,0 0 0,0-1 0,0 0 326,0-3 0,0-1 0,0 0 0,0-1 0,0 1 0,0-1 0,0 0 0,0 1 0,0 1 0,0 0 0,0 1 0,0 0-104,0-6 1,1 0 0,-1 0 0,1 0 0,-1 0 103,1 2 0,-1 0 0,1 0 0,0-1 0,-1 1 0,1 6 0,0 1 0,-1-1 0,1-1 200,0-4 1,-1 0-1,1 0 1,-1-3-201,0 6 0,0-2 0,0-2 1146,0 8 1,0-4-1147,0-11 0,0-3 1565,0 6-1565,0-18 578,0-11 0,0-6 0,0-3 1</inkml:trace>
+  <inkml:trace contextRef="#ctx0" brushRef="#br0" timeOffset="1485">21167 15573 24575,'2'6'0,"0"0"0,-1 5 0,-1 5 0,0 4 0,0 5 0,0 3 0,4 9 0,6 9 0,-3-19 0,2 1 0,1 1 0,0-1 0,1 0 0,0-1 0,0-2 0,0-2 0,10 17 0,-2-8 0,-3-5 0,-1 0 0,-1-2 0,-1 1 0,-2-5 0,-1-4 0,-2-4 0,-2-7 0,-1-1 0,-3-6 0,0-1 0,1-6 0,-1-5 0,3-7 0,6-11 0,11-11 0,-5 14 0,3-2 0,3-3 0,2 0 0,2-4 0,0 1 0,-2 0 0,-1 0 0,-5 6 0,-1 1 0,-4 5 0,-2 0 0,5-8 0,-5 7 0,0 1 0,2 0 0,4-2 0,2 4 0,-3 5 0,-1 6 0,-8 6 0,-3 3 0</inkml:trace>
+  <inkml:trace contextRef="#ctx0" brushRef="#br0" timeOffset="8098">13938 9089 24575,'19'-3'0,"22"1"0,-7 2 0,4 0 0,-4 0 0,1 0 0,2 0-704,4 0 1,1 0 0,1 0 703,4 0 0,1 0 0,1 0 0,-11 0 0,0 0 0,1 0 0,0 0-285,0 0 1,1 0 0,0 0 0,0 0 284,0 0 0,1 0 0,-2 0 0,1-1 0,8 1 0,0-1 0,-2 0 135,-4-1 1,-1 1-1,-1-2-135,10-1 0,-3-1 0,-9-1 0,-3 0 0,-8 0 0,-2 1 986,8-4-986,-13 3 1453,-8 3-1453,-4 2 0,-4 1 0,-2 0 0</inkml:trace>
+  <inkml:trace contextRef="#ctx0" brushRef="#br0" timeOffset="22650">9484 7276 24575,'-31'0'0,"-19"0"0,15 0 0,-3 1 0,-5 1 0,-2 3 0,-1 3 0,2 3 0,3 2 0,3 3 0,4 3 0,2 1 0,4 1 0,3 1 0,3 1 0,2 1 0,0 4 0,1 2 0,3 1 0,2 2 0,1 4 0,2 0 0,1 0 0,2 0 0,3-2 0,1-1 0,0-5 0,2-1 0,0 15 0,2-12 0,3-5 0,7 0 0,11 1 0,10-4 0,10-6 0,-15-11 0,1-3 0,4-1 0,1-2 0,4-3 0,2-2 0,2-4 0,0-3 0,-1-4 0,0-2 0,0-6 0,-1-3 0,-5-3 0,-2-2 0,-3 0 0,-4-1 0,-3 0 0,-2 0 0,-6 3 0,-1-1 0,-2 2 0,-2 0 0,0-2 0,0 0 0,-1-1 0,-1 0 0,0 0 0,0 0 0,-1 2 0,-1 1 0,2-18 0,-4 15 0,-6 11 0,-9 10 0,-8 7 0,-7 2 0,-2 2 0,3 0 0,3 1 0,5 1 0,6 1 0,5 1 0,4-1 0,1-1 0</inkml:trace>
+  <inkml:trace contextRef="#ctx0" brushRef="#br0" timeOffset="24158">9116 7679 24575,'8'3'0,"10"9"0,11 12 0,8 10 0,-17-14 0,0 1 0,1 1 0,-1 0 0,0-1 0,0 1 0,1 1 0,0 1 0,1-1 0,-1 1 0,-1-1 0,1 0 0,-2 0 0,0 0 0,-1 0 0,-2-1 0,0-1 0,0 1 0,-2-1 0,0 1 0,0-1 0,-1 1 0,13 19 0,-4-4 0,-2-6 0,-5-9 0,-4-6 0,-5-7 0,-3-4 0,-2-3 0</inkml:trace>
+  <inkml:trace contextRef="#ctx0" brushRef="#br0" timeOffset="42818">4520 11976 24575,'0'30'0,"0"6"0,0-12 0,0 2 0,0 5 0,0 3 0,0 5 0,0 1 0,0 5 0,0 1 0,0 1 0,0 0 0,0 1 0,0-1 0,0-3 0,0-1 0,0 1 0,0 0 0,0 0 0,0-1 0,0 2 0,0 0 0,0 0 0,0 0 0,0-2 0,1 0 0,-1-2 0,1 0 0,1-5 0,0 0 0,-1-3 0,1 0 0,0-4 0,-1 0 0,1-1 0,-1-1 0,0 1 0,0 0 0,0 1 0,0 1 0,-1 0 0,0 0 0,0 1 0,0-1 0,0-1 0,0-1 0,0 0 0,0-1 0,0 1 0,0 1 0,0 2 0,-1 0 0,0 5 0,0 0 0,0 2 0,-1 1 0,0-2 0,1-2 0,-1-4 0,1-2 0,-2 12 0,1-17 0,1-11 0,1-6 0,0-2 0,0-1 0,0 2 0,0 8 0,0 7 0,0 11 0,0 4 0,0-1 0,0-6 0,0-8 0,0-7 0,0-9 0,0-2 0,0-13 0,0-3 0,0 1 0,0 2 0</inkml:trace>
+  <inkml:trace contextRef="#ctx0" brushRef="#br0" timeOffset="56250">5945 12311 24575,'22'0'0,"22"0"0,-10 0 0,3 0 0,-5 0 0,2 0 0,0 0-351,1 0 0,1 0 1,0 0 350,2 0 0,2 0 0,-1 0 0,-1 0 0,-1 0 0,0 0 0,-3 0 0,-1 0 0,0 0 172,14 0 0,-3 0-172,-11 0 0,-2 0 175,17 0-175,-18 0 0,-12 0 0,-8 0 533,-4 0-533,-2 0 0,-2 0 0,-1 0 0</inkml:trace>
+  <inkml:trace contextRef="#ctx0" brushRef="#br0" timeOffset="63203">6147 15444 24575,'14'0'0,"17"0"0,-4 0 0,5 0 0,11 0 0,4 0 0,-9 0 0,1 0 0,1 0-434,5 0 0,0 0 1,0 0 433,-1 0 0,0 0 0,-1 0 0,1 0 0,0 0 0,-1 0 0,-1 0 0,0 0 0,0 0 0,-2 0 0,-1 0 0,0 0 0,2 0 0,0 0 0,-1 0 0,-3 0 0,0 0 0,0 0-75,0 0 1,-1 0-1,1 0 75,1 0 0,0 0 0,0 0 0,0 0 0,0 0 0,1 0 0,0 0 0,0 0 0,1 0 0,0 0 0,1 0 0,0 0 0,1 0 0,-1 0 0,1 0 0,2 0 0,0 0 0,0 0 0,-2 0 0,1 0 0,-1 0 0,-2 0 0,1 0 0,-1 0 0,-2 0 0,-1 0 0,0 0 0,-2 0 0,-1 0 0,-1 0 0,17 0 0,-2 0 0,-6 0 0,-1 0 0,-4 0 0,0 0 0,-4 0 0,-1 0 0,-4 0 0,-1 0 957,20 0-957,-8 0 568,-9 0-568,-8 0 0,-5 0 0,-10 0 0,0 0 0,-6 0 0,0 0 0</inkml:trace>
+  <inkml:trace contextRef="#ctx0" brushRef="#br0" timeOffset="70221">28262 10861 24575,'0'13'0,"0"18"0,-1 2 0,2 7 0,-1-1 0,1 5 0,0 1-820,1-2 1,-1 2 0,1 1 0,1 1 596,-1-7 0,0 1 0,1 0 0,0 0 0,0 0 223,0 0 0,0-1 0,0 0 0,1 0 0,0-1-129,0 7 0,0-1 1,1 0-1,-1-1 129,0-2 0,-1-2 0,0 1 0,1-1 0,-1 0 0,-1-1 0,1 1 0,-1 0 0,1 1 0,0-1 0,-1 1 0,1 0 0,-1 1 0,1 0 0,-1 0 0,1 0 0,0 0 0,0-1 0,0 0 0,0-1 0,0 10 0,1 0 0,0-2 202,-1-4 0,0 0 0,0-3-202,0-4 0,1-2 0,-1 0 0,1 12 0,1-1-61,0-2 0,0-1 61,0 1 0,1 1 0,0 4 0,0 1 0,-2-16 0,1 0 0,-1 1 0,0 0 0,-1-1 0,1 0 0,1 12 0,-1-3 1030,-1-8 0,1-3-1030,-1 13-3277,-1-21 1624,-2-12 2059,0-8-406,0-6 0,0-2 0</inkml:trace>
+  <inkml:trace contextRef="#ctx0" brushRef="#br0" timeOffset="72683">25216 10882 24575,'38'0'0,"6"0"0,6 0 0,-6 0 0,1 0-421,-1 0 1,3 0 0,-3 0 420,-8 0 0,-2 0 0,-1 0 0,16-1 0,-1 0 205,-3 0 1,-1 0-206,-4 0 0,-2-1 104,-5 0 1,-1 0-105,-4 1 0,-1 0 0,16-3 0,-10 1 641,-7 0-641,-7 1 0,-5 2 0,-4 0 0,-4 0 0,-2 0 0,-3 0 0,-1 0 0</inkml:trace>
+  <inkml:trace contextRef="#ctx0" brushRef="#br0" timeOffset="74319">25900 14628 24575,'39'0'0,"10"0"0,-22 0 0,1 0 0,1 0 0,-1 0 0,-1 0 0,-2 0 0,16 0 0,-8 0 0,-12 0 0,-11 0 0,-2 0 0,2 0 0,7 0 0,7 0 0,0 0 0,-5 0 0,-5 0 0,-8 0 0,-3 0 0</inkml:trace>
+  <inkml:trace contextRef="#ctx0" brushRef="#br0" timeOffset="106459">19152 12484 24575,'39'0'0,"4"0"0,6 0 0,-5 0 0,3 0 0,3 0-656,-9 0 1,2 0-1,2 0 1,1 0 0,-1 0 160,2 0 1,0 0-1,1 0 1,0 0 0,0 0 494,-1 0 0,1 0 0,-1 0 0,0 0 0,-1 0-36,-1 0 0,0 0 0,-1 0 1,-1 0-1,-2 0 36,1 0 0,-2 0 0,-1 0 0,-2 0 351,9 0 1,-3 0-1,-1 0-351,6 0 0,-4 0 0,-8 0 0,-2 0 0,14 0 2796,-18 0-2796,-10 0 1764,-8 0-1764,-4 0 314,-2 0-314,-1 0 0,-3 1 0,0 2 0,0-1 0,-1 0 0,2 0 0,-2 1 0,0 1 0,0 4 0,-2 3 0,-2 4 0,-3 5 0,-7 8 0,-3 14 0,5-11 0,0 4 0,2-4 0,1 2 0,0 2-505,-1 7 1,-1 2-1,1 2 505,1-6 0,0 0 0,1 2 0,-1 0-520,1 3 1,-1 2 0,1 0 0,-1 0 519,1 2 0,0 0 0,-1 0 0,2 1 0,0-2 0,0 1 0,0-1 0,1-1-242,1-3 0,-1-2 1,1 0-1,0-2 242,0 8 0,1-2 0,0-1 0,1-9 0,1-1 0,0-2 0,0 7 0,0-2 635,1-7 1,0-2-636,-1 12 2114,-1-10-2114,1-4 1173,-1 5-1173,2 7 0,0 6 0,0 4 0,0 0 0,0 0 0,0-23 0,0 2 0,1 5 0,0 1 0,1 5 0,0 1 0,2 2 0,-1 0 0,2 0 0,0 0 0,-1-4 0,1-2 0,-1-3 0,0-2 0,-2-3 0,1-1 0,0 16 0,-1-10 0,-1-7 0,0-6 0,0-4 0,-1-3 0,-1-6 0,-3-2 0,-4-5 0,-12 0 0,-11 0 0,-14 0 0,17 0 0,-1 0 0,-3 0 0,1 0 0,1 0 0,0 0 0,-19 0 0,13 0 0,17 0 0,10-2 0,6 0 0,2-2 0,1 1 0,0-2 0,0-9 0,0 7 0,0-5 0</inkml:trace>
+  <inkml:trace contextRef="#ctx0" brushRef="#br0" timeOffset="107971">20379 15078 24575,'-16'3'0,"-11"-1"0,-4 4 0,-3 0 0,8-1 0,0 0 0,-10 3 0,2 2 0,-3 2 0,7-1 0,10-3 0,7-3 0,6-2 0,3-3 0,0 0 0,1 0 0,10 1 0,4 5 0,12 5 0,4 10 0,5 8 0,2 5 0,-16-16 0,1-1 0,15 15 0,-4-6 0,-4-5 0,-3-5 0,-5-3 0,-2-2 0,-2-1 0,-3-2 0,-2-1 0,-3-1 0,-2-3 0,-3-1 0,0-1 0</inkml:trace>
+  <inkml:trace contextRef="#ctx0" brushRef="#br0" timeOffset="110223">19772 14860 24575,'0'-12'0,"0"-7"0,0-15 0,0-11 0,0 17 0,0-2 0,0-5 0,0 0 0,0 0 0,2 1 0,3-1 0,2 2 0,3 3 0,3 2 0,2 5 0,4 2 0,5 1 0,3 1 0,3 2 0,3 2 0,7-1 0,4 2 0,-10 3 0,2 1 0,0 1-296,4-1 1,1 1-1,0 1 296,2 0 0,0 0 0,-1 1 0,1 0 0,-2 1 0,1 0 0,-4 1 0,0 0 0,0 0-73,-3 0 1,-1 0 0,0 0 72,14-3 0,-1 0 0,-4-1 0,-1 0 0,-4-1 0,-1 0 0,-4 0 0,-1-1 0,-2 0 0,-1-1 0,1 0 0,0 0 438,2-2 1,0-1-439,4-1 0,0-1 113,1-1 1,0-1-114,-1-2 0,1-1 0,0-3 0,0 0 0,0-3 0,0-3 0,-11 9 0,0-2 0,-1 0-180,1-3 0,-1-1 0,0 0 180,-1 0 0,-1-1 0,1 0 0,0-2 0,1-1 0,1 1 0,-1 0 0,1 0 0,0 1 0,1 0 0,0 2 0,0-1 0,1-1 0,1 0 0,-1 1 0,-2 3 0,-1 0 0,0 0 0,-1 0 0,-1 0 0,0 1 0,8-12 0,-2 0-23,-3 1 0,-2 0 23,-1 2 0,-1-1 0,-2 2 0,0 1 0,0 1 0,-1 2 0,-1 5 0,-1 1 0,-1 3 0,0 1 538,11-10-538,-1 5 48,2 0-48,10-5 0,-14 12 0,0-1 0,4-2 0,0 0 0,2-1 0,-1 1 0,-2 2 0,-1 0 0,-4 3 0,-1 2 0,7-4 0,-11 7 0,-7 6 0,-3 3 0,-2 0 0,-4 0 0,0 1 0,-2 0 0</inkml:trace>
+  <inkml:trace contextRef="#ctx0" brushRef="#br0" timeOffset="111691">22806 12030 24575,'16'0'0,"7"0"0,10 0 0,2 0 0,-4 0 0,-5 0 0,-8 0 0,-4-2 0,-6 1 0,-3 0 0,-2 4 0,-1 3 0,-1 0 0,-1 2 0,0 0 0,0 0 0,0 0 0,0 0 0,-1 0 0,-3 1 0,-3 1 0,-4 3 0,-3 12 0,-3 15 0,8-13 0,0 3 0,0 4 0,0 1 0,1 1 0,1 1 0,1-1 0,0 0 0,1-3 0,1 0 0,-1-4 0,0-1 0,-4 18 0,0-11 0,3-9 0,3-9 0,2-5 0,1-5 0,0-3 0,0-2 0,0 1 0,0-1 0,0-1 0,0 0 0</inkml:trace>
+  <inkml:trace contextRef="#ctx0" brushRef="#br0" timeOffset="129124">23951 7315 24575,'27'0'0,"-1"0"0,7 0 0,4 0 0,4 0 0,1 0 0,4 0 0,3 0 0,0 0-656,-4 0 1,2 0-1,0 0 1,1 0 0,-1 0 249,0 0 0,0 0 1,0 0-1,0 0 1,-2 0 405,6 0 0,0 0 0,-2 0 0,-3 0 421,3 0 0,-2 0 1,-4 0-422,6 0 0,-7 0 0,-14 0 0,-4 0 0,-2 0 928,-13 1-928,-6 0 0,-4 0 0,0 0 0</inkml:trace>
+</inkml:ink>
+</file>
+
+<file path=ppt/ink/ink9.xml><?xml version="1.0" encoding="utf-8"?>
+<inkml:ink xmlns:inkml="http://www.w3.org/2003/InkML">
+  <inkml:definitions>
+    <inkml:context xml:id="ctx0">
+      <inkml:inkSource xml:id="inkSrc0">
+        <inkml:traceFormat>
+          <inkml:channel name="X" type="integer" min="-2.14748E9" max="2.14748E9" units="cm"/>
+          <inkml:channel name="Y" type="integer" min="-2.14748E9" max="2.14748E9" units="cm"/>
+          <inkml:channel name="F" type="integer" max="32767" units="dev"/>
+        </inkml:traceFormat>
+        <inkml:channelProperties>
+          <inkml:channelProperty channel="X" name="resolution" value="1000" units="1/cm"/>
+          <inkml:channelProperty channel="Y" name="resolution" value="1000" units="1/cm"/>
+          <inkml:channelProperty channel="F" name="resolution" value="0" units="1/dev"/>
+        </inkml:channelProperties>
+      </inkml:inkSource>
+      <inkml:timestamp xml:id="ts0" timeString="2023-07-05T07:32:37.799"/>
+    </inkml:context>
+    <inkml:brush xml:id="br0">
+      <inkml:brushProperty name="width" value="0.05292" units="cm"/>
+      <inkml:brushProperty name="height" value="0.05292" units="cm"/>
+      <inkml:brushProperty name="color" value="#FF0000"/>
+    </inkml:brush>
+  </inkml:definitions>
+  <inkml:trace contextRef="#ctx0" brushRef="#br0">13318 16081 24575,'-7'15'0,"-3"5"0,-7 5 0,-4 5 0,0-1 0,2-2 0,1-2 0,2-1 0,1-2 0,0 0 0,2-1 0,2 1 0,1 0 0,2-3 0,3-1 0,3-4 0,-1-2 0,2-1 0,-2-2 0,-2 0 0,0 0 0,0 1 0,1-1 0,1-1 0,0-1 0,1-1 0,-1 1 0,0 1 0,1-1 0,1 0 0,1-2 0,0-1 0,1-2 0,1-1 0,2-1 0,2 0 0,4 0 0,3 0 0,3-2 0,4-3 0,3-3 0,3-1 0,1 1 0,0 2 0,-1 2 0,-2 1 0,-3 2 0,-2-1 0,-1 0 0,-4-1 0,-2-2 0,-1 0 0,-2 0 0,0-1 0,0-2 0,-2 0 0,-1-1 0,-3 1 0,-2 1 0,-1 1 0,-1 1 0,-5-1 0,-8 0 0,-10-1 0,-7-1 0,-1 1 0,1 0 0,2 1 0,3 2 0,-2 1 0,3 0 0,1-1 0,3 1 0,5 2 0,4-1 0,3 0 0,4 1 0,0 0 0,2 0 0,1-1 0,2-1 0,0-2 0,0 1 0,1 0 0,2 2 0,1 2 0,2 0 0,-1 0 0,0 0 0,-1 1 0,0 0 0,-2 0 0,0 0 0</inkml:trace>
 </inkml:ink>
 </file>
 
@@ -276,7 +1243,7 @@
           <a:p>
             <a:fld id="{475CC26B-B355-DF46-A6D5-CA447CAB9038}" type="datetimeFigureOut">
               <a:rPr lang="en-US" smtClean="0"/>
-              <a:t>9/24/22</a:t>
+              <a:t>7/4/23</a:t>
             </a:fld>
             <a:endParaRPr lang="en-US"/>
           </a:p>
@@ -4413,6 +5380,57 @@
           </a:extLst>
         </p:spPr>
       </p:pic>
+      <mc:AlternateContent xmlns:mc="http://schemas.openxmlformats.org/markup-compatibility/2006">
+        <mc:Choice xmlns:p14="http://schemas.microsoft.com/office/powerpoint/2010/main" Requires="p14">
+          <p:contentPart p14:bwMode="auto" r:id="rId3">
+            <p14:nvContentPartPr>
+              <p14:cNvPr id="3" name="Ink 2">
+                <a:extLst>
+                  <a:ext uri="{FF2B5EF4-FFF2-40B4-BE49-F238E27FC236}">
+                    <a16:creationId xmlns:a16="http://schemas.microsoft.com/office/drawing/2014/main" id="{FB5C58B9-3EC1-A090-F895-5118B833EECE}"/>
+                  </a:ext>
+                </a:extLst>
+              </p14:cNvPr>
+              <p14:cNvContentPartPr/>
+              <p14:nvPr/>
+            </p14:nvContentPartPr>
+            <p14:xfrm>
+              <a:off x="5679360" y="2655360"/>
+              <a:ext cx="4209120" cy="2785320"/>
+            </p14:xfrm>
+          </p:contentPart>
+        </mc:Choice>
+        <mc:Fallback>
+          <p:pic>
+            <p:nvPicPr>
+              <p:cNvPr id="3" name="Ink 2">
+                <a:extLst>
+                  <a:ext uri="{FF2B5EF4-FFF2-40B4-BE49-F238E27FC236}">
+                    <a16:creationId xmlns:a16="http://schemas.microsoft.com/office/drawing/2014/main" id="{FB5C58B9-3EC1-A090-F895-5118B833EECE}"/>
+                  </a:ext>
+                </a:extLst>
+              </p:cNvPr>
+              <p:cNvPicPr/>
+              <p:nvPr/>
+            </p:nvPicPr>
+            <p:blipFill>
+              <a:blip r:embed="rId4"/>
+              <a:stretch>
+                <a:fillRect/>
+              </a:stretch>
+            </p:blipFill>
+            <p:spPr>
+              <a:xfrm>
+                <a:off x="5670000" y="2646000"/>
+                <a:ext cx="4227840" cy="2804040"/>
+              </a:xfrm>
+              <a:prstGeom prst="rect">
+                <a:avLst/>
+              </a:prstGeom>
+            </p:spPr>
+          </p:pic>
+        </mc:Fallback>
+      </mc:AlternateContent>
     </p:spTree>
     <p:extLst>
       <p:ext uri="{BB962C8B-B14F-4D97-AF65-F5344CB8AC3E}">
@@ -5154,6 +6172,57 @@
           </a:p>
         </p:txBody>
       </p:sp>
+      <mc:AlternateContent xmlns:mc="http://schemas.openxmlformats.org/markup-compatibility/2006">
+        <mc:Choice xmlns:p14="http://schemas.microsoft.com/office/powerpoint/2010/main" Requires="p14">
+          <p:contentPart p14:bwMode="auto" r:id="rId2">
+            <p14:nvContentPartPr>
+              <p14:cNvPr id="5" name="Ink 4">
+                <a:extLst>
+                  <a:ext uri="{FF2B5EF4-FFF2-40B4-BE49-F238E27FC236}">
+                    <a16:creationId xmlns:a16="http://schemas.microsoft.com/office/drawing/2014/main" id="{96B8DB97-5D19-C216-9C52-4B2DE72035EA}"/>
+                  </a:ext>
+                </a:extLst>
+              </p14:cNvPr>
+              <p14:cNvContentPartPr/>
+              <p14:nvPr/>
+            </p14:nvContentPartPr>
+            <p14:xfrm>
+              <a:off x="1268280" y="3874320"/>
+              <a:ext cx="5715000" cy="1828080"/>
+            </p14:xfrm>
+          </p:contentPart>
+        </mc:Choice>
+        <mc:Fallback>
+          <p:pic>
+            <p:nvPicPr>
+              <p:cNvPr id="5" name="Ink 4">
+                <a:extLst>
+                  <a:ext uri="{FF2B5EF4-FFF2-40B4-BE49-F238E27FC236}">
+                    <a16:creationId xmlns:a16="http://schemas.microsoft.com/office/drawing/2014/main" id="{96B8DB97-5D19-C216-9C52-4B2DE72035EA}"/>
+                  </a:ext>
+                </a:extLst>
+              </p:cNvPr>
+              <p:cNvPicPr/>
+              <p:nvPr/>
+            </p:nvPicPr>
+            <p:blipFill>
+              <a:blip r:embed="rId3"/>
+              <a:stretch>
+                <a:fillRect/>
+              </a:stretch>
+            </p:blipFill>
+            <p:spPr>
+              <a:xfrm>
+                <a:off x="1258920" y="3864960"/>
+                <a:ext cx="5733720" cy="1846800"/>
+              </a:xfrm>
+              <a:prstGeom prst="rect">
+                <a:avLst/>
+              </a:prstGeom>
+            </p:spPr>
+          </p:pic>
+        </mc:Fallback>
+      </mc:AlternateContent>
     </p:spTree>
     <p:extLst>
       <p:ext uri="{BB962C8B-B14F-4D97-AF65-F5344CB8AC3E}">
@@ -5761,6 +6830,57 @@
           </a:p>
         </p:txBody>
       </p:sp>
+      <mc:AlternateContent xmlns:mc="http://schemas.openxmlformats.org/markup-compatibility/2006">
+        <mc:Choice xmlns:p14="http://schemas.microsoft.com/office/powerpoint/2010/main" Requires="p14">
+          <p:contentPart p14:bwMode="auto" r:id="rId2">
+            <p14:nvContentPartPr>
+              <p14:cNvPr id="6" name="Ink 5">
+                <a:extLst>
+                  <a:ext uri="{FF2B5EF4-FFF2-40B4-BE49-F238E27FC236}">
+                    <a16:creationId xmlns:a16="http://schemas.microsoft.com/office/drawing/2014/main" id="{156F2EF2-A7A7-45DD-C7C7-E726DB625511}"/>
+                  </a:ext>
+                </a:extLst>
+              </p14:cNvPr>
+              <p14:cNvContentPartPr/>
+              <p14:nvPr/>
+            </p14:nvContentPartPr>
+            <p14:xfrm>
+              <a:off x="3494520" y="1936800"/>
+              <a:ext cx="1917360" cy="2053080"/>
+            </p14:xfrm>
+          </p:contentPart>
+        </mc:Choice>
+        <mc:Fallback>
+          <p:pic>
+            <p:nvPicPr>
+              <p:cNvPr id="6" name="Ink 5">
+                <a:extLst>
+                  <a:ext uri="{FF2B5EF4-FFF2-40B4-BE49-F238E27FC236}">
+                    <a16:creationId xmlns:a16="http://schemas.microsoft.com/office/drawing/2014/main" id="{156F2EF2-A7A7-45DD-C7C7-E726DB625511}"/>
+                  </a:ext>
+                </a:extLst>
+              </p:cNvPr>
+              <p:cNvPicPr/>
+              <p:nvPr/>
+            </p:nvPicPr>
+            <p:blipFill>
+              <a:blip r:embed="rId3"/>
+              <a:stretch>
+                <a:fillRect/>
+              </a:stretch>
+            </p:blipFill>
+            <p:spPr>
+              <a:xfrm>
+                <a:off x="3485160" y="1927440"/>
+                <a:ext cx="1936080" cy="2071800"/>
+              </a:xfrm>
+              <a:prstGeom prst="rect">
+                <a:avLst/>
+              </a:prstGeom>
+            </p:spPr>
+          </p:pic>
+        </mc:Fallback>
+      </mc:AlternateContent>
     </p:spTree>
     <p:extLst>
       <p:ext uri="{BB962C8B-B14F-4D97-AF65-F5344CB8AC3E}">
@@ -6200,6 +7320,57 @@
           </a:p>
         </p:txBody>
       </p:sp>
+      <mc:AlternateContent xmlns:mc="http://schemas.openxmlformats.org/markup-compatibility/2006">
+        <mc:Choice xmlns:p14="http://schemas.microsoft.com/office/powerpoint/2010/main" Requires="p14">
+          <p:contentPart p14:bwMode="auto" r:id="rId2">
+            <p14:nvContentPartPr>
+              <p14:cNvPr id="6" name="Ink 5">
+                <a:extLst>
+                  <a:ext uri="{FF2B5EF4-FFF2-40B4-BE49-F238E27FC236}">
+                    <a16:creationId xmlns:a16="http://schemas.microsoft.com/office/drawing/2014/main" id="{93EB8B39-F7AE-BEC0-48CD-E43558BD26FB}"/>
+                  </a:ext>
+                </a:extLst>
+              </p14:cNvPr>
+              <p14:cNvContentPartPr/>
+              <p14:nvPr/>
+            </p14:nvContentPartPr>
+            <p14:xfrm>
+              <a:off x="271800" y="2500560"/>
+              <a:ext cx="10068840" cy="3575880"/>
+            </p14:xfrm>
+          </p:contentPart>
+        </mc:Choice>
+        <mc:Fallback>
+          <p:pic>
+            <p:nvPicPr>
+              <p:cNvPr id="6" name="Ink 5">
+                <a:extLst>
+                  <a:ext uri="{FF2B5EF4-FFF2-40B4-BE49-F238E27FC236}">
+                    <a16:creationId xmlns:a16="http://schemas.microsoft.com/office/drawing/2014/main" id="{93EB8B39-F7AE-BEC0-48CD-E43558BD26FB}"/>
+                  </a:ext>
+                </a:extLst>
+              </p:cNvPr>
+              <p:cNvPicPr/>
+              <p:nvPr/>
+            </p:nvPicPr>
+            <p:blipFill>
+              <a:blip r:embed="rId3"/>
+              <a:stretch>
+                <a:fillRect/>
+              </a:stretch>
+            </p:blipFill>
+            <p:spPr>
+              <a:xfrm>
+                <a:off x="262440" y="2491200"/>
+                <a:ext cx="10087560" cy="3594600"/>
+              </a:xfrm>
+              <a:prstGeom prst="rect">
+                <a:avLst/>
+              </a:prstGeom>
+            </p:spPr>
+          </p:pic>
+        </mc:Fallback>
+      </mc:AlternateContent>
     </p:spTree>
     <p:extLst>
       <p:ext uri="{BB962C8B-B14F-4D97-AF65-F5344CB8AC3E}">
@@ -6404,6 +7575,57 @@
           </a:p>
         </p:txBody>
       </p:sp>
+      <mc:AlternateContent xmlns:mc="http://schemas.openxmlformats.org/markup-compatibility/2006">
+        <mc:Choice xmlns:p14="http://schemas.microsoft.com/office/powerpoint/2010/main" Requires="p14">
+          <p:contentPart p14:bwMode="auto" r:id="rId4">
+            <p14:nvContentPartPr>
+              <p14:cNvPr id="7" name="Ink 6">
+                <a:extLst>
+                  <a:ext uri="{FF2B5EF4-FFF2-40B4-BE49-F238E27FC236}">
+                    <a16:creationId xmlns:a16="http://schemas.microsoft.com/office/drawing/2014/main" id="{64F93345-9D6F-C606-54A9-E3DDAEBAA42A}"/>
+                  </a:ext>
+                </a:extLst>
+              </p14:cNvPr>
+              <p14:cNvContentPartPr/>
+              <p14:nvPr/>
+            </p14:nvContentPartPr>
+            <p14:xfrm>
+              <a:off x="1627200" y="2616840"/>
+              <a:ext cx="8630640" cy="3223440"/>
+            </p14:xfrm>
+          </p:contentPart>
+        </mc:Choice>
+        <mc:Fallback>
+          <p:pic>
+            <p:nvPicPr>
+              <p:cNvPr id="7" name="Ink 6">
+                <a:extLst>
+                  <a:ext uri="{FF2B5EF4-FFF2-40B4-BE49-F238E27FC236}">
+                    <a16:creationId xmlns:a16="http://schemas.microsoft.com/office/drawing/2014/main" id="{64F93345-9D6F-C606-54A9-E3DDAEBAA42A}"/>
+                  </a:ext>
+                </a:extLst>
+              </p:cNvPr>
+              <p:cNvPicPr/>
+              <p:nvPr/>
+            </p:nvPicPr>
+            <p:blipFill>
+              <a:blip r:embed="rId5"/>
+              <a:stretch>
+                <a:fillRect/>
+              </a:stretch>
+            </p:blipFill>
+            <p:spPr>
+              <a:xfrm>
+                <a:off x="1617840" y="2607480"/>
+                <a:ext cx="8649360" cy="3242160"/>
+              </a:xfrm>
+              <a:prstGeom prst="rect">
+                <a:avLst/>
+              </a:prstGeom>
+            </p:spPr>
+          </p:pic>
+        </mc:Fallback>
+      </mc:AlternateContent>
     </p:spTree>
     <p:extLst>
       <p:ext uri="{BB962C8B-B14F-4D97-AF65-F5344CB8AC3E}">
@@ -8490,6 +9712,57 @@
           </a:prstGeom>
         </p:spPr>
       </p:pic>
+      <mc:AlternateContent xmlns:mc="http://schemas.openxmlformats.org/markup-compatibility/2006">
+        <mc:Choice xmlns:p14="http://schemas.microsoft.com/office/powerpoint/2010/main" Requires="p14">
+          <p:contentPart p14:bwMode="auto" r:id="rId3">
+            <p14:nvContentPartPr>
+              <p14:cNvPr id="3" name="Ink 2">
+                <a:extLst>
+                  <a:ext uri="{FF2B5EF4-FFF2-40B4-BE49-F238E27FC236}">
+                    <a16:creationId xmlns:a16="http://schemas.microsoft.com/office/drawing/2014/main" id="{9C8ECC87-A395-4E9D-9F85-81CFD864D809}"/>
+                  </a:ext>
+                </a:extLst>
+              </p14:cNvPr>
+              <p14:cNvContentPartPr/>
+              <p14:nvPr/>
+            </p14:nvContentPartPr>
+            <p14:xfrm>
+              <a:off x="4704120" y="5789160"/>
+              <a:ext cx="131400" cy="175320"/>
+            </p14:xfrm>
+          </p:contentPart>
+        </mc:Choice>
+        <mc:Fallback>
+          <p:pic>
+            <p:nvPicPr>
+              <p:cNvPr id="3" name="Ink 2">
+                <a:extLst>
+                  <a:ext uri="{FF2B5EF4-FFF2-40B4-BE49-F238E27FC236}">
+                    <a16:creationId xmlns:a16="http://schemas.microsoft.com/office/drawing/2014/main" id="{9C8ECC87-A395-4E9D-9F85-81CFD864D809}"/>
+                  </a:ext>
+                </a:extLst>
+              </p:cNvPr>
+              <p:cNvPicPr/>
+              <p:nvPr/>
+            </p:nvPicPr>
+            <p:blipFill>
+              <a:blip r:embed="rId4"/>
+              <a:stretch>
+                <a:fillRect/>
+              </a:stretch>
+            </p:blipFill>
+            <p:spPr>
+              <a:xfrm>
+                <a:off x="4694760" y="5779800"/>
+                <a:ext cx="150120" cy="194040"/>
+              </a:xfrm>
+              <a:prstGeom prst="rect">
+                <a:avLst/>
+              </a:prstGeom>
+            </p:spPr>
+          </p:pic>
+        </mc:Fallback>
+      </mc:AlternateContent>
     </p:spTree>
     <p:extLst>
       <p:ext uri="{BB962C8B-B14F-4D97-AF65-F5344CB8AC3E}">
@@ -9443,6 +10716,57 @@
           </p:spPr>
         </p:pic>
       </p:grpSp>
+      <mc:AlternateContent xmlns:mc="http://schemas.openxmlformats.org/markup-compatibility/2006">
+        <mc:Choice xmlns:p14="http://schemas.microsoft.com/office/powerpoint/2010/main" Requires="p14">
+          <p:contentPart p14:bwMode="auto" r:id="rId4">
+            <p14:nvContentPartPr>
+              <p14:cNvPr id="5" name="Ink 4">
+                <a:extLst>
+                  <a:ext uri="{FF2B5EF4-FFF2-40B4-BE49-F238E27FC236}">
+                    <a16:creationId xmlns:a16="http://schemas.microsoft.com/office/drawing/2014/main" id="{5D15822E-1E53-4F98-F88F-83000B42A656}"/>
+                  </a:ext>
+                </a:extLst>
+              </p14:cNvPr>
+              <p14:cNvContentPartPr/>
+              <p14:nvPr/>
+            </p14:nvContentPartPr>
+            <p14:xfrm>
+              <a:off x="5160600" y="5206320"/>
+              <a:ext cx="2749680" cy="422640"/>
+            </p14:xfrm>
+          </p:contentPart>
+        </mc:Choice>
+        <mc:Fallback>
+          <p:pic>
+            <p:nvPicPr>
+              <p:cNvPr id="5" name="Ink 4">
+                <a:extLst>
+                  <a:ext uri="{FF2B5EF4-FFF2-40B4-BE49-F238E27FC236}">
+                    <a16:creationId xmlns:a16="http://schemas.microsoft.com/office/drawing/2014/main" id="{5D15822E-1E53-4F98-F88F-83000B42A656}"/>
+                  </a:ext>
+                </a:extLst>
+              </p:cNvPr>
+              <p:cNvPicPr/>
+              <p:nvPr/>
+            </p:nvPicPr>
+            <p:blipFill>
+              <a:blip r:embed="rId5"/>
+              <a:stretch>
+                <a:fillRect/>
+              </a:stretch>
+            </p:blipFill>
+            <p:spPr>
+              <a:xfrm>
+                <a:off x="5151240" y="5196960"/>
+                <a:ext cx="2768400" cy="441360"/>
+              </a:xfrm>
+              <a:prstGeom prst="rect">
+                <a:avLst/>
+              </a:prstGeom>
+            </p:spPr>
+          </p:pic>
+        </mc:Fallback>
+      </mc:AlternateContent>
     </p:spTree>
     <p:extLst>
       <p:ext uri="{BB962C8B-B14F-4D97-AF65-F5344CB8AC3E}">
@@ -10218,6 +11542,57 @@
           </a:p>
         </p:txBody>
       </p:sp>
+      <mc:AlternateContent xmlns:mc="http://schemas.openxmlformats.org/markup-compatibility/2006">
+        <mc:Choice xmlns:p14="http://schemas.microsoft.com/office/powerpoint/2010/main" Requires="p14">
+          <p:contentPart p14:bwMode="auto" r:id="rId2">
+            <p14:nvContentPartPr>
+              <p14:cNvPr id="5" name="Ink 4">
+                <a:extLst>
+                  <a:ext uri="{FF2B5EF4-FFF2-40B4-BE49-F238E27FC236}">
+                    <a16:creationId xmlns:a16="http://schemas.microsoft.com/office/drawing/2014/main" id="{69CBD1FB-C196-4A94-E266-C9C337E20427}"/>
+                  </a:ext>
+                </a:extLst>
+              </p14:cNvPr>
+              <p14:cNvContentPartPr/>
+              <p14:nvPr/>
+            </p14:nvContentPartPr>
+            <p14:xfrm>
+              <a:off x="1437480" y="2673000"/>
+              <a:ext cx="8066160" cy="2703960"/>
+            </p14:xfrm>
+          </p:contentPart>
+        </mc:Choice>
+        <mc:Fallback>
+          <p:pic>
+            <p:nvPicPr>
+              <p:cNvPr id="5" name="Ink 4">
+                <a:extLst>
+                  <a:ext uri="{FF2B5EF4-FFF2-40B4-BE49-F238E27FC236}">
+                    <a16:creationId xmlns:a16="http://schemas.microsoft.com/office/drawing/2014/main" id="{69CBD1FB-C196-4A94-E266-C9C337E20427}"/>
+                  </a:ext>
+                </a:extLst>
+              </p:cNvPr>
+              <p:cNvPicPr/>
+              <p:nvPr/>
+            </p:nvPicPr>
+            <p:blipFill>
+              <a:blip r:embed="rId3"/>
+              <a:stretch>
+                <a:fillRect/>
+              </a:stretch>
+            </p:blipFill>
+            <p:spPr>
+              <a:xfrm>
+                <a:off x="1428120" y="2663640"/>
+                <a:ext cx="8084880" cy="2722680"/>
+              </a:xfrm>
+              <a:prstGeom prst="rect">
+                <a:avLst/>
+              </a:prstGeom>
+            </p:spPr>
+          </p:pic>
+        </mc:Fallback>
+      </mc:AlternateContent>
     </p:spTree>
     <p:extLst>
       <p:ext uri="{BB962C8B-B14F-4D97-AF65-F5344CB8AC3E}">
@@ -10400,6 +11775,57 @@
           </a:prstGeom>
         </p:spPr>
       </p:pic>
+      <mc:AlternateContent xmlns:mc="http://schemas.openxmlformats.org/markup-compatibility/2006">
+        <mc:Choice xmlns:p14="http://schemas.microsoft.com/office/powerpoint/2010/main" Requires="p14">
+          <p:contentPart p14:bwMode="auto" r:id="rId4">
+            <p14:nvContentPartPr>
+              <p14:cNvPr id="5" name="Ink 4">
+                <a:extLst>
+                  <a:ext uri="{FF2B5EF4-FFF2-40B4-BE49-F238E27FC236}">
+                    <a16:creationId xmlns:a16="http://schemas.microsoft.com/office/drawing/2014/main" id="{1107B1C3-EC7F-3B78-8AAB-EE82FF534CC2}"/>
+                  </a:ext>
+                </a:extLst>
+              </p14:cNvPr>
+              <p14:cNvContentPartPr/>
+              <p14:nvPr/>
+            </p14:nvContentPartPr>
+            <p14:xfrm>
+              <a:off x="2927880" y="1411560"/>
+              <a:ext cx="1407240" cy="39960"/>
+            </p14:xfrm>
+          </p:contentPart>
+        </mc:Choice>
+        <mc:Fallback>
+          <p:pic>
+            <p:nvPicPr>
+              <p:cNvPr id="5" name="Ink 4">
+                <a:extLst>
+                  <a:ext uri="{FF2B5EF4-FFF2-40B4-BE49-F238E27FC236}">
+                    <a16:creationId xmlns:a16="http://schemas.microsoft.com/office/drawing/2014/main" id="{1107B1C3-EC7F-3B78-8AAB-EE82FF534CC2}"/>
+                  </a:ext>
+                </a:extLst>
+              </p:cNvPr>
+              <p:cNvPicPr/>
+              <p:nvPr/>
+            </p:nvPicPr>
+            <p:blipFill>
+              <a:blip r:embed="rId5"/>
+              <a:stretch>
+                <a:fillRect/>
+              </a:stretch>
+            </p:blipFill>
+            <p:spPr>
+              <a:xfrm>
+                <a:off x="2918520" y="1402200"/>
+                <a:ext cx="1425960" cy="58680"/>
+              </a:xfrm>
+              <a:prstGeom prst="rect">
+                <a:avLst/>
+              </a:prstGeom>
+            </p:spPr>
+          </p:pic>
+        </mc:Fallback>
+      </mc:AlternateContent>
     </p:spTree>
     <p:extLst>
       <p:ext uri="{BB962C8B-B14F-4D97-AF65-F5344CB8AC3E}">
@@ -10742,6 +12168,108 @@
           </a:prstGeom>
         </p:spPr>
       </p:pic>
+      <mc:AlternateContent xmlns:mc="http://schemas.openxmlformats.org/markup-compatibility/2006">
+        <mc:Choice xmlns:p14="http://schemas.microsoft.com/office/powerpoint/2010/main" Requires="p14">
+          <p:contentPart p14:bwMode="auto" r:id="rId4">
+            <p14:nvContentPartPr>
+              <p14:cNvPr id="6" name="Ink 5">
+                <a:extLst>
+                  <a:ext uri="{FF2B5EF4-FFF2-40B4-BE49-F238E27FC236}">
+                    <a16:creationId xmlns:a16="http://schemas.microsoft.com/office/drawing/2014/main" id="{F7182E8F-7760-B63A-F206-7919D8D65A1F}"/>
+                  </a:ext>
+                </a:extLst>
+              </p14:cNvPr>
+              <p14:cNvContentPartPr/>
+              <p14:nvPr/>
+            </p14:nvContentPartPr>
+            <p14:xfrm>
+              <a:off x="1307160" y="1310040"/>
+              <a:ext cx="2562840" cy="4341960"/>
+            </p14:xfrm>
+          </p:contentPart>
+        </mc:Choice>
+        <mc:Fallback>
+          <p:pic>
+            <p:nvPicPr>
+              <p:cNvPr id="6" name="Ink 5">
+                <a:extLst>
+                  <a:ext uri="{FF2B5EF4-FFF2-40B4-BE49-F238E27FC236}">
+                    <a16:creationId xmlns:a16="http://schemas.microsoft.com/office/drawing/2014/main" id="{F7182E8F-7760-B63A-F206-7919D8D65A1F}"/>
+                  </a:ext>
+                </a:extLst>
+              </p:cNvPr>
+              <p:cNvPicPr/>
+              <p:nvPr/>
+            </p:nvPicPr>
+            <p:blipFill>
+              <a:blip r:embed="rId5"/>
+              <a:stretch>
+                <a:fillRect/>
+              </a:stretch>
+            </p:blipFill>
+            <p:spPr>
+              <a:xfrm>
+                <a:off x="1297800" y="1300680"/>
+                <a:ext cx="2581560" cy="4360680"/>
+              </a:xfrm>
+              <a:prstGeom prst="rect">
+                <a:avLst/>
+              </a:prstGeom>
+            </p:spPr>
+          </p:pic>
+        </mc:Fallback>
+      </mc:AlternateContent>
+      <mc:AlternateContent xmlns:mc="http://schemas.openxmlformats.org/markup-compatibility/2006">
+        <mc:Choice xmlns:p14="http://schemas.microsoft.com/office/powerpoint/2010/main" Requires="p14">
+          <p:contentPart p14:bwMode="auto" r:id="rId6">
+            <p14:nvContentPartPr>
+              <p14:cNvPr id="8" name="Ink 7">
+                <a:extLst>
+                  <a:ext uri="{FF2B5EF4-FFF2-40B4-BE49-F238E27FC236}">
+                    <a16:creationId xmlns:a16="http://schemas.microsoft.com/office/drawing/2014/main" id="{9D434755-A9AC-1826-ED84-858AEDF689F1}"/>
+                  </a:ext>
+                </a:extLst>
+              </p14:cNvPr>
+              <p14:cNvContentPartPr/>
+              <p14:nvPr/>
+            </p14:nvContentPartPr>
+            <p14:xfrm>
+              <a:off x="9590400" y="2494800"/>
+              <a:ext cx="189000" cy="199440"/>
+            </p14:xfrm>
+          </p:contentPart>
+        </mc:Choice>
+        <mc:Fallback>
+          <p:pic>
+            <p:nvPicPr>
+              <p:cNvPr id="8" name="Ink 7">
+                <a:extLst>
+                  <a:ext uri="{FF2B5EF4-FFF2-40B4-BE49-F238E27FC236}">
+                    <a16:creationId xmlns:a16="http://schemas.microsoft.com/office/drawing/2014/main" id="{9D434755-A9AC-1826-ED84-858AEDF689F1}"/>
+                  </a:ext>
+                </a:extLst>
+              </p:cNvPr>
+              <p:cNvPicPr/>
+              <p:nvPr/>
+            </p:nvPicPr>
+            <p:blipFill>
+              <a:blip r:embed="rId7"/>
+              <a:stretch>
+                <a:fillRect/>
+              </a:stretch>
+            </p:blipFill>
+            <p:spPr>
+              <a:xfrm>
+                <a:off x="9581040" y="2485440"/>
+                <a:ext cx="207720" cy="218160"/>
+              </a:xfrm>
+              <a:prstGeom prst="rect">
+                <a:avLst/>
+              </a:prstGeom>
+            </p:spPr>
+          </p:pic>
+        </mc:Fallback>
+      </mc:AlternateContent>
     </p:spTree>
     <p:extLst>
       <p:ext uri="{BB962C8B-B14F-4D97-AF65-F5344CB8AC3E}">
@@ -10922,6 +12450,57 @@
           </a:prstGeom>
         </p:spPr>
       </p:pic>
+      <mc:AlternateContent xmlns:mc="http://schemas.openxmlformats.org/markup-compatibility/2006">
+        <mc:Choice xmlns:p14="http://schemas.microsoft.com/office/powerpoint/2010/main" Requires="p14">
+          <p:contentPart p14:bwMode="auto" r:id="rId4">
+            <p14:nvContentPartPr>
+              <p14:cNvPr id="5" name="Ink 4">
+                <a:extLst>
+                  <a:ext uri="{FF2B5EF4-FFF2-40B4-BE49-F238E27FC236}">
+                    <a16:creationId xmlns:a16="http://schemas.microsoft.com/office/drawing/2014/main" id="{162E1EDC-1549-75DF-AECD-64DF8DA0EB32}"/>
+                  </a:ext>
+                </a:extLst>
+              </p14:cNvPr>
+              <p14:cNvContentPartPr/>
+              <p14:nvPr/>
+            </p14:nvContentPartPr>
+            <p14:xfrm>
+              <a:off x="920880" y="1250280"/>
+              <a:ext cx="1854360" cy="32760"/>
+            </p14:xfrm>
+          </p:contentPart>
+        </mc:Choice>
+        <mc:Fallback>
+          <p:pic>
+            <p:nvPicPr>
+              <p:cNvPr id="5" name="Ink 4">
+                <a:extLst>
+                  <a:ext uri="{FF2B5EF4-FFF2-40B4-BE49-F238E27FC236}">
+                    <a16:creationId xmlns:a16="http://schemas.microsoft.com/office/drawing/2014/main" id="{162E1EDC-1549-75DF-AECD-64DF8DA0EB32}"/>
+                  </a:ext>
+                </a:extLst>
+              </p:cNvPr>
+              <p:cNvPicPr/>
+              <p:nvPr/>
+            </p:nvPicPr>
+            <p:blipFill>
+              <a:blip r:embed="rId5"/>
+              <a:stretch>
+                <a:fillRect/>
+              </a:stretch>
+            </p:blipFill>
+            <p:spPr>
+              <a:xfrm>
+                <a:off x="911520" y="1240920"/>
+                <a:ext cx="1873080" cy="51480"/>
+              </a:xfrm>
+              <a:prstGeom prst="rect">
+                <a:avLst/>
+              </a:prstGeom>
+            </p:spPr>
+          </p:pic>
+        </mc:Fallback>
+      </mc:AlternateContent>
     </p:spTree>
     <p:extLst>
       <p:ext uri="{BB962C8B-B14F-4D97-AF65-F5344CB8AC3E}">
@@ -11130,6 +12709,57 @@
           </a:p>
         </p:txBody>
       </p:sp>
+      <mc:AlternateContent xmlns:mc="http://schemas.openxmlformats.org/markup-compatibility/2006">
+        <mc:Choice xmlns:p14="http://schemas.microsoft.com/office/powerpoint/2010/main" Requires="p14">
+          <p:contentPart p14:bwMode="auto" r:id="rId2">
+            <p14:nvContentPartPr>
+              <p14:cNvPr id="5" name="Ink 4">
+                <a:extLst>
+                  <a:ext uri="{FF2B5EF4-FFF2-40B4-BE49-F238E27FC236}">
+                    <a16:creationId xmlns:a16="http://schemas.microsoft.com/office/drawing/2014/main" id="{89E537F6-716F-B301-16AF-B29BE5AAEDBC}"/>
+                  </a:ext>
+                </a:extLst>
+              </p14:cNvPr>
+              <p14:cNvContentPartPr/>
+              <p14:nvPr/>
+            </p14:nvContentPartPr>
+            <p14:xfrm>
+              <a:off x="7731000" y="950400"/>
+              <a:ext cx="2787840" cy="905040"/>
+            </p14:xfrm>
+          </p:contentPart>
+        </mc:Choice>
+        <mc:Fallback>
+          <p:pic>
+            <p:nvPicPr>
+              <p:cNvPr id="5" name="Ink 4">
+                <a:extLst>
+                  <a:ext uri="{FF2B5EF4-FFF2-40B4-BE49-F238E27FC236}">
+                    <a16:creationId xmlns:a16="http://schemas.microsoft.com/office/drawing/2014/main" id="{89E537F6-716F-B301-16AF-B29BE5AAEDBC}"/>
+                  </a:ext>
+                </a:extLst>
+              </p:cNvPr>
+              <p:cNvPicPr/>
+              <p:nvPr/>
+            </p:nvPicPr>
+            <p:blipFill>
+              <a:blip r:embed="rId3"/>
+              <a:stretch>
+                <a:fillRect/>
+              </a:stretch>
+            </p:blipFill>
+            <p:spPr>
+              <a:xfrm>
+                <a:off x="7721640" y="941040"/>
+                <a:ext cx="2806560" cy="923760"/>
+              </a:xfrm>
+              <a:prstGeom prst="rect">
+                <a:avLst/>
+              </a:prstGeom>
+            </p:spPr>
+          </p:pic>
+        </mc:Fallback>
+      </mc:AlternateContent>
     </p:spTree>
     <p:extLst>
       <p:ext uri="{BB962C8B-B14F-4D97-AF65-F5344CB8AC3E}">
@@ -15639,6 +17269,57 @@
           </a:p>
         </p:txBody>
       </p:sp>
+      <mc:AlternateContent xmlns:mc="http://schemas.openxmlformats.org/markup-compatibility/2006">
+        <mc:Choice xmlns:p14="http://schemas.microsoft.com/office/powerpoint/2010/main" Requires="p14">
+          <p:contentPart p14:bwMode="auto" r:id="rId2">
+            <p14:nvContentPartPr>
+              <p14:cNvPr id="6" name="Ink 5">
+                <a:extLst>
+                  <a:ext uri="{FF2B5EF4-FFF2-40B4-BE49-F238E27FC236}">
+                    <a16:creationId xmlns:a16="http://schemas.microsoft.com/office/drawing/2014/main" id="{7911B6B0-E167-F505-D27D-905D87CC2578}"/>
+                  </a:ext>
+                </a:extLst>
+              </p14:cNvPr>
+              <p14:cNvContentPartPr/>
+              <p14:nvPr/>
+            </p14:nvContentPartPr>
+            <p14:xfrm>
+              <a:off x="1346760" y="2385360"/>
+              <a:ext cx="1439280" cy="3430080"/>
+            </p14:xfrm>
+          </p:contentPart>
+        </mc:Choice>
+        <mc:Fallback>
+          <p:pic>
+            <p:nvPicPr>
+              <p:cNvPr id="6" name="Ink 5">
+                <a:extLst>
+                  <a:ext uri="{FF2B5EF4-FFF2-40B4-BE49-F238E27FC236}">
+                    <a16:creationId xmlns:a16="http://schemas.microsoft.com/office/drawing/2014/main" id="{7911B6B0-E167-F505-D27D-905D87CC2578}"/>
+                  </a:ext>
+                </a:extLst>
+              </p:cNvPr>
+              <p:cNvPicPr/>
+              <p:nvPr/>
+            </p:nvPicPr>
+            <p:blipFill>
+              <a:blip r:embed="rId3"/>
+              <a:stretch>
+                <a:fillRect/>
+              </a:stretch>
+            </p:blipFill>
+            <p:spPr>
+              <a:xfrm>
+                <a:off x="1337400" y="2376000"/>
+                <a:ext cx="1458000" cy="3448800"/>
+              </a:xfrm>
+              <a:prstGeom prst="rect">
+                <a:avLst/>
+              </a:prstGeom>
+            </p:spPr>
+          </p:pic>
+        </mc:Fallback>
+      </mc:AlternateContent>
     </p:spTree>
     <p:extLst>
       <p:ext uri="{BB962C8B-B14F-4D97-AF65-F5344CB8AC3E}">
@@ -18569,6 +20250,57 @@
           </a:p>
         </p:txBody>
       </p:sp>
+      <mc:AlternateContent xmlns:mc="http://schemas.openxmlformats.org/markup-compatibility/2006">
+        <mc:Choice xmlns:p14="http://schemas.microsoft.com/office/powerpoint/2010/main" Requires="p14">
+          <p:contentPart p14:bwMode="auto" r:id="rId2">
+            <p14:nvContentPartPr>
+              <p14:cNvPr id="9" name="Ink 8">
+                <a:extLst>
+                  <a:ext uri="{FF2B5EF4-FFF2-40B4-BE49-F238E27FC236}">
+                    <a16:creationId xmlns:a16="http://schemas.microsoft.com/office/drawing/2014/main" id="{EE194557-D477-1780-0DCC-D8B3C8A0C4CC}"/>
+                  </a:ext>
+                </a:extLst>
+              </p14:cNvPr>
+              <p14:cNvContentPartPr/>
+              <p14:nvPr/>
+            </p14:nvContentPartPr>
+            <p14:xfrm>
+              <a:off x="691200" y="1541880"/>
+              <a:ext cx="8648280" cy="1887840"/>
+            </p14:xfrm>
+          </p:contentPart>
+        </mc:Choice>
+        <mc:Fallback>
+          <p:pic>
+            <p:nvPicPr>
+              <p:cNvPr id="9" name="Ink 8">
+                <a:extLst>
+                  <a:ext uri="{FF2B5EF4-FFF2-40B4-BE49-F238E27FC236}">
+                    <a16:creationId xmlns:a16="http://schemas.microsoft.com/office/drawing/2014/main" id="{EE194557-D477-1780-0DCC-D8B3C8A0C4CC}"/>
+                  </a:ext>
+                </a:extLst>
+              </p:cNvPr>
+              <p:cNvPicPr/>
+              <p:nvPr/>
+            </p:nvPicPr>
+            <p:blipFill>
+              <a:blip r:embed="rId3"/>
+              <a:stretch>
+                <a:fillRect/>
+              </a:stretch>
+            </p:blipFill>
+            <p:spPr>
+              <a:xfrm>
+                <a:off x="681840" y="1532520"/>
+                <a:ext cx="8667000" cy="1906560"/>
+              </a:xfrm>
+              <a:prstGeom prst="rect">
+                <a:avLst/>
+              </a:prstGeom>
+            </p:spPr>
+          </p:pic>
+        </mc:Fallback>
+      </mc:AlternateContent>
     </p:spTree>
     <p:extLst>
       <p:ext uri="{BB962C8B-B14F-4D97-AF65-F5344CB8AC3E}">
@@ -18917,6 +20649,57 @@
           </a:p>
         </p:txBody>
       </p:sp>
+      <mc:AlternateContent xmlns:mc="http://schemas.openxmlformats.org/markup-compatibility/2006">
+        <mc:Choice xmlns:p14="http://schemas.microsoft.com/office/powerpoint/2010/main" Requires="p14">
+          <p:contentPart p14:bwMode="auto" r:id="rId2">
+            <p14:nvContentPartPr>
+              <p14:cNvPr id="9" name="Ink 8">
+                <a:extLst>
+                  <a:ext uri="{FF2B5EF4-FFF2-40B4-BE49-F238E27FC236}">
+                    <a16:creationId xmlns:a16="http://schemas.microsoft.com/office/drawing/2014/main" id="{77420F15-B65E-80AC-8B3C-19E421472BB3}"/>
+                  </a:ext>
+                </a:extLst>
+              </p14:cNvPr>
+              <p14:cNvContentPartPr/>
+              <p14:nvPr/>
+            </p14:nvContentPartPr>
+            <p14:xfrm>
+              <a:off x="391680" y="1416240"/>
+              <a:ext cx="8901000" cy="1766880"/>
+            </p14:xfrm>
+          </p:contentPart>
+        </mc:Choice>
+        <mc:Fallback>
+          <p:pic>
+            <p:nvPicPr>
+              <p:cNvPr id="9" name="Ink 8">
+                <a:extLst>
+                  <a:ext uri="{FF2B5EF4-FFF2-40B4-BE49-F238E27FC236}">
+                    <a16:creationId xmlns:a16="http://schemas.microsoft.com/office/drawing/2014/main" id="{77420F15-B65E-80AC-8B3C-19E421472BB3}"/>
+                  </a:ext>
+                </a:extLst>
+              </p:cNvPr>
+              <p:cNvPicPr/>
+              <p:nvPr/>
+            </p:nvPicPr>
+            <p:blipFill>
+              <a:blip r:embed="rId3"/>
+              <a:stretch>
+                <a:fillRect/>
+              </a:stretch>
+            </p:blipFill>
+            <p:spPr>
+              <a:xfrm>
+                <a:off x="382320" y="1406880"/>
+                <a:ext cx="8919720" cy="1785600"/>
+              </a:xfrm>
+              <a:prstGeom prst="rect">
+                <a:avLst/>
+              </a:prstGeom>
+            </p:spPr>
+          </p:pic>
+        </mc:Fallback>
+      </mc:AlternateContent>
     </p:spTree>
     <p:extLst>
       <p:ext uri="{BB962C8B-B14F-4D97-AF65-F5344CB8AC3E}">
@@ -19295,6 +21078,57 @@
           </a:p>
         </p:txBody>
       </p:sp>
+      <mc:AlternateContent xmlns:mc="http://schemas.openxmlformats.org/markup-compatibility/2006">
+        <mc:Choice xmlns:p14="http://schemas.microsoft.com/office/powerpoint/2010/main" Requires="p14">
+          <p:contentPart p14:bwMode="auto" r:id="rId2">
+            <p14:nvContentPartPr>
+              <p14:cNvPr id="9" name="Ink 8">
+                <a:extLst>
+                  <a:ext uri="{FF2B5EF4-FFF2-40B4-BE49-F238E27FC236}">
+                    <a16:creationId xmlns:a16="http://schemas.microsoft.com/office/drawing/2014/main" id="{5C88DC32-9B46-DA49-2223-27DBE202D579}"/>
+                  </a:ext>
+                </a:extLst>
+              </p14:cNvPr>
+              <p14:cNvContentPartPr/>
+              <p14:nvPr/>
+            </p14:nvContentPartPr>
+            <p14:xfrm>
+              <a:off x="797760" y="814680"/>
+              <a:ext cx="8580960" cy="2646000"/>
+            </p14:xfrm>
+          </p:contentPart>
+        </mc:Choice>
+        <mc:Fallback>
+          <p:pic>
+            <p:nvPicPr>
+              <p:cNvPr id="9" name="Ink 8">
+                <a:extLst>
+                  <a:ext uri="{FF2B5EF4-FFF2-40B4-BE49-F238E27FC236}">
+                    <a16:creationId xmlns:a16="http://schemas.microsoft.com/office/drawing/2014/main" id="{5C88DC32-9B46-DA49-2223-27DBE202D579}"/>
+                  </a:ext>
+                </a:extLst>
+              </p:cNvPr>
+              <p:cNvPicPr/>
+              <p:nvPr/>
+            </p:nvPicPr>
+            <p:blipFill>
+              <a:blip r:embed="rId3"/>
+              <a:stretch>
+                <a:fillRect/>
+              </a:stretch>
+            </p:blipFill>
+            <p:spPr>
+              <a:xfrm>
+                <a:off x="788400" y="805320"/>
+                <a:ext cx="8599680" cy="2664720"/>
+              </a:xfrm>
+              <a:prstGeom prst="rect">
+                <a:avLst/>
+              </a:prstGeom>
+            </p:spPr>
+          </p:pic>
+        </mc:Fallback>
+      </mc:AlternateContent>
     </p:spTree>
     <p:extLst>
       <p:ext uri="{BB962C8B-B14F-4D97-AF65-F5344CB8AC3E}">
@@ -19683,6 +21517,57 @@
           </a:p>
         </p:txBody>
       </p:sp>
+      <mc:AlternateContent xmlns:mc="http://schemas.openxmlformats.org/markup-compatibility/2006">
+        <mc:Choice xmlns:p14="http://schemas.microsoft.com/office/powerpoint/2010/main" Requires="p14">
+          <p:contentPart p14:bwMode="auto" r:id="rId2">
+            <p14:nvContentPartPr>
+              <p14:cNvPr id="9" name="Ink 8">
+                <a:extLst>
+                  <a:ext uri="{FF2B5EF4-FFF2-40B4-BE49-F238E27FC236}">
+                    <a16:creationId xmlns:a16="http://schemas.microsoft.com/office/drawing/2014/main" id="{0FE64467-3851-EDA8-2841-57F6EFF2D2AB}"/>
+                  </a:ext>
+                </a:extLst>
+              </p14:cNvPr>
+              <p14:cNvContentPartPr/>
+              <p14:nvPr/>
+            </p14:nvContentPartPr>
+            <p14:xfrm>
+              <a:off x="329040" y="1139760"/>
+              <a:ext cx="10872720" cy="3604320"/>
+            </p14:xfrm>
+          </p:contentPart>
+        </mc:Choice>
+        <mc:Fallback>
+          <p:pic>
+            <p:nvPicPr>
+              <p:cNvPr id="9" name="Ink 8">
+                <a:extLst>
+                  <a:ext uri="{FF2B5EF4-FFF2-40B4-BE49-F238E27FC236}">
+                    <a16:creationId xmlns:a16="http://schemas.microsoft.com/office/drawing/2014/main" id="{0FE64467-3851-EDA8-2841-57F6EFF2D2AB}"/>
+                  </a:ext>
+                </a:extLst>
+              </p:cNvPr>
+              <p:cNvPicPr/>
+              <p:nvPr/>
+            </p:nvPicPr>
+            <p:blipFill>
+              <a:blip r:embed="rId3"/>
+              <a:stretch>
+                <a:fillRect/>
+              </a:stretch>
+            </p:blipFill>
+            <p:spPr>
+              <a:xfrm>
+                <a:off x="319680" y="1130400"/>
+                <a:ext cx="10891440" cy="3623040"/>
+              </a:xfrm>
+              <a:prstGeom prst="rect">
+                <a:avLst/>
+              </a:prstGeom>
+            </p:spPr>
+          </p:pic>
+        </mc:Fallback>
+      </mc:AlternateContent>
     </p:spTree>
     <p:extLst>
       <p:ext uri="{BB962C8B-B14F-4D97-AF65-F5344CB8AC3E}">
@@ -19872,6 +21757,57 @@
           </a:p>
         </p:txBody>
       </p:sp>
+      <mc:AlternateContent xmlns:mc="http://schemas.openxmlformats.org/markup-compatibility/2006">
+        <mc:Choice xmlns:p14="http://schemas.microsoft.com/office/powerpoint/2010/main" Requires="p14">
+          <p:contentPart p14:bwMode="auto" r:id="rId2">
+            <p14:nvContentPartPr>
+              <p14:cNvPr id="6" name="Ink 5">
+                <a:extLst>
+                  <a:ext uri="{FF2B5EF4-FFF2-40B4-BE49-F238E27FC236}">
+                    <a16:creationId xmlns:a16="http://schemas.microsoft.com/office/drawing/2014/main" id="{43D82FB3-CB13-5DB6-7F20-EA6086E0CB0A}"/>
+                  </a:ext>
+                </a:extLst>
+              </p14:cNvPr>
+              <p14:cNvContentPartPr/>
+              <p14:nvPr/>
+            </p14:nvContentPartPr>
+            <p14:xfrm>
+              <a:off x="2939400" y="4273920"/>
+              <a:ext cx="941400" cy="417240"/>
+            </p14:xfrm>
+          </p:contentPart>
+        </mc:Choice>
+        <mc:Fallback>
+          <p:pic>
+            <p:nvPicPr>
+              <p:cNvPr id="6" name="Ink 5">
+                <a:extLst>
+                  <a:ext uri="{FF2B5EF4-FFF2-40B4-BE49-F238E27FC236}">
+                    <a16:creationId xmlns:a16="http://schemas.microsoft.com/office/drawing/2014/main" id="{43D82FB3-CB13-5DB6-7F20-EA6086E0CB0A}"/>
+                  </a:ext>
+                </a:extLst>
+              </p:cNvPr>
+              <p:cNvPicPr/>
+              <p:nvPr/>
+            </p:nvPicPr>
+            <p:blipFill>
+              <a:blip r:embed="rId3"/>
+              <a:stretch>
+                <a:fillRect/>
+              </a:stretch>
+            </p:blipFill>
+            <p:spPr>
+              <a:xfrm>
+                <a:off x="2930040" y="4264560"/>
+                <a:ext cx="960120" cy="435960"/>
+              </a:xfrm>
+              <a:prstGeom prst="rect">
+                <a:avLst/>
+              </a:prstGeom>
+            </p:spPr>
+          </p:pic>
+        </mc:Fallback>
+      </mc:AlternateContent>
     </p:spTree>
     <p:extLst>
       <p:ext uri="{BB962C8B-B14F-4D97-AF65-F5344CB8AC3E}">
@@ -20196,6 +22132,57 @@
           </a:p>
         </p:txBody>
       </p:sp>
+      <mc:AlternateContent xmlns:mc="http://schemas.openxmlformats.org/markup-compatibility/2006">
+        <mc:Choice xmlns:p14="http://schemas.microsoft.com/office/powerpoint/2010/main" Requires="p14">
+          <p:contentPart p14:bwMode="auto" r:id="rId2">
+            <p14:nvContentPartPr>
+              <p14:cNvPr id="6" name="Ink 5">
+                <a:extLst>
+                  <a:ext uri="{FF2B5EF4-FFF2-40B4-BE49-F238E27FC236}">
+                    <a16:creationId xmlns:a16="http://schemas.microsoft.com/office/drawing/2014/main" id="{C19A17C4-C249-A274-7AA4-464764F6D49C}"/>
+                  </a:ext>
+                </a:extLst>
+              </p14:cNvPr>
+              <p14:cNvContentPartPr/>
+              <p14:nvPr/>
+            </p14:nvContentPartPr>
+            <p14:xfrm>
+              <a:off x="449640" y="1774800"/>
+              <a:ext cx="6603120" cy="1607040"/>
+            </p14:xfrm>
+          </p:contentPart>
+        </mc:Choice>
+        <mc:Fallback>
+          <p:pic>
+            <p:nvPicPr>
+              <p:cNvPr id="6" name="Ink 5">
+                <a:extLst>
+                  <a:ext uri="{FF2B5EF4-FFF2-40B4-BE49-F238E27FC236}">
+                    <a16:creationId xmlns:a16="http://schemas.microsoft.com/office/drawing/2014/main" id="{C19A17C4-C249-A274-7AA4-464764F6D49C}"/>
+                  </a:ext>
+                </a:extLst>
+              </p:cNvPr>
+              <p:cNvPicPr/>
+              <p:nvPr/>
+            </p:nvPicPr>
+            <p:blipFill>
+              <a:blip r:embed="rId3"/>
+              <a:stretch>
+                <a:fillRect/>
+              </a:stretch>
+            </p:blipFill>
+            <p:spPr>
+              <a:xfrm>
+                <a:off x="440280" y="1765440"/>
+                <a:ext cx="6621840" cy="1625760"/>
+              </a:xfrm>
+              <a:prstGeom prst="rect">
+                <a:avLst/>
+              </a:prstGeom>
+            </p:spPr>
+          </p:pic>
+        </mc:Fallback>
+      </mc:AlternateContent>
     </p:spTree>
     <p:extLst>
       <p:ext uri="{BB962C8B-B14F-4D97-AF65-F5344CB8AC3E}">
@@ -20533,6 +22520,57 @@
           </a:p>
         </p:txBody>
       </p:sp>
+      <mc:AlternateContent xmlns:mc="http://schemas.openxmlformats.org/markup-compatibility/2006">
+        <mc:Choice xmlns:p14="http://schemas.microsoft.com/office/powerpoint/2010/main" Requires="p14">
+          <p:contentPart p14:bwMode="auto" r:id="rId2">
+            <p14:nvContentPartPr>
+              <p14:cNvPr id="6" name="Ink 5">
+                <a:extLst>
+                  <a:ext uri="{FF2B5EF4-FFF2-40B4-BE49-F238E27FC236}">
+                    <a16:creationId xmlns:a16="http://schemas.microsoft.com/office/drawing/2014/main" id="{FA24C0B7-4041-F353-FD02-045E5F216F2D}"/>
+                  </a:ext>
+                </a:extLst>
+              </p14:cNvPr>
+              <p14:cNvContentPartPr/>
+              <p14:nvPr/>
+            </p14:nvContentPartPr>
+            <p14:xfrm>
+              <a:off x="131040" y="1624320"/>
+              <a:ext cx="7632720" cy="1810800"/>
+            </p14:xfrm>
+          </p:contentPart>
+        </mc:Choice>
+        <mc:Fallback>
+          <p:pic>
+            <p:nvPicPr>
+              <p:cNvPr id="6" name="Ink 5">
+                <a:extLst>
+                  <a:ext uri="{FF2B5EF4-FFF2-40B4-BE49-F238E27FC236}">
+                    <a16:creationId xmlns:a16="http://schemas.microsoft.com/office/drawing/2014/main" id="{FA24C0B7-4041-F353-FD02-045E5F216F2D}"/>
+                  </a:ext>
+                </a:extLst>
+              </p:cNvPr>
+              <p:cNvPicPr/>
+              <p:nvPr/>
+            </p:nvPicPr>
+            <p:blipFill>
+              <a:blip r:embed="rId3"/>
+              <a:stretch>
+                <a:fillRect/>
+              </a:stretch>
+            </p:blipFill>
+            <p:spPr>
+              <a:xfrm>
+                <a:off x="121680" y="1614960"/>
+                <a:ext cx="7651440" cy="1829520"/>
+              </a:xfrm>
+              <a:prstGeom prst="rect">
+                <a:avLst/>
+              </a:prstGeom>
+            </p:spPr>
+          </p:pic>
+        </mc:Fallback>
+      </mc:AlternateContent>
     </p:spTree>
     <p:extLst>
       <p:ext uri="{BB962C8B-B14F-4D97-AF65-F5344CB8AC3E}">
@@ -20921,6 +22959,57 @@
           </a:p>
         </p:txBody>
       </p:sp>
+      <mc:AlternateContent xmlns:mc="http://schemas.openxmlformats.org/markup-compatibility/2006">
+        <mc:Choice xmlns:p14="http://schemas.microsoft.com/office/powerpoint/2010/main" Requires="p14">
+          <p:contentPart p14:bwMode="auto" r:id="rId2">
+            <p14:nvContentPartPr>
+              <p14:cNvPr id="7" name="Ink 6">
+                <a:extLst>
+                  <a:ext uri="{FF2B5EF4-FFF2-40B4-BE49-F238E27FC236}">
+                    <a16:creationId xmlns:a16="http://schemas.microsoft.com/office/drawing/2014/main" id="{514649DC-C2A9-813F-399B-DB04E560F7E4}"/>
+                  </a:ext>
+                </a:extLst>
+              </p14:cNvPr>
+              <p14:cNvContentPartPr/>
+              <p14:nvPr/>
+            </p14:nvContentPartPr>
+            <p14:xfrm>
+              <a:off x="4307040" y="4773240"/>
+              <a:ext cx="7599600" cy="332640"/>
+            </p14:xfrm>
+          </p:contentPart>
+        </mc:Choice>
+        <mc:Fallback>
+          <p:pic>
+            <p:nvPicPr>
+              <p:cNvPr id="7" name="Ink 6">
+                <a:extLst>
+                  <a:ext uri="{FF2B5EF4-FFF2-40B4-BE49-F238E27FC236}">
+                    <a16:creationId xmlns:a16="http://schemas.microsoft.com/office/drawing/2014/main" id="{514649DC-C2A9-813F-399B-DB04E560F7E4}"/>
+                  </a:ext>
+                </a:extLst>
+              </p:cNvPr>
+              <p:cNvPicPr/>
+              <p:nvPr/>
+            </p:nvPicPr>
+            <p:blipFill>
+              <a:blip r:embed="rId3"/>
+              <a:stretch>
+                <a:fillRect/>
+              </a:stretch>
+            </p:blipFill>
+            <p:spPr>
+              <a:xfrm>
+                <a:off x="4297680" y="4763880"/>
+                <a:ext cx="7618320" cy="351360"/>
+              </a:xfrm>
+              <a:prstGeom prst="rect">
+                <a:avLst/>
+              </a:prstGeom>
+            </p:spPr>
+          </p:pic>
+        </mc:Fallback>
+      </mc:AlternateContent>
     </p:spTree>
     <p:extLst>
       <p:ext uri="{BB962C8B-B14F-4D97-AF65-F5344CB8AC3E}">
@@ -22127,6 +24216,57 @@
           </a:p>
         </p:txBody>
       </p:sp>
+      <mc:AlternateContent xmlns:mc="http://schemas.openxmlformats.org/markup-compatibility/2006">
+        <mc:Choice xmlns:p14="http://schemas.microsoft.com/office/powerpoint/2010/main" Requires="p14">
+          <p:contentPart p14:bwMode="auto" r:id="rId2">
+            <p14:nvContentPartPr>
+              <p14:cNvPr id="6" name="Ink 5">
+                <a:extLst>
+                  <a:ext uri="{FF2B5EF4-FFF2-40B4-BE49-F238E27FC236}">
+                    <a16:creationId xmlns:a16="http://schemas.microsoft.com/office/drawing/2014/main" id="{77AF4388-EF12-A8B2-4260-3DCEFB6C4BF4}"/>
+                  </a:ext>
+                </a:extLst>
+              </p14:cNvPr>
+              <p14:cNvContentPartPr/>
+              <p14:nvPr/>
+            </p14:nvContentPartPr>
+            <p14:xfrm>
+              <a:off x="1898280" y="4466880"/>
+              <a:ext cx="3138840" cy="32760"/>
+            </p14:xfrm>
+          </p:contentPart>
+        </mc:Choice>
+        <mc:Fallback>
+          <p:pic>
+            <p:nvPicPr>
+              <p:cNvPr id="6" name="Ink 5">
+                <a:extLst>
+                  <a:ext uri="{FF2B5EF4-FFF2-40B4-BE49-F238E27FC236}">
+                    <a16:creationId xmlns:a16="http://schemas.microsoft.com/office/drawing/2014/main" id="{77AF4388-EF12-A8B2-4260-3DCEFB6C4BF4}"/>
+                  </a:ext>
+                </a:extLst>
+              </p:cNvPr>
+              <p:cNvPicPr/>
+              <p:nvPr/>
+            </p:nvPicPr>
+            <p:blipFill>
+              <a:blip r:embed="rId3"/>
+              <a:stretch>
+                <a:fillRect/>
+              </a:stretch>
+            </p:blipFill>
+            <p:spPr>
+              <a:xfrm>
+                <a:off x="1888920" y="4457520"/>
+                <a:ext cx="3157560" cy="51480"/>
+              </a:xfrm>
+              <a:prstGeom prst="rect">
+                <a:avLst/>
+              </a:prstGeom>
+            </p:spPr>
+          </p:pic>
+        </mc:Fallback>
+      </mc:AlternateContent>
     </p:spTree>
     <p:extLst>
       <p:ext uri="{BB962C8B-B14F-4D97-AF65-F5344CB8AC3E}">
@@ -22316,6 +24456,57 @@
           </a:p>
         </p:txBody>
       </p:sp>
+      <mc:AlternateContent xmlns:mc="http://schemas.openxmlformats.org/markup-compatibility/2006">
+        <mc:Choice xmlns:p14="http://schemas.microsoft.com/office/powerpoint/2010/main" Requires="p14">
+          <p:contentPart p14:bwMode="auto" r:id="rId2">
+            <p14:nvContentPartPr>
+              <p14:cNvPr id="6" name="Ink 5">
+                <a:extLst>
+                  <a:ext uri="{FF2B5EF4-FFF2-40B4-BE49-F238E27FC236}">
+                    <a16:creationId xmlns:a16="http://schemas.microsoft.com/office/drawing/2014/main" id="{4AD5836E-E2AA-27DC-6AB1-AC3A85BC9C5A}"/>
+                  </a:ext>
+                </a:extLst>
+              </p14:cNvPr>
+              <p14:cNvContentPartPr/>
+              <p14:nvPr/>
+            </p14:nvContentPartPr>
+            <p14:xfrm>
+              <a:off x="278640" y="2786400"/>
+              <a:ext cx="5096160" cy="2310840"/>
+            </p14:xfrm>
+          </p:contentPart>
+        </mc:Choice>
+        <mc:Fallback>
+          <p:pic>
+            <p:nvPicPr>
+              <p:cNvPr id="6" name="Ink 5">
+                <a:extLst>
+                  <a:ext uri="{FF2B5EF4-FFF2-40B4-BE49-F238E27FC236}">
+                    <a16:creationId xmlns:a16="http://schemas.microsoft.com/office/drawing/2014/main" id="{4AD5836E-E2AA-27DC-6AB1-AC3A85BC9C5A}"/>
+                  </a:ext>
+                </a:extLst>
+              </p:cNvPr>
+              <p:cNvPicPr/>
+              <p:nvPr/>
+            </p:nvPicPr>
+            <p:blipFill>
+              <a:blip r:embed="rId3"/>
+              <a:stretch>
+                <a:fillRect/>
+              </a:stretch>
+            </p:blipFill>
+            <p:spPr>
+              <a:xfrm>
+                <a:off x="269280" y="2777040"/>
+                <a:ext cx="5114880" cy="2329560"/>
+              </a:xfrm>
+              <a:prstGeom prst="rect">
+                <a:avLst/>
+              </a:prstGeom>
+            </p:spPr>
+          </p:pic>
+        </mc:Fallback>
+      </mc:AlternateContent>
     </p:spTree>
     <p:extLst>
       <p:ext uri="{BB962C8B-B14F-4D97-AF65-F5344CB8AC3E}">
@@ -22507,6 +24698,57 @@
           </a:p>
         </p:txBody>
       </p:sp>
+      <mc:AlternateContent xmlns:mc="http://schemas.openxmlformats.org/markup-compatibility/2006">
+        <mc:Choice xmlns:p14="http://schemas.microsoft.com/office/powerpoint/2010/main" Requires="p14">
+          <p:contentPart p14:bwMode="auto" r:id="rId2">
+            <p14:nvContentPartPr>
+              <p14:cNvPr id="6" name="Ink 5">
+                <a:extLst>
+                  <a:ext uri="{FF2B5EF4-FFF2-40B4-BE49-F238E27FC236}">
+                    <a16:creationId xmlns:a16="http://schemas.microsoft.com/office/drawing/2014/main" id="{0818B8BF-DF12-5950-FBC2-EAF4848C250C}"/>
+                  </a:ext>
+                </a:extLst>
+              </p14:cNvPr>
+              <p14:cNvContentPartPr/>
+              <p14:nvPr/>
+            </p14:nvContentPartPr>
+            <p14:xfrm>
+              <a:off x="1725480" y="1971720"/>
+              <a:ext cx="7096680" cy="3405600"/>
+            </p14:xfrm>
+          </p:contentPart>
+        </mc:Choice>
+        <mc:Fallback>
+          <p:pic>
+            <p:nvPicPr>
+              <p:cNvPr id="6" name="Ink 5">
+                <a:extLst>
+                  <a:ext uri="{FF2B5EF4-FFF2-40B4-BE49-F238E27FC236}">
+                    <a16:creationId xmlns:a16="http://schemas.microsoft.com/office/drawing/2014/main" id="{0818B8BF-DF12-5950-FBC2-EAF4848C250C}"/>
+                  </a:ext>
+                </a:extLst>
+              </p:cNvPr>
+              <p:cNvPicPr/>
+              <p:nvPr/>
+            </p:nvPicPr>
+            <p:blipFill>
+              <a:blip r:embed="rId3"/>
+              <a:stretch>
+                <a:fillRect/>
+              </a:stretch>
+            </p:blipFill>
+            <p:spPr>
+              <a:xfrm>
+                <a:off x="1716120" y="1962360"/>
+                <a:ext cx="7115400" cy="3424320"/>
+              </a:xfrm>
+              <a:prstGeom prst="rect">
+                <a:avLst/>
+              </a:prstGeom>
+            </p:spPr>
+          </p:pic>
+        </mc:Fallback>
+      </mc:AlternateContent>
     </p:spTree>
     <p:extLst>
       <p:ext uri="{BB962C8B-B14F-4D97-AF65-F5344CB8AC3E}">

</xml_diff>